<commit_message>
Aggiunte le analisi statistiche, modificata la presetnazione, bug fix
</commit_message>
<xml_diff>
--- a/altro/Presentazione_risultati.pptx
+++ b/altro/Presentazione_risultati.pptx
@@ -126,6 +126,7 @@
 <file path=ppt/revisionInfo.xml><?xml version="1.0" encoding="utf-8"?>
 <p1510:revInfo xmlns:a="http://schemas.openxmlformats.org/drawingml/2006/main" xmlns:r="http://schemas.openxmlformats.org/officeDocument/2006/relationships" xmlns:p1510="http://schemas.microsoft.com/office/powerpoint/2015/10/main">
   <p1510:revLst>
+    <p1510:client id="{81EC2F62-2733-048C-7502-79C1B40CAA66}" v="150" dt="2024-11-05T21:59:16.797"/>
     <p1510:client id="{8206CC87-374E-0244-1595-B5ADA5FB0999}" v="93" dt="2024-11-05T12:11:33.041"/>
     <p1510:client id="{EE52808C-FFD0-DD79-1A99-C4822EF6D9B5}" v="1640" dt="2024-11-04T18:09:24.816"/>
   </p1510:revLst>
@@ -4179,7 +4180,35 @@
                 <a:ea typeface="+mn-lt"/>
                 <a:cs typeface="+mn-lt"/>
               </a:rPr>
-              <a:t>: </a:t>
+              <a:t>: 29069.204 </a:t>
+            </a:r>
+            <a:r>
+              <a:rPr lang="en-US" sz="2000" dirty="0" err="1">
+                <a:ea typeface="+mn-lt"/>
+                <a:cs typeface="+mn-lt"/>
+              </a:rPr>
+              <a:t>ms</a:t>
+            </a:r>
+            <a:r>
+              <a:rPr lang="en-US" sz="2000" dirty="0">
+                <a:ea typeface="+mn-lt"/>
+                <a:cs typeface="+mn-lt"/>
+              </a:rPr>
+              <a:t> (0:0:29:69  </a:t>
+            </a:r>
+            <a:r>
+              <a:rPr lang="en-US" sz="2000" dirty="0" err="1">
+                <a:ea typeface="+mn-lt"/>
+                <a:cs typeface="+mn-lt"/>
+              </a:rPr>
+              <a:t>ore:minuti:secondi:millisecondi</a:t>
+            </a:r>
+            <a:r>
+              <a:rPr lang="en-US" sz="2000" dirty="0">
+                <a:ea typeface="+mn-lt"/>
+                <a:cs typeface="+mn-lt"/>
+              </a:rPr>
+              <a:t>)</a:t>
             </a:r>
           </a:p>
           <a:p>
@@ -4215,7 +4244,35 @@
                 <a:ea typeface="+mn-lt"/>
                 <a:cs typeface="+mn-lt"/>
               </a:rPr>
-              <a:t> </a:t>
+              <a:t> 372010 </a:t>
+            </a:r>
+            <a:r>
+              <a:rPr lang="en-US" sz="2000" dirty="0" err="1">
+                <a:ea typeface="+mn-lt"/>
+                <a:cs typeface="+mn-lt"/>
+              </a:rPr>
+              <a:t>ms</a:t>
+            </a:r>
+            <a:r>
+              <a:rPr lang="en-US" sz="2000" dirty="0">
+                <a:ea typeface="+mn-lt"/>
+                <a:cs typeface="+mn-lt"/>
+              </a:rPr>
+              <a:t> (0:6:12:10  </a:t>
+            </a:r>
+            <a:r>
+              <a:rPr lang="en-US" sz="2000" dirty="0" err="1">
+                <a:ea typeface="+mn-lt"/>
+                <a:cs typeface="+mn-lt"/>
+              </a:rPr>
+              <a:t>ore:minuti:secondi:millisecondi</a:t>
+            </a:r>
+            <a:r>
+              <a:rPr lang="en-US" sz="2000" dirty="0">
+                <a:ea typeface="+mn-lt"/>
+                <a:cs typeface="+mn-lt"/>
+              </a:rPr>
+              <a:t>)</a:t>
             </a:r>
           </a:p>
           <a:p>
@@ -4258,7 +4315,7 @@
                 <a:ea typeface="+mn-lt"/>
                 <a:cs typeface="+mn-lt"/>
               </a:rPr>
-              <a:t> </a:t>
+              <a:t>  239,240,241,242,243</a:t>
             </a:r>
           </a:p>
           <a:p>
@@ -4279,6 +4336,34 @@
               </a:rPr>
               <a:t>: </a:t>
             </a:r>
+            <a:r>
+              <a:rPr lang="en-US" sz="2000" dirty="0" err="1">
+                <a:ea typeface="+mn-lt"/>
+                <a:cs typeface="+mn-lt"/>
+              </a:rPr>
+              <a:t>ones_before</a:t>
+            </a:r>
+            <a:r>
+              <a:rPr lang="en-US" sz="2000" dirty="0">
+                <a:ea typeface="+mn-lt"/>
+                <a:cs typeface="+mn-lt"/>
+              </a:rPr>
+              <a:t>: 40 </a:t>
+            </a:r>
+            <a:r>
+              <a:rPr lang="en-US" sz="2000" dirty="0" err="1">
+                <a:ea typeface="+mn-lt"/>
+                <a:cs typeface="+mn-lt"/>
+              </a:rPr>
+              <a:t>ones_after</a:t>
+            </a:r>
+            <a:r>
+              <a:rPr lang="en-US" sz="2000" dirty="0">
+                <a:ea typeface="+mn-lt"/>
+                <a:cs typeface="+mn-lt"/>
+              </a:rPr>
+              <a:t>: 122 human evaluation impact: 82</a:t>
+            </a:r>
             <a:endParaRPr lang="en-US" sz="2000" dirty="0"/>
           </a:p>
           <a:p>
@@ -4342,7 +4427,7 @@
                 <a:ea typeface="+mn-lt"/>
                 <a:cs typeface="+mn-lt"/>
               </a:rPr>
-              <a:t>:  </a:t>
+              <a:t>: 0.122 </a:t>
             </a:r>
             <a:r>
               <a:rPr lang="en-US" sz="2000" b="1" dirty="0">
@@ -4379,10 +4464,13 @@
               </a:rPr>
               <a:t>):</a:t>
             </a:r>
-            <a:endParaRPr lang="en-US" sz="2000" dirty="0">
-              <a:ea typeface="+mn-lt"/>
-              <a:cs typeface="+mn-lt"/>
-            </a:endParaRPr>
+            <a:r>
+              <a:rPr lang="en-US" sz="2000" dirty="0">
+                <a:ea typeface="+mn-lt"/>
+                <a:cs typeface="+mn-lt"/>
+              </a:rPr>
+              <a:t>0.374</a:t>
+            </a:r>
           </a:p>
           <a:p>
             <a:endParaRPr lang="en-US" sz="2000" dirty="0"/>
@@ -4823,7 +4911,7 @@
           <p:nvPr>
             <p:extLst>
               <p:ext uri="{D42A27DB-BD31-4B8C-83A1-F6EECF244321}">
-                <p14:modId xmlns:p14="http://schemas.microsoft.com/office/powerpoint/2010/main" val="89512623"/>
+                <p14:modId xmlns:p14="http://schemas.microsoft.com/office/powerpoint/2010/main" val="2238163137"/>
               </p:ext>
             </p:extLst>
           </p:nvPr>
@@ -4983,7 +5071,13 @@
                       <a:pPr lvl="0">
                         <a:buNone/>
                       </a:pPr>
-                      <a:endParaRPr lang="en-US" sz="1800" b="0" i="0" u="none" strike="noStrike" noProof="0" dirty="0"/>
+                      <a:r>
+                        <a:rPr lang="en-US" sz="1800" b="0" i="0" u="none" strike="noStrike" noProof="0" dirty="0">
+                          <a:latin typeface="Neue Haas Grotesk Text Pro"/>
+                        </a:rPr>
+                        <a:t>0.483</a:t>
+                      </a:r>
+                      <a:endParaRPr lang="en-US" dirty="0"/>
                     </a:p>
                   </a:txBody>
                   <a:tcPr/>
@@ -5009,7 +5103,13 @@
                       <a:pPr lvl="0">
                         <a:buNone/>
                       </a:pPr>
-                      <a:endParaRPr lang="en-US" sz="1800" b="0" i="0" u="none" strike="noStrike" noProof="0" dirty="0"/>
+                      <a:r>
+                        <a:rPr lang="en-US" sz="1800" b="0" i="0" u="none" strike="noStrike" noProof="0" dirty="0">
+                          <a:latin typeface="Neue Haas Grotesk Text Pro"/>
+                        </a:rPr>
+                        <a:t>0.483</a:t>
+                      </a:r>
+                      <a:endParaRPr lang="en-US" dirty="0"/>
                     </a:p>
                   </a:txBody>
                   <a:tcPr/>
@@ -5064,7 +5164,13 @@
                       <a:pPr lvl="0">
                         <a:buNone/>
                       </a:pPr>
-                      <a:endParaRPr lang="en-US" sz="1800" b="0" i="0" u="none" strike="noStrike" noProof="0" dirty="0"/>
+                      <a:r>
+                        <a:rPr lang="en-US" sz="1800" b="0" i="0" u="none" strike="noStrike" noProof="0" dirty="0">
+                          <a:latin typeface="Neue Haas Grotesk Text Pro"/>
+                        </a:rPr>
+                        <a:t>0.565</a:t>
+                      </a:r>
+                      <a:endParaRPr lang="en-US" dirty="0"/>
                     </a:p>
                   </a:txBody>
                   <a:tcPr/>
@@ -5099,7 +5205,13 @@
                       <a:pPr lvl="0">
                         <a:buNone/>
                       </a:pPr>
-                      <a:endParaRPr lang="en-US" sz="1800" b="0" i="0" u="none" strike="noStrike" noProof="0" dirty="0"/>
+                      <a:r>
+                        <a:rPr lang="en-US" sz="1800" b="0" i="0" u="none" strike="noStrike" noProof="0" dirty="0">
+                          <a:latin typeface="Neue Haas Grotesk Text Pro"/>
+                        </a:rPr>
+                        <a:t>0.465</a:t>
+                      </a:r>
+                      <a:endParaRPr lang="en-US" dirty="0"/>
                     </a:p>
                   </a:txBody>
                   <a:tcPr/>
@@ -5154,7 +5266,13 @@
                       <a:pPr lvl="0">
                         <a:buNone/>
                       </a:pPr>
-                      <a:endParaRPr lang="en-US" sz="1800" b="0" i="0" u="none" strike="noStrike" noProof="0" dirty="0"/>
+                      <a:r>
+                        <a:rPr lang="en-US" sz="1800" b="0" i="0" u="none" strike="noStrike" noProof="0" dirty="0">
+                          <a:latin typeface="Neue Haas Grotesk Text Pro"/>
+                        </a:rPr>
+                        <a:t>0.677</a:t>
+                      </a:r>
+                      <a:endParaRPr lang="en-US" dirty="0"/>
                     </a:p>
                   </a:txBody>
                   <a:tcPr/>
@@ -5189,7 +5307,13 @@
                       <a:pPr lvl="0">
                         <a:buNone/>
                       </a:pPr>
-                      <a:endParaRPr lang="en-US" sz="1800" b="0" i="0" u="none" strike="noStrike" noProof="0" dirty="0"/>
+                      <a:r>
+                        <a:rPr lang="en-US" sz="1800" b="0" i="0" u="none" strike="noStrike" noProof="0" dirty="0">
+                          <a:latin typeface="Neue Haas Grotesk Text Pro"/>
+                        </a:rPr>
+                        <a:t>0.556</a:t>
+                      </a:r>
+                      <a:endParaRPr lang="en-US" dirty="0"/>
                     </a:p>
                   </a:txBody>
                   <a:tcPr/>
@@ -5244,7 +5368,13 @@
                       <a:pPr lvl="0">
                         <a:buNone/>
                       </a:pPr>
-                      <a:endParaRPr lang="en-US" sz="1800" b="0" i="0" u="none" strike="noStrike" noProof="0" dirty="0"/>
+                      <a:r>
+                        <a:rPr lang="en-US" sz="1800" b="0" i="0" u="none" strike="noStrike" noProof="0" dirty="0">
+                          <a:latin typeface="Neue Haas Grotesk Text Pro"/>
+                        </a:rPr>
+                        <a:t>0.550</a:t>
+                      </a:r>
+                      <a:endParaRPr lang="en-US" dirty="0"/>
                     </a:p>
                   </a:txBody>
                   <a:tcPr/>
@@ -5279,7 +5409,13 @@
                       <a:pPr lvl="0">
                         <a:buNone/>
                       </a:pPr>
-                      <a:endParaRPr lang="en-US" sz="1800" b="0" i="0" u="none" strike="noStrike" noProof="0" dirty="0"/>
+                      <a:r>
+                        <a:rPr lang="en-US" sz="1800" b="0" i="0" u="none" strike="noStrike" noProof="0" dirty="0">
+                          <a:latin typeface="Neue Haas Grotesk Text Pro"/>
+                        </a:rPr>
+                        <a:t>0.453</a:t>
+                      </a:r>
+                      <a:endParaRPr lang="en-US" dirty="0"/>
                     </a:p>
                   </a:txBody>
                   <a:tcPr/>
@@ -5337,7 +5473,13 @@
                       <a:pPr lvl="0">
                         <a:buNone/>
                       </a:pPr>
-                      <a:endParaRPr lang="en-US" sz="1800" b="0" i="0" u="none" strike="noStrike" noProof="0" dirty="0"/>
+                      <a:r>
+                        <a:rPr lang="en-US" sz="1800" b="0" i="0" u="none" strike="noStrike" noProof="0" dirty="0">
+                          <a:latin typeface="Neue Haas Grotesk Text Pro"/>
+                        </a:rPr>
+                        <a:t>0.503</a:t>
+                      </a:r>
+                      <a:endParaRPr lang="en-US" dirty="0"/>
                     </a:p>
                   </a:txBody>
                   <a:tcPr/>
@@ -5372,7 +5514,13 @@
                       <a:pPr lvl="0">
                         <a:buNone/>
                       </a:pPr>
-                      <a:endParaRPr lang="en-US" sz="1800" b="0" i="0" u="none" strike="noStrike" noProof="0" dirty="0"/>
+                      <a:r>
+                        <a:rPr lang="en-US" sz="1800" b="0" i="0" u="none" strike="noStrike" noProof="0" dirty="0">
+                          <a:latin typeface="Neue Haas Grotesk Text Pro"/>
+                        </a:rPr>
+                        <a:t>0.427</a:t>
+                      </a:r>
+                      <a:endParaRPr lang="en-US" dirty="0"/>
                     </a:p>
                   </a:txBody>
                   <a:tcPr/>
@@ -5427,7 +5575,13 @@
                       <a:pPr lvl="0">
                         <a:buNone/>
                       </a:pPr>
-                      <a:endParaRPr lang="en-US" sz="1800" b="0" i="0" u="none" strike="noStrike" noProof="0" dirty="0"/>
+                      <a:r>
+                        <a:rPr lang="en-US" sz="1800" b="0" i="0" u="none" strike="noStrike" noProof="0" dirty="0">
+                          <a:latin typeface="Neue Haas Grotesk Text Pro"/>
+                        </a:rPr>
+                        <a:t>0.510</a:t>
+                      </a:r>
+                      <a:endParaRPr lang="en-US" dirty="0"/>
                     </a:p>
                   </a:txBody>
                   <a:tcPr/>
@@ -5462,7 +5616,13 @@
                       <a:pPr lvl="0">
                         <a:buNone/>
                       </a:pPr>
-                      <a:endParaRPr lang="en-US" sz="1800" b="0" i="0" u="none" strike="noStrike" noProof="0" dirty="0"/>
+                      <a:r>
+                        <a:rPr lang="en-US" sz="1800" b="0" i="0" u="none" strike="noStrike" noProof="0" dirty="0">
+                          <a:latin typeface="Neue Haas Grotesk Text Pro"/>
+                        </a:rPr>
+                        <a:t>0.425</a:t>
+                      </a:r>
+                      <a:endParaRPr lang="en-US" dirty="0"/>
                     </a:p>
                   </a:txBody>
                   <a:tcPr/>
@@ -5520,7 +5680,13 @@
                       <a:pPr lvl="0">
                         <a:buNone/>
                       </a:pPr>
-                      <a:endParaRPr lang="en-US" sz="1800" b="0" i="0" u="none" strike="noStrike" noProof="0" dirty="0"/>
+                      <a:r>
+                        <a:rPr lang="en-US" sz="1800" b="0" i="0" u="none" strike="noStrike" noProof="0" dirty="0">
+                          <a:latin typeface="Neue Haas Grotesk Text Pro"/>
+                        </a:rPr>
+                        <a:t>0.589</a:t>
+                      </a:r>
+                      <a:endParaRPr lang="en-US" dirty="0"/>
                     </a:p>
                   </a:txBody>
                   <a:tcPr/>
@@ -5555,7 +5721,13 @@
                       <a:pPr lvl="0">
                         <a:buNone/>
                       </a:pPr>
-                      <a:endParaRPr lang="en-US" sz="1800" b="0" i="0" u="none" strike="noStrike" noProof="0" dirty="0"/>
+                      <a:r>
+                        <a:rPr lang="en-US" sz="1800" b="0" i="0" u="none" strike="noStrike" noProof="0" dirty="0">
+                          <a:latin typeface="Neue Haas Grotesk Text Pro"/>
+                        </a:rPr>
+                        <a:t>0.487</a:t>
+                      </a:r>
+                      <a:endParaRPr lang="en-US" dirty="0"/>
                     </a:p>
                   </a:txBody>
                   <a:tcPr/>
@@ -6028,7 +6200,7 @@
           <p:nvPr>
             <p:extLst>
               <p:ext uri="{D42A27DB-BD31-4B8C-83A1-F6EECF244321}">
-                <p14:modId xmlns:p14="http://schemas.microsoft.com/office/powerpoint/2010/main" val="164369329"/>
+                <p14:modId xmlns:p14="http://schemas.microsoft.com/office/powerpoint/2010/main" val="844531783"/>
               </p:ext>
             </p:extLst>
           </p:nvPr>
@@ -6084,6 +6256,15 @@
                     <a:bodyPr/>
                     <a:lstStyle/>
                     <a:p>
+                      <a:pPr lvl="0">
+                        <a:buNone/>
+                      </a:pPr>
+                      <a:r>
+                        <a:rPr lang="en-US" sz="1800" b="0" i="0" u="none" strike="noStrike" noProof="0" dirty="0">
+                          <a:latin typeface="Neue Haas Grotesk Text Pro"/>
+                        </a:rPr>
+                        <a:t>0.75</a:t>
+                      </a:r>
                       <a:endParaRPr lang="en-US" dirty="0"/>
                     </a:p>
                   </a:txBody>
@@ -6120,6 +6301,15 @@
                     <a:bodyPr/>
                     <a:lstStyle/>
                     <a:p>
+                      <a:pPr lvl="0">
+                        <a:buNone/>
+                      </a:pPr>
+                      <a:r>
+                        <a:rPr lang="en-US" sz="1800" b="0" i="0" u="none" strike="noStrike" noProof="0" dirty="0">
+                          <a:latin typeface="Neue Haas Grotesk Text Pro"/>
+                        </a:rPr>
+                        <a:t>0.5</a:t>
+                      </a:r>
                       <a:endParaRPr lang="en-US" dirty="0"/>
                     </a:p>
                   </a:txBody>
@@ -6159,9 +6349,11 @@
                       <a:pPr lvl="0">
                         <a:buNone/>
                       </a:pPr>
-                      <a:endParaRPr lang="en-US" sz="1800" b="0" i="0" u="none" strike="noStrike" noProof="0" dirty="0">
-                        <a:latin typeface="Neue Haas Grotesk Text Pro"/>
-                      </a:endParaRPr>
+                      <a:r>
+                        <a:rPr lang="en-US" sz="1800" b="0" i="0" u="none" strike="noStrike" noProof="0" dirty="0"/>
+                        <a:t>0.333</a:t>
+                      </a:r>
+                      <a:endParaRPr lang="en-US" dirty="0"/>
                     </a:p>
                   </a:txBody>
                   <a:tcPr/>
@@ -6200,9 +6392,11 @@
                       <a:pPr lvl="0">
                         <a:buNone/>
                       </a:pPr>
-                      <a:endParaRPr lang="en-US" sz="1800" b="0" i="0" u="none" strike="noStrike" noProof="0" dirty="0">
-                        <a:latin typeface="Neue Haas Grotesk Text Pro"/>
-                      </a:endParaRPr>
+                      <a:r>
+                        <a:rPr lang="en-US" sz="1800" b="0" i="0" u="none" strike="noStrike" noProof="0" dirty="0"/>
+                        <a:t>0.3</a:t>
+                      </a:r>
+                      <a:endParaRPr lang="en-US" dirty="0"/>
                     </a:p>
                   </a:txBody>
                   <a:tcPr/>
@@ -6239,9 +6433,11 @@
                       <a:pPr lvl="0">
                         <a:buNone/>
                       </a:pPr>
-                      <a:endParaRPr lang="en-US" sz="1800" b="0" i="0" u="none" strike="noStrike" noProof="0" dirty="0">
-                        <a:latin typeface="Neue Haas Grotesk Text Pro"/>
-                      </a:endParaRPr>
+                      <a:r>
+                        <a:rPr lang="en-US" sz="1800" b="0" i="0" u="none" strike="noStrike" noProof="0" dirty="0"/>
+                        <a:t>0.125</a:t>
+                      </a:r>
+                      <a:endParaRPr lang="en-US" dirty="0"/>
                     </a:p>
                   </a:txBody>
                   <a:tcPr/>
@@ -6280,9 +6476,11 @@
                       <a:pPr lvl="0">
                         <a:buNone/>
                       </a:pPr>
-                      <a:endParaRPr lang="en-US" sz="1800" b="0" i="0" u="none" strike="noStrike" noProof="0" dirty="0">
-                        <a:latin typeface="Neue Haas Grotesk Text Pro"/>
-                      </a:endParaRPr>
+                      <a:r>
+                        <a:rPr lang="en-US" sz="1800" b="0" i="0" u="none" strike="noStrike" noProof="0" dirty="0"/>
+                        <a:t>0.333</a:t>
+                      </a:r>
+                      <a:endParaRPr lang="en-US" dirty="0"/>
                     </a:p>
                   </a:txBody>
                   <a:tcPr/>
@@ -6319,9 +6517,11 @@
                       <a:pPr lvl="0">
                         <a:buNone/>
                       </a:pPr>
-                      <a:endParaRPr lang="en-US" sz="1800" b="0" i="0" u="none" strike="noStrike" noProof="0" dirty="0">
-                        <a:latin typeface="Neue Haas Grotesk Text Pro"/>
-                      </a:endParaRPr>
+                      <a:r>
+                        <a:rPr lang="en-US" sz="1800" b="0" i="0" u="none" strike="noStrike" noProof="0" dirty="0"/>
+                        <a:t>0.125</a:t>
+                      </a:r>
+                      <a:endParaRPr lang="en-US" dirty="0"/>
                     </a:p>
                   </a:txBody>
                   <a:tcPr/>
@@ -6360,9 +6560,11 @@
                       <a:pPr lvl="0">
                         <a:buNone/>
                       </a:pPr>
-                      <a:endParaRPr lang="en-US" sz="1800" b="0" i="0" u="none" strike="noStrike" noProof="0" dirty="0">
-                        <a:latin typeface="Neue Haas Grotesk Text Pro"/>
-                      </a:endParaRPr>
+                      <a:r>
+                        <a:rPr lang="en-US" sz="1800" b="0" i="0" u="none" strike="noStrike" noProof="0" dirty="0"/>
+                        <a:t>0.3</a:t>
+                      </a:r>
+                      <a:endParaRPr lang="en-US" dirty="0"/>
                     </a:p>
                   </a:txBody>
                   <a:tcPr/>
@@ -6399,9 +6601,12 @@
                       <a:pPr lvl="0">
                         <a:buNone/>
                       </a:pPr>
-                      <a:endParaRPr lang="en-US" sz="1800" b="0" i="0" u="none" strike="noStrike" noProof="0" dirty="0">
-                        <a:latin typeface="Neue Haas Grotesk Text Pro"/>
-                      </a:endParaRPr>
+                      <a:r>
+                        <a:rPr lang="en-US" sz="1800" b="0" i="0" u="none" strike="noStrike" noProof="0" dirty="0">
+                          <a:latin typeface="Neue Haas Grotesk Text Pro"/>
+                        </a:rPr>
+                        <a:t>0</a:t>
+                      </a:r>
                     </a:p>
                   </a:txBody>
                   <a:tcPr/>
@@ -6440,6 +6645,12 @@
                       <a:pPr lvl="0">
                         <a:buNone/>
                       </a:pPr>
+                      <a:r>
+                        <a:rPr lang="en-US" sz="1800" b="0" i="0" u="none" strike="noStrike" noProof="0" dirty="0">
+                          <a:latin typeface="Neue Haas Grotesk Text Pro"/>
+                        </a:rPr>
+                        <a:t>0.5</a:t>
+                      </a:r>
                       <a:endParaRPr lang="en-US" dirty="0"/>
                     </a:p>
                   </a:txBody>
@@ -6477,9 +6688,11 @@
                       <a:pPr lvl="0">
                         <a:buNone/>
                       </a:pPr>
-                      <a:endParaRPr lang="en-US" sz="1800" b="0" i="0" u="none" strike="noStrike" noProof="0" dirty="0">
-                        <a:latin typeface="Neue Haas Grotesk Text Pro"/>
-                      </a:endParaRPr>
+                      <a:r>
+                        <a:rPr lang="en-US" sz="1800" b="0" i="0" u="none" strike="noStrike" noProof="0" dirty="0"/>
+                        <a:t>0.333</a:t>
+                      </a:r>
+                      <a:endParaRPr lang="en-US" dirty="0"/>
                     </a:p>
                   </a:txBody>
                   <a:tcPr/>
@@ -6518,9 +6731,11 @@
                       <a:pPr lvl="0">
                         <a:buNone/>
                       </a:pPr>
-                      <a:endParaRPr lang="en-US" sz="1800" b="0" i="0" u="none" strike="noStrike" noProof="0" dirty="0">
-                        <a:latin typeface="Neue Haas Grotesk Text Pro"/>
-                      </a:endParaRPr>
+                      <a:r>
+                        <a:rPr lang="en-US" sz="1800" b="0" i="0" u="none" strike="noStrike" noProof="0" dirty="0"/>
+                        <a:t>0.333</a:t>
+                      </a:r>
+                      <a:endParaRPr lang="en-US" dirty="0"/>
                     </a:p>
                   </a:txBody>
                   <a:tcPr/>

</xml_diff>

<commit_message>
Aggiunta documentazione, modificata la presentazione
</commit_message>
<xml_diff>
--- a/altro/Presentazione_risultati.pptx
+++ b/altro/Presentazione_risultati.pptx
@@ -20,7 +20,8 @@
     <p:sldId id="267" r:id="rId14"/>
     <p:sldId id="266" r:id="rId15"/>
     <p:sldId id="265" r:id="rId16"/>
-    <p:sldId id="271" r:id="rId17"/>
+    <p:sldId id="273" r:id="rId17"/>
+    <p:sldId id="271" r:id="rId18"/>
   </p:sldIdLst>
   <p:sldSz cx="12192000" cy="6858000"/>
   <p:notesSz cx="6858000" cy="9144000"/>
@@ -132,7 +133,7 @@
   <p1510:revLst>
     <p1510:client id="{203135A6-A33B-A01C-9C59-5FC4F72485A0}" v="941" dt="2024-11-06T19:03:16.653"/>
     <p1510:client id="{81EC2F62-2733-048C-7502-79C1B40CAA66}" v="150" dt="2024-11-05T21:59:16.797"/>
-    <p1510:client id="{8206CC87-374E-0244-1595-B5ADA5FB0999}" v="93" dt="2024-11-05T12:11:33.041"/>
+    <p1510:client id="{B634F85E-07EB-B30A-AEFD-5C513E62976F}" v="246" dt="2024-11-07T14:37:56.727"/>
   </p1510:revLst>
 </p1510:revInfo>
 </file>
@@ -291,7 +292,7 @@
           <a:p>
             <a:fld id="{A1E45834-53BD-4C8F-B791-CD5378F4150E}" type="datetimeFigureOut">
               <a:rPr lang="en-US" smtClean="0"/>
-              <a:t>11/6/2024</a:t>
+              <a:t>11/7/2024</a:t>
             </a:fld>
             <a:endParaRPr lang="en-US"/>
           </a:p>
@@ -489,7 +490,7 @@
           <a:p>
             <a:fld id="{A1E45834-53BD-4C8F-B791-CD5378F4150E}" type="datetimeFigureOut">
               <a:rPr lang="en-US" smtClean="0"/>
-              <a:t>11/6/2024</a:t>
+              <a:t>11/7/2024</a:t>
             </a:fld>
             <a:endParaRPr lang="en-US"/>
           </a:p>
@@ -697,7 +698,7 @@
           <a:p>
             <a:fld id="{A1E45834-53BD-4C8F-B791-CD5378F4150E}" type="datetimeFigureOut">
               <a:rPr lang="en-US" smtClean="0"/>
-              <a:t>11/6/2024</a:t>
+              <a:t>11/7/2024</a:t>
             </a:fld>
             <a:endParaRPr lang="en-US"/>
           </a:p>
@@ -938,7 +939,7 @@
           <a:p>
             <a:fld id="{A1E45834-53BD-4C8F-B791-CD5378F4150E}" type="datetimeFigureOut">
               <a:rPr lang="en-US" smtClean="0"/>
-              <a:t>11/6/2024</a:t>
+              <a:t>11/7/2024</a:t>
             </a:fld>
             <a:endParaRPr lang="en-US"/>
           </a:p>
@@ -1216,7 +1217,7 @@
           <a:p>
             <a:fld id="{A1E45834-53BD-4C8F-B791-CD5378F4150E}" type="datetimeFigureOut">
               <a:rPr lang="en-US" smtClean="0"/>
-              <a:t>11/6/2024</a:t>
+              <a:t>11/7/2024</a:t>
             </a:fld>
             <a:endParaRPr lang="en-US"/>
           </a:p>
@@ -1486,7 +1487,7 @@
           <a:p>
             <a:fld id="{A1E45834-53BD-4C8F-B791-CD5378F4150E}" type="datetimeFigureOut">
               <a:rPr lang="en-US" smtClean="0"/>
-              <a:t>11/6/2024</a:t>
+              <a:t>11/7/2024</a:t>
             </a:fld>
             <a:endParaRPr lang="en-US"/>
           </a:p>
@@ -1908,7 +1909,7 @@
           <a:p>
             <a:fld id="{A1E45834-53BD-4C8F-B791-CD5378F4150E}" type="datetimeFigureOut">
               <a:rPr lang="en-US" smtClean="0"/>
-              <a:t>11/6/2024</a:t>
+              <a:t>11/7/2024</a:t>
             </a:fld>
             <a:endParaRPr lang="en-US"/>
           </a:p>
@@ -2053,7 +2054,7 @@
           <a:p>
             <a:fld id="{A1E45834-53BD-4C8F-B791-CD5378F4150E}" type="datetimeFigureOut">
               <a:rPr lang="en-US" smtClean="0"/>
-              <a:t>11/6/2024</a:t>
+              <a:t>11/7/2024</a:t>
             </a:fld>
             <a:endParaRPr lang="en-US"/>
           </a:p>
@@ -2166,7 +2167,7 @@
           <a:p>
             <a:fld id="{A1E45834-53BD-4C8F-B791-CD5378F4150E}" type="datetimeFigureOut">
               <a:rPr lang="en-US" smtClean="0"/>
-              <a:t>11/6/2024</a:t>
+              <a:t>11/7/2024</a:t>
             </a:fld>
             <a:endParaRPr lang="en-US"/>
           </a:p>
@@ -2480,7 +2481,7 @@
           <a:p>
             <a:fld id="{A1E45834-53BD-4C8F-B791-CD5378F4150E}" type="datetimeFigureOut">
               <a:rPr lang="en-US" smtClean="0"/>
-              <a:t>11/6/2024</a:t>
+              <a:t>11/7/2024</a:t>
             </a:fld>
             <a:endParaRPr lang="en-US"/>
           </a:p>
@@ -2774,7 +2775,7 @@
           <a:p>
             <a:fld id="{A1E45834-53BD-4C8F-B791-CD5378F4150E}" type="datetimeFigureOut">
               <a:rPr lang="en-US" smtClean="0"/>
-              <a:t>11/6/2024</a:t>
+              <a:t>11/7/2024</a:t>
             </a:fld>
             <a:endParaRPr lang="en-US"/>
           </a:p>
@@ -3013,7 +3014,7 @@
           <a:p>
             <a:fld id="{A1E45834-53BD-4C8F-B791-CD5378F4150E}" type="datetimeFigureOut">
               <a:rPr lang="en-US" smtClean="0"/>
-              <a:t>11/6/2024</a:t>
+              <a:t>11/7/2024</a:t>
             </a:fld>
             <a:endParaRPr lang="en-US"/>
           </a:p>
@@ -9761,6 +9762,848 @@
 <file path=ppt/slides/slide16.xml><?xml version="1.0" encoding="utf-8"?>
 <p:sld xmlns:a="http://schemas.openxmlformats.org/drawingml/2006/main" xmlns:r="http://schemas.openxmlformats.org/officeDocument/2006/relationships" xmlns:p="http://schemas.openxmlformats.org/presentationml/2006/main">
   <p:cSld>
+    <p:bg>
+      <p:bgPr>
+        <a:solidFill>
+          <a:schemeClr val="bg1"/>
+        </a:solidFill>
+        <a:effectLst/>
+      </p:bgPr>
+    </p:bg>
+    <p:spTree>
+      <p:nvGrpSpPr>
+        <p:cNvPr id="1" name=""/>
+        <p:cNvGrpSpPr/>
+        <p:nvPr/>
+      </p:nvGrpSpPr>
+      <p:grpSpPr>
+        <a:xfrm>
+          <a:off x="0" y="0"/>
+          <a:ext cx="0" cy="0"/>
+          <a:chOff x="0" y="0"/>
+          <a:chExt cx="0" cy="0"/>
+        </a:xfrm>
+      </p:grpSpPr>
+      <p:cxnSp>
+        <p:nvCxnSpPr>
+          <p:cNvPr id="18" name="Straight Connector 17">
+            <a:extLst>
+              <a:ext uri="{FF2B5EF4-FFF2-40B4-BE49-F238E27FC236}">
+                <a16:creationId xmlns:a16="http://schemas.microsoft.com/office/drawing/2014/main" id="{D8689CE0-64D2-447C-9C1F-872D111D8AC3}"/>
+              </a:ext>
+              <a:ext uri="{C183D7F6-B498-43B3-948B-1728B52AA6E4}">
+                <adec:decorative xmlns:adec="http://schemas.microsoft.com/office/drawing/2017/decorative" val="1"/>
+              </a:ext>
+            </a:extLst>
+          </p:cNvPr>
+          <p:cNvCxnSpPr>
+            <a:cxnSpLocks noGrp="1" noRot="1" noChangeAspect="1" noMove="1" noResize="1" noEditPoints="1" noAdjustHandles="1" noChangeArrowheads="1" noChangeShapeType="1"/>
+          </p:cNvCxnSpPr>
+          <p:nvPr>
+            <p:extLst>
+              <p:ext uri="{386F3935-93C4-4BCD-93E2-E3B085C9AB24}">
+                <p16:designElem xmlns:p16="http://schemas.microsoft.com/office/powerpoint/2015/main" val="1"/>
+              </p:ext>
+            </p:extLst>
+          </p:nvPr>
+        </p:nvCxnSpPr>
+        <p:spPr>
+          <a:xfrm>
+            <a:off x="0" y="1185205"/>
+            <a:ext cx="804195" cy="0"/>
+          </a:xfrm>
+          <a:prstGeom prst="line">
+            <a:avLst/>
+          </a:prstGeom>
+          <a:ln w="85725">
+            <a:solidFill>
+              <a:schemeClr val="tx1"/>
+            </a:solidFill>
+          </a:ln>
+        </p:spPr>
+        <p:style>
+          <a:lnRef idx="1">
+            <a:schemeClr val="accent1"/>
+          </a:lnRef>
+          <a:fillRef idx="0">
+            <a:schemeClr val="accent1"/>
+          </a:fillRef>
+          <a:effectRef idx="0">
+            <a:schemeClr val="accent1"/>
+          </a:effectRef>
+          <a:fontRef idx="minor">
+            <a:schemeClr val="tx1"/>
+          </a:fontRef>
+        </p:style>
+      </p:cxnSp>
+      <p:sp useBgFill="1">
+        <p:nvSpPr>
+          <p:cNvPr id="20" name="Rectangle 19">
+            <a:extLst>
+              <a:ext uri="{FF2B5EF4-FFF2-40B4-BE49-F238E27FC236}">
+                <a16:creationId xmlns:a16="http://schemas.microsoft.com/office/drawing/2014/main" id="{511C99DC-C3C5-4EBE-91DD-345109C3D6E0}"/>
+              </a:ext>
+              <a:ext uri="{C183D7F6-B498-43B3-948B-1728B52AA6E4}">
+                <adec:decorative xmlns:adec="http://schemas.microsoft.com/office/drawing/2017/decorative" val="1"/>
+              </a:ext>
+            </a:extLst>
+          </p:cNvPr>
+          <p:cNvSpPr>
+            <a:spLocks noGrp="1" noRot="1" noChangeAspect="1" noMove="1" noResize="1" noEditPoints="1" noAdjustHandles="1" noChangeArrowheads="1" noChangeShapeType="1" noTextEdit="1"/>
+          </p:cNvSpPr>
+          <p:nvPr>
+            <p:extLst>
+              <p:ext uri="{386F3935-93C4-4BCD-93E2-E3B085C9AB24}">
+                <p16:designElem xmlns:p16="http://schemas.microsoft.com/office/powerpoint/2015/main" val="1"/>
+              </p:ext>
+            </p:extLst>
+          </p:nvPr>
+        </p:nvSpPr>
+        <p:spPr>
+          <a:xfrm>
+            <a:off x="0" y="0"/>
+            <a:ext cx="12192000" cy="6858000"/>
+          </a:xfrm>
+          <a:prstGeom prst="rect">
+            <a:avLst/>
+          </a:prstGeom>
+          <a:ln w="12700" cap="flat" cmpd="sng" algn="ctr">
+            <a:noFill/>
+            <a:prstDash val="solid"/>
+            <a:miter lim="800000"/>
+          </a:ln>
+          <a:effectLst/>
+          <a:extLst>
+            <a:ext uri="{91240B29-F687-4F45-9708-019B960494DF}">
+              <a14:hiddenLine xmlns:a14="http://schemas.microsoft.com/office/drawing/2010/main" w="12700" cap="flat" cmpd="sng" algn="ctr">
+                <a:solidFill>
+                  <a:schemeClr val="accent1">
+                    <a:shade val="50000"/>
+                  </a:schemeClr>
+                </a:solidFill>
+                <a:prstDash val="solid"/>
+                <a:miter lim="800000"/>
+              </a14:hiddenLine>
+            </a:ext>
+          </a:extLst>
+        </p:spPr>
+        <p:style>
+          <a:lnRef idx="2">
+            <a:schemeClr val="accent1">
+              <a:shade val="50000"/>
+            </a:schemeClr>
+          </a:lnRef>
+          <a:fillRef idx="1">
+            <a:schemeClr val="accent1"/>
+          </a:fillRef>
+          <a:effectRef idx="0">
+            <a:schemeClr val="accent1"/>
+          </a:effectRef>
+          <a:fontRef idx="minor">
+            <a:schemeClr val="lt1"/>
+          </a:fontRef>
+        </p:style>
+        <p:txBody>
+          <a:bodyPr rtlCol="0" anchor="ctr"/>
+          <a:lstStyle/>
+          <a:p>
+            <a:pPr algn="ctr"/>
+            <a:endParaRPr lang="en-US"/>
+          </a:p>
+        </p:txBody>
+      </p:sp>
+      <p:sp>
+        <p:nvSpPr>
+          <p:cNvPr id="2" name="Title 1">
+            <a:extLst>
+              <a:ext uri="{FF2B5EF4-FFF2-40B4-BE49-F238E27FC236}">
+                <a16:creationId xmlns:a16="http://schemas.microsoft.com/office/drawing/2014/main" id="{AC499DF1-0D29-F059-3D2A-DCFD9A3CAD41}"/>
+              </a:ext>
+            </a:extLst>
+          </p:cNvPr>
+          <p:cNvSpPr>
+            <a:spLocks noGrp="1"/>
+          </p:cNvSpPr>
+          <p:nvPr>
+            <p:ph type="title"/>
+          </p:nvPr>
+        </p:nvSpPr>
+        <p:spPr>
+          <a:xfrm>
+            <a:off x="1044516" y="1187246"/>
+            <a:ext cx="9141351" cy="2352368"/>
+          </a:xfrm>
+        </p:spPr>
+        <p:txBody>
+          <a:bodyPr vert="horz" lIns="91440" tIns="45720" rIns="91440" bIns="45720" rtlCol="0" anchor="t">
+            <a:normAutofit/>
+          </a:bodyPr>
+          <a:lstStyle/>
+          <a:p>
+            <a:r>
+              <a:rPr lang="en-US" sz="2800" cap="all" dirty="0" err="1"/>
+              <a:t>Correlazione</a:t>
+            </a:r>
+            <a:r>
+              <a:rPr lang="en-US" sz="2800" cap="all" dirty="0"/>
+              <a:t> </a:t>
+            </a:r>
+            <a:r>
+              <a:rPr lang="en-US" sz="2800" cap="all" dirty="0" err="1"/>
+              <a:t>globale</a:t>
+            </a:r>
+          </a:p>
+        </p:txBody>
+      </p:sp>
+      <p:cxnSp>
+        <p:nvCxnSpPr>
+          <p:cNvPr id="22" name="Straight Connector 21">
+            <a:extLst>
+              <a:ext uri="{FF2B5EF4-FFF2-40B4-BE49-F238E27FC236}">
+                <a16:creationId xmlns:a16="http://schemas.microsoft.com/office/drawing/2014/main" id="{B0AA360F-DECB-4836-8FB6-22C4BC3FB02D}"/>
+              </a:ext>
+              <a:ext uri="{C183D7F6-B498-43B3-948B-1728B52AA6E4}">
+                <adec:decorative xmlns:adec="http://schemas.microsoft.com/office/drawing/2017/decorative" val="1"/>
+              </a:ext>
+            </a:extLst>
+          </p:cNvPr>
+          <p:cNvCxnSpPr>
+            <a:cxnSpLocks noGrp="1" noRot="1" noChangeAspect="1" noMove="1" noResize="1" noEditPoints="1" noAdjustHandles="1" noChangeArrowheads="1" noChangeShapeType="1"/>
+          </p:cNvCxnSpPr>
+          <p:nvPr>
+            <p:extLst>
+              <p:ext uri="{386F3935-93C4-4BCD-93E2-E3B085C9AB24}">
+                <p16:designElem xmlns:p16="http://schemas.microsoft.com/office/powerpoint/2015/main" val="1"/>
+              </p:ext>
+            </p:extLst>
+          </p:nvPr>
+        </p:nvCxnSpPr>
+        <p:spPr>
+          <a:xfrm>
+            <a:off x="-7684" y="1186792"/>
+            <a:ext cx="804195" cy="0"/>
+          </a:xfrm>
+          <a:prstGeom prst="line">
+            <a:avLst/>
+          </a:prstGeom>
+          <a:ln w="85725">
+            <a:solidFill>
+              <a:schemeClr val="tx1"/>
+            </a:solidFill>
+          </a:ln>
+        </p:spPr>
+        <p:style>
+          <a:lnRef idx="1">
+            <a:schemeClr val="accent1"/>
+          </a:lnRef>
+          <a:fillRef idx="0">
+            <a:schemeClr val="accent1"/>
+          </a:fillRef>
+          <a:effectRef idx="0">
+            <a:schemeClr val="accent1"/>
+          </a:effectRef>
+          <a:fontRef idx="minor">
+            <a:schemeClr val="tx1"/>
+          </a:fontRef>
+        </p:style>
+      </p:cxnSp>
+      <p:sp>
+        <p:nvSpPr>
+          <p:cNvPr id="6" name="Content Placeholder 5">
+            <a:extLst>
+              <a:ext uri="{FF2B5EF4-FFF2-40B4-BE49-F238E27FC236}">
+                <a16:creationId xmlns:a16="http://schemas.microsoft.com/office/drawing/2014/main" id="{0ADEF452-779C-4232-E25B-9045183B144B}"/>
+              </a:ext>
+            </a:extLst>
+          </p:cNvPr>
+          <p:cNvSpPr>
+            <a:spLocks noGrp="1"/>
+          </p:cNvSpPr>
+          <p:nvPr>
+            <p:ph idx="1"/>
+          </p:nvPr>
+        </p:nvSpPr>
+        <p:spPr>
+          <a:xfrm>
+            <a:off x="805460" y="1870133"/>
+            <a:ext cx="10524989" cy="483464"/>
+          </a:xfrm>
+        </p:spPr>
+        <p:txBody>
+          <a:bodyPr vert="horz" lIns="91440" tIns="45720" rIns="91440" bIns="45720" rtlCol="0" anchor="t">
+            <a:normAutofit/>
+          </a:bodyPr>
+          <a:lstStyle/>
+          <a:p>
+            <a:pPr marL="0" indent="0">
+              <a:buNone/>
+            </a:pPr>
+            <a:r>
+              <a:rPr lang="en-US" dirty="0"/>
+              <a:t>Si </a:t>
+            </a:r>
+            <a:r>
+              <a:rPr lang="en-US" dirty="0" err="1"/>
+              <a:t>riporta</a:t>
+            </a:r>
+            <a:r>
+              <a:rPr lang="en-US" dirty="0"/>
+              <a:t> di </a:t>
+            </a:r>
+            <a:r>
+              <a:rPr lang="en-US" dirty="0" err="1"/>
+              <a:t>seguito</a:t>
+            </a:r>
+            <a:r>
+              <a:rPr lang="en-US" dirty="0"/>
+              <a:t> la media </a:t>
+            </a:r>
+            <a:r>
+              <a:rPr lang="en-US" dirty="0" err="1"/>
+              <a:t>delle</a:t>
+            </a:r>
+            <a:r>
+              <a:rPr lang="en-US" dirty="0"/>
+              <a:t> </a:t>
+            </a:r>
+            <a:r>
+              <a:rPr lang="en-US" dirty="0" err="1"/>
+              <a:t>correlazioni</a:t>
+            </a:r>
+            <a:r>
+              <a:rPr lang="en-US" dirty="0"/>
+              <a:t> sui 3 </a:t>
+            </a:r>
+            <a:r>
+              <a:rPr lang="en-US" dirty="0" err="1"/>
+              <a:t>modelli</a:t>
+            </a:r>
+            <a:r>
+              <a:rPr lang="en-US" dirty="0"/>
+              <a:t> </a:t>
+            </a:r>
+            <a:r>
+              <a:rPr lang="en-US" dirty="0" err="1"/>
+              <a:t>analizzati</a:t>
+            </a:r>
+          </a:p>
+        </p:txBody>
+      </p:sp>
+      <p:graphicFrame>
+        <p:nvGraphicFramePr>
+          <p:cNvPr id="4" name="Table 3">
+            <a:extLst>
+              <a:ext uri="{FF2B5EF4-FFF2-40B4-BE49-F238E27FC236}">
+                <a16:creationId xmlns:a16="http://schemas.microsoft.com/office/drawing/2014/main" id="{A220603D-7C4A-43B7-D85F-45A83267B4F7}"/>
+              </a:ext>
+            </a:extLst>
+          </p:cNvPr>
+          <p:cNvGraphicFramePr>
+            <a:graphicFrameLocks noGrp="1"/>
+          </p:cNvGraphicFramePr>
+          <p:nvPr>
+            <p:extLst>
+              <p:ext uri="{D42A27DB-BD31-4B8C-83A1-F6EECF244321}">
+                <p14:modId xmlns:p14="http://schemas.microsoft.com/office/powerpoint/2010/main" val="2278969227"/>
+              </p:ext>
+            </p:extLst>
+          </p:nvPr>
+        </p:nvGraphicFramePr>
+        <p:xfrm>
+          <a:off x="1040745" y="2541344"/>
+          <a:ext cx="9455838" cy="3745333"/>
+        </p:xfrm>
+        <a:graphic>
+          <a:graphicData uri="http://schemas.openxmlformats.org/drawingml/2006/table">
+            <a:tbl>
+              <a:tblPr firstRow="1" bandRow="1">
+                <a:tableStyleId>{5C22544A-7EE6-4342-B048-85BDC9FD1C3A}</a:tableStyleId>
+              </a:tblPr>
+              <a:tblGrid>
+                <a:gridCol w="3151946">
+                  <a:extLst>
+                    <a:ext uri="{9D8B030D-6E8A-4147-A177-3AD203B41FA5}">
+                      <a16:colId xmlns:a16="http://schemas.microsoft.com/office/drawing/2014/main" val="3371868344"/>
+                    </a:ext>
+                  </a:extLst>
+                </a:gridCol>
+                <a:gridCol w="3151946">
+                  <a:extLst>
+                    <a:ext uri="{9D8B030D-6E8A-4147-A177-3AD203B41FA5}">
+                      <a16:colId xmlns:a16="http://schemas.microsoft.com/office/drawing/2014/main" val="1258793391"/>
+                    </a:ext>
+                  </a:extLst>
+                </a:gridCol>
+                <a:gridCol w="3151946">
+                  <a:extLst>
+                    <a:ext uri="{9D8B030D-6E8A-4147-A177-3AD203B41FA5}">
+                      <a16:colId xmlns:a16="http://schemas.microsoft.com/office/drawing/2014/main" val="1595832302"/>
+                    </a:ext>
+                  </a:extLst>
+                </a:gridCol>
+              </a:tblGrid>
+              <a:tr h="469798">
+                <a:tc>
+                  <a:txBody>
+                    <a:bodyPr/>
+                    <a:lstStyle/>
+                    <a:p>
+                      <a:endParaRPr lang="en-US"/>
+                    </a:p>
+                  </a:txBody>
+                  <a:tcPr/>
+                </a:tc>
+                <a:tc>
+                  <a:txBody>
+                    <a:bodyPr/>
+                    <a:lstStyle/>
+                    <a:p>
+                      <a:r>
+                        <a:rPr lang="en-US" dirty="0" err="1"/>
+                        <a:t>Spermann</a:t>
+                      </a:r>
+                    </a:p>
+                  </a:txBody>
+                  <a:tcPr/>
+                </a:tc>
+                <a:tc>
+                  <a:txBody>
+                    <a:bodyPr/>
+                    <a:lstStyle/>
+                    <a:p>
+                      <a:r>
+                        <a:rPr lang="en-US" dirty="0"/>
+                        <a:t>Kendall</a:t>
+                      </a:r>
+                    </a:p>
+                  </a:txBody>
+                  <a:tcPr/>
+                </a:tc>
+                <a:extLst>
+                  <a:ext uri="{0D108BD9-81ED-4DB2-BD59-A6C34878D82A}">
+                    <a16:rowId xmlns:a16="http://schemas.microsoft.com/office/drawing/2014/main" val="1777444580"/>
+                  </a:ext>
+                </a:extLst>
+              </a:tr>
+              <a:tr h="469798">
+                <a:tc>
+                  <a:txBody>
+                    <a:bodyPr/>
+                    <a:lstStyle/>
+                    <a:p>
+                      <a:r>
+                        <a:rPr lang="en-US" dirty="0"/>
+                        <a:t>EM</a:t>
+                      </a:r>
+                    </a:p>
+                  </a:txBody>
+                  <a:tcPr/>
+                </a:tc>
+                <a:tc>
+                  <a:txBody>
+                    <a:bodyPr/>
+                    <a:lstStyle/>
+                    <a:p>
+                      <a:pPr lvl="0">
+                        <a:buNone/>
+                      </a:pPr>
+                      <a:r>
+                        <a:rPr lang="en-US" sz="1800" b="0" i="0" u="none" strike="noStrike" noProof="0" dirty="0">
+                          <a:latin typeface="Neue Haas Grotesk Text Pro"/>
+                        </a:rPr>
+                        <a:t>0.521</a:t>
+                      </a:r>
+                      <a:endParaRPr lang="en-US" dirty="0"/>
+                    </a:p>
+                  </a:txBody>
+                  <a:tcPr/>
+                </a:tc>
+                <a:tc>
+                  <a:txBody>
+                    <a:bodyPr/>
+                    <a:lstStyle/>
+                    <a:p>
+                      <a:pPr lvl="0">
+                        <a:buNone/>
+                      </a:pPr>
+                      <a:r>
+                        <a:rPr lang="en-US" sz="1800" b="0" i="0" u="none" strike="noStrike" noProof="0" dirty="0">
+                          <a:latin typeface="Neue Haas Grotesk Text Pro"/>
+                        </a:rPr>
+                        <a:t>0.521</a:t>
+                      </a:r>
+                    </a:p>
+                  </a:txBody>
+                  <a:tcPr/>
+                </a:tc>
+                <a:extLst>
+                  <a:ext uri="{0D108BD9-81ED-4DB2-BD59-A6C34878D82A}">
+                    <a16:rowId xmlns:a16="http://schemas.microsoft.com/office/drawing/2014/main" val="1349283095"/>
+                  </a:ext>
+                </a:extLst>
+              </a:tr>
+              <a:tr h="469798">
+                <a:tc>
+                  <a:txBody>
+                    <a:bodyPr/>
+                    <a:lstStyle/>
+                    <a:p>
+                      <a:r>
+                        <a:rPr lang="en-US" dirty="0"/>
+                        <a:t>ED</a:t>
+                      </a:r>
+                    </a:p>
+                  </a:txBody>
+                  <a:tcPr/>
+                </a:tc>
+                <a:tc>
+                  <a:txBody>
+                    <a:bodyPr/>
+                    <a:lstStyle/>
+                    <a:p>
+                      <a:pPr lvl="0">
+                        <a:buNone/>
+                      </a:pPr>
+                      <a:r>
+                        <a:rPr lang="en-US" sz="1800" b="0" i="0" u="none" strike="noStrike" noProof="0" dirty="0">
+                          <a:latin typeface="Neue Haas Grotesk Text Pro"/>
+                        </a:rPr>
+                        <a:t>0.621</a:t>
+                      </a:r>
+                    </a:p>
+                  </a:txBody>
+                  <a:tcPr/>
+                </a:tc>
+                <a:tc>
+                  <a:txBody>
+                    <a:bodyPr/>
+                    <a:lstStyle/>
+                    <a:p>
+                      <a:pPr lvl="0">
+                        <a:buNone/>
+                      </a:pPr>
+                      <a:r>
+                        <a:rPr lang="en-US" sz="1800" b="0" i="0" u="none" strike="noStrike" noProof="0" dirty="0">
+                          <a:latin typeface="Neue Haas Grotesk Text Pro"/>
+                        </a:rPr>
+                        <a:t>0.533</a:t>
+                      </a:r>
+                    </a:p>
+                  </a:txBody>
+                  <a:tcPr/>
+                </a:tc>
+                <a:extLst>
+                  <a:ext uri="{0D108BD9-81ED-4DB2-BD59-A6C34878D82A}">
+                    <a16:rowId xmlns:a16="http://schemas.microsoft.com/office/drawing/2014/main" val="3748603194"/>
+                  </a:ext>
+                </a:extLst>
+              </a:tr>
+              <a:tr h="456747">
+                <a:tc>
+                  <a:txBody>
+                    <a:bodyPr/>
+                    <a:lstStyle/>
+                    <a:p>
+                      <a:r>
+                        <a:rPr lang="en-US" dirty="0"/>
+                        <a:t>METEOR</a:t>
+                      </a:r>
+                    </a:p>
+                  </a:txBody>
+                  <a:tcPr/>
+                </a:tc>
+                <a:tc>
+                  <a:txBody>
+                    <a:bodyPr/>
+                    <a:lstStyle/>
+                    <a:p>
+                      <a:pPr lvl="0">
+                        <a:buNone/>
+                      </a:pPr>
+                      <a:r>
+                        <a:rPr lang="en-US" sz="1800" b="0" i="0" u="none" strike="noStrike" noProof="0" dirty="0">
+                          <a:latin typeface="Neue Haas Grotesk Text Pro"/>
+                        </a:rPr>
+                        <a:t>0.632</a:t>
+                      </a:r>
+                    </a:p>
+                  </a:txBody>
+                  <a:tcPr/>
+                </a:tc>
+                <a:tc>
+                  <a:txBody>
+                    <a:bodyPr/>
+                    <a:lstStyle/>
+                    <a:p>
+                      <a:pPr lvl="0">
+                        <a:buNone/>
+                      </a:pPr>
+                      <a:r>
+                        <a:rPr lang="en-US" sz="1800" b="0" i="0" u="none" strike="noStrike" noProof="0" dirty="0">
+                          <a:latin typeface="Neue Haas Grotesk Text Pro"/>
+                        </a:rPr>
+                        <a:t>0.520</a:t>
+                      </a:r>
+                    </a:p>
+                  </a:txBody>
+                  <a:tcPr/>
+                </a:tc>
+                <a:extLst>
+                  <a:ext uri="{0D108BD9-81ED-4DB2-BD59-A6C34878D82A}">
+                    <a16:rowId xmlns:a16="http://schemas.microsoft.com/office/drawing/2014/main" val="1845850733"/>
+                  </a:ext>
+                </a:extLst>
+              </a:tr>
+              <a:tr h="469798">
+                <a:tc>
+                  <a:txBody>
+                    <a:bodyPr/>
+                    <a:lstStyle/>
+                    <a:p>
+                      <a:r>
+                        <a:rPr lang="en-US" dirty="0"/>
+                        <a:t>LCS</a:t>
+                      </a:r>
+                    </a:p>
+                  </a:txBody>
+                  <a:tcPr/>
+                </a:tc>
+                <a:tc>
+                  <a:txBody>
+                    <a:bodyPr/>
+                    <a:lstStyle/>
+                    <a:p>
+                      <a:pPr lvl="0">
+                        <a:buNone/>
+                      </a:pPr>
+                      <a:r>
+                        <a:rPr lang="en-US" sz="1800" b="0" i="0" u="none" strike="noStrike" noProof="0" dirty="0">
+                          <a:latin typeface="Neue Haas Grotesk Text Pro"/>
+                        </a:rPr>
+                        <a:t>0.618</a:t>
+                      </a:r>
+                    </a:p>
+                  </a:txBody>
+                  <a:tcPr/>
+                </a:tc>
+                <a:tc>
+                  <a:txBody>
+                    <a:bodyPr/>
+                    <a:lstStyle/>
+                    <a:p>
+                      <a:pPr lvl="0">
+                        <a:buNone/>
+                      </a:pPr>
+                      <a:r>
+                        <a:rPr lang="en-US" sz="1800" b="0" i="0" u="none" strike="noStrike" noProof="0" dirty="0">
+                          <a:latin typeface="Neue Haas Grotesk Text Pro"/>
+                        </a:rPr>
+                        <a:t>0.530</a:t>
+                      </a:r>
+                    </a:p>
+                  </a:txBody>
+                  <a:tcPr/>
+                </a:tc>
+                <a:extLst>
+                  <a:ext uri="{0D108BD9-81ED-4DB2-BD59-A6C34878D82A}">
+                    <a16:rowId xmlns:a16="http://schemas.microsoft.com/office/drawing/2014/main" val="1451872956"/>
+                  </a:ext>
+                </a:extLst>
+              </a:tr>
+              <a:tr h="469798">
+                <a:tc>
+                  <a:txBody>
+                    <a:bodyPr/>
+                    <a:lstStyle/>
+                    <a:p>
+                      <a:pPr lvl="0">
+                        <a:buNone/>
+                      </a:pPr>
+                      <a:r>
+                        <a:rPr lang="en-US" dirty="0"/>
+                        <a:t>CRYSTAL BLEU</a:t>
+                      </a:r>
+                    </a:p>
+                  </a:txBody>
+                  <a:tcPr/>
+                </a:tc>
+                <a:tc>
+                  <a:txBody>
+                    <a:bodyPr/>
+                    <a:lstStyle/>
+                    <a:p>
+                      <a:pPr lvl="0">
+                        <a:buNone/>
+                      </a:pPr>
+                      <a:r>
+                        <a:rPr lang="en-US" sz="1800" b="0" i="0" u="none" strike="noStrike" noProof="0" dirty="0">
+                          <a:latin typeface="Neue Haas Grotesk Text Pro"/>
+                        </a:rPr>
+                        <a:t>0.559</a:t>
+                      </a:r>
+                    </a:p>
+                  </a:txBody>
+                  <a:tcPr/>
+                </a:tc>
+                <a:tc>
+                  <a:txBody>
+                    <a:bodyPr/>
+                    <a:lstStyle/>
+                    <a:p>
+                      <a:pPr lvl="0">
+                        <a:buNone/>
+                      </a:pPr>
+                      <a:r>
+                        <a:rPr lang="en-US" sz="1800" b="0" i="0" u="none" strike="noStrike" noProof="0" dirty="0">
+                          <a:latin typeface="Neue Haas Grotesk Text Pro"/>
+                        </a:rPr>
+                        <a:t>0.489</a:t>
+                      </a:r>
+                    </a:p>
+                  </a:txBody>
+                  <a:tcPr/>
+                </a:tc>
+                <a:extLst>
+                  <a:ext uri="{0D108BD9-81ED-4DB2-BD59-A6C34878D82A}">
+                    <a16:rowId xmlns:a16="http://schemas.microsoft.com/office/drawing/2014/main" val="4228586729"/>
+                  </a:ext>
+                </a:extLst>
+              </a:tr>
+              <a:tr h="469798">
+                <a:tc>
+                  <a:txBody>
+                    <a:bodyPr/>
+                    <a:lstStyle/>
+                    <a:p>
+                      <a:r>
+                        <a:rPr lang="en-US" dirty="0"/>
+                        <a:t>SACRE BLEU</a:t>
+                      </a:r>
+                    </a:p>
+                  </a:txBody>
+                  <a:tcPr/>
+                </a:tc>
+                <a:tc>
+                  <a:txBody>
+                    <a:bodyPr/>
+                    <a:lstStyle/>
+                    <a:p>
+                      <a:pPr lvl="0">
+                        <a:buNone/>
+                      </a:pPr>
+                      <a:r>
+                        <a:rPr lang="en-US" sz="1800" b="0" i="0" u="none" strike="noStrike" noProof="0" dirty="0">
+                          <a:latin typeface="Neue Haas Grotesk Text Pro"/>
+                        </a:rPr>
+                        <a:t>0.526</a:t>
+                      </a:r>
+                    </a:p>
+                  </a:txBody>
+                  <a:tcPr/>
+                </a:tc>
+                <a:tc>
+                  <a:txBody>
+                    <a:bodyPr/>
+                    <a:lstStyle/>
+                    <a:p>
+                      <a:pPr lvl="0">
+                        <a:buNone/>
+                      </a:pPr>
+                      <a:r>
+                        <a:rPr lang="en-US" sz="1800" b="0" i="0" u="none" strike="noStrike" noProof="0" dirty="0">
+                          <a:latin typeface="Neue Haas Grotesk Text Pro"/>
+                        </a:rPr>
+                        <a:t>0.459</a:t>
+                      </a:r>
+                    </a:p>
+                  </a:txBody>
+                  <a:tcPr/>
+                </a:tc>
+                <a:extLst>
+                  <a:ext uri="{0D108BD9-81ED-4DB2-BD59-A6C34878D82A}">
+                    <a16:rowId xmlns:a16="http://schemas.microsoft.com/office/drawing/2014/main" val="3861408195"/>
+                  </a:ext>
+                </a:extLst>
+              </a:tr>
+              <a:tr h="469798">
+                <a:tc>
+                  <a:txBody>
+                    <a:bodyPr/>
+                    <a:lstStyle/>
+                    <a:p>
+                      <a:pPr lvl="0">
+                        <a:buNone/>
+                      </a:pPr>
+                      <a:r>
+                        <a:rPr lang="en-US" dirty="0"/>
+                        <a:t>ROUGE</a:t>
+                      </a:r>
+                    </a:p>
+                  </a:txBody>
+                  <a:tcPr/>
+                </a:tc>
+                <a:tc>
+                  <a:txBody>
+                    <a:bodyPr/>
+                    <a:lstStyle/>
+                    <a:p>
+                      <a:pPr lvl="0">
+                        <a:buNone/>
+                      </a:pPr>
+                      <a:r>
+                        <a:rPr lang="en-US" sz="1800" b="0" i="0" u="none" strike="noStrike" noProof="0" dirty="0">
+                          <a:latin typeface="Neue Haas Grotesk Text Pro"/>
+                        </a:rPr>
+                        <a:t>0.609</a:t>
+                      </a:r>
+                    </a:p>
+                  </a:txBody>
+                  <a:tcPr/>
+                </a:tc>
+                <a:tc>
+                  <a:txBody>
+                    <a:bodyPr/>
+                    <a:lstStyle/>
+                    <a:p>
+                      <a:pPr lvl="0">
+                        <a:buNone/>
+                      </a:pPr>
+                      <a:r>
+                        <a:rPr lang="en-US" sz="1800" b="0" i="0" u="none" strike="noStrike" noProof="0" dirty="0">
+                          <a:latin typeface="Neue Haas Grotesk Text Pro"/>
+                        </a:rPr>
+                        <a:t>0.524</a:t>
+                      </a:r>
+                    </a:p>
+                  </a:txBody>
+                  <a:tcPr/>
+                </a:tc>
+                <a:extLst>
+                  <a:ext uri="{0D108BD9-81ED-4DB2-BD59-A6C34878D82A}">
+                    <a16:rowId xmlns:a16="http://schemas.microsoft.com/office/drawing/2014/main" val="2649155756"/>
+                  </a:ext>
+                </a:extLst>
+              </a:tr>
+            </a:tbl>
+          </a:graphicData>
+        </a:graphic>
+      </p:graphicFrame>
+    </p:spTree>
+    <p:extLst>
+      <p:ext uri="{BB962C8B-B14F-4D97-AF65-F5344CB8AC3E}">
+        <p14:creationId xmlns:p14="http://schemas.microsoft.com/office/powerpoint/2010/main" val="1450613826"/>
+      </p:ext>
+    </p:extLst>
+  </p:cSld>
+  <p:clrMapOvr>
+    <a:masterClrMapping/>
+  </p:clrMapOvr>
+</p:sld>
+</file>
+
+<file path=ppt/slides/slide17.xml><?xml version="1.0" encoding="utf-8"?>
+<p:sld xmlns:a="http://schemas.openxmlformats.org/drawingml/2006/main" xmlns:r="http://schemas.openxmlformats.org/officeDocument/2006/relationships" xmlns:p="http://schemas.openxmlformats.org/presentationml/2006/main">
+  <p:cSld>
     <p:spTree>
       <p:nvGrpSpPr>
         <p:cNvPr id="1" name=""/>

</xml_diff>

<commit_message>
Aggiunta analisi di correlazione globale, modificata la presentazione, modificati i requirements
</commit_message>
<xml_diff>
--- a/altro/Presentazione_risultati.pptx
+++ b/altro/Presentazione_risultati.pptx
@@ -131,8 +131,8 @@
 <file path=ppt/revisionInfo.xml><?xml version="1.0" encoding="utf-8"?>
 <p1510:revInfo xmlns:a="http://schemas.openxmlformats.org/drawingml/2006/main" xmlns:r="http://schemas.openxmlformats.org/officeDocument/2006/relationships" xmlns:p1510="http://schemas.microsoft.com/office/powerpoint/2015/10/main">
   <p1510:revLst>
-    <p1510:client id="{203135A6-A33B-A01C-9C59-5FC4F72485A0}" v="941" dt="2024-11-06T19:03:16.653"/>
-    <p1510:client id="{81EC2F62-2733-048C-7502-79C1B40CAA66}" v="150" dt="2024-11-05T21:59:16.797"/>
+    <p1510:client id="{3D6CF423-B00C-E821-0823-40A7A0285529}" v="614" dt="2024-11-09T11:02:05.503"/>
+    <p1510:client id="{999DB1A7-F261-7600-A806-41B9DE218A06}" v="238" dt="2024-11-09T11:19:59.309"/>
     <p1510:client id="{B634F85E-07EB-B30A-AEFD-5C513E62976F}" v="246" dt="2024-11-07T14:37:56.727"/>
   </p1510:revLst>
 </p1510:revInfo>
@@ -292,7 +292,7 @@
           <a:p>
             <a:fld id="{A1E45834-53BD-4C8F-B791-CD5378F4150E}" type="datetimeFigureOut">
               <a:rPr lang="en-US" smtClean="0"/>
-              <a:t>11/7/2024</a:t>
+              <a:t>11/9/2024</a:t>
             </a:fld>
             <a:endParaRPr lang="en-US"/>
           </a:p>
@@ -490,7 +490,7 @@
           <a:p>
             <a:fld id="{A1E45834-53BD-4C8F-B791-CD5378F4150E}" type="datetimeFigureOut">
               <a:rPr lang="en-US" smtClean="0"/>
-              <a:t>11/7/2024</a:t>
+              <a:t>11/9/2024</a:t>
             </a:fld>
             <a:endParaRPr lang="en-US"/>
           </a:p>
@@ -698,7 +698,7 @@
           <a:p>
             <a:fld id="{A1E45834-53BD-4C8F-B791-CD5378F4150E}" type="datetimeFigureOut">
               <a:rPr lang="en-US" smtClean="0"/>
-              <a:t>11/7/2024</a:t>
+              <a:t>11/9/2024</a:t>
             </a:fld>
             <a:endParaRPr lang="en-US"/>
           </a:p>
@@ -939,7 +939,7 @@
           <a:p>
             <a:fld id="{A1E45834-53BD-4C8F-B791-CD5378F4150E}" type="datetimeFigureOut">
               <a:rPr lang="en-US" smtClean="0"/>
-              <a:t>11/7/2024</a:t>
+              <a:t>11/9/2024</a:t>
             </a:fld>
             <a:endParaRPr lang="en-US"/>
           </a:p>
@@ -1217,7 +1217,7 @@
           <a:p>
             <a:fld id="{A1E45834-53BD-4C8F-B791-CD5378F4150E}" type="datetimeFigureOut">
               <a:rPr lang="en-US" smtClean="0"/>
-              <a:t>11/7/2024</a:t>
+              <a:t>11/9/2024</a:t>
             </a:fld>
             <a:endParaRPr lang="en-US"/>
           </a:p>
@@ -1487,7 +1487,7 @@
           <a:p>
             <a:fld id="{A1E45834-53BD-4C8F-B791-CD5378F4150E}" type="datetimeFigureOut">
               <a:rPr lang="en-US" smtClean="0"/>
-              <a:t>11/7/2024</a:t>
+              <a:t>11/9/2024</a:t>
             </a:fld>
             <a:endParaRPr lang="en-US"/>
           </a:p>
@@ -1909,7 +1909,7 @@
           <a:p>
             <a:fld id="{A1E45834-53BD-4C8F-B791-CD5378F4150E}" type="datetimeFigureOut">
               <a:rPr lang="en-US" smtClean="0"/>
-              <a:t>11/7/2024</a:t>
+              <a:t>11/9/2024</a:t>
             </a:fld>
             <a:endParaRPr lang="en-US"/>
           </a:p>
@@ -2054,7 +2054,7 @@
           <a:p>
             <a:fld id="{A1E45834-53BD-4C8F-B791-CD5378F4150E}" type="datetimeFigureOut">
               <a:rPr lang="en-US" smtClean="0"/>
-              <a:t>11/7/2024</a:t>
+              <a:t>11/9/2024</a:t>
             </a:fld>
             <a:endParaRPr lang="en-US"/>
           </a:p>
@@ -2167,7 +2167,7 @@
           <a:p>
             <a:fld id="{A1E45834-53BD-4C8F-B791-CD5378F4150E}" type="datetimeFigureOut">
               <a:rPr lang="en-US" smtClean="0"/>
-              <a:t>11/7/2024</a:t>
+              <a:t>11/9/2024</a:t>
             </a:fld>
             <a:endParaRPr lang="en-US"/>
           </a:p>
@@ -2481,7 +2481,7 @@
           <a:p>
             <a:fld id="{A1E45834-53BD-4C8F-B791-CD5378F4150E}" type="datetimeFigureOut">
               <a:rPr lang="en-US" smtClean="0"/>
-              <a:t>11/7/2024</a:t>
+              <a:t>11/9/2024</a:t>
             </a:fld>
             <a:endParaRPr lang="en-US"/>
           </a:p>
@@ -2775,7 +2775,7 @@
           <a:p>
             <a:fld id="{A1E45834-53BD-4C8F-B791-CD5378F4150E}" type="datetimeFigureOut">
               <a:rPr lang="en-US" smtClean="0"/>
-              <a:t>11/7/2024</a:t>
+              <a:t>11/9/2024</a:t>
             </a:fld>
             <a:endParaRPr lang="en-US"/>
           </a:p>
@@ -3014,7 +3014,7 @@
           <a:p>
             <a:fld id="{A1E45834-53BD-4C8F-B791-CD5378F4150E}" type="datetimeFigureOut">
               <a:rPr lang="en-US" smtClean="0"/>
-              <a:t>11/7/2024</a:t>
+              <a:t>11/9/2024</a:t>
             </a:fld>
             <a:endParaRPr lang="en-US"/>
           </a:p>
@@ -4729,7 +4729,7 @@
         </p:nvSpPr>
         <p:spPr>
           <a:xfrm>
-            <a:off x="1044516" y="1187246"/>
+            <a:off x="1077173" y="936875"/>
             <a:ext cx="9141351" cy="2352368"/>
           </a:xfrm>
         </p:spPr>
@@ -4829,7 +4829,7 @@
         </p:nvSpPr>
         <p:spPr>
           <a:xfrm>
-            <a:off x="805460" y="1870133"/>
+            <a:off x="838117" y="1478247"/>
             <a:ext cx="10524989" cy="483464"/>
           </a:xfrm>
         </p:spPr>
@@ -4908,14 +4908,14 @@
           <p:nvPr>
             <p:extLst>
               <p:ext uri="{D42A27DB-BD31-4B8C-83A1-F6EECF244321}">
-                <p14:modId xmlns:p14="http://schemas.microsoft.com/office/powerpoint/2010/main" val="2799378302"/>
+                <p14:modId xmlns:p14="http://schemas.microsoft.com/office/powerpoint/2010/main" val="1800834409"/>
               </p:ext>
             </p:extLst>
           </p:nvPr>
         </p:nvGraphicFramePr>
         <p:xfrm>
-          <a:off x="1040745" y="2541344"/>
-          <a:ext cx="10550105" cy="3903823"/>
+          <a:off x="735945" y="2116802"/>
+          <a:ext cx="10717452" cy="4525805"/>
         </p:xfrm>
         <a:graphic>
           <a:graphicData uri="http://schemas.openxmlformats.org/drawingml/2006/table">
@@ -4924,41 +4924,55 @@
                 <a:tableStyleId>{5C22544A-7EE6-4342-B048-85BDC9FD1C3A}</a:tableStyleId>
               </a:tblPr>
               <a:tblGrid>
-                <a:gridCol w="2110021">
+                <a:gridCol w="1591194">
                   <a:extLst>
                     <a:ext uri="{9D8B030D-6E8A-4147-A177-3AD203B41FA5}">
                       <a16:colId xmlns:a16="http://schemas.microsoft.com/office/drawing/2014/main" val="3371868344"/>
                     </a:ext>
                   </a:extLst>
                 </a:gridCol>
-                <a:gridCol w="2110021">
+                <a:gridCol w="1262686">
                   <a:extLst>
                     <a:ext uri="{9D8B030D-6E8A-4147-A177-3AD203B41FA5}">
                       <a16:colId xmlns:a16="http://schemas.microsoft.com/office/drawing/2014/main" val="1258793391"/>
                     </a:ext>
                   </a:extLst>
                 </a:gridCol>
-                <a:gridCol w="2110021">
+                <a:gridCol w="1827305">
                   <a:extLst>
                     <a:ext uri="{9D8B030D-6E8A-4147-A177-3AD203B41FA5}">
                       <a16:colId xmlns:a16="http://schemas.microsoft.com/office/drawing/2014/main" val="2446546284"/>
                     </a:ext>
                   </a:extLst>
                 </a:gridCol>
-                <a:gridCol w="2110021">
+                <a:gridCol w="1108701">
                   <a:extLst>
                     <a:ext uri="{9D8B030D-6E8A-4147-A177-3AD203B41FA5}">
                       <a16:colId xmlns:a16="http://schemas.microsoft.com/office/drawing/2014/main" val="1595832302"/>
                     </a:ext>
                   </a:extLst>
                 </a:gridCol>
-                <a:gridCol w="2110021">
+                <a:gridCol w="1642522">
                   <a:extLst>
                     <a:ext uri="{9D8B030D-6E8A-4147-A177-3AD203B41FA5}">
                       <a16:colId xmlns:a16="http://schemas.microsoft.com/office/drawing/2014/main" val="3607507415"/>
                     </a:ext>
                   </a:extLst>
                 </a:gridCol>
+                <a:gridCol w="1642522">
+                  <a:extLst>
+                    <a:ext uri="{9D8B030D-6E8A-4147-A177-3AD203B41FA5}">
+                      <a16:colId xmlns:a16="http://schemas.microsoft.com/office/drawing/2014/main" val="3694811404"/>
+                    </a:ext>
+                  </a:extLst>
+                </a:gridCol>
+                <a:gridCol w="1642522">
+                  <a:extLst>
+                    <a:ext uri="{9D8B030D-6E8A-4147-A177-3AD203B41FA5}">
+                      <a16:colId xmlns:a16="http://schemas.microsoft.com/office/drawing/2014/main" val="2280856461"/>
+                    </a:ext>
+                  </a:extLst>
+                </a:gridCol>
               </a:tblGrid>
               <a:tr h="466249">
                 <a:tc>
@@ -4977,7 +4991,7 @@
                     <a:lstStyle/>
                     <a:p>
                       <a:r>
-                        <a:rPr lang="en-US" dirty="0" err="1"/>
+                        <a:rPr lang="en-US" err="1"/>
                         <a:t>Spermann</a:t>
                       </a:r>
                     </a:p>
@@ -4994,7 +5008,7 @@
                         <a:t>P-value(</a:t>
                       </a:r>
                       <a:r>
-                        <a:rPr lang="en-US" dirty="0" err="1"/>
+                        <a:rPr lang="en-US" err="1"/>
                         <a:t>Speramnn</a:t>
                       </a:r>
                       <a:r>
@@ -5036,6 +5050,49 @@
                         <a:t>P-value(Kendall)</a:t>
                       </a:r>
                       <a:endParaRPr lang="en-US"/>
+                    </a:p>
+                  </a:txBody>
+                  <a:tcPr/>
+                </a:tc>
+                <a:tc>
+                  <a:txBody>
+                    <a:bodyPr/>
+                    <a:lstStyle/>
+                    <a:p>
+                      <a:pPr lvl="0">
+                        <a:buNone/>
+                      </a:pPr>
+                      <a:r>
+                        <a:rPr lang="en-US" sz="1800" b="1" i="0" u="none" strike="noStrike" noProof="0" dirty="0">
+                          <a:solidFill>
+                            <a:srgbClr val="FFFFFF"/>
+                          </a:solidFill>
+                          <a:latin typeface="Neue Haas Grotesk Text Pro"/>
+                        </a:rPr>
+                        <a:t>Pearson</a:t>
+                      </a:r>
+                      <a:endParaRPr lang="en-US" dirty="0"/>
+                    </a:p>
+                  </a:txBody>
+                  <a:tcPr/>
+                </a:tc>
+                <a:tc>
+                  <a:txBody>
+                    <a:bodyPr/>
+                    <a:lstStyle/>
+                    <a:p>
+                      <a:pPr lvl="0">
+                        <a:buNone/>
+                      </a:pPr>
+                      <a:r>
+                        <a:rPr lang="en-US" sz="1800" b="1" i="0" u="none" strike="noStrike" noProof="0" dirty="0">
+                          <a:solidFill>
+                            <a:srgbClr val="FFFFFF"/>
+                          </a:solidFill>
+                          <a:latin typeface="Neue Haas Grotesk Text Pro"/>
+                        </a:rPr>
+                        <a:t>P-value(Pearson)</a:t>
+                      </a:r>
                     </a:p>
                   </a:txBody>
                   <a:tcPr/>
@@ -5129,6 +5186,49 @@
                   </a:txBody>
                   <a:tcPr/>
                 </a:tc>
+                <a:tc>
+                  <a:txBody>
+                    <a:bodyPr/>
+                    <a:lstStyle/>
+                    <a:p>
+                      <a:pPr lvl="0">
+                        <a:buNone/>
+                      </a:pPr>
+                      <a:r>
+                        <a:rPr lang="en-US" sz="1800" b="0" i="0" u="none" strike="noStrike" noProof="0" dirty="0">
+                          <a:solidFill>
+                            <a:srgbClr val="000000"/>
+                          </a:solidFill>
+                          <a:latin typeface="Neue Haas Grotesk Text Pro"/>
+                        </a:rPr>
+                        <a:t>0.436</a:t>
+                      </a:r>
+                    </a:p>
+                  </a:txBody>
+                  <a:tcPr/>
+                </a:tc>
+                <a:tc>
+                  <a:txBody>
+                    <a:bodyPr/>
+                    <a:lstStyle/>
+                    <a:p>
+                      <a:pPr lvl="0">
+                        <a:buNone/>
+                      </a:pPr>
+                      <a:r>
+                        <a:rPr lang="en-US" sz="1800" b="0" i="0" u="none" strike="noStrike" noProof="0" dirty="0">
+                          <a:solidFill>
+                            <a:srgbClr val="000000"/>
+                          </a:solidFill>
+                          <a:latin typeface="Neue Haas Grotesk Text Pro"/>
+                        </a:rPr>
+                        <a:t>&lt;0.05</a:t>
+                      </a:r>
+                      <a:endParaRPr lang="en-US"/>
+                    </a:p>
+                  </a:txBody>
+                  <a:tcPr/>
+                </a:tc>
                 <a:extLst>
                   <a:ext uri="{0D108BD9-81ED-4DB2-BD59-A6C34878D82A}">
                     <a16:rowId xmlns:a16="http://schemas.microsoft.com/office/drawing/2014/main" val="1349283095"/>
@@ -5227,6 +5327,49 @@
                   </a:txBody>
                   <a:tcPr/>
                 </a:tc>
+                <a:tc>
+                  <a:txBody>
+                    <a:bodyPr/>
+                    <a:lstStyle/>
+                    <a:p>
+                      <a:pPr lvl="0">
+                        <a:buNone/>
+                      </a:pPr>
+                      <a:r>
+                        <a:rPr lang="en-US" sz="1800" b="0" i="0" u="none" strike="noStrike" noProof="0" dirty="0">
+                          <a:solidFill>
+                            <a:srgbClr val="000000"/>
+                          </a:solidFill>
+                          <a:latin typeface="Neue Haas Grotesk Text Pro"/>
+                        </a:rPr>
+                        <a:t>0.708</a:t>
+                      </a:r>
+                    </a:p>
+                  </a:txBody>
+                  <a:tcPr/>
+                </a:tc>
+                <a:tc>
+                  <a:txBody>
+                    <a:bodyPr/>
+                    <a:lstStyle/>
+                    <a:p>
+                      <a:pPr lvl="0">
+                        <a:buNone/>
+                      </a:pPr>
+                      <a:r>
+                        <a:rPr lang="en-US" sz="1800" b="0" i="0" u="none" strike="noStrike" noProof="0" dirty="0">
+                          <a:solidFill>
+                            <a:srgbClr val="000000"/>
+                          </a:solidFill>
+                          <a:latin typeface="Neue Haas Grotesk Text Pro"/>
+                        </a:rPr>
+                        <a:t>&lt;0.05</a:t>
+                      </a:r>
+                      <a:endParaRPr lang="en-US"/>
+                    </a:p>
+                  </a:txBody>
+                  <a:tcPr/>
+                </a:tc>
                 <a:extLst>
                   <a:ext uri="{0D108BD9-81ED-4DB2-BD59-A6C34878D82A}">
                     <a16:rowId xmlns:a16="http://schemas.microsoft.com/office/drawing/2014/main" val="3748603194"/>
@@ -5325,6 +5468,49 @@
                   </a:txBody>
                   <a:tcPr/>
                 </a:tc>
+                <a:tc>
+                  <a:txBody>
+                    <a:bodyPr/>
+                    <a:lstStyle/>
+                    <a:p>
+                      <a:pPr lvl="0">
+                        <a:buNone/>
+                      </a:pPr>
+                      <a:r>
+                        <a:rPr lang="en-US" sz="1800" b="0" i="0" u="none" strike="noStrike" noProof="0" dirty="0">
+                          <a:solidFill>
+                            <a:srgbClr val="000000"/>
+                          </a:solidFill>
+                          <a:latin typeface="Neue Haas Grotesk Text Pro"/>
+                        </a:rPr>
+                        <a:t>0.770</a:t>
+                      </a:r>
+                    </a:p>
+                  </a:txBody>
+                  <a:tcPr/>
+                </a:tc>
+                <a:tc>
+                  <a:txBody>
+                    <a:bodyPr/>
+                    <a:lstStyle/>
+                    <a:p>
+                      <a:pPr lvl="0">
+                        <a:buNone/>
+                      </a:pPr>
+                      <a:r>
+                        <a:rPr lang="en-US" sz="1800" b="0" i="0" u="none" strike="noStrike" noProof="0" dirty="0">
+                          <a:solidFill>
+                            <a:srgbClr val="000000"/>
+                          </a:solidFill>
+                          <a:latin typeface="Neue Haas Grotesk Text Pro"/>
+                        </a:rPr>
+                        <a:t>&lt;0.05</a:t>
+                      </a:r>
+                      <a:endParaRPr lang="en-US"/>
+                    </a:p>
+                  </a:txBody>
+                  <a:tcPr/>
+                </a:tc>
                 <a:extLst>
                   <a:ext uri="{0D108BD9-81ED-4DB2-BD59-A6C34878D82A}">
                     <a16:rowId xmlns:a16="http://schemas.microsoft.com/office/drawing/2014/main" val="1845850733"/>
@@ -5423,6 +5609,49 @@
                   </a:txBody>
                   <a:tcPr/>
                 </a:tc>
+                <a:tc>
+                  <a:txBody>
+                    <a:bodyPr/>
+                    <a:lstStyle/>
+                    <a:p>
+                      <a:pPr lvl="0">
+                        <a:buNone/>
+                      </a:pPr>
+                      <a:r>
+                        <a:rPr lang="en-US" sz="1800" b="0" i="0" u="none" strike="noStrike" noProof="0" dirty="0">
+                          <a:solidFill>
+                            <a:srgbClr val="000000"/>
+                          </a:solidFill>
+                          <a:latin typeface="Neue Haas Grotesk Text Pro"/>
+                        </a:rPr>
+                        <a:t>0.702</a:t>
+                      </a:r>
+                    </a:p>
+                  </a:txBody>
+                  <a:tcPr/>
+                </a:tc>
+                <a:tc>
+                  <a:txBody>
+                    <a:bodyPr/>
+                    <a:lstStyle/>
+                    <a:p>
+                      <a:pPr lvl="0">
+                        <a:buNone/>
+                      </a:pPr>
+                      <a:r>
+                        <a:rPr lang="en-US" sz="1800" b="0" i="0" u="none" strike="noStrike" noProof="0" dirty="0">
+                          <a:solidFill>
+                            <a:srgbClr val="000000"/>
+                          </a:solidFill>
+                          <a:latin typeface="Neue Haas Grotesk Text Pro"/>
+                        </a:rPr>
+                        <a:t>&lt;0.05</a:t>
+                      </a:r>
+                      <a:endParaRPr lang="en-US"/>
+                    </a:p>
+                  </a:txBody>
+                  <a:tcPr/>
+                </a:tc>
                 <a:extLst>
                   <a:ext uri="{0D108BD9-81ED-4DB2-BD59-A6C34878D82A}">
                     <a16:rowId xmlns:a16="http://schemas.microsoft.com/office/drawing/2014/main" val="1451872956"/>
@@ -5524,6 +5753,49 @@
                   </a:txBody>
                   <a:tcPr/>
                 </a:tc>
+                <a:tc>
+                  <a:txBody>
+                    <a:bodyPr/>
+                    <a:lstStyle/>
+                    <a:p>
+                      <a:pPr lvl="0">
+                        <a:buNone/>
+                      </a:pPr>
+                      <a:r>
+                        <a:rPr lang="en-US" sz="1800" b="0" i="0" u="none" strike="noStrike" noProof="0" dirty="0">
+                          <a:solidFill>
+                            <a:srgbClr val="000000"/>
+                          </a:solidFill>
+                          <a:latin typeface="Neue Haas Grotesk Text Pro"/>
+                        </a:rPr>
+                        <a:t>0.650</a:t>
+                      </a:r>
+                    </a:p>
+                  </a:txBody>
+                  <a:tcPr/>
+                </a:tc>
+                <a:tc>
+                  <a:txBody>
+                    <a:bodyPr/>
+                    <a:lstStyle/>
+                    <a:p>
+                      <a:pPr lvl="0">
+                        <a:buNone/>
+                      </a:pPr>
+                      <a:r>
+                        <a:rPr lang="en-US" sz="1800" b="0" i="0" u="none" strike="noStrike" noProof="0" dirty="0">
+                          <a:solidFill>
+                            <a:srgbClr val="000000"/>
+                          </a:solidFill>
+                          <a:latin typeface="Neue Haas Grotesk Text Pro"/>
+                        </a:rPr>
+                        <a:t>&lt;0.05</a:t>
+                      </a:r>
+                      <a:endParaRPr lang="en-US"/>
+                    </a:p>
+                  </a:txBody>
+                  <a:tcPr/>
+                </a:tc>
                 <a:extLst>
                   <a:ext uri="{0D108BD9-81ED-4DB2-BD59-A6C34878D82A}">
                     <a16:rowId xmlns:a16="http://schemas.microsoft.com/office/drawing/2014/main" val="4228586729"/>
@@ -5622,6 +5894,49 @@
                   </a:txBody>
                   <a:tcPr/>
                 </a:tc>
+                <a:tc>
+                  <a:txBody>
+                    <a:bodyPr/>
+                    <a:lstStyle/>
+                    <a:p>
+                      <a:pPr lvl="0">
+                        <a:buNone/>
+                      </a:pPr>
+                      <a:r>
+                        <a:rPr lang="en-US" sz="1800" b="0" i="0" u="none" strike="noStrike" noProof="0" dirty="0">
+                          <a:solidFill>
+                            <a:srgbClr val="000000"/>
+                          </a:solidFill>
+                          <a:latin typeface="Neue Haas Grotesk Text Pro"/>
+                        </a:rPr>
+                        <a:t>0.390</a:t>
+                      </a:r>
+                    </a:p>
+                  </a:txBody>
+                  <a:tcPr/>
+                </a:tc>
+                <a:tc>
+                  <a:txBody>
+                    <a:bodyPr/>
+                    <a:lstStyle/>
+                    <a:p>
+                      <a:pPr lvl="0">
+                        <a:buNone/>
+                      </a:pPr>
+                      <a:r>
+                        <a:rPr lang="en-US" sz="1800" b="0" i="0" u="none" strike="noStrike" noProof="0" dirty="0">
+                          <a:solidFill>
+                            <a:srgbClr val="000000"/>
+                          </a:solidFill>
+                          <a:latin typeface="Neue Haas Grotesk Text Pro"/>
+                        </a:rPr>
+                        <a:t>&lt;0.05</a:t>
+                      </a:r>
+                      <a:endParaRPr lang="en-US"/>
+                    </a:p>
+                  </a:txBody>
+                  <a:tcPr/>
+                </a:tc>
                 <a:extLst>
                   <a:ext uri="{0D108BD9-81ED-4DB2-BD59-A6C34878D82A}">
                     <a16:rowId xmlns:a16="http://schemas.microsoft.com/office/drawing/2014/main" val="3861408195"/>
@@ -5719,6 +6034,49 @@
                         <a:t>&lt;0.05</a:t>
                       </a:r>
                       <a:endParaRPr lang="en-US" dirty="0"/>
+                    </a:p>
+                  </a:txBody>
+                  <a:tcPr/>
+                </a:tc>
+                <a:tc>
+                  <a:txBody>
+                    <a:bodyPr/>
+                    <a:lstStyle/>
+                    <a:p>
+                      <a:pPr lvl="0">
+                        <a:buNone/>
+                      </a:pPr>
+                      <a:r>
+                        <a:rPr lang="en-US" sz="1800" b="0" i="0" u="none" strike="noStrike" noProof="0" dirty="0">
+                          <a:solidFill>
+                            <a:srgbClr val="000000"/>
+                          </a:solidFill>
+                          <a:latin typeface="Neue Haas Grotesk Text Pro"/>
+                        </a:rPr>
+                        <a:t>0.585</a:t>
+                      </a:r>
+                    </a:p>
+                  </a:txBody>
+                  <a:tcPr/>
+                </a:tc>
+                <a:tc>
+                  <a:txBody>
+                    <a:bodyPr/>
+                    <a:lstStyle/>
+                    <a:p>
+                      <a:pPr lvl="0">
+                        <a:buNone/>
+                      </a:pPr>
+                      <a:r>
+                        <a:rPr lang="en-US" sz="1800" b="0" i="0" u="none" strike="noStrike" noProof="0" dirty="0">
+                          <a:solidFill>
+                            <a:srgbClr val="000000"/>
+                          </a:solidFill>
+                          <a:latin typeface="Neue Haas Grotesk Text Pro"/>
+                        </a:rPr>
+                        <a:t>&lt;0.05</a:t>
+                      </a:r>
+                      <a:endParaRPr lang="en-US"/>
                     </a:p>
                   </a:txBody>
                   <a:tcPr/>
@@ -6161,7 +6519,7 @@
           <p:nvPr>
             <p:extLst>
               <p:ext uri="{D42A27DB-BD31-4B8C-83A1-F6EECF244321}">
-                <p14:modId xmlns:p14="http://schemas.microsoft.com/office/powerpoint/2010/main" val="191765841"/>
+                <p14:modId xmlns:p14="http://schemas.microsoft.com/office/powerpoint/2010/main" val="3763037981"/>
               </p:ext>
             </p:extLst>
           </p:nvPr>
@@ -6203,27 +6561,46 @@
                       </a:pPr>
                       <a:r>
                         <a:rPr lang="en-US" sz="1800" b="0" i="0" u="none" strike="noStrike" noProof="0" dirty="0">
+                          <a:solidFill>
+                            <a:schemeClr val="tx1"/>
+                          </a:solidFill>
                           <a:latin typeface="Neue Haas Grotesk Text Pro"/>
                         </a:rPr>
                         <a:t>entity definition without generic</a:t>
                       </a:r>
-                      <a:endParaRPr lang="en-US" dirty="0"/>
-                    </a:p>
-                  </a:txBody>
-                  <a:tcPr/>
-                </a:tc>
-                <a:tc>
-                  <a:txBody>
-                    <a:bodyPr/>
-                    <a:lstStyle/>
-                    <a:p>
-                      <a:r>
-                        <a:rPr lang="en-US" dirty="0"/>
+                      <a:endParaRPr lang="en-US" dirty="0">
+                        <a:solidFill>
+                          <a:schemeClr val="tx1"/>
+                        </a:solidFill>
+                      </a:endParaRPr>
+                    </a:p>
+                  </a:txBody>
+                  <a:tcPr>
+                    <a:solidFill>
+                      <a:srgbClr val="F6CDD3"/>
+                    </a:solidFill>
+                  </a:tcPr>
+                </a:tc>
+                <a:tc>
+                  <a:txBody>
+                    <a:bodyPr/>
+                    <a:lstStyle/>
+                    <a:p>
+                      <a:r>
+                        <a:rPr lang="en-US" b="0" dirty="0">
+                          <a:solidFill>
+                            <a:schemeClr val="tx1"/>
+                          </a:solidFill>
+                        </a:rPr>
                         <a:t>0.875</a:t>
                       </a:r>
                     </a:p>
                   </a:txBody>
-                  <a:tcPr/>
+                  <a:tcPr>
+                    <a:solidFill>
+                      <a:srgbClr val="F6CDD3"/>
+                    </a:solidFill>
+                  </a:tcPr>
                 </a:tc>
                 <a:extLst>
                   <a:ext uri="{0D108BD9-81ED-4DB2-BD59-A6C34878D82A}">
@@ -7736,7 +8113,7 @@
         </p:nvSpPr>
         <p:spPr>
           <a:xfrm>
-            <a:off x="1044516" y="1187246"/>
+            <a:off x="1077173" y="936875"/>
             <a:ext cx="9141351" cy="2352368"/>
           </a:xfrm>
         </p:spPr>
@@ -7836,7 +8213,7 @@
         </p:nvSpPr>
         <p:spPr>
           <a:xfrm>
-            <a:off x="805460" y="1870133"/>
+            <a:off x="794574" y="1478247"/>
             <a:ext cx="10524989" cy="483464"/>
           </a:xfrm>
         </p:spPr>
@@ -7915,14 +8292,14 @@
           <p:nvPr>
             <p:extLst>
               <p:ext uri="{D42A27DB-BD31-4B8C-83A1-F6EECF244321}">
-                <p14:modId xmlns:p14="http://schemas.microsoft.com/office/powerpoint/2010/main" val="2238163137"/>
+                <p14:modId xmlns:p14="http://schemas.microsoft.com/office/powerpoint/2010/main" val="591897386"/>
               </p:ext>
             </p:extLst>
           </p:nvPr>
         </p:nvGraphicFramePr>
         <p:xfrm>
-          <a:off x="1040745" y="2541344"/>
-          <a:ext cx="10550105" cy="3889607"/>
+          <a:off x="616202" y="1953515"/>
+          <a:ext cx="10886076" cy="4511589"/>
         </p:xfrm>
         <a:graphic>
           <a:graphicData uri="http://schemas.openxmlformats.org/drawingml/2006/table">
@@ -7931,41 +8308,55 @@
                 <a:tableStyleId>{5C22544A-7EE6-4342-B048-85BDC9FD1C3A}</a:tableStyleId>
               </a:tblPr>
               <a:tblGrid>
-                <a:gridCol w="2110021">
+                <a:gridCol w="1622444">
                   <a:extLst>
                     <a:ext uri="{9D8B030D-6E8A-4147-A177-3AD203B41FA5}">
                       <a16:colId xmlns:a16="http://schemas.microsoft.com/office/drawing/2014/main" val="3371868344"/>
                     </a:ext>
                   </a:extLst>
                 </a:gridCol>
-                <a:gridCol w="2110021">
+                <a:gridCol w="1203748">
                   <a:extLst>
                     <a:ext uri="{9D8B030D-6E8A-4147-A177-3AD203B41FA5}">
                       <a16:colId xmlns:a16="http://schemas.microsoft.com/office/drawing/2014/main" val="1258793391"/>
                     </a:ext>
                   </a:extLst>
                 </a:gridCol>
-                <a:gridCol w="2110021">
+                <a:gridCol w="1946932">
                   <a:extLst>
                     <a:ext uri="{9D8B030D-6E8A-4147-A177-3AD203B41FA5}">
                       <a16:colId xmlns:a16="http://schemas.microsoft.com/office/drawing/2014/main" val="2446546284"/>
                     </a:ext>
                   </a:extLst>
                 </a:gridCol>
-                <a:gridCol w="2110021">
+                <a:gridCol w="1057205">
                   <a:extLst>
                     <a:ext uri="{9D8B030D-6E8A-4147-A177-3AD203B41FA5}">
                       <a16:colId xmlns:a16="http://schemas.microsoft.com/office/drawing/2014/main" val="1595832302"/>
                     </a:ext>
                   </a:extLst>
                 </a:gridCol>
-                <a:gridCol w="2110021">
+                <a:gridCol w="1685249">
                   <a:extLst>
                     <a:ext uri="{9D8B030D-6E8A-4147-A177-3AD203B41FA5}">
                       <a16:colId xmlns:a16="http://schemas.microsoft.com/office/drawing/2014/main" val="3607507415"/>
                     </a:ext>
                   </a:extLst>
                 </a:gridCol>
+                <a:gridCol w="1685249">
+                  <a:extLst>
+                    <a:ext uri="{9D8B030D-6E8A-4147-A177-3AD203B41FA5}">
+                      <a16:colId xmlns:a16="http://schemas.microsoft.com/office/drawing/2014/main" val="1557202668"/>
+                    </a:ext>
+                  </a:extLst>
+                </a:gridCol>
+                <a:gridCol w="1685249">
+                  <a:extLst>
+                    <a:ext uri="{9D8B030D-6E8A-4147-A177-3AD203B41FA5}">
+                      <a16:colId xmlns:a16="http://schemas.microsoft.com/office/drawing/2014/main" val="552446072"/>
+                    </a:ext>
+                  </a:extLst>
+                </a:gridCol>
               </a:tblGrid>
               <a:tr h="466249">
                 <a:tc>
@@ -7984,7 +8375,7 @@
                     <a:lstStyle/>
                     <a:p>
                       <a:r>
-                        <a:rPr lang="en-US" dirty="0" err="1"/>
+                        <a:rPr lang="en-US" err="1"/>
                         <a:t>Spermann</a:t>
                       </a:r>
                     </a:p>
@@ -8001,7 +8392,7 @@
                         <a:t>P-value(</a:t>
                       </a:r>
                       <a:r>
-                        <a:rPr lang="en-US" dirty="0" err="1"/>
+                        <a:rPr lang="en-US" err="1"/>
                         <a:t>Speramnn</a:t>
                       </a:r>
                       <a:r>
@@ -8043,6 +8434,50 @@
                         <a:t>P-value(Kendall)</a:t>
                       </a:r>
                       <a:endParaRPr lang="en-US"/>
+                    </a:p>
+                  </a:txBody>
+                  <a:tcPr/>
+                </a:tc>
+                <a:tc>
+                  <a:txBody>
+                    <a:bodyPr/>
+                    <a:lstStyle/>
+                    <a:p>
+                      <a:pPr lvl="0">
+                        <a:buNone/>
+                      </a:pPr>
+                      <a:r>
+                        <a:rPr lang="en-US" sz="1800" b="1" i="0" u="none" strike="noStrike" noProof="0" dirty="0">
+                          <a:solidFill>
+                            <a:srgbClr val="FFFFFF"/>
+                          </a:solidFill>
+                          <a:latin typeface="Neue Haas Grotesk Text Pro"/>
+                        </a:rPr>
+                        <a:t>Pearson</a:t>
+                      </a:r>
+                      <a:endParaRPr lang="en-US" dirty="0"/>
+                    </a:p>
+                  </a:txBody>
+                  <a:tcPr/>
+                </a:tc>
+                <a:tc>
+                  <a:txBody>
+                    <a:bodyPr/>
+                    <a:lstStyle/>
+                    <a:p>
+                      <a:pPr lvl="0">
+                        <a:buNone/>
+                      </a:pPr>
+                      <a:r>
+                        <a:rPr lang="en-US" sz="1800" b="1" i="0" u="none" strike="noStrike" noProof="0" dirty="0">
+                          <a:solidFill>
+                            <a:srgbClr val="FFFFFF"/>
+                          </a:solidFill>
+                          <a:latin typeface="Neue Haas Grotesk Text Pro"/>
+                        </a:rPr>
+                        <a:t>P-value(Pearson)</a:t>
+                      </a:r>
+                      <a:endParaRPr lang="en-US" dirty="0"/>
                     </a:p>
                   </a:txBody>
                   <a:tcPr/>
@@ -8140,6 +8575,49 @@
                   </a:txBody>
                   <a:tcPr/>
                 </a:tc>
+                <a:tc>
+                  <a:txBody>
+                    <a:bodyPr/>
+                    <a:lstStyle/>
+                    <a:p>
+                      <a:pPr lvl="0">
+                        <a:buNone/>
+                      </a:pPr>
+                      <a:r>
+                        <a:rPr lang="en-US" sz="1800" b="0" i="0" u="none" strike="noStrike" noProof="0" dirty="0">
+                          <a:solidFill>
+                            <a:srgbClr val="000000"/>
+                          </a:solidFill>
+                          <a:latin typeface="Neue Haas Grotesk Text Pro"/>
+                        </a:rPr>
+                        <a:t>0.484</a:t>
+                      </a:r>
+                    </a:p>
+                  </a:txBody>
+                  <a:tcPr/>
+                </a:tc>
+                <a:tc>
+                  <a:txBody>
+                    <a:bodyPr/>
+                    <a:lstStyle/>
+                    <a:p>
+                      <a:pPr lvl="0">
+                        <a:buNone/>
+                      </a:pPr>
+                      <a:r>
+                        <a:rPr lang="en-US" sz="1800" b="0" i="0" u="none" strike="noStrike" noProof="0" dirty="0">
+                          <a:solidFill>
+                            <a:srgbClr val="000000"/>
+                          </a:solidFill>
+                          <a:latin typeface="Neue Haas Grotesk Text Pro"/>
+                        </a:rPr>
+                        <a:t>&lt;0.05</a:t>
+                      </a:r>
+                      <a:endParaRPr lang="en-US"/>
+                    </a:p>
+                  </a:txBody>
+                  <a:tcPr/>
+                </a:tc>
                 <a:extLst>
                   <a:ext uri="{0D108BD9-81ED-4DB2-BD59-A6C34878D82A}">
                     <a16:rowId xmlns:a16="http://schemas.microsoft.com/office/drawing/2014/main" val="1349283095"/>
@@ -8242,6 +8720,49 @@
                   </a:txBody>
                   <a:tcPr/>
                 </a:tc>
+                <a:tc>
+                  <a:txBody>
+                    <a:bodyPr/>
+                    <a:lstStyle/>
+                    <a:p>
+                      <a:pPr lvl="0">
+                        <a:buNone/>
+                      </a:pPr>
+                      <a:r>
+                        <a:rPr lang="en-US" sz="1800" b="0" i="0" u="none" strike="noStrike" noProof="0" dirty="0">
+                          <a:solidFill>
+                            <a:srgbClr val="000000"/>
+                          </a:solidFill>
+                          <a:latin typeface="Neue Haas Grotesk Text Pro"/>
+                        </a:rPr>
+                        <a:t>0.581</a:t>
+                      </a:r>
+                    </a:p>
+                  </a:txBody>
+                  <a:tcPr/>
+                </a:tc>
+                <a:tc>
+                  <a:txBody>
+                    <a:bodyPr/>
+                    <a:lstStyle/>
+                    <a:p>
+                      <a:pPr lvl="0">
+                        <a:buNone/>
+                      </a:pPr>
+                      <a:r>
+                        <a:rPr lang="en-US" sz="1800" b="0" i="0" u="none" strike="noStrike" noProof="0" dirty="0">
+                          <a:solidFill>
+                            <a:srgbClr val="000000"/>
+                          </a:solidFill>
+                          <a:latin typeface="Neue Haas Grotesk Text Pro"/>
+                        </a:rPr>
+                        <a:t>&lt;0.05</a:t>
+                      </a:r>
+                      <a:endParaRPr lang="en-US"/>
+                    </a:p>
+                  </a:txBody>
+                  <a:tcPr/>
+                </a:tc>
                 <a:extLst>
                   <a:ext uri="{0D108BD9-81ED-4DB2-BD59-A6C34878D82A}">
                     <a16:rowId xmlns:a16="http://schemas.microsoft.com/office/drawing/2014/main" val="3748603194"/>
@@ -8344,6 +8865,49 @@
                   </a:txBody>
                   <a:tcPr/>
                 </a:tc>
+                <a:tc>
+                  <a:txBody>
+                    <a:bodyPr/>
+                    <a:lstStyle/>
+                    <a:p>
+                      <a:pPr lvl="0">
+                        <a:buNone/>
+                      </a:pPr>
+                      <a:r>
+                        <a:rPr lang="en-US" sz="1800" b="0" i="0" u="none" strike="noStrike" noProof="0" dirty="0">
+                          <a:solidFill>
+                            <a:srgbClr val="000000"/>
+                          </a:solidFill>
+                          <a:latin typeface="Neue Haas Grotesk Text Pro"/>
+                        </a:rPr>
+                        <a:t>0.653</a:t>
+                      </a:r>
+                    </a:p>
+                  </a:txBody>
+                  <a:tcPr/>
+                </a:tc>
+                <a:tc>
+                  <a:txBody>
+                    <a:bodyPr/>
+                    <a:lstStyle/>
+                    <a:p>
+                      <a:pPr lvl="0">
+                        <a:buNone/>
+                      </a:pPr>
+                      <a:r>
+                        <a:rPr lang="en-US" sz="1800" b="0" i="0" u="none" strike="noStrike" noProof="0" dirty="0">
+                          <a:solidFill>
+                            <a:srgbClr val="000000"/>
+                          </a:solidFill>
+                          <a:latin typeface="Neue Haas Grotesk Text Pro"/>
+                        </a:rPr>
+                        <a:t>&lt;0.05</a:t>
+                      </a:r>
+                      <a:endParaRPr lang="en-US"/>
+                    </a:p>
+                  </a:txBody>
+                  <a:tcPr/>
+                </a:tc>
                 <a:extLst>
                   <a:ext uri="{0D108BD9-81ED-4DB2-BD59-A6C34878D82A}">
                     <a16:rowId xmlns:a16="http://schemas.microsoft.com/office/drawing/2014/main" val="1845850733"/>
@@ -8446,6 +9010,49 @@
                   </a:txBody>
                   <a:tcPr/>
                 </a:tc>
+                <a:tc>
+                  <a:txBody>
+                    <a:bodyPr/>
+                    <a:lstStyle/>
+                    <a:p>
+                      <a:pPr lvl="0">
+                        <a:buNone/>
+                      </a:pPr>
+                      <a:r>
+                        <a:rPr lang="en-US" sz="1800" b="0" i="0" u="none" strike="noStrike" noProof="0" dirty="0">
+                          <a:solidFill>
+                            <a:srgbClr val="000000"/>
+                          </a:solidFill>
+                          <a:latin typeface="Neue Haas Grotesk Text Pro"/>
+                        </a:rPr>
+                        <a:t>0.546</a:t>
+                      </a:r>
+                    </a:p>
+                  </a:txBody>
+                  <a:tcPr/>
+                </a:tc>
+                <a:tc>
+                  <a:txBody>
+                    <a:bodyPr/>
+                    <a:lstStyle/>
+                    <a:p>
+                      <a:pPr lvl="0">
+                        <a:buNone/>
+                      </a:pPr>
+                      <a:r>
+                        <a:rPr lang="en-US" sz="1800" b="0" i="0" u="none" strike="noStrike" noProof="0" dirty="0">
+                          <a:solidFill>
+                            <a:srgbClr val="000000"/>
+                          </a:solidFill>
+                          <a:latin typeface="Neue Haas Grotesk Text Pro"/>
+                        </a:rPr>
+                        <a:t>&lt;0.05</a:t>
+                      </a:r>
+                      <a:endParaRPr lang="en-US"/>
+                    </a:p>
+                  </a:txBody>
+                  <a:tcPr/>
+                </a:tc>
                 <a:extLst>
                   <a:ext uri="{0D108BD9-81ED-4DB2-BD59-A6C34878D82A}">
                     <a16:rowId xmlns:a16="http://schemas.microsoft.com/office/drawing/2014/main" val="1451872956"/>
@@ -8551,6 +9158,49 @@
                   </a:txBody>
                   <a:tcPr/>
                 </a:tc>
+                <a:tc>
+                  <a:txBody>
+                    <a:bodyPr/>
+                    <a:lstStyle/>
+                    <a:p>
+                      <a:pPr lvl="0">
+                        <a:buNone/>
+                      </a:pPr>
+                      <a:r>
+                        <a:rPr lang="en-US" sz="1800" b="0" i="0" u="none" strike="noStrike" noProof="0" dirty="0">
+                          <a:solidFill>
+                            <a:srgbClr val="000000"/>
+                          </a:solidFill>
+                          <a:latin typeface="Neue Haas Grotesk Text Pro"/>
+                        </a:rPr>
+                        <a:t>0.589</a:t>
+                      </a:r>
+                    </a:p>
+                  </a:txBody>
+                  <a:tcPr/>
+                </a:tc>
+                <a:tc>
+                  <a:txBody>
+                    <a:bodyPr/>
+                    <a:lstStyle/>
+                    <a:p>
+                      <a:pPr lvl="0">
+                        <a:buNone/>
+                      </a:pPr>
+                      <a:r>
+                        <a:rPr lang="en-US" sz="1800" b="0" i="0" u="none" strike="noStrike" noProof="0" dirty="0">
+                          <a:solidFill>
+                            <a:srgbClr val="000000"/>
+                          </a:solidFill>
+                          <a:latin typeface="Neue Haas Grotesk Text Pro"/>
+                        </a:rPr>
+                        <a:t>&lt;0.05</a:t>
+                      </a:r>
+                      <a:endParaRPr lang="en-US"/>
+                    </a:p>
+                  </a:txBody>
+                  <a:tcPr/>
+                </a:tc>
                 <a:extLst>
                   <a:ext uri="{0D108BD9-81ED-4DB2-BD59-A6C34878D82A}">
                     <a16:rowId xmlns:a16="http://schemas.microsoft.com/office/drawing/2014/main" val="4228586729"/>
@@ -8653,6 +9303,49 @@
                   </a:txBody>
                   <a:tcPr/>
                 </a:tc>
+                <a:tc>
+                  <a:txBody>
+                    <a:bodyPr/>
+                    <a:lstStyle/>
+                    <a:p>
+                      <a:pPr lvl="0">
+                        <a:buNone/>
+                      </a:pPr>
+                      <a:r>
+                        <a:rPr lang="en-US" sz="1800" b="0" i="0" u="none" strike="noStrike" noProof="0" dirty="0">
+                          <a:solidFill>
+                            <a:srgbClr val="000000"/>
+                          </a:solidFill>
+                          <a:latin typeface="Neue Haas Grotesk Text Pro"/>
+                        </a:rPr>
+                        <a:t>0.405</a:t>
+                      </a:r>
+                    </a:p>
+                  </a:txBody>
+                  <a:tcPr/>
+                </a:tc>
+                <a:tc>
+                  <a:txBody>
+                    <a:bodyPr/>
+                    <a:lstStyle/>
+                    <a:p>
+                      <a:pPr lvl="0">
+                        <a:buNone/>
+                      </a:pPr>
+                      <a:r>
+                        <a:rPr lang="en-US" sz="1800" b="0" i="0" u="none" strike="noStrike" noProof="0" dirty="0">
+                          <a:solidFill>
+                            <a:srgbClr val="000000"/>
+                          </a:solidFill>
+                          <a:latin typeface="Neue Haas Grotesk Text Pro"/>
+                        </a:rPr>
+                        <a:t>&lt;0.05</a:t>
+                      </a:r>
+                      <a:endParaRPr lang="en-US"/>
+                    </a:p>
+                  </a:txBody>
+                  <a:tcPr/>
+                </a:tc>
                 <a:extLst>
                   <a:ext uri="{0D108BD9-81ED-4DB2-BD59-A6C34878D82A}">
                     <a16:rowId xmlns:a16="http://schemas.microsoft.com/office/drawing/2014/main" val="3861408195"/>
@@ -8754,6 +9447,49 @@
                         <a:t>&lt;0.05</a:t>
                       </a:r>
                       <a:endParaRPr lang="en-US" dirty="0"/>
+                    </a:p>
+                  </a:txBody>
+                  <a:tcPr/>
+                </a:tc>
+                <a:tc>
+                  <a:txBody>
+                    <a:bodyPr/>
+                    <a:lstStyle/>
+                    <a:p>
+                      <a:pPr lvl="0">
+                        <a:buNone/>
+                      </a:pPr>
+                      <a:r>
+                        <a:rPr lang="en-US" sz="1800" b="0" i="0" u="none" strike="noStrike" noProof="0" dirty="0">
+                          <a:solidFill>
+                            <a:srgbClr val="000000"/>
+                          </a:solidFill>
+                          <a:latin typeface="Neue Haas Grotesk Text Pro"/>
+                        </a:rPr>
+                        <a:t>0.581</a:t>
+                      </a:r>
+                    </a:p>
+                  </a:txBody>
+                  <a:tcPr/>
+                </a:tc>
+                <a:tc>
+                  <a:txBody>
+                    <a:bodyPr/>
+                    <a:lstStyle/>
+                    <a:p>
+                      <a:pPr lvl="0">
+                        <a:buNone/>
+                      </a:pPr>
+                      <a:r>
+                        <a:rPr lang="en-US" sz="1800" b="0" i="0" u="none" strike="noStrike" noProof="0" dirty="0">
+                          <a:solidFill>
+                            <a:srgbClr val="000000"/>
+                          </a:solidFill>
+                          <a:latin typeface="Neue Haas Grotesk Text Pro"/>
+                        </a:rPr>
+                        <a:t>&lt;0.05</a:t>
+                      </a:r>
+                      <a:endParaRPr lang="en-US"/>
                     </a:p>
                   </a:txBody>
                   <a:tcPr/>
@@ -9196,7 +9932,7 @@
           <p:nvPr>
             <p:extLst>
               <p:ext uri="{D42A27DB-BD31-4B8C-83A1-F6EECF244321}">
-                <p14:modId xmlns:p14="http://schemas.microsoft.com/office/powerpoint/2010/main" val="844531783"/>
+                <p14:modId xmlns:p14="http://schemas.microsoft.com/office/powerpoint/2010/main" val="2677561564"/>
               </p:ext>
             </p:extLst>
           </p:nvPr>
@@ -9238,33 +9974,55 @@
                       </a:pPr>
                       <a:r>
                         <a:rPr lang="en-US" sz="1800" b="0" i="0" u="none" strike="noStrike" noProof="0" dirty="0">
+                          <a:solidFill>
+                            <a:schemeClr val="tx1"/>
+                          </a:solidFill>
                           <a:latin typeface="Neue Haas Grotesk Text Pro"/>
                         </a:rPr>
                         <a:t>entity definition without generic</a:t>
                       </a:r>
-                      <a:endParaRPr lang="en-US" dirty="0"/>
-                    </a:p>
-                  </a:txBody>
-                  <a:tcPr/>
-                </a:tc>
-                <a:tc>
-                  <a:txBody>
-                    <a:bodyPr/>
-                    <a:lstStyle/>
-                    <a:p>
-                      <a:pPr lvl="0">
-                        <a:buNone/>
-                      </a:pPr>
-                      <a:r>
-                        <a:rPr lang="en-US" sz="1800" b="0" i="0" u="none" strike="noStrike" noProof="0" dirty="0">
+                      <a:endParaRPr lang="en-US" dirty="0">
+                        <a:solidFill>
+                          <a:schemeClr val="tx1"/>
+                        </a:solidFill>
+                      </a:endParaRPr>
+                    </a:p>
+                  </a:txBody>
+                  <a:tcPr>
+                    <a:solidFill>
+                      <a:srgbClr val="F6CDD3"/>
+                    </a:solidFill>
+                  </a:tcPr>
+                </a:tc>
+                <a:tc>
+                  <a:txBody>
+                    <a:bodyPr/>
+                    <a:lstStyle/>
+                    <a:p>
+                      <a:pPr lvl="0">
+                        <a:buNone/>
+                      </a:pPr>
+                      <a:r>
+                        <a:rPr lang="en-US" sz="1800" b="0" i="0" u="none" strike="noStrike" noProof="0" dirty="0">
+                          <a:solidFill>
+                            <a:schemeClr val="tx1"/>
+                          </a:solidFill>
                           <a:latin typeface="Neue Haas Grotesk Text Pro"/>
                         </a:rPr>
                         <a:t>0.75</a:t>
                       </a:r>
-                      <a:endParaRPr lang="en-US" dirty="0"/>
-                    </a:p>
-                  </a:txBody>
-                  <a:tcPr/>
+                      <a:endParaRPr lang="en-US" dirty="0">
+                        <a:solidFill>
+                          <a:schemeClr val="tx1"/>
+                        </a:solidFill>
+                      </a:endParaRPr>
+                    </a:p>
+                  </a:txBody>
+                  <a:tcPr>
+                    <a:solidFill>
+                      <a:srgbClr val="F6CDD3"/>
+                    </a:solidFill>
+                  </a:tcPr>
                 </a:tc>
                 <a:extLst>
                   <a:ext uri="{0D108BD9-81ED-4DB2-BD59-A6C34878D82A}">
@@ -10056,27 +10814,11 @@
             </a:r>
             <a:r>
               <a:rPr lang="en-US" dirty="0"/>
-              <a:t> la media </a:t>
-            </a:r>
-            <a:r>
-              <a:rPr lang="en-US" dirty="0" err="1"/>
-              <a:t>delle</a:t>
-            </a:r>
-            <a:r>
-              <a:rPr lang="en-US" dirty="0"/>
               <a:t> </a:t>
             </a:r>
             <a:r>
               <a:rPr lang="en-US" dirty="0" err="1"/>
-              <a:t>correlazioni</a:t>
-            </a:r>
-            <a:r>
-              <a:rPr lang="en-US" dirty="0"/>
-              <a:t> sui 3 </a:t>
-            </a:r>
-            <a:r>
-              <a:rPr lang="en-US" dirty="0" err="1"/>
-              <a:t>modelli</a:t>
+              <a:t>correlazione</a:t>
             </a:r>
             <a:r>
               <a:rPr lang="en-US" dirty="0"/>
@@ -10084,7 +10826,35 @@
             </a:r>
             <a:r>
               <a:rPr lang="en-US" dirty="0" err="1"/>
-              <a:t>analizzati</a:t>
+              <a:t>globale</a:t>
+            </a:r>
+            <a:r>
+              <a:rPr lang="en-US" dirty="0"/>
+              <a:t>, tutti I </a:t>
+            </a:r>
+            <a:r>
+              <a:rPr lang="en-US" dirty="0" err="1"/>
+              <a:t>risultati</a:t>
+            </a:r>
+            <a:r>
+              <a:rPr lang="en-US" dirty="0"/>
+              <a:t> </a:t>
+            </a:r>
+            <a:r>
+              <a:rPr lang="en-US" dirty="0" err="1"/>
+              <a:t>si</a:t>
+            </a:r>
+            <a:r>
+              <a:rPr lang="en-US" dirty="0"/>
+              <a:t> </a:t>
+            </a:r>
+            <a:r>
+              <a:rPr lang="en-US" dirty="0" err="1"/>
+              <a:t>riportano</a:t>
+            </a:r>
+            <a:r>
+              <a:rPr lang="en-US" dirty="0"/>
+              <a:t> con un p-value &lt; 0.5</a:t>
             </a:r>
           </a:p>
         </p:txBody>
@@ -10104,14 +10874,14 @@
           <p:nvPr>
             <p:extLst>
               <p:ext uri="{D42A27DB-BD31-4B8C-83A1-F6EECF244321}">
-                <p14:modId xmlns:p14="http://schemas.microsoft.com/office/powerpoint/2010/main" val="2278969227"/>
+                <p14:modId xmlns:p14="http://schemas.microsoft.com/office/powerpoint/2010/main" val="1085041301"/>
               </p:ext>
             </p:extLst>
           </p:nvPr>
         </p:nvGraphicFramePr>
         <p:xfrm>
           <a:off x="1040745" y="2541344"/>
-          <a:ext cx="9455838" cy="3745333"/>
+          <a:ext cx="9455836" cy="3745333"/>
         </p:xfrm>
         <a:graphic>
           <a:graphicData uri="http://schemas.openxmlformats.org/drawingml/2006/table">
@@ -10120,27 +10890,34 @@
                 <a:tableStyleId>{5C22544A-7EE6-4342-B048-85BDC9FD1C3A}</a:tableStyleId>
               </a:tblPr>
               <a:tblGrid>
-                <a:gridCol w="3151946">
+                <a:gridCol w="2363959">
                   <a:extLst>
                     <a:ext uri="{9D8B030D-6E8A-4147-A177-3AD203B41FA5}">
                       <a16:colId xmlns:a16="http://schemas.microsoft.com/office/drawing/2014/main" val="3371868344"/>
                     </a:ext>
                   </a:extLst>
                 </a:gridCol>
-                <a:gridCol w="3151946">
+                <a:gridCol w="2363959">
                   <a:extLst>
                     <a:ext uri="{9D8B030D-6E8A-4147-A177-3AD203B41FA5}">
                       <a16:colId xmlns:a16="http://schemas.microsoft.com/office/drawing/2014/main" val="1258793391"/>
                     </a:ext>
                   </a:extLst>
                 </a:gridCol>
-                <a:gridCol w="3151946">
+                <a:gridCol w="2363959">
                   <a:extLst>
                     <a:ext uri="{9D8B030D-6E8A-4147-A177-3AD203B41FA5}">
                       <a16:colId xmlns:a16="http://schemas.microsoft.com/office/drawing/2014/main" val="1595832302"/>
                     </a:ext>
                   </a:extLst>
                 </a:gridCol>
+                <a:gridCol w="2363959">
+                  <a:extLst>
+                    <a:ext uri="{9D8B030D-6E8A-4147-A177-3AD203B41FA5}">
+                      <a16:colId xmlns:a16="http://schemas.microsoft.com/office/drawing/2014/main" val="3824653826"/>
+                    </a:ext>
+                  </a:extLst>
+                </a:gridCol>
               </a:tblGrid>
               <a:tr h="469798">
                 <a:tc>
@@ -10174,6 +10951,22 @@
                       <a:r>
                         <a:rPr lang="en-US" dirty="0"/>
                         <a:t>Kendall</a:t>
+                      </a:r>
+                    </a:p>
+                  </a:txBody>
+                  <a:tcPr/>
+                </a:tc>
+                <a:tc>
+                  <a:txBody>
+                    <a:bodyPr/>
+                    <a:lstStyle/>
+                    <a:p>
+                      <a:pPr lvl="0">
+                        <a:buNone/>
+                      </a:pPr>
+                      <a:r>
+                        <a:rPr lang="en-US" dirty="0"/>
+                        <a:t>Pearson</a:t>
                       </a:r>
                     </a:p>
                   </a:txBody>
@@ -10211,26 +11004,43 @@
                         <a:rPr lang="en-US" sz="1800" b="0" i="0" u="none" strike="noStrike" noProof="0" dirty="0">
                           <a:latin typeface="Neue Haas Grotesk Text Pro"/>
                         </a:rPr>
-                        <a:t>0.521</a:t>
-                      </a:r>
-                      <a:endParaRPr lang="en-US" dirty="0"/>
-                    </a:p>
-                  </a:txBody>
-                  <a:tcPr/>
-                </a:tc>
-                <a:tc>
-                  <a:txBody>
-                    <a:bodyPr/>
-                    <a:lstStyle/>
-                    <a:p>
-                      <a:pPr lvl="0">
-                        <a:buNone/>
-                      </a:pPr>
-                      <a:r>
-                        <a:rPr lang="en-US" sz="1800" b="0" i="0" u="none" strike="noStrike" noProof="0" dirty="0">
-                          <a:latin typeface="Neue Haas Grotesk Text Pro"/>
-                        </a:rPr>
-                        <a:t>0.521</a:t>
+                        <a:t>0.568</a:t>
+                      </a:r>
+                    </a:p>
+                  </a:txBody>
+                  <a:tcPr/>
+                </a:tc>
+                <a:tc>
+                  <a:txBody>
+                    <a:bodyPr/>
+                    <a:lstStyle/>
+                    <a:p>
+                      <a:pPr lvl="0">
+                        <a:buNone/>
+                      </a:pPr>
+                      <a:r>
+                        <a:rPr lang="en-US" sz="1800" b="0" i="0" u="none" strike="noStrike" noProof="0" dirty="0">
+                          <a:latin typeface="Neue Haas Grotesk Text Pro"/>
+                        </a:rPr>
+                        <a:t>0.568</a:t>
+                      </a:r>
+                    </a:p>
+                  </a:txBody>
+                  <a:tcPr/>
+                </a:tc>
+                <a:tc>
+                  <a:txBody>
+                    <a:bodyPr/>
+                    <a:lstStyle/>
+                    <a:p>
+                      <a:pPr lvl="0">
+                        <a:buNone/>
+                      </a:pPr>
+                      <a:r>
+                        <a:rPr lang="en-US" sz="1800" b="0" i="0" u="none" strike="noStrike" noProof="0" dirty="0">
+                          <a:latin typeface="Neue Haas Grotesk Text Pro"/>
+                        </a:rPr>
+                        <a:t>0.568</a:t>
                       </a:r>
                     </a:p>
                   </a:txBody>
@@ -10268,25 +11078,43 @@
                         <a:rPr lang="en-US" sz="1800" b="0" i="0" u="none" strike="noStrike" noProof="0" dirty="0">
                           <a:latin typeface="Neue Haas Grotesk Text Pro"/>
                         </a:rPr>
-                        <a:t>0.621</a:t>
-                      </a:r>
-                    </a:p>
-                  </a:txBody>
-                  <a:tcPr/>
-                </a:tc>
-                <a:tc>
-                  <a:txBody>
-                    <a:bodyPr/>
-                    <a:lstStyle/>
-                    <a:p>
-                      <a:pPr lvl="0">
-                        <a:buNone/>
-                      </a:pPr>
-                      <a:r>
-                        <a:rPr lang="en-US" sz="1800" b="0" i="0" u="none" strike="noStrike" noProof="0" dirty="0">
-                          <a:latin typeface="Neue Haas Grotesk Text Pro"/>
-                        </a:rPr>
-                        <a:t>0.533</a:t>
+                        <a:t>0.701</a:t>
+                      </a:r>
+                    </a:p>
+                  </a:txBody>
+                  <a:tcPr/>
+                </a:tc>
+                <a:tc>
+                  <a:txBody>
+                    <a:bodyPr/>
+                    <a:lstStyle/>
+                    <a:p>
+                      <a:pPr lvl="0">
+                        <a:buNone/>
+                      </a:pPr>
+                      <a:r>
+                        <a:rPr lang="en-US" sz="1800" b="0" i="0" u="none" strike="noStrike" noProof="0" dirty="0">
+                          <a:latin typeface="Neue Haas Grotesk Text Pro"/>
+                        </a:rPr>
+                        <a:t>0.596</a:t>
+                      </a:r>
+                    </a:p>
+                  </a:txBody>
+                  <a:tcPr/>
+                </a:tc>
+                <a:tc>
+                  <a:txBody>
+                    <a:bodyPr/>
+                    <a:lstStyle/>
+                    <a:p>
+                      <a:pPr lvl="0">
+                        <a:buNone/>
+                      </a:pPr>
+                      <a:r>
+                        <a:rPr lang="en-US" sz="1800" b="0" i="0" u="none" strike="noStrike" noProof="0" dirty="0">
+                          <a:latin typeface="Neue Haas Grotesk Text Pro"/>
+                        </a:rPr>
+                        <a:t>0.680</a:t>
                       </a:r>
                     </a:p>
                   </a:txBody>
@@ -10324,25 +11152,43 @@
                         <a:rPr lang="en-US" sz="1800" b="0" i="0" u="none" strike="noStrike" noProof="0" dirty="0">
                           <a:latin typeface="Neue Haas Grotesk Text Pro"/>
                         </a:rPr>
-                        <a:t>0.632</a:t>
-                      </a:r>
-                    </a:p>
-                  </a:txBody>
-                  <a:tcPr/>
-                </a:tc>
-                <a:tc>
-                  <a:txBody>
-                    <a:bodyPr/>
-                    <a:lstStyle/>
-                    <a:p>
-                      <a:pPr lvl="0">
-                        <a:buNone/>
-                      </a:pPr>
-                      <a:r>
-                        <a:rPr lang="en-US" sz="1800" b="0" i="0" u="none" strike="noStrike" noProof="0" dirty="0">
-                          <a:latin typeface="Neue Haas Grotesk Text Pro"/>
-                        </a:rPr>
-                        <a:t>0.520</a:t>
+                        <a:t>0.706</a:t>
+                      </a:r>
+                    </a:p>
+                  </a:txBody>
+                  <a:tcPr/>
+                </a:tc>
+                <a:tc>
+                  <a:txBody>
+                    <a:bodyPr/>
+                    <a:lstStyle/>
+                    <a:p>
+                      <a:pPr lvl="0">
+                        <a:buNone/>
+                      </a:pPr>
+                      <a:r>
+                        <a:rPr lang="en-US" sz="1800" b="0" i="0" u="none" strike="noStrike" noProof="0" dirty="0">
+                          <a:latin typeface="Neue Haas Grotesk Text Pro"/>
+                        </a:rPr>
+                        <a:t>0.580</a:t>
+                      </a:r>
+                    </a:p>
+                  </a:txBody>
+                  <a:tcPr/>
+                </a:tc>
+                <a:tc>
+                  <a:txBody>
+                    <a:bodyPr/>
+                    <a:lstStyle/>
+                    <a:p>
+                      <a:pPr lvl="0">
+                        <a:buNone/>
+                      </a:pPr>
+                      <a:r>
+                        <a:rPr lang="en-US" sz="1800" b="0" i="0" u="none" strike="noStrike" noProof="0" dirty="0">
+                          <a:latin typeface="Neue Haas Grotesk Text Pro"/>
+                        </a:rPr>
+                        <a:t>0.70</a:t>
                       </a:r>
                     </a:p>
                   </a:txBody>
@@ -10380,25 +11226,43 @@
                         <a:rPr lang="en-US" sz="1800" b="0" i="0" u="none" strike="noStrike" noProof="0" dirty="0">
                           <a:latin typeface="Neue Haas Grotesk Text Pro"/>
                         </a:rPr>
-                        <a:t>0.618</a:t>
-                      </a:r>
-                    </a:p>
-                  </a:txBody>
-                  <a:tcPr/>
-                </a:tc>
-                <a:tc>
-                  <a:txBody>
-                    <a:bodyPr/>
-                    <a:lstStyle/>
-                    <a:p>
-                      <a:pPr lvl="0">
-                        <a:buNone/>
-                      </a:pPr>
-                      <a:r>
-                        <a:rPr lang="en-US" sz="1800" b="0" i="0" u="none" strike="noStrike" noProof="0" dirty="0">
-                          <a:latin typeface="Neue Haas Grotesk Text Pro"/>
-                        </a:rPr>
-                        <a:t>0.530</a:t>
+                        <a:t>0.70</a:t>
+                      </a:r>
+                    </a:p>
+                  </a:txBody>
+                  <a:tcPr/>
+                </a:tc>
+                <a:tc>
+                  <a:txBody>
+                    <a:bodyPr/>
+                    <a:lstStyle/>
+                    <a:p>
+                      <a:pPr lvl="0">
+                        <a:buNone/>
+                      </a:pPr>
+                      <a:r>
+                        <a:rPr lang="en-US" sz="1800" b="0" i="0" u="none" strike="noStrike" noProof="0" dirty="0">
+                          <a:latin typeface="Neue Haas Grotesk Text Pro"/>
+                        </a:rPr>
+                        <a:t>0.593</a:t>
+                      </a:r>
+                    </a:p>
+                  </a:txBody>
+                  <a:tcPr/>
+                </a:tc>
+                <a:tc>
+                  <a:txBody>
+                    <a:bodyPr/>
+                    <a:lstStyle/>
+                    <a:p>
+                      <a:pPr lvl="0">
+                        <a:buNone/>
+                      </a:pPr>
+                      <a:r>
+                        <a:rPr lang="en-US" sz="1800" b="0" i="0" u="none" strike="noStrike" noProof="0" dirty="0">
+                          <a:latin typeface="Neue Haas Grotesk Text Pro"/>
+                        </a:rPr>
+                        <a:t>0.662</a:t>
                       </a:r>
                     </a:p>
                   </a:txBody>
@@ -10439,25 +11303,46 @@
                         <a:rPr lang="en-US" sz="1800" b="0" i="0" u="none" strike="noStrike" noProof="0" dirty="0">
                           <a:latin typeface="Neue Haas Grotesk Text Pro"/>
                         </a:rPr>
-                        <a:t>0.559</a:t>
-                      </a:r>
-                    </a:p>
-                  </a:txBody>
-                  <a:tcPr/>
-                </a:tc>
-                <a:tc>
-                  <a:txBody>
-                    <a:bodyPr/>
-                    <a:lstStyle/>
-                    <a:p>
-                      <a:pPr lvl="0">
-                        <a:buNone/>
-                      </a:pPr>
-                      <a:r>
-                        <a:rPr lang="en-US" sz="1800" b="0" i="0" u="none" strike="noStrike" noProof="0" dirty="0">
-                          <a:latin typeface="Neue Haas Grotesk Text Pro"/>
-                        </a:rPr>
-                        <a:t>0.489</a:t>
+                        <a:t>0.639</a:t>
+                      </a:r>
+                    </a:p>
+                  </a:txBody>
+                  <a:tcPr/>
+                </a:tc>
+                <a:tc>
+                  <a:txBody>
+                    <a:bodyPr/>
+                    <a:lstStyle/>
+                    <a:p>
+                      <a:pPr lvl="0">
+                        <a:buNone/>
+                      </a:pPr>
+                      <a:r>
+                        <a:rPr lang="en-US" sz="1800" b="0" i="0" u="none" strike="noStrike" noProof="0">
+                          <a:latin typeface="Neue Haas Grotesk Text Pro"/>
+                        </a:rPr>
+                        <a:t>0.555</a:t>
+                      </a:r>
+                      <a:endParaRPr lang="en-US" sz="1800" b="0" i="0" u="none" strike="noStrike" noProof="0" dirty="0">
+                        <a:latin typeface="Neue Haas Grotesk Text Pro"/>
+                      </a:endParaRPr>
+                    </a:p>
+                  </a:txBody>
+                  <a:tcPr/>
+                </a:tc>
+                <a:tc>
+                  <a:txBody>
+                    <a:bodyPr/>
+                    <a:lstStyle/>
+                    <a:p>
+                      <a:pPr lvl="0">
+                        <a:buNone/>
+                      </a:pPr>
+                      <a:r>
+                        <a:rPr lang="en-US" sz="1800" b="0" i="0" u="none" strike="noStrike" noProof="0" dirty="0">
+                          <a:latin typeface="Neue Haas Grotesk Text Pro"/>
+                        </a:rPr>
+                        <a:t>0.638</a:t>
                       </a:r>
                     </a:p>
                   </a:txBody>
@@ -10495,25 +11380,43 @@
                         <a:rPr lang="en-US" sz="1800" b="0" i="0" u="none" strike="noStrike" noProof="0" dirty="0">
                           <a:latin typeface="Neue Haas Grotesk Text Pro"/>
                         </a:rPr>
-                        <a:t>0.526</a:t>
-                      </a:r>
-                    </a:p>
-                  </a:txBody>
-                  <a:tcPr/>
-                </a:tc>
-                <a:tc>
-                  <a:txBody>
-                    <a:bodyPr/>
-                    <a:lstStyle/>
-                    <a:p>
-                      <a:pPr lvl="0">
-                        <a:buNone/>
-                      </a:pPr>
-                      <a:r>
-                        <a:rPr lang="en-US" sz="1800" b="0" i="0" u="none" strike="noStrike" noProof="0" dirty="0">
-                          <a:latin typeface="Neue Haas Grotesk Text Pro"/>
-                        </a:rPr>
-                        <a:t>0.459</a:t>
+                        <a:t>0.607</a:t>
+                      </a:r>
+                    </a:p>
+                  </a:txBody>
+                  <a:tcPr/>
+                </a:tc>
+                <a:tc>
+                  <a:txBody>
+                    <a:bodyPr/>
+                    <a:lstStyle/>
+                    <a:p>
+                      <a:pPr lvl="0">
+                        <a:buNone/>
+                      </a:pPr>
+                      <a:r>
+                        <a:rPr lang="en-US" sz="1800" b="0" i="0" u="none" strike="noStrike" noProof="0" dirty="0">
+                          <a:latin typeface="Neue Haas Grotesk Text Pro"/>
+                        </a:rPr>
+                        <a:t>0.527</a:t>
+                      </a:r>
+                    </a:p>
+                  </a:txBody>
+                  <a:tcPr/>
+                </a:tc>
+                <a:tc>
+                  <a:txBody>
+                    <a:bodyPr/>
+                    <a:lstStyle/>
+                    <a:p>
+                      <a:pPr lvl="0">
+                        <a:buNone/>
+                      </a:pPr>
+                      <a:r>
+                        <a:rPr lang="en-US" sz="1800" b="0" i="0" u="none" strike="noStrike" noProof="0" dirty="0">
+                          <a:latin typeface="Neue Haas Grotesk Text Pro"/>
+                        </a:rPr>
+                        <a:t>0.480</a:t>
                       </a:r>
                     </a:p>
                   </a:txBody>
@@ -10554,25 +11457,43 @@
                         <a:rPr lang="en-US" sz="1800" b="0" i="0" u="none" strike="noStrike" noProof="0" dirty="0">
                           <a:latin typeface="Neue Haas Grotesk Text Pro"/>
                         </a:rPr>
-                        <a:t>0.609</a:t>
-                      </a:r>
-                    </a:p>
-                  </a:txBody>
-                  <a:tcPr/>
-                </a:tc>
-                <a:tc>
-                  <a:txBody>
-                    <a:bodyPr/>
-                    <a:lstStyle/>
-                    <a:p>
-                      <a:pPr lvl="0">
-                        <a:buNone/>
-                      </a:pPr>
-                      <a:r>
-                        <a:rPr lang="en-US" sz="1800" b="0" i="0" u="none" strike="noStrike" noProof="0" dirty="0">
-                          <a:latin typeface="Neue Haas Grotesk Text Pro"/>
-                        </a:rPr>
-                        <a:t>0.524</a:t>
+                        <a:t>0.678</a:t>
+                      </a:r>
+                    </a:p>
+                  </a:txBody>
+                  <a:tcPr/>
+                </a:tc>
+                <a:tc>
+                  <a:txBody>
+                    <a:bodyPr/>
+                    <a:lstStyle/>
+                    <a:p>
+                      <a:pPr lvl="0">
+                        <a:buNone/>
+                      </a:pPr>
+                      <a:r>
+                        <a:rPr lang="en-US" sz="1800" b="0" i="0" u="none" strike="noStrike" noProof="0" dirty="0">
+                          <a:latin typeface="Neue Haas Grotesk Text Pro"/>
+                        </a:rPr>
+                        <a:t>0.578</a:t>
+                      </a:r>
+                    </a:p>
+                  </a:txBody>
+                  <a:tcPr/>
+                </a:tc>
+                <a:tc>
+                  <a:txBody>
+                    <a:bodyPr/>
+                    <a:lstStyle/>
+                    <a:p>
+                      <a:pPr lvl="0">
+                        <a:buNone/>
+                      </a:pPr>
+                      <a:r>
+                        <a:rPr lang="en-US" sz="1800" b="0" i="0" u="none" strike="noStrike" noProof="0" dirty="0">
+                          <a:latin typeface="Neue Haas Grotesk Text Pro"/>
+                        </a:rPr>
+                        <a:t>0.656</a:t>
                       </a:r>
                     </a:p>
                   </a:txBody>
@@ -13806,14 +14727,14 @@
           <p:nvPr>
             <p:extLst>
               <p:ext uri="{D42A27DB-BD31-4B8C-83A1-F6EECF244321}">
-                <p14:modId xmlns:p14="http://schemas.microsoft.com/office/powerpoint/2010/main" val="2035580615"/>
+                <p14:modId xmlns:p14="http://schemas.microsoft.com/office/powerpoint/2010/main" val="1635219344"/>
               </p:ext>
             </p:extLst>
           </p:nvPr>
         </p:nvGraphicFramePr>
         <p:xfrm>
-          <a:off x="1040745" y="2541344"/>
-          <a:ext cx="10550105" cy="3903823"/>
+          <a:off x="680340" y="2366290"/>
+          <a:ext cx="10827620" cy="4525805"/>
         </p:xfrm>
         <a:graphic>
           <a:graphicData uri="http://schemas.openxmlformats.org/drawingml/2006/table">
@@ -13822,41 +14743,55 @@
                 <a:tableStyleId>{5C22544A-7EE6-4342-B048-85BDC9FD1C3A}</a:tableStyleId>
               </a:tblPr>
               <a:tblGrid>
-                <a:gridCol w="2110021">
+                <a:gridCol w="1647567">
                   <a:extLst>
                     <a:ext uri="{9D8B030D-6E8A-4147-A177-3AD203B41FA5}">
                       <a16:colId xmlns:a16="http://schemas.microsoft.com/office/drawing/2014/main" val="3371868344"/>
                     </a:ext>
                   </a:extLst>
                 </a:gridCol>
-                <a:gridCol w="2110021">
+                <a:gridCol w="1295951">
                   <a:extLst>
                     <a:ext uri="{9D8B030D-6E8A-4147-A177-3AD203B41FA5}">
                       <a16:colId xmlns:a16="http://schemas.microsoft.com/office/drawing/2014/main" val="1258793391"/>
                     </a:ext>
                   </a:extLst>
                 </a:gridCol>
-                <a:gridCol w="2110021">
+                <a:gridCol w="1932477">
                   <a:extLst>
                     <a:ext uri="{9D8B030D-6E8A-4147-A177-3AD203B41FA5}">
                       <a16:colId xmlns:a16="http://schemas.microsoft.com/office/drawing/2014/main" val="2446546284"/>
                     </a:ext>
                   </a:extLst>
                 </a:gridCol>
-                <a:gridCol w="2110021">
+                <a:gridCol w="955959">
                   <a:extLst>
                     <a:ext uri="{9D8B030D-6E8A-4147-A177-3AD203B41FA5}">
                       <a16:colId xmlns:a16="http://schemas.microsoft.com/office/drawing/2014/main" val="1595832302"/>
                     </a:ext>
                   </a:extLst>
                 </a:gridCol>
-                <a:gridCol w="2110021">
+                <a:gridCol w="1665222">
                   <a:extLst>
                     <a:ext uri="{9D8B030D-6E8A-4147-A177-3AD203B41FA5}">
                       <a16:colId xmlns:a16="http://schemas.microsoft.com/office/drawing/2014/main" val="3607507415"/>
                     </a:ext>
                   </a:extLst>
                 </a:gridCol>
+                <a:gridCol w="1665222">
+                  <a:extLst>
+                    <a:ext uri="{9D8B030D-6E8A-4147-A177-3AD203B41FA5}">
+                      <a16:colId xmlns:a16="http://schemas.microsoft.com/office/drawing/2014/main" val="3134780531"/>
+                    </a:ext>
+                  </a:extLst>
+                </a:gridCol>
+                <a:gridCol w="1665222">
+                  <a:extLst>
+                    <a:ext uri="{9D8B030D-6E8A-4147-A177-3AD203B41FA5}">
+                      <a16:colId xmlns:a16="http://schemas.microsoft.com/office/drawing/2014/main" val="1020137527"/>
+                    </a:ext>
+                  </a:extLst>
+                </a:gridCol>
               </a:tblGrid>
               <a:tr h="466249">
                 <a:tc>
@@ -13875,28 +14810,29 @@
                     <a:lstStyle/>
                     <a:p>
                       <a:r>
+                        <a:rPr lang="en-US" err="1"/>
+                        <a:t>Spermann</a:t>
+                      </a:r>
+                      <a:endParaRPr lang="en-US" dirty="0" err="1"/>
+                    </a:p>
+                  </a:txBody>
+                  <a:tcPr/>
+                </a:tc>
+                <a:tc>
+                  <a:txBody>
+                    <a:bodyPr/>
+                    <a:lstStyle/>
+                    <a:p>
+                      <a:r>
+                        <a:rPr lang="en-US" dirty="0"/>
+                        <a:t>P-value(</a:t>
+                      </a:r>
+                      <a:r>
                         <a:rPr lang="en-US" dirty="0" err="1"/>
-                        <a:t>Spermann</a:t>
-                      </a:r>
-                    </a:p>
-                  </a:txBody>
-                  <a:tcPr/>
-                </a:tc>
-                <a:tc>
-                  <a:txBody>
-                    <a:bodyPr/>
-                    <a:lstStyle/>
-                    <a:p>
-                      <a:r>
-                        <a:rPr lang="en-US"/>
-                        <a:t>P-value(</a:t>
-                      </a:r>
-                      <a:r>
-                        <a:rPr lang="en-US" err="1"/>
                         <a:t>Speramnn</a:t>
                       </a:r>
                       <a:r>
-                        <a:rPr lang="en-US"/>
+                        <a:rPr lang="en-US" dirty="0"/>
                         <a:t>)</a:t>
                       </a:r>
                     </a:p>
@@ -13934,6 +14870,49 @@
                         <a:t>P-value(Kendall)</a:t>
                       </a:r>
                       <a:endParaRPr lang="en-US"/>
+                    </a:p>
+                  </a:txBody>
+                  <a:tcPr/>
+                </a:tc>
+                <a:tc>
+                  <a:txBody>
+                    <a:bodyPr/>
+                    <a:lstStyle/>
+                    <a:p>
+                      <a:pPr lvl="0">
+                        <a:buNone/>
+                      </a:pPr>
+                      <a:r>
+                        <a:rPr lang="en-US" sz="1800" b="1" i="0" u="none" strike="noStrike" noProof="0" dirty="0">
+                          <a:solidFill>
+                            <a:srgbClr val="FFFFFF"/>
+                          </a:solidFill>
+                          <a:latin typeface="Neue Haas Grotesk Text Pro"/>
+                        </a:rPr>
+                        <a:t>Pearson</a:t>
+                      </a:r>
+                    </a:p>
+                  </a:txBody>
+                  <a:tcPr/>
+                </a:tc>
+                <a:tc>
+                  <a:txBody>
+                    <a:bodyPr/>
+                    <a:lstStyle/>
+                    <a:p>
+                      <a:pPr lvl="0">
+                        <a:buNone/>
+                      </a:pPr>
+                      <a:r>
+                        <a:rPr lang="en-US" sz="1800" b="1" i="0" u="none" strike="noStrike" noProof="0" dirty="0">
+                          <a:solidFill>
+                            <a:srgbClr val="FFFFFF"/>
+                          </a:solidFill>
+                          <a:latin typeface="Neue Haas Grotesk Text Pro"/>
+                        </a:rPr>
+                        <a:t>P-value(Pearson)</a:t>
+                      </a:r>
+                      <a:endParaRPr lang="en-US" dirty="0"/>
                     </a:p>
                   </a:txBody>
                   <a:tcPr/>
@@ -14031,6 +15010,49 @@
                   </a:txBody>
                   <a:tcPr/>
                 </a:tc>
+                <a:tc>
+                  <a:txBody>
+                    <a:bodyPr/>
+                    <a:lstStyle/>
+                    <a:p>
+                      <a:pPr lvl="0">
+                        <a:buNone/>
+                      </a:pPr>
+                      <a:r>
+                        <a:rPr lang="en-US" sz="1800" b="0" i="0" u="none" strike="noStrike" noProof="0" dirty="0">
+                          <a:solidFill>
+                            <a:srgbClr val="000000"/>
+                          </a:solidFill>
+                          <a:latin typeface="Neue Haas Grotesk Text Pro"/>
+                        </a:rPr>
+                        <a:t>0.645</a:t>
+                      </a:r>
+                    </a:p>
+                  </a:txBody>
+                  <a:tcPr/>
+                </a:tc>
+                <a:tc>
+                  <a:txBody>
+                    <a:bodyPr/>
+                    <a:lstStyle/>
+                    <a:p>
+                      <a:pPr lvl="0">
+                        <a:buNone/>
+                      </a:pPr>
+                      <a:r>
+                        <a:rPr lang="en-US" sz="1800" b="0" i="0" u="none" strike="noStrike" noProof="0" dirty="0">
+                          <a:solidFill>
+                            <a:srgbClr val="000000"/>
+                          </a:solidFill>
+                          <a:latin typeface="Neue Haas Grotesk Text Pro"/>
+                        </a:rPr>
+                        <a:t>&lt;0.05</a:t>
+                      </a:r>
+                      <a:endParaRPr lang="en-US"/>
+                    </a:p>
+                  </a:txBody>
+                  <a:tcPr/>
+                </a:tc>
                 <a:extLst>
                   <a:ext uri="{0D108BD9-81ED-4DB2-BD59-A6C34878D82A}">
                     <a16:rowId xmlns:a16="http://schemas.microsoft.com/office/drawing/2014/main" val="1349283095"/>
@@ -14133,6 +15155,49 @@
                   </a:txBody>
                   <a:tcPr/>
                 </a:tc>
+                <a:tc>
+                  <a:txBody>
+                    <a:bodyPr/>
+                    <a:lstStyle/>
+                    <a:p>
+                      <a:pPr lvl="0">
+                        <a:buNone/>
+                      </a:pPr>
+                      <a:r>
+                        <a:rPr lang="en-US" sz="1800" b="0" i="0" u="none" strike="noStrike" noProof="0" dirty="0">
+                          <a:solidFill>
+                            <a:srgbClr val="000000"/>
+                          </a:solidFill>
+                          <a:latin typeface="Neue Haas Grotesk Text Pro"/>
+                        </a:rPr>
+                        <a:t>0.614</a:t>
+                      </a:r>
+                    </a:p>
+                  </a:txBody>
+                  <a:tcPr/>
+                </a:tc>
+                <a:tc>
+                  <a:txBody>
+                    <a:bodyPr/>
+                    <a:lstStyle/>
+                    <a:p>
+                      <a:pPr lvl="0">
+                        <a:buNone/>
+                      </a:pPr>
+                      <a:r>
+                        <a:rPr lang="en-US" sz="1800" b="0" i="0" u="none" strike="noStrike" noProof="0" dirty="0">
+                          <a:solidFill>
+                            <a:srgbClr val="000000"/>
+                          </a:solidFill>
+                          <a:latin typeface="Neue Haas Grotesk Text Pro"/>
+                        </a:rPr>
+                        <a:t>&lt;0.05</a:t>
+                      </a:r>
+                      <a:endParaRPr lang="en-US"/>
+                    </a:p>
+                  </a:txBody>
+                  <a:tcPr/>
+                </a:tc>
                 <a:extLst>
                   <a:ext uri="{0D108BD9-81ED-4DB2-BD59-A6C34878D82A}">
                     <a16:rowId xmlns:a16="http://schemas.microsoft.com/office/drawing/2014/main" val="3748603194"/>
@@ -14235,6 +15300,49 @@
                   </a:txBody>
                   <a:tcPr/>
                 </a:tc>
+                <a:tc>
+                  <a:txBody>
+                    <a:bodyPr/>
+                    <a:lstStyle/>
+                    <a:p>
+                      <a:pPr lvl="0">
+                        <a:buNone/>
+                      </a:pPr>
+                      <a:r>
+                        <a:rPr lang="en-US" sz="1800" b="0" i="0" u="none" strike="noStrike" noProof="0" dirty="0">
+                          <a:solidFill>
+                            <a:srgbClr val="000000"/>
+                          </a:solidFill>
+                          <a:latin typeface="Neue Haas Grotesk Text Pro"/>
+                        </a:rPr>
+                        <a:t>0.553</a:t>
+                      </a:r>
+                    </a:p>
+                  </a:txBody>
+                  <a:tcPr/>
+                </a:tc>
+                <a:tc>
+                  <a:txBody>
+                    <a:bodyPr/>
+                    <a:lstStyle/>
+                    <a:p>
+                      <a:pPr lvl="0">
+                        <a:buNone/>
+                      </a:pPr>
+                      <a:r>
+                        <a:rPr lang="en-US" sz="1800" b="0" i="0" u="none" strike="noStrike" noProof="0" dirty="0">
+                          <a:solidFill>
+                            <a:srgbClr val="000000"/>
+                          </a:solidFill>
+                          <a:latin typeface="Neue Haas Grotesk Text Pro"/>
+                        </a:rPr>
+                        <a:t>&lt;0.05</a:t>
+                      </a:r>
+                      <a:endParaRPr lang="en-US"/>
+                    </a:p>
+                  </a:txBody>
+                  <a:tcPr/>
+                </a:tc>
                 <a:extLst>
                   <a:ext uri="{0D108BD9-81ED-4DB2-BD59-A6C34878D82A}">
                     <a16:rowId xmlns:a16="http://schemas.microsoft.com/office/drawing/2014/main" val="1845850733"/>
@@ -14337,6 +15445,49 @@
                   </a:txBody>
                   <a:tcPr/>
                 </a:tc>
+                <a:tc>
+                  <a:txBody>
+                    <a:bodyPr/>
+                    <a:lstStyle/>
+                    <a:p>
+                      <a:pPr lvl="0">
+                        <a:buNone/>
+                      </a:pPr>
+                      <a:r>
+                        <a:rPr lang="en-US" sz="1800" b="0" i="0" u="none" strike="noStrike" noProof="0" dirty="0">
+                          <a:solidFill>
+                            <a:srgbClr val="000000"/>
+                          </a:solidFill>
+                          <a:latin typeface="Neue Haas Grotesk Text Pro"/>
+                        </a:rPr>
+                        <a:t>0.611</a:t>
+                      </a:r>
+                    </a:p>
+                  </a:txBody>
+                  <a:tcPr/>
+                </a:tc>
+                <a:tc>
+                  <a:txBody>
+                    <a:bodyPr/>
+                    <a:lstStyle/>
+                    <a:p>
+                      <a:pPr lvl="0">
+                        <a:buNone/>
+                      </a:pPr>
+                      <a:r>
+                        <a:rPr lang="en-US" sz="1800" b="0" i="0" u="none" strike="noStrike" noProof="0" dirty="0">
+                          <a:solidFill>
+                            <a:srgbClr val="000000"/>
+                          </a:solidFill>
+                          <a:latin typeface="Neue Haas Grotesk Text Pro"/>
+                        </a:rPr>
+                        <a:t>&lt;0.05</a:t>
+                      </a:r>
+                      <a:endParaRPr lang="en-US"/>
+                    </a:p>
+                  </a:txBody>
+                  <a:tcPr/>
+                </a:tc>
                 <a:extLst>
                   <a:ext uri="{0D108BD9-81ED-4DB2-BD59-A6C34878D82A}">
                     <a16:rowId xmlns:a16="http://schemas.microsoft.com/office/drawing/2014/main" val="1451872956"/>
@@ -14442,6 +15593,49 @@
                   </a:txBody>
                   <a:tcPr/>
                 </a:tc>
+                <a:tc>
+                  <a:txBody>
+                    <a:bodyPr/>
+                    <a:lstStyle/>
+                    <a:p>
+                      <a:pPr lvl="0">
+                        <a:buNone/>
+                      </a:pPr>
+                      <a:r>
+                        <a:rPr lang="en-US" sz="1800" b="0" i="0" u="none" strike="noStrike" noProof="0" dirty="0">
+                          <a:solidFill>
+                            <a:srgbClr val="000000"/>
+                          </a:solidFill>
+                          <a:latin typeface="Neue Haas Grotesk Text Pro"/>
+                        </a:rPr>
+                        <a:t>0.505</a:t>
+                      </a:r>
+                    </a:p>
+                  </a:txBody>
+                  <a:tcPr/>
+                </a:tc>
+                <a:tc>
+                  <a:txBody>
+                    <a:bodyPr/>
+                    <a:lstStyle/>
+                    <a:p>
+                      <a:pPr lvl="0">
+                        <a:buNone/>
+                      </a:pPr>
+                      <a:r>
+                        <a:rPr lang="en-US" sz="1800" b="0" i="0" u="none" strike="noStrike" noProof="0" dirty="0">
+                          <a:solidFill>
+                            <a:srgbClr val="000000"/>
+                          </a:solidFill>
+                          <a:latin typeface="Neue Haas Grotesk Text Pro"/>
+                        </a:rPr>
+                        <a:t>&lt;0.05</a:t>
+                      </a:r>
+                      <a:endParaRPr lang="en-US"/>
+                    </a:p>
+                  </a:txBody>
+                  <a:tcPr/>
+                </a:tc>
                 <a:extLst>
                   <a:ext uri="{0D108BD9-81ED-4DB2-BD59-A6C34878D82A}">
                     <a16:rowId xmlns:a16="http://schemas.microsoft.com/office/drawing/2014/main" val="4228586729"/>
@@ -14544,6 +15738,49 @@
                   </a:txBody>
                   <a:tcPr/>
                 </a:tc>
+                <a:tc>
+                  <a:txBody>
+                    <a:bodyPr/>
+                    <a:lstStyle/>
+                    <a:p>
+                      <a:pPr lvl="0">
+                        <a:buNone/>
+                      </a:pPr>
+                      <a:r>
+                        <a:rPr lang="en-US" sz="1800" b="0" i="0" u="none" strike="noStrike" noProof="0" dirty="0">
+                          <a:solidFill>
+                            <a:srgbClr val="000000"/>
+                          </a:solidFill>
+                          <a:latin typeface="Neue Haas Grotesk Text Pro"/>
+                        </a:rPr>
+                        <a:t>0.441</a:t>
+                      </a:r>
+                    </a:p>
+                  </a:txBody>
+                  <a:tcPr/>
+                </a:tc>
+                <a:tc>
+                  <a:txBody>
+                    <a:bodyPr/>
+                    <a:lstStyle/>
+                    <a:p>
+                      <a:pPr lvl="0">
+                        <a:buNone/>
+                      </a:pPr>
+                      <a:r>
+                        <a:rPr lang="en-US" sz="1800" b="0" i="0" u="none" strike="noStrike" noProof="0" dirty="0">
+                          <a:solidFill>
+                            <a:srgbClr val="000000"/>
+                          </a:solidFill>
+                          <a:latin typeface="Neue Haas Grotesk Text Pro"/>
+                        </a:rPr>
+                        <a:t>&lt;0.05</a:t>
+                      </a:r>
+                      <a:endParaRPr lang="en-US"/>
+                    </a:p>
+                  </a:txBody>
+                  <a:tcPr/>
+                </a:tc>
                 <a:extLst>
                   <a:ext uri="{0D108BD9-81ED-4DB2-BD59-A6C34878D82A}">
                     <a16:rowId xmlns:a16="http://schemas.microsoft.com/office/drawing/2014/main" val="3861408195"/>
@@ -14645,6 +15882,49 @@
                         <a:t>&lt;0.05</a:t>
                       </a:r>
                       <a:endParaRPr lang="en-US" dirty="0"/>
+                    </a:p>
+                  </a:txBody>
+                  <a:tcPr/>
+                </a:tc>
+                <a:tc>
+                  <a:txBody>
+                    <a:bodyPr/>
+                    <a:lstStyle/>
+                    <a:p>
+                      <a:pPr lvl="0">
+                        <a:buNone/>
+                      </a:pPr>
+                      <a:r>
+                        <a:rPr lang="en-US" sz="1800" b="0" i="0" u="none" strike="noStrike" noProof="0" dirty="0">
+                          <a:solidFill>
+                            <a:srgbClr val="000000"/>
+                          </a:solidFill>
+                          <a:latin typeface="Neue Haas Grotesk Text Pro"/>
+                        </a:rPr>
+                        <a:t>0.608</a:t>
+                      </a:r>
+                    </a:p>
+                  </a:txBody>
+                  <a:tcPr/>
+                </a:tc>
+                <a:tc>
+                  <a:txBody>
+                    <a:bodyPr/>
+                    <a:lstStyle/>
+                    <a:p>
+                      <a:pPr lvl="0">
+                        <a:buNone/>
+                      </a:pPr>
+                      <a:r>
+                        <a:rPr lang="en-US" sz="1800" b="0" i="0" u="none" strike="noStrike" noProof="0" dirty="0">
+                          <a:solidFill>
+                            <a:srgbClr val="000000"/>
+                          </a:solidFill>
+                          <a:latin typeface="Neue Haas Grotesk Text Pro"/>
+                        </a:rPr>
+                        <a:t>&lt;0.05</a:t>
+                      </a:r>
+                      <a:endParaRPr lang="en-US"/>
                     </a:p>
                   </a:txBody>
                   <a:tcPr/>
@@ -15095,7 +16375,7 @@
           <p:nvPr>
             <p:extLst>
               <p:ext uri="{D42A27DB-BD31-4B8C-83A1-F6EECF244321}">
-                <p14:modId xmlns:p14="http://schemas.microsoft.com/office/powerpoint/2010/main" val="1286473496"/>
+                <p14:modId xmlns:p14="http://schemas.microsoft.com/office/powerpoint/2010/main" val="1331948837"/>
               </p:ext>
             </p:extLst>
           </p:nvPr>
@@ -15137,27 +16417,46 @@
                       </a:pPr>
                       <a:r>
                         <a:rPr lang="en-US" sz="1800" b="0" i="0" u="none" strike="noStrike" noProof="0" dirty="0">
+                          <a:solidFill>
+                            <a:schemeClr val="tx1"/>
+                          </a:solidFill>
                           <a:latin typeface="Neue Haas Grotesk Text Pro"/>
                         </a:rPr>
                         <a:t>entity definition without generic</a:t>
                       </a:r>
-                      <a:endParaRPr lang="en-US" dirty="0"/>
-                    </a:p>
-                  </a:txBody>
-                  <a:tcPr/>
-                </a:tc>
-                <a:tc>
-                  <a:txBody>
-                    <a:bodyPr/>
-                    <a:lstStyle/>
-                    <a:p>
-                      <a:r>
-                        <a:rPr lang="en-US" dirty="0"/>
+                      <a:endParaRPr lang="en-US" b="0" dirty="0">
+                        <a:solidFill>
+                          <a:schemeClr val="tx1"/>
+                        </a:solidFill>
+                      </a:endParaRPr>
+                    </a:p>
+                  </a:txBody>
+                  <a:tcPr>
+                    <a:solidFill>
+                      <a:srgbClr val="F6CDD3"/>
+                    </a:solidFill>
+                  </a:tcPr>
+                </a:tc>
+                <a:tc>
+                  <a:txBody>
+                    <a:bodyPr/>
+                    <a:lstStyle/>
+                    <a:p>
+                      <a:r>
+                        <a:rPr lang="en-US" b="0" dirty="0">
+                          <a:solidFill>
+                            <a:schemeClr val="tx1"/>
+                          </a:solidFill>
+                        </a:rPr>
                         <a:t>0.875</a:t>
                       </a:r>
                     </a:p>
                   </a:txBody>
-                  <a:tcPr/>
+                  <a:tcPr>
+                    <a:solidFill>
+                      <a:srgbClr val="F6CDD3"/>
+                    </a:solidFill>
+                  </a:tcPr>
                 </a:tc>
                 <a:extLst>
                   <a:ext uri="{0D108BD9-81ED-4DB2-BD59-A6C34878D82A}">

</xml_diff>

<commit_message>
Terminate analisi CodeT5_770, modificata presentazione
</commit_message>
<xml_diff>
--- a/altro/Presentazione_risultati.pptx
+++ b/altro/Presentazione_risultati.pptx
@@ -139,6 +139,7 @@
 <file path=ppt/revisionInfo.xml><?xml version="1.0" encoding="utf-8"?>
 <p1510:revInfo xmlns:a="http://schemas.openxmlformats.org/drawingml/2006/main" xmlns:r="http://schemas.openxmlformats.org/officeDocument/2006/relationships" xmlns:p1510="http://schemas.microsoft.com/office/powerpoint/2015/10/main">
   <p1510:revLst>
+    <p1510:client id="{399B8EAD-FEB5-C4A3-B020-2D723E8CDEBC}" v="351" dt="2024-11-19T20:36:06.923"/>
     <p1510:client id="{8BEA49BD-5CE1-6B1F-9A40-9BE672AAF9F5}" v="446" dt="2024-11-17T21:03:36.232"/>
   </p1510:revLst>
 </p1510:revInfo>
@@ -298,7 +299,7 @@
           <a:p>
             <a:fld id="{A1E45834-53BD-4C8F-B791-CD5378F4150E}" type="datetimeFigureOut">
               <a:rPr lang="en-US" smtClean="0"/>
-              <a:t>11/17/2024</a:t>
+              <a:t>11/19/2024</a:t>
             </a:fld>
             <a:endParaRPr lang="en-US"/>
           </a:p>
@@ -496,7 +497,7 @@
           <a:p>
             <a:fld id="{A1E45834-53BD-4C8F-B791-CD5378F4150E}" type="datetimeFigureOut">
               <a:rPr lang="en-US" smtClean="0"/>
-              <a:t>11/17/2024</a:t>
+              <a:t>11/19/2024</a:t>
             </a:fld>
             <a:endParaRPr lang="en-US"/>
           </a:p>
@@ -704,7 +705,7 @@
           <a:p>
             <a:fld id="{A1E45834-53BD-4C8F-B791-CD5378F4150E}" type="datetimeFigureOut">
               <a:rPr lang="en-US" smtClean="0"/>
-              <a:t>11/17/2024</a:t>
+              <a:t>11/19/2024</a:t>
             </a:fld>
             <a:endParaRPr lang="en-US"/>
           </a:p>
@@ -945,7 +946,7 @@
           <a:p>
             <a:fld id="{A1E45834-53BD-4C8F-B791-CD5378F4150E}" type="datetimeFigureOut">
               <a:rPr lang="en-US" smtClean="0"/>
-              <a:t>11/17/2024</a:t>
+              <a:t>11/19/2024</a:t>
             </a:fld>
             <a:endParaRPr lang="en-US"/>
           </a:p>
@@ -1223,7 +1224,7 @@
           <a:p>
             <a:fld id="{A1E45834-53BD-4C8F-B791-CD5378F4150E}" type="datetimeFigureOut">
               <a:rPr lang="en-US" smtClean="0"/>
-              <a:t>11/17/2024</a:t>
+              <a:t>11/19/2024</a:t>
             </a:fld>
             <a:endParaRPr lang="en-US"/>
           </a:p>
@@ -1493,7 +1494,7 @@
           <a:p>
             <a:fld id="{A1E45834-53BD-4C8F-B791-CD5378F4150E}" type="datetimeFigureOut">
               <a:rPr lang="en-US" smtClean="0"/>
-              <a:t>11/17/2024</a:t>
+              <a:t>11/19/2024</a:t>
             </a:fld>
             <a:endParaRPr lang="en-US"/>
           </a:p>
@@ -1915,7 +1916,7 @@
           <a:p>
             <a:fld id="{A1E45834-53BD-4C8F-B791-CD5378F4150E}" type="datetimeFigureOut">
               <a:rPr lang="en-US" smtClean="0"/>
-              <a:t>11/17/2024</a:t>
+              <a:t>11/19/2024</a:t>
             </a:fld>
             <a:endParaRPr lang="en-US"/>
           </a:p>
@@ -2060,7 +2061,7 @@
           <a:p>
             <a:fld id="{A1E45834-53BD-4C8F-B791-CD5378F4150E}" type="datetimeFigureOut">
               <a:rPr lang="en-US" smtClean="0"/>
-              <a:t>11/17/2024</a:t>
+              <a:t>11/19/2024</a:t>
             </a:fld>
             <a:endParaRPr lang="en-US"/>
           </a:p>
@@ -2173,7 +2174,7 @@
           <a:p>
             <a:fld id="{A1E45834-53BD-4C8F-B791-CD5378F4150E}" type="datetimeFigureOut">
               <a:rPr lang="en-US" smtClean="0"/>
-              <a:t>11/17/2024</a:t>
+              <a:t>11/19/2024</a:t>
             </a:fld>
             <a:endParaRPr lang="en-US"/>
           </a:p>
@@ -2487,7 +2488,7 @@
           <a:p>
             <a:fld id="{A1E45834-53BD-4C8F-B791-CD5378F4150E}" type="datetimeFigureOut">
               <a:rPr lang="en-US" smtClean="0"/>
-              <a:t>11/17/2024</a:t>
+              <a:t>11/19/2024</a:t>
             </a:fld>
             <a:endParaRPr lang="en-US"/>
           </a:p>
@@ -2781,7 +2782,7 @@
           <a:p>
             <a:fld id="{A1E45834-53BD-4C8F-B791-CD5378F4150E}" type="datetimeFigureOut">
               <a:rPr lang="en-US" smtClean="0"/>
-              <a:t>11/17/2024</a:t>
+              <a:t>11/19/2024</a:t>
             </a:fld>
             <a:endParaRPr lang="en-US"/>
           </a:p>
@@ -3020,7 +3021,7 @@
           <a:p>
             <a:fld id="{A1E45834-53BD-4C8F-B791-CD5378F4150E}" type="datetimeFigureOut">
               <a:rPr lang="en-US" smtClean="0"/>
-              <a:t>11/17/2024</a:t>
+              <a:t>11/19/2024</a:t>
             </a:fld>
             <a:endParaRPr lang="en-US"/>
           </a:p>
@@ -10993,7 +10994,7 @@
                 <a:ea typeface="+mn-lt"/>
                 <a:cs typeface="+mn-lt"/>
               </a:rPr>
-              <a:t>:  </a:t>
+              <a:t>:  34062.06 </a:t>
             </a:r>
             <a:r>
               <a:rPr lang="en-US" sz="2000" dirty="0" err="1">
@@ -11007,7 +11008,7 @@
                 <a:ea typeface="+mn-lt"/>
                 <a:cs typeface="+mn-lt"/>
               </a:rPr>
-              <a:t> (  </a:t>
+              <a:t> (  0:0:34:62 </a:t>
             </a:r>
             <a:r>
               <a:rPr lang="en-US" sz="2000" dirty="0" err="1">
@@ -11057,7 +11058,7 @@
                 <a:ea typeface="+mn-lt"/>
                 <a:cs typeface="+mn-lt"/>
               </a:rPr>
-              <a:t> </a:t>
+              <a:t> 315039 </a:t>
             </a:r>
             <a:r>
               <a:rPr lang="en-US" sz="2000" dirty="0" err="1">
@@ -11071,7 +11072,7 @@
                 <a:ea typeface="+mn-lt"/>
                 <a:cs typeface="+mn-lt"/>
               </a:rPr>
-              <a:t> (  </a:t>
+              <a:t> (  0:5:15:39 </a:t>
             </a:r>
             <a:r>
               <a:rPr lang="en-US" sz="2000" dirty="0" err="1">
@@ -11128,7 +11129,7 @@
                 <a:ea typeface="+mn-lt"/>
                 <a:cs typeface="+mn-lt"/>
               </a:rPr>
-              <a:t>  </a:t>
+              <a:t>  256,257,258,259,260</a:t>
             </a:r>
           </a:p>
           <a:p>
@@ -11161,7 +11162,7 @@
                 <a:ea typeface="+mn-lt"/>
                 <a:cs typeface="+mn-lt"/>
               </a:rPr>
-              <a:t>:  </a:t>
+              <a:t>:  165 </a:t>
             </a:r>
             <a:r>
               <a:rPr lang="en-US" sz="2000" dirty="0" err="1">
@@ -11175,7 +11176,7 @@
                 <a:ea typeface="+mn-lt"/>
                 <a:cs typeface="+mn-lt"/>
               </a:rPr>
-              <a:t>:  human evaluation impact: </a:t>
+              <a:t>:  280 human evaluation impact: 115</a:t>
             </a:r>
             <a:endParaRPr lang="en-US" sz="2000" dirty="0"/>
           </a:p>
@@ -11240,7 +11241,7 @@
                 <a:ea typeface="+mn-lt"/>
                 <a:cs typeface="+mn-lt"/>
               </a:rPr>
-              <a:t>:  </a:t>
+              <a:t>:  0.51 </a:t>
             </a:r>
             <a:r>
               <a:rPr lang="en-US" sz="2000" b="1" dirty="0">
@@ -11275,12 +11276,15 @@
                 <a:ea typeface="+mn-lt"/>
                 <a:cs typeface="+mn-lt"/>
               </a:rPr>
-              <a:t>):</a:t>
-            </a:r>
-            <a:endParaRPr lang="en-US" sz="2000" dirty="0">
-              <a:ea typeface="+mn-lt"/>
-              <a:cs typeface="+mn-lt"/>
-            </a:endParaRPr>
+              <a:t>): </a:t>
+            </a:r>
+            <a:r>
+              <a:rPr lang="en-US" sz="2000" dirty="0">
+                <a:ea typeface="+mn-lt"/>
+                <a:cs typeface="+mn-lt"/>
+              </a:rPr>
+              <a:t>0.86</a:t>
+            </a:r>
           </a:p>
           <a:p>
             <a:endParaRPr lang="en-US" sz="2000" dirty="0"/>
@@ -11290,7 +11294,11 @@
               <a:rPr lang="en-US" sz="2000" b="1" dirty="0"/>
               <a:t>Problems: </a:t>
             </a:r>
-            <a:endParaRPr lang="en-US" sz="2000" dirty="0"/>
+            <a:r>
+              <a:rPr lang="en-US" sz="2000" err="1"/>
+              <a:t>Nessuno</a:t>
+            </a:r>
+            <a:endParaRPr lang="en-US" sz="2000"/>
           </a:p>
         </p:txBody>
       </p:sp>
@@ -11456,7 +11464,14 @@
           <a:lstStyle/>
           <a:p>
             <a:pPr algn="ctr"/>
-            <a:endParaRPr lang="en-US"/>
+            <a:r>
+              <a:rPr lang="en-US" dirty="0">
+                <a:ea typeface="+mn-lt"/>
+                <a:cs typeface="+mn-lt"/>
+              </a:rPr>
+              <a:t>0.41</a:t>
+            </a:r>
+            <a:endParaRPr lang="en-US" dirty="0"/>
           </a:p>
         </p:txBody>
       </p:sp>
@@ -11657,7 +11672,7 @@
           <p:nvPr>
             <p:extLst>
               <p:ext uri="{D42A27DB-BD31-4B8C-83A1-F6EECF244321}">
-                <p14:modId xmlns:p14="http://schemas.microsoft.com/office/powerpoint/2010/main" val="1209797689"/>
+                <p14:modId xmlns:p14="http://schemas.microsoft.com/office/powerpoint/2010/main" val="1460808795"/>
               </p:ext>
             </p:extLst>
           </p:nvPr>
@@ -11875,9 +11890,11 @@
                       <a:pPr lvl="0">
                         <a:buNone/>
                       </a:pPr>
-                      <a:endParaRPr lang="en-US" sz="1800" b="0" i="0" u="none" strike="noStrike" noProof="0" dirty="0">
-                        <a:latin typeface="Neue Haas Grotesk Text Pro"/>
-                      </a:endParaRPr>
+                      <a:r>
+                        <a:rPr lang="en-US" sz="1800" b="0" i="0" u="none" strike="noStrike" noProof="0" dirty="0"/>
+                        <a:t>0.41</a:t>
+                      </a:r>
+                      <a:endParaRPr lang="en-US" dirty="0"/>
                     </a:p>
                   </a:txBody>
                   <a:tcPr/>
@@ -11903,9 +11920,11 @@
                       <a:pPr lvl="0">
                         <a:buNone/>
                       </a:pPr>
-                      <a:endParaRPr lang="en-US" sz="1800" b="0" i="0" u="none" strike="noStrike" noProof="0" dirty="0">
-                        <a:latin typeface="Neue Haas Grotesk Text Pro"/>
-                      </a:endParaRPr>
+                      <a:r>
+                        <a:rPr lang="en-US" sz="1800" b="0" i="0" u="none" strike="noStrike" noProof="0" dirty="0"/>
+                        <a:t>0.41</a:t>
+                      </a:r>
+                      <a:endParaRPr lang="en-US" dirty="0"/>
                     </a:p>
                   </a:txBody>
                   <a:tcPr/>
@@ -11940,12 +11959,15 @@
                       <a:pPr lvl="0">
                         <a:buNone/>
                       </a:pPr>
-                      <a:endParaRPr lang="en-US" sz="1800" b="0" i="0" u="none" strike="noStrike" noProof="0" dirty="0">
-                        <a:solidFill>
-                          <a:srgbClr val="000000"/>
-                        </a:solidFill>
-                        <a:latin typeface="Neue Haas Grotesk Text Pro"/>
-                      </a:endParaRPr>
+                      <a:r>
+                        <a:rPr lang="en-US" sz="1800" b="0" i="0" u="none" strike="noStrike" noProof="0" dirty="0">
+                          <a:solidFill>
+                            <a:srgbClr val="000000"/>
+                          </a:solidFill>
+                        </a:rPr>
+                        <a:t>0.41</a:t>
+                      </a:r>
+                      <a:endParaRPr lang="en-US" dirty="0"/>
                     </a:p>
                   </a:txBody>
                   <a:tcPr/>
@@ -12000,9 +12022,11 @@
                       <a:pPr lvl="0">
                         <a:buNone/>
                       </a:pPr>
-                      <a:endParaRPr lang="en-US" sz="1800" b="0" i="0" u="none" strike="noStrike" noProof="0" dirty="0">
-                        <a:latin typeface="Neue Haas Grotesk Text Pro"/>
-                      </a:endParaRPr>
+                      <a:r>
+                        <a:rPr lang="en-US" sz="1800" b="0" i="0" u="none" strike="noStrike" noProof="0" dirty="0"/>
+                        <a:t>0.53</a:t>
+                      </a:r>
+                      <a:endParaRPr lang="en-US" dirty="0"/>
                     </a:p>
                   </a:txBody>
                   <a:tcPr/>
@@ -12037,9 +12061,11 @@
                       <a:pPr lvl="0">
                         <a:buNone/>
                       </a:pPr>
-                      <a:endParaRPr lang="en-US" sz="1800" b="0" i="0" u="none" strike="noStrike" noProof="0" dirty="0">
-                        <a:latin typeface="Neue Haas Grotesk Text Pro"/>
-                      </a:endParaRPr>
+                      <a:r>
+                        <a:rPr lang="en-US" sz="1800" b="0" i="0" u="none" strike="noStrike" noProof="0" dirty="0"/>
+                        <a:t>0.47</a:t>
+                      </a:r>
+                      <a:endParaRPr lang="en-US" dirty="0"/>
                     </a:p>
                   </a:txBody>
                   <a:tcPr/>
@@ -12074,12 +12100,15 @@
                       <a:pPr lvl="0">
                         <a:buNone/>
                       </a:pPr>
-                      <a:endParaRPr lang="en-US" sz="1800" b="0" i="0" u="none" strike="noStrike" noProof="0" dirty="0">
-                        <a:solidFill>
-                          <a:srgbClr val="000000"/>
-                        </a:solidFill>
-                        <a:latin typeface="Neue Haas Grotesk Text Pro"/>
-                      </a:endParaRPr>
+                      <a:r>
+                        <a:rPr lang="en-US" sz="1800" b="0" i="0" u="none" strike="noStrike" noProof="0" dirty="0">
+                          <a:solidFill>
+                            <a:srgbClr val="000000"/>
+                          </a:solidFill>
+                        </a:rPr>
+                        <a:t>0.54</a:t>
+                      </a:r>
+                      <a:endParaRPr lang="en-US" dirty="0"/>
                     </a:p>
                   </a:txBody>
                   <a:tcPr/>
@@ -12134,9 +12163,11 @@
                       <a:pPr lvl="0">
                         <a:buNone/>
                       </a:pPr>
-                      <a:endParaRPr lang="en-US" sz="1800" b="0" i="0" u="none" strike="noStrike" noProof="0" dirty="0">
-                        <a:latin typeface="Neue Haas Grotesk Text Pro"/>
-                      </a:endParaRPr>
+                      <a:r>
+                        <a:rPr lang="en-US" sz="1800" b="0" i="0" u="none" strike="noStrike" noProof="0" dirty="0"/>
+                        <a:t>0.53</a:t>
+                      </a:r>
+                      <a:endParaRPr lang="en-US" dirty="0"/>
                     </a:p>
                   </a:txBody>
                   <a:tcPr/>
@@ -12171,9 +12202,11 @@
                       <a:pPr lvl="0">
                         <a:buNone/>
                       </a:pPr>
-                      <a:endParaRPr lang="en-US" sz="1800" b="0" i="0" u="none" strike="noStrike" noProof="0" dirty="0">
-                        <a:latin typeface="Neue Haas Grotesk Text Pro"/>
-                      </a:endParaRPr>
+                      <a:r>
+                        <a:rPr lang="en-US" sz="1800" b="0" i="0" u="none" strike="noStrike" noProof="0" dirty="0"/>
+                        <a:t>0.44</a:t>
+                      </a:r>
+                      <a:endParaRPr lang="en-US" dirty="0"/>
                     </a:p>
                   </a:txBody>
                   <a:tcPr/>
@@ -12208,12 +12241,15 @@
                       <a:pPr lvl="0">
                         <a:buNone/>
                       </a:pPr>
-                      <a:endParaRPr lang="en-US" sz="1800" b="0" i="0" u="none" strike="noStrike" noProof="0" dirty="0">
-                        <a:solidFill>
-                          <a:srgbClr val="000000"/>
-                        </a:solidFill>
-                        <a:latin typeface="Neue Haas Grotesk Text Pro"/>
-                      </a:endParaRPr>
+                      <a:r>
+                        <a:rPr lang="en-US" sz="1800" b="0" i="0" u="none" strike="noStrike" noProof="0" dirty="0">
+                          <a:solidFill>
+                            <a:srgbClr val="000000"/>
+                          </a:solidFill>
+                        </a:rPr>
+                        <a:t>0.63</a:t>
+                      </a:r>
+                      <a:endParaRPr lang="en-US" dirty="0"/>
                     </a:p>
                   </a:txBody>
                   <a:tcPr/>
@@ -12268,9 +12304,11 @@
                       <a:pPr lvl="0">
                         <a:buNone/>
                       </a:pPr>
-                      <a:endParaRPr lang="en-US" sz="1800" b="0" i="0" u="none" strike="noStrike" noProof="0" dirty="0">
-                        <a:latin typeface="Neue Haas Grotesk Text Pro"/>
-                      </a:endParaRPr>
+                      <a:r>
+                        <a:rPr lang="en-US" sz="1800" b="0" i="0" u="none" strike="noStrike" noProof="0" dirty="0"/>
+                        <a:t>0.54</a:t>
+                      </a:r>
+                      <a:endParaRPr lang="en-US" dirty="0"/>
                     </a:p>
                   </a:txBody>
                   <a:tcPr/>
@@ -12305,9 +12343,11 @@
                       <a:pPr lvl="0">
                         <a:buNone/>
                       </a:pPr>
-                      <a:endParaRPr lang="en-US" sz="1800" b="0" i="0" u="none" strike="noStrike" noProof="0" dirty="0">
-                        <a:latin typeface="Neue Haas Grotesk Text Pro"/>
-                      </a:endParaRPr>
+                      <a:r>
+                        <a:rPr lang="en-US" sz="1800" b="0" i="0" u="none" strike="noStrike" noProof="0" dirty="0"/>
+                        <a:t>0.47</a:t>
+                      </a:r>
+                      <a:endParaRPr lang="en-US" dirty="0"/>
                     </a:p>
                   </a:txBody>
                   <a:tcPr/>
@@ -12342,12 +12382,15 @@
                       <a:pPr lvl="0">
                         <a:buNone/>
                       </a:pPr>
-                      <a:endParaRPr lang="en-US" sz="1800" b="0" i="0" u="none" strike="noStrike" noProof="0" dirty="0">
-                        <a:solidFill>
-                          <a:srgbClr val="000000"/>
-                        </a:solidFill>
-                        <a:latin typeface="Neue Haas Grotesk Text Pro"/>
-                      </a:endParaRPr>
+                      <a:r>
+                        <a:rPr lang="en-US" sz="1800" b="0" i="0" u="none" strike="noStrike" noProof="0" dirty="0">
+                          <a:solidFill>
+                            <a:srgbClr val="000000"/>
+                          </a:solidFill>
+                        </a:rPr>
+                        <a:t>0.54</a:t>
+                      </a:r>
+                      <a:endParaRPr lang="en-US" dirty="0"/>
                     </a:p>
                   </a:txBody>
                   <a:tcPr/>
@@ -12405,9 +12448,11 @@
                       <a:pPr lvl="0">
                         <a:buNone/>
                       </a:pPr>
-                      <a:endParaRPr lang="en-US" sz="1800" b="0" i="0" u="none" strike="noStrike" noProof="0" dirty="0">
-                        <a:latin typeface="Neue Haas Grotesk Text Pro"/>
-                      </a:endParaRPr>
+                      <a:r>
+                        <a:rPr lang="en-US" sz="1800" b="0" i="0" u="none" strike="noStrike" noProof="0" dirty="0"/>
+                        <a:t>0.49</a:t>
+                      </a:r>
+                      <a:endParaRPr lang="en-US" dirty="0"/>
                     </a:p>
                   </a:txBody>
                   <a:tcPr/>
@@ -12442,9 +12487,11 @@
                       <a:pPr lvl="0">
                         <a:buNone/>
                       </a:pPr>
-                      <a:endParaRPr lang="en-US" sz="1800" b="0" i="0" u="none" strike="noStrike" noProof="0" dirty="0">
-                        <a:latin typeface="Neue Haas Grotesk Text Pro"/>
-                      </a:endParaRPr>
+                      <a:r>
+                        <a:rPr lang="en-US" sz="1800" b="0" i="0" u="none" strike="noStrike" noProof="0" dirty="0"/>
+                        <a:t>0.44</a:t>
+                      </a:r>
+                      <a:endParaRPr lang="en-US" dirty="0"/>
                     </a:p>
                   </a:txBody>
                   <a:tcPr/>
@@ -12479,12 +12526,15 @@
                       <a:pPr lvl="0">
                         <a:buNone/>
                       </a:pPr>
-                      <a:endParaRPr lang="en-US" sz="1800" b="0" i="0" u="none" strike="noStrike" noProof="0" dirty="0">
-                        <a:solidFill>
-                          <a:srgbClr val="000000"/>
-                        </a:solidFill>
-                        <a:latin typeface="Neue Haas Grotesk Text Pro"/>
-                      </a:endParaRPr>
+                      <a:r>
+                        <a:rPr lang="en-US" sz="1800" b="0" i="0" u="none" strike="noStrike" noProof="0" dirty="0">
+                          <a:solidFill>
+                            <a:srgbClr val="000000"/>
+                          </a:solidFill>
+                        </a:rPr>
+                        <a:t>0.49</a:t>
+                      </a:r>
+                      <a:endParaRPr lang="en-US" dirty="0"/>
                     </a:p>
                   </a:txBody>
                   <a:tcPr/>
@@ -12539,9 +12589,11 @@
                       <a:pPr lvl="0">
                         <a:buNone/>
                       </a:pPr>
-                      <a:endParaRPr lang="en-US" sz="1800" b="0" i="0" u="none" strike="noStrike" noProof="0" dirty="0">
-                        <a:latin typeface="Neue Haas Grotesk Text Pro"/>
-                      </a:endParaRPr>
+                      <a:r>
+                        <a:rPr lang="en-US" sz="1800" b="0" i="0" u="none" strike="noStrike" noProof="0" dirty="0"/>
+                        <a:t>0.53</a:t>
+                      </a:r>
+                      <a:endParaRPr lang="en-US" dirty="0"/>
                     </a:p>
                   </a:txBody>
                   <a:tcPr/>
@@ -12576,9 +12628,11 @@
                       <a:pPr lvl="0">
                         <a:buNone/>
                       </a:pPr>
-                      <a:endParaRPr lang="en-US" sz="1800" b="0" i="0" u="none" strike="noStrike" noProof="0" dirty="0">
-                        <a:latin typeface="Neue Haas Grotesk Text Pro"/>
-                      </a:endParaRPr>
+                      <a:r>
+                        <a:rPr lang="en-US" sz="1800" b="0" i="0" u="none" strike="noStrike" noProof="0" dirty="0"/>
+                        <a:t>0.48</a:t>
+                      </a:r>
+                      <a:endParaRPr lang="en-US" dirty="0"/>
                     </a:p>
                   </a:txBody>
                   <a:tcPr/>
@@ -12613,12 +12667,15 @@
                       <a:pPr lvl="0">
                         <a:buNone/>
                       </a:pPr>
-                      <a:endParaRPr lang="en-US" sz="1800" b="0" i="0" u="none" strike="noStrike" noProof="0" dirty="0">
-                        <a:solidFill>
-                          <a:srgbClr val="000000"/>
-                        </a:solidFill>
-                        <a:latin typeface="Neue Haas Grotesk Text Pro"/>
-                      </a:endParaRPr>
+                      <a:r>
+                        <a:rPr lang="en-US" sz="1800" b="0" i="0" u="none" strike="noStrike" noProof="0" dirty="0">
+                          <a:solidFill>
+                            <a:srgbClr val="000000"/>
+                          </a:solidFill>
+                        </a:rPr>
+                        <a:t>0.44</a:t>
+                      </a:r>
+                      <a:endParaRPr lang="en-US" dirty="0"/>
                     </a:p>
                   </a:txBody>
                   <a:tcPr/>
@@ -12676,9 +12733,11 @@
                       <a:pPr lvl="0">
                         <a:buNone/>
                       </a:pPr>
-                      <a:endParaRPr lang="en-US" sz="1800" b="0" i="0" u="none" strike="noStrike" noProof="0" dirty="0">
-                        <a:latin typeface="Neue Haas Grotesk Text Pro"/>
-                      </a:endParaRPr>
+                      <a:r>
+                        <a:rPr lang="en-US" sz="1800" b="0" i="0" u="none" strike="noStrike" noProof="0" dirty="0"/>
+                        <a:t>0.46</a:t>
+                      </a:r>
+                      <a:endParaRPr lang="en-US" dirty="0"/>
                     </a:p>
                   </a:txBody>
                   <a:tcPr/>
@@ -12713,9 +12772,11 @@
                       <a:pPr lvl="0">
                         <a:buNone/>
                       </a:pPr>
-                      <a:endParaRPr lang="en-US" sz="1800" b="0" i="0" u="none" strike="noStrike" noProof="0" dirty="0">
-                        <a:latin typeface="Neue Haas Grotesk Text Pro"/>
-                      </a:endParaRPr>
+                      <a:r>
+                        <a:rPr lang="en-US" sz="1800" b="0" i="0" u="none" strike="noStrike" noProof="0" dirty="0"/>
+                        <a:t>0.41</a:t>
+                      </a:r>
+                      <a:endParaRPr lang="en-US" dirty="0"/>
                     </a:p>
                   </a:txBody>
                   <a:tcPr/>
@@ -12750,12 +12811,15 @@
                       <a:pPr lvl="0">
                         <a:buNone/>
                       </a:pPr>
-                      <a:endParaRPr lang="en-US" sz="1800" b="0" i="0" u="none" strike="noStrike" noProof="0" dirty="0">
-                        <a:solidFill>
-                          <a:srgbClr val="000000"/>
-                        </a:solidFill>
-                        <a:latin typeface="Neue Haas Grotesk Text Pro"/>
-                      </a:endParaRPr>
+                      <a:r>
+                        <a:rPr lang="en-US" sz="1800" b="0" i="0" u="none" strike="noStrike" noProof="0" dirty="0">
+                          <a:solidFill>
+                            <a:srgbClr val="000000"/>
+                          </a:solidFill>
+                        </a:rPr>
+                        <a:t>0.42</a:t>
+                      </a:r>
+                      <a:endParaRPr lang="en-US" dirty="0"/>
                     </a:p>
                   </a:txBody>
                   <a:tcPr/>
@@ -13220,7 +13284,7 @@
           <p:nvPr>
             <p:extLst>
               <p:ext uri="{D42A27DB-BD31-4B8C-83A1-F6EECF244321}">
-                <p14:modId xmlns:p14="http://schemas.microsoft.com/office/powerpoint/2010/main" val="2774909796"/>
+                <p14:modId xmlns:p14="http://schemas.microsoft.com/office/powerpoint/2010/main" val="2339577651"/>
               </p:ext>
             </p:extLst>
           </p:nvPr>
@@ -13290,12 +13354,15 @@
                       <a:pPr lvl="0">
                         <a:buNone/>
                       </a:pPr>
-                      <a:endParaRPr lang="en-US" sz="1800" b="0" i="0" u="none" strike="noStrike" noProof="0" dirty="0">
-                        <a:solidFill>
-                          <a:schemeClr val="tx1"/>
-                        </a:solidFill>
-                        <a:latin typeface="Neue Haas Grotesk Text Pro"/>
-                      </a:endParaRPr>
+                      <a:r>
+                        <a:rPr lang="en-US" sz="1800" b="0" i="0" u="none" strike="noStrike" noProof="0" dirty="0">
+                          <a:solidFill>
+                            <a:schemeClr val="tx1"/>
+                          </a:solidFill>
+                          <a:latin typeface="Neue Haas Grotesk Text Pro"/>
+                        </a:rPr>
+                        <a:t>1</a:t>
+                      </a:r>
                     </a:p>
                   </a:txBody>
                   <a:tcPr>
@@ -13338,9 +13405,12 @@
                       <a:pPr lvl="0">
                         <a:buNone/>
                       </a:pPr>
-                      <a:endParaRPr lang="en-US" sz="1800" b="0" i="0" u="none" strike="noStrike" noProof="0" dirty="0">
-                        <a:latin typeface="Neue Haas Grotesk Text Pro"/>
-                      </a:endParaRPr>
+                      <a:r>
+                        <a:rPr lang="en-US" sz="1800" b="0" i="0" u="none" strike="noStrike" noProof="0" dirty="0">
+                          <a:latin typeface="Neue Haas Grotesk Text Pro"/>
+                        </a:rPr>
+                        <a:t>1</a:t>
+                      </a:r>
                     </a:p>
                   </a:txBody>
                   <a:tcPr/>
@@ -13379,7 +13449,10 @@
                       <a:pPr lvl="0">
                         <a:buNone/>
                       </a:pPr>
-                      <a:endParaRPr lang="en-US" sz="1800" b="0" i="0" u="none" strike="noStrike" noProof="0" dirty="0"/>
+                      <a:r>
+                        <a:rPr lang="en-US" sz="1800" b="0" i="0" u="none" strike="noStrike" noProof="0" dirty="0"/>
+                        <a:t>1</a:t>
+                      </a:r>
                     </a:p>
                   </a:txBody>
                   <a:tcPr/>
@@ -13418,7 +13491,10 @@
                       <a:pPr lvl="0">
                         <a:buNone/>
                       </a:pPr>
-                      <a:endParaRPr lang="en-US" sz="1800" b="0" i="0" u="none" strike="noStrike" noProof="0" dirty="0"/>
+                      <a:r>
+                        <a:rPr lang="en-US" sz="1800" b="0" i="0" u="none" strike="noStrike" noProof="0" dirty="0"/>
+                        <a:t>1</a:t>
+                      </a:r>
                     </a:p>
                   </a:txBody>
                   <a:tcPr/>
@@ -13455,7 +13531,10 @@
                       <a:pPr lvl="0">
                         <a:buNone/>
                       </a:pPr>
-                      <a:endParaRPr lang="en-US" sz="1800" b="0" i="0" u="none" strike="noStrike" noProof="0" dirty="0"/>
+                      <a:r>
+                        <a:rPr lang="en-US" sz="1800" b="0" i="0" u="none" strike="noStrike" noProof="0" dirty="0"/>
+                        <a:t>0.875</a:t>
+                      </a:r>
                     </a:p>
                   </a:txBody>
                   <a:tcPr/>
@@ -13494,7 +13573,10 @@
                       <a:pPr lvl="0">
                         <a:buNone/>
                       </a:pPr>
-                      <a:endParaRPr lang="en-US" sz="1800" b="0" i="0" u="none" strike="noStrike" noProof="0" dirty="0"/>
+                      <a:r>
+                        <a:rPr lang="en-US" sz="1800" b="0" i="0" u="none" strike="noStrike" noProof="0" dirty="0"/>
+                        <a:t>1</a:t>
+                      </a:r>
                     </a:p>
                   </a:txBody>
                   <a:tcPr/>
@@ -13531,7 +13613,10 @@
                       <a:pPr lvl="0">
                         <a:buNone/>
                       </a:pPr>
-                      <a:endParaRPr lang="en-US" sz="1800" b="0" i="0" u="none" strike="noStrike" noProof="0" dirty="0"/>
+                      <a:r>
+                        <a:rPr lang="en-US" sz="1800" b="0" i="0" u="none" strike="noStrike" noProof="0" dirty="0"/>
+                        <a:t>1</a:t>
+                      </a:r>
                     </a:p>
                   </a:txBody>
                   <a:tcPr/>
@@ -13570,7 +13655,10 @@
                       <a:pPr lvl="0">
                         <a:buNone/>
                       </a:pPr>
-                      <a:endParaRPr lang="en-US" sz="1800" b="0" i="0" u="none" strike="noStrike" noProof="0" dirty="0"/>
+                      <a:r>
+                        <a:rPr lang="en-US" sz="1800" b="0" i="0" u="none" strike="noStrike" noProof="0" dirty="0"/>
+                        <a:t>1</a:t>
+                      </a:r>
                     </a:p>
                   </a:txBody>
                   <a:tcPr/>
@@ -13607,9 +13695,12 @@
                       <a:pPr lvl="0">
                         <a:buNone/>
                       </a:pPr>
-                      <a:endParaRPr lang="en-US" sz="1800" b="0" i="0" u="none" strike="noStrike" noProof="0" dirty="0">
-                        <a:latin typeface="Neue Haas Grotesk Text Pro"/>
-                      </a:endParaRPr>
+                      <a:r>
+                        <a:rPr lang="en-US" sz="1800" b="0" i="0" u="none" strike="noStrike" noProof="0" dirty="0">
+                          <a:latin typeface="Neue Haas Grotesk Text Pro"/>
+                        </a:rPr>
+                        <a:t>0.66</a:t>
+                      </a:r>
                     </a:p>
                   </a:txBody>
                   <a:tcPr/>
@@ -13648,9 +13739,12 @@
                       <a:pPr lvl="0">
                         <a:buNone/>
                       </a:pPr>
-                      <a:endParaRPr lang="en-US" sz="1800" b="0" i="0" u="none" strike="noStrike" noProof="0" dirty="0">
-                        <a:latin typeface="Neue Haas Grotesk Text Pro"/>
-                      </a:endParaRPr>
+                      <a:r>
+                        <a:rPr lang="en-US" sz="1800" b="0" i="0" u="none" strike="noStrike" noProof="0" dirty="0">
+                          <a:latin typeface="Neue Haas Grotesk Text Pro"/>
+                        </a:rPr>
+                        <a:t>0.83</a:t>
+                      </a:r>
                     </a:p>
                   </a:txBody>
                   <a:tcPr/>
@@ -13687,7 +13781,10 @@
                       <a:pPr lvl="0">
                         <a:buNone/>
                       </a:pPr>
-                      <a:endParaRPr lang="en-US" sz="1800" b="0" i="0" u="none" strike="noStrike" noProof="0" dirty="0"/>
+                      <a:r>
+                        <a:rPr lang="en-US" sz="1800" b="0" i="0" u="none" strike="noStrike" noProof="0" dirty="0"/>
+                        <a:t>1</a:t>
+                      </a:r>
                     </a:p>
                   </a:txBody>
                   <a:tcPr/>
@@ -13726,7 +13823,10 @@
                       <a:pPr lvl="0">
                         <a:buNone/>
                       </a:pPr>
-                      <a:endParaRPr lang="en-US" sz="1800" b="0" i="0" u="none" strike="noStrike" noProof="0" dirty="0"/>
+                      <a:r>
+                        <a:rPr lang="en-US" sz="1800" b="0" i="0" u="none" strike="noStrike" noProof="0" dirty="0"/>
+                        <a:t>0.83</a:t>
+                      </a:r>
                     </a:p>
                   </a:txBody>
                   <a:tcPr/>
@@ -17550,7 +17650,7 @@
           <p:nvPr>
             <p:extLst>
               <p:ext uri="{D42A27DB-BD31-4B8C-83A1-F6EECF244321}">
-                <p14:modId xmlns:p14="http://schemas.microsoft.com/office/powerpoint/2010/main" val="1708761756"/>
+                <p14:modId xmlns:p14="http://schemas.microsoft.com/office/powerpoint/2010/main" val="1533004212"/>
               </p:ext>
             </p:extLst>
           </p:nvPr>
@@ -17676,39 +17776,45 @@
                       <a:pPr lvl="0">
                         <a:buNone/>
                       </a:pPr>
-                      <a:endParaRPr lang="en-US" sz="1800" b="0" i="0" u="none" strike="noStrike" noProof="0" dirty="0">
-                        <a:latin typeface="Neue Haas Grotesk Text Pro"/>
-                      </a:endParaRPr>
-                    </a:p>
-                  </a:txBody>
-                  <a:tcPr/>
-                </a:tc>
-                <a:tc>
-                  <a:txBody>
-                    <a:bodyPr/>
-                    <a:lstStyle/>
-                    <a:p>
-                      <a:pPr lvl="0">
-                        <a:buNone/>
-                      </a:pPr>
-                      <a:endParaRPr lang="en-US" sz="1800" b="0" i="0" u="none" strike="noStrike" noProof="0" dirty="0">
-                        <a:latin typeface="Neue Haas Grotesk Text Pro"/>
-                      </a:endParaRPr>
-                    </a:p>
-                  </a:txBody>
-                  <a:tcPr/>
-                </a:tc>
-                <a:tc>
-                  <a:txBody>
-                    <a:bodyPr/>
-                    <a:lstStyle/>
-                    <a:p>
-                      <a:pPr lvl="0">
-                        <a:buNone/>
-                      </a:pPr>
-                      <a:endParaRPr lang="en-US" sz="1800" b="0" i="0" u="none" strike="noStrike" noProof="0" dirty="0">
-                        <a:latin typeface="Neue Haas Grotesk Text Pro"/>
-                      </a:endParaRPr>
+                      <a:r>
+                        <a:rPr lang="en-US" sz="1800" b="0" i="0" u="none" strike="noStrike" noProof="0" dirty="0"/>
+                        <a:t>0.62</a:t>
+                      </a:r>
+                      <a:endParaRPr lang="en-US" dirty="0"/>
+                    </a:p>
+                  </a:txBody>
+                  <a:tcPr/>
+                </a:tc>
+                <a:tc>
+                  <a:txBody>
+                    <a:bodyPr/>
+                    <a:lstStyle/>
+                    <a:p>
+                      <a:pPr lvl="0">
+                        <a:buNone/>
+                      </a:pPr>
+                      <a:r>
+                        <a:rPr lang="en-US" sz="1800" b="0" i="0" u="none" strike="noStrike" noProof="0" dirty="0"/>
+                        <a:t>0.62</a:t>
+                      </a:r>
+                      <a:endParaRPr lang="en-US" dirty="0"/>
+                    </a:p>
+                  </a:txBody>
+                  <a:tcPr/>
+                </a:tc>
+                <a:tc>
+                  <a:txBody>
+                    <a:bodyPr/>
+                    <a:lstStyle/>
+                    <a:p>
+                      <a:pPr lvl="0">
+                        <a:buNone/>
+                      </a:pPr>
+                      <a:r>
+                        <a:rPr lang="en-US" sz="1800" b="0" i="0" u="none" strike="noStrike" noProof="0" dirty="0"/>
+                        <a:t>0.62</a:t>
+                      </a:r>
+                      <a:endParaRPr lang="en-US" dirty="0"/>
                     </a:p>
                   </a:txBody>
                   <a:tcPr/>
@@ -17741,39 +17847,45 @@
                       <a:pPr lvl="0">
                         <a:buNone/>
                       </a:pPr>
-                      <a:endParaRPr lang="en-US" sz="1800" b="0" i="0" u="none" strike="noStrike" noProof="0" dirty="0">
-                        <a:latin typeface="Neue Haas Grotesk Text Pro"/>
-                      </a:endParaRPr>
-                    </a:p>
-                  </a:txBody>
-                  <a:tcPr/>
-                </a:tc>
-                <a:tc>
-                  <a:txBody>
-                    <a:bodyPr/>
-                    <a:lstStyle/>
-                    <a:p>
-                      <a:pPr lvl="0">
-                        <a:buNone/>
-                      </a:pPr>
-                      <a:endParaRPr lang="en-US" sz="1800" b="0" i="0" u="none" strike="noStrike" noProof="0" dirty="0">
-                        <a:latin typeface="Neue Haas Grotesk Text Pro"/>
-                      </a:endParaRPr>
-                    </a:p>
-                  </a:txBody>
-                  <a:tcPr/>
-                </a:tc>
-                <a:tc>
-                  <a:txBody>
-                    <a:bodyPr/>
-                    <a:lstStyle/>
-                    <a:p>
-                      <a:pPr lvl="0">
-                        <a:buNone/>
-                      </a:pPr>
-                      <a:endParaRPr lang="en-US" sz="1800" b="0" i="0" u="none" strike="noStrike" noProof="0" dirty="0">
-                        <a:latin typeface="Neue Haas Grotesk Text Pro"/>
-                      </a:endParaRPr>
+                      <a:r>
+                        <a:rPr lang="en-US" sz="1800" b="0" i="0" u="none" strike="noStrike" noProof="0" dirty="0"/>
+                        <a:t>0.69</a:t>
+                      </a:r>
+                      <a:endParaRPr lang="en-US" dirty="0"/>
+                    </a:p>
+                  </a:txBody>
+                  <a:tcPr/>
+                </a:tc>
+                <a:tc>
+                  <a:txBody>
+                    <a:bodyPr/>
+                    <a:lstStyle/>
+                    <a:p>
+                      <a:pPr lvl="0">
+                        <a:buNone/>
+                      </a:pPr>
+                      <a:r>
+                        <a:rPr lang="en-US" sz="1800" b="0" i="0" u="none" strike="noStrike" noProof="0" dirty="0"/>
+                        <a:t>0.59</a:t>
+                      </a:r>
+                      <a:endParaRPr lang="en-US" dirty="0"/>
+                    </a:p>
+                  </a:txBody>
+                  <a:tcPr/>
+                </a:tc>
+                <a:tc>
+                  <a:txBody>
+                    <a:bodyPr/>
+                    <a:lstStyle/>
+                    <a:p>
+                      <a:pPr lvl="0">
+                        <a:buNone/>
+                      </a:pPr>
+                      <a:r>
+                        <a:rPr lang="en-US" sz="1800" b="0" i="0" u="none" strike="noStrike" noProof="0" dirty="0"/>
+                        <a:t>0.62</a:t>
+                      </a:r>
+                      <a:endParaRPr lang="en-US" dirty="0"/>
                     </a:p>
                   </a:txBody>
                   <a:tcPr/>
@@ -17806,39 +17918,45 @@
                       <a:pPr lvl="0">
                         <a:buNone/>
                       </a:pPr>
-                      <a:endParaRPr lang="en-US" sz="1800" b="0" i="0" u="none" strike="noStrike" noProof="0" dirty="0">
-                        <a:latin typeface="Neue Haas Grotesk Text Pro"/>
-                      </a:endParaRPr>
-                    </a:p>
-                  </a:txBody>
-                  <a:tcPr/>
-                </a:tc>
-                <a:tc>
-                  <a:txBody>
-                    <a:bodyPr/>
-                    <a:lstStyle/>
-                    <a:p>
-                      <a:pPr lvl="0">
-                        <a:buNone/>
-                      </a:pPr>
-                      <a:endParaRPr lang="en-US" sz="1800" b="0" i="0" u="none" strike="noStrike" noProof="0" dirty="0">
-                        <a:latin typeface="Neue Haas Grotesk Text Pro"/>
-                      </a:endParaRPr>
-                    </a:p>
-                  </a:txBody>
-                  <a:tcPr/>
-                </a:tc>
-                <a:tc>
-                  <a:txBody>
-                    <a:bodyPr/>
-                    <a:lstStyle/>
-                    <a:p>
-                      <a:pPr lvl="0">
-                        <a:buNone/>
-                      </a:pPr>
-                      <a:endParaRPr lang="en-US" sz="1800" b="0" i="0" u="none" strike="noStrike" noProof="0" dirty="0">
-                        <a:latin typeface="Neue Haas Grotesk Text Pro"/>
-                      </a:endParaRPr>
+                      <a:r>
+                        <a:rPr lang="en-US" sz="1800" b="0" i="0" u="none" strike="noStrike" noProof="0" dirty="0"/>
+                        <a:t>0.66</a:t>
+                      </a:r>
+                      <a:endParaRPr lang="en-US" dirty="0"/>
+                    </a:p>
+                  </a:txBody>
+                  <a:tcPr/>
+                </a:tc>
+                <a:tc>
+                  <a:txBody>
+                    <a:bodyPr/>
+                    <a:lstStyle/>
+                    <a:p>
+                      <a:pPr lvl="0">
+                        <a:buNone/>
+                      </a:pPr>
+                      <a:r>
+                        <a:rPr lang="en-US" sz="1800" b="0" i="0" u="none" strike="noStrike" noProof="0" dirty="0"/>
+                        <a:t>0.54</a:t>
+                      </a:r>
+                      <a:endParaRPr lang="en-US" dirty="0"/>
+                    </a:p>
+                  </a:txBody>
+                  <a:tcPr/>
+                </a:tc>
+                <a:tc>
+                  <a:txBody>
+                    <a:bodyPr/>
+                    <a:lstStyle/>
+                    <a:p>
+                      <a:pPr lvl="0">
+                        <a:buNone/>
+                      </a:pPr>
+                      <a:r>
+                        <a:rPr lang="en-US" sz="1800" b="0" i="0" u="none" strike="noStrike" noProof="0" dirty="0"/>
+                        <a:t>0.61</a:t>
+                      </a:r>
+                      <a:endParaRPr lang="en-US" dirty="0"/>
                     </a:p>
                   </a:txBody>
                   <a:tcPr/>
@@ -17871,39 +17989,45 @@
                       <a:pPr lvl="0">
                         <a:buNone/>
                       </a:pPr>
-                      <a:endParaRPr lang="en-US" sz="1800" b="0" i="0" u="none" strike="noStrike" noProof="0" dirty="0">
-                        <a:latin typeface="Neue Haas Grotesk Text Pro"/>
-                      </a:endParaRPr>
-                    </a:p>
-                  </a:txBody>
-                  <a:tcPr/>
-                </a:tc>
-                <a:tc>
-                  <a:txBody>
-                    <a:bodyPr/>
-                    <a:lstStyle/>
-                    <a:p>
-                      <a:pPr lvl="0">
-                        <a:buNone/>
-                      </a:pPr>
-                      <a:endParaRPr lang="en-US" sz="1800" b="0" i="0" u="none" strike="noStrike" noProof="0" dirty="0">
-                        <a:latin typeface="Neue Haas Grotesk Text Pro"/>
-                      </a:endParaRPr>
-                    </a:p>
-                  </a:txBody>
-                  <a:tcPr/>
-                </a:tc>
-                <a:tc>
-                  <a:txBody>
-                    <a:bodyPr/>
-                    <a:lstStyle/>
-                    <a:p>
-                      <a:pPr lvl="0">
-                        <a:buNone/>
-                      </a:pPr>
-                      <a:endParaRPr lang="en-US" sz="1800" b="0" i="0" u="none" strike="noStrike" noProof="0" dirty="0">
-                        <a:latin typeface="Neue Haas Grotesk Text Pro"/>
-                      </a:endParaRPr>
+                      <a:r>
+                        <a:rPr lang="en-US" sz="1800" b="0" i="0" u="none" strike="noStrike" noProof="0" dirty="0"/>
+                        <a:t>0.68</a:t>
+                      </a:r>
+                      <a:endParaRPr lang="en-US" dirty="0"/>
+                    </a:p>
+                  </a:txBody>
+                  <a:tcPr/>
+                </a:tc>
+                <a:tc>
+                  <a:txBody>
+                    <a:bodyPr/>
+                    <a:lstStyle/>
+                    <a:p>
+                      <a:pPr lvl="0">
+                        <a:buNone/>
+                      </a:pPr>
+                      <a:r>
+                        <a:rPr lang="en-US" sz="1800" b="0" i="0" u="none" strike="noStrike" noProof="0" dirty="0"/>
+                        <a:t>0.58</a:t>
+                      </a:r>
+                      <a:endParaRPr lang="en-US" dirty="0"/>
+                    </a:p>
+                  </a:txBody>
+                  <a:tcPr/>
+                </a:tc>
+                <a:tc>
+                  <a:txBody>
+                    <a:bodyPr/>
+                    <a:lstStyle/>
+                    <a:p>
+                      <a:pPr lvl="0">
+                        <a:buNone/>
+                      </a:pPr>
+                      <a:r>
+                        <a:rPr lang="en-US" sz="1800" b="0" i="0" u="none" strike="noStrike" noProof="0" dirty="0"/>
+                        <a:t>0.60</a:t>
+                      </a:r>
+                      <a:endParaRPr lang="en-US" dirty="0"/>
                     </a:p>
                   </a:txBody>
                   <a:tcPr/>
@@ -17939,39 +18063,45 @@
                       <a:pPr lvl="0">
                         <a:buNone/>
                       </a:pPr>
-                      <a:endParaRPr lang="en-US" sz="1800" b="0" i="0" u="none" strike="noStrike" noProof="0" dirty="0">
-                        <a:latin typeface="Neue Haas Grotesk Text Pro"/>
-                      </a:endParaRPr>
-                    </a:p>
-                  </a:txBody>
-                  <a:tcPr/>
-                </a:tc>
-                <a:tc>
-                  <a:txBody>
-                    <a:bodyPr/>
-                    <a:lstStyle/>
-                    <a:p>
-                      <a:pPr lvl="0">
-                        <a:buNone/>
-                      </a:pPr>
-                      <a:endParaRPr lang="en-US" sz="1800" b="0" i="0" u="none" strike="noStrike" noProof="0" dirty="0">
-                        <a:latin typeface="Neue Haas Grotesk Text Pro"/>
-                      </a:endParaRPr>
-                    </a:p>
-                  </a:txBody>
-                  <a:tcPr/>
-                </a:tc>
-                <a:tc>
-                  <a:txBody>
-                    <a:bodyPr/>
-                    <a:lstStyle/>
-                    <a:p>
-                      <a:pPr lvl="0">
-                        <a:buNone/>
-                      </a:pPr>
-                      <a:endParaRPr lang="en-US" sz="1800" b="0" i="0" u="none" strike="noStrike" noProof="0" dirty="0">
-                        <a:latin typeface="Neue Haas Grotesk Text Pro"/>
-                      </a:endParaRPr>
+                      <a:r>
+                        <a:rPr lang="en-US" sz="1800" b="0" i="0" u="none" strike="noStrike" noProof="0" dirty="0"/>
+                        <a:t>0.60</a:t>
+                      </a:r>
+                      <a:endParaRPr lang="en-US" dirty="0"/>
+                    </a:p>
+                  </a:txBody>
+                  <a:tcPr/>
+                </a:tc>
+                <a:tc>
+                  <a:txBody>
+                    <a:bodyPr/>
+                    <a:lstStyle/>
+                    <a:p>
+                      <a:pPr lvl="0">
+                        <a:buNone/>
+                      </a:pPr>
+                      <a:r>
+                        <a:rPr lang="en-US" sz="1800" b="0" i="0" u="none" strike="noStrike" noProof="0" dirty="0"/>
+                        <a:t>0.53</a:t>
+                      </a:r>
+                      <a:endParaRPr lang="en-US" dirty="0"/>
+                    </a:p>
+                  </a:txBody>
+                  <a:tcPr/>
+                </a:tc>
+                <a:tc>
+                  <a:txBody>
+                    <a:bodyPr/>
+                    <a:lstStyle/>
+                    <a:p>
+                      <a:pPr lvl="0">
+                        <a:buNone/>
+                      </a:pPr>
+                      <a:r>
+                        <a:rPr lang="en-US" sz="1800" b="0" i="0" u="none" strike="noStrike" noProof="0" dirty="0"/>
+                        <a:t>0.58</a:t>
+                      </a:r>
+                      <a:endParaRPr lang="en-US" dirty="0"/>
                     </a:p>
                   </a:txBody>
                   <a:tcPr/>
@@ -18004,39 +18134,45 @@
                       <a:pPr lvl="0">
                         <a:buNone/>
                       </a:pPr>
-                      <a:endParaRPr lang="en-US" sz="1800" b="0" i="0" u="none" strike="noStrike" noProof="0" dirty="0">
-                        <a:latin typeface="Neue Haas Grotesk Text Pro"/>
-                      </a:endParaRPr>
-                    </a:p>
-                  </a:txBody>
-                  <a:tcPr/>
-                </a:tc>
-                <a:tc>
-                  <a:txBody>
-                    <a:bodyPr/>
-                    <a:lstStyle/>
-                    <a:p>
-                      <a:pPr lvl="0">
-                        <a:buNone/>
-                      </a:pPr>
-                      <a:endParaRPr lang="en-US" sz="1800" b="0" i="0" u="none" strike="noStrike" noProof="0" dirty="0">
-                        <a:latin typeface="Neue Haas Grotesk Text Pro"/>
-                      </a:endParaRPr>
-                    </a:p>
-                  </a:txBody>
-                  <a:tcPr/>
-                </a:tc>
-                <a:tc>
-                  <a:txBody>
-                    <a:bodyPr/>
-                    <a:lstStyle/>
-                    <a:p>
-                      <a:pPr lvl="0">
-                        <a:buNone/>
-                      </a:pPr>
-                      <a:endParaRPr lang="en-US" sz="1800" b="0" i="0" u="none" strike="noStrike" noProof="0" dirty="0">
-                        <a:latin typeface="Neue Haas Grotesk Text Pro"/>
-                      </a:endParaRPr>
+                      <a:r>
+                        <a:rPr lang="en-US" sz="1800" b="0" i="0" u="none" strike="noStrike" noProof="0" dirty="0"/>
+                        <a:t>0.61</a:t>
+                      </a:r>
+                      <a:endParaRPr lang="en-US" dirty="0"/>
+                    </a:p>
+                  </a:txBody>
+                  <a:tcPr/>
+                </a:tc>
+                <a:tc>
+                  <a:txBody>
+                    <a:bodyPr/>
+                    <a:lstStyle/>
+                    <a:p>
+                      <a:pPr lvl="0">
+                        <a:buNone/>
+                      </a:pPr>
+                      <a:r>
+                        <a:rPr lang="en-US" sz="1800" b="0" i="0" u="none" strike="noStrike" noProof="0" dirty="0"/>
+                        <a:t>0.53</a:t>
+                      </a:r>
+                      <a:endParaRPr lang="en-US" dirty="0"/>
+                    </a:p>
+                  </a:txBody>
+                  <a:tcPr/>
+                </a:tc>
+                <a:tc>
+                  <a:txBody>
+                    <a:bodyPr/>
+                    <a:lstStyle/>
+                    <a:p>
+                      <a:pPr lvl="0">
+                        <a:buNone/>
+                      </a:pPr>
+                      <a:r>
+                        <a:rPr lang="en-US" sz="1800" b="0" i="0" u="none" strike="noStrike" noProof="0" dirty="0"/>
+                        <a:t>0.45</a:t>
+                      </a:r>
+                      <a:endParaRPr lang="en-US" dirty="0"/>
                     </a:p>
                   </a:txBody>
                   <a:tcPr/>
@@ -18072,39 +18208,45 @@
                       <a:pPr lvl="0">
                         <a:buNone/>
                       </a:pPr>
-                      <a:endParaRPr lang="en-US" sz="1800" b="0" i="0" u="none" strike="noStrike" noProof="0" dirty="0">
-                        <a:latin typeface="Neue Haas Grotesk Text Pro"/>
-                      </a:endParaRPr>
-                    </a:p>
-                  </a:txBody>
-                  <a:tcPr/>
-                </a:tc>
-                <a:tc>
-                  <a:txBody>
-                    <a:bodyPr/>
-                    <a:lstStyle/>
-                    <a:p>
-                      <a:pPr lvl="0">
-                        <a:buNone/>
-                      </a:pPr>
-                      <a:endParaRPr lang="en-US" sz="1800" b="0" i="0" u="none" strike="noStrike" noProof="0" dirty="0">
-                        <a:latin typeface="Neue Haas Grotesk Text Pro"/>
-                      </a:endParaRPr>
-                    </a:p>
-                  </a:txBody>
-                  <a:tcPr/>
-                </a:tc>
-                <a:tc>
-                  <a:txBody>
-                    <a:bodyPr/>
-                    <a:lstStyle/>
-                    <a:p>
-                      <a:pPr lvl="0">
-                        <a:buNone/>
-                      </a:pPr>
-                      <a:endParaRPr lang="en-US" sz="1800" b="0" i="0" u="none" strike="noStrike" noProof="0" dirty="0">
-                        <a:latin typeface="Neue Haas Grotesk Text Pro"/>
-                      </a:endParaRPr>
+                      <a:r>
+                        <a:rPr lang="en-US" sz="1800" b="0" i="0" u="none" strike="noStrike" noProof="0" dirty="0"/>
+                        <a:t>0.68</a:t>
+                      </a:r>
+                      <a:endParaRPr lang="en-US" dirty="0"/>
+                    </a:p>
+                  </a:txBody>
+                  <a:tcPr/>
+                </a:tc>
+                <a:tc>
+                  <a:txBody>
+                    <a:bodyPr/>
+                    <a:lstStyle/>
+                    <a:p>
+                      <a:pPr lvl="0">
+                        <a:buNone/>
+                      </a:pPr>
+                      <a:r>
+                        <a:rPr lang="en-US" sz="1800" b="0" i="0" u="none" strike="noStrike" noProof="0" dirty="0"/>
+                        <a:t>0.58</a:t>
+                      </a:r>
+                      <a:endParaRPr lang="en-US" dirty="0"/>
+                    </a:p>
+                  </a:txBody>
+                  <a:tcPr/>
+                </a:tc>
+                <a:tc>
+                  <a:txBody>
+                    <a:bodyPr/>
+                    <a:lstStyle/>
+                    <a:p>
+                      <a:pPr lvl="0">
+                        <a:buNone/>
+                      </a:pPr>
+                      <a:r>
+                        <a:rPr lang="en-US" sz="1800" b="0" i="0" u="none" strike="noStrike" noProof="0" dirty="0"/>
+                        <a:t>0.63</a:t>
+                      </a:r>
+                      <a:endParaRPr lang="en-US" dirty="0"/>
                     </a:p>
                   </a:txBody>
                   <a:tcPr/>

</xml_diff>

<commit_message>
Modifiche al framework e aggiunte tempi di valutazione
</commit_message>
<xml_diff>
--- a/altro/Presentazione_risultati.pptx
+++ b/altro/Presentazione_risultati.pptx
@@ -23,13 +23,17 @@
     <p:sldId id="276" r:id="rId17"/>
     <p:sldId id="275" r:id="rId18"/>
     <p:sldId id="274" r:id="rId19"/>
-    <p:sldId id="280" r:id="rId20"/>
-    <p:sldId id="279" r:id="rId21"/>
-    <p:sldId id="278" r:id="rId22"/>
-    <p:sldId id="273" r:id="rId23"/>
-    <p:sldId id="282" r:id="rId24"/>
-    <p:sldId id="281" r:id="rId25"/>
-    <p:sldId id="271" r:id="rId26"/>
+    <p:sldId id="283" r:id="rId20"/>
+    <p:sldId id="284" r:id="rId21"/>
+    <p:sldId id="286" r:id="rId22"/>
+    <p:sldId id="285" r:id="rId23"/>
+    <p:sldId id="280" r:id="rId24"/>
+    <p:sldId id="279" r:id="rId25"/>
+    <p:sldId id="278" r:id="rId26"/>
+    <p:sldId id="273" r:id="rId27"/>
+    <p:sldId id="282" r:id="rId28"/>
+    <p:sldId id="281" r:id="rId29"/>
+    <p:sldId id="271" r:id="rId30"/>
   </p:sldIdLst>
   <p:sldSz cx="12192000" cy="6858000"/>
   <p:notesSz cx="6858000" cy="9144000"/>
@@ -299,7 +303,7 @@
           <a:p>
             <a:fld id="{A1E45834-53BD-4C8F-B791-CD5378F4150E}" type="datetimeFigureOut">
               <a:rPr lang="en-US" smtClean="0"/>
-              <a:t>11/19/2024</a:t>
+              <a:t>11/23/2024</a:t>
             </a:fld>
             <a:endParaRPr lang="en-US"/>
           </a:p>
@@ -353,7 +357,7 @@
           <a:p>
             <a:fld id="{719D7796-F675-488F-AC46-C88938C80352}" type="slidenum">
               <a:rPr lang="en-US" smtClean="0"/>
-              <a:t>‹#›</a:t>
+              <a:t>‹N›</a:t>
             </a:fld>
             <a:endParaRPr lang="en-US"/>
           </a:p>
@@ -497,7 +501,7 @@
           <a:p>
             <a:fld id="{A1E45834-53BD-4C8F-B791-CD5378F4150E}" type="datetimeFigureOut">
               <a:rPr lang="en-US" smtClean="0"/>
-              <a:t>11/19/2024</a:t>
+              <a:t>11/23/2024</a:t>
             </a:fld>
             <a:endParaRPr lang="en-US"/>
           </a:p>
@@ -551,7 +555,7 @@
           <a:p>
             <a:fld id="{719D7796-F675-488F-AC46-C88938C80352}" type="slidenum">
               <a:rPr lang="en-US" smtClean="0"/>
-              <a:t>‹#›</a:t>
+              <a:t>‹N›</a:t>
             </a:fld>
             <a:endParaRPr lang="en-US"/>
           </a:p>
@@ -705,7 +709,7 @@
           <a:p>
             <a:fld id="{A1E45834-53BD-4C8F-B791-CD5378F4150E}" type="datetimeFigureOut">
               <a:rPr lang="en-US" smtClean="0"/>
-              <a:t>11/19/2024</a:t>
+              <a:t>11/23/2024</a:t>
             </a:fld>
             <a:endParaRPr lang="en-US"/>
           </a:p>
@@ -759,7 +763,7 @@
           <a:p>
             <a:fld id="{719D7796-F675-488F-AC46-C88938C80352}" type="slidenum">
               <a:rPr lang="en-US" smtClean="0"/>
-              <a:t>‹#›</a:t>
+              <a:t>‹N›</a:t>
             </a:fld>
             <a:endParaRPr lang="en-US"/>
           </a:p>
@@ -946,7 +950,7 @@
           <a:p>
             <a:fld id="{A1E45834-53BD-4C8F-B791-CD5378F4150E}" type="datetimeFigureOut">
               <a:rPr lang="en-US" smtClean="0"/>
-              <a:t>11/19/2024</a:t>
+              <a:t>11/23/2024</a:t>
             </a:fld>
             <a:endParaRPr lang="en-US"/>
           </a:p>
@@ -1000,7 +1004,7 @@
           <a:p>
             <a:fld id="{719D7796-F675-488F-AC46-C88938C80352}" type="slidenum">
               <a:rPr lang="en-US" smtClean="0"/>
-              <a:t>‹#›</a:t>
+              <a:t>‹N›</a:t>
             </a:fld>
             <a:endParaRPr lang="en-US"/>
           </a:p>
@@ -1224,7 +1228,7 @@
           <a:p>
             <a:fld id="{A1E45834-53BD-4C8F-B791-CD5378F4150E}" type="datetimeFigureOut">
               <a:rPr lang="en-US" smtClean="0"/>
-              <a:t>11/19/2024</a:t>
+              <a:t>11/23/2024</a:t>
             </a:fld>
             <a:endParaRPr lang="en-US"/>
           </a:p>
@@ -1278,7 +1282,7 @@
           <a:p>
             <a:fld id="{719D7796-F675-488F-AC46-C88938C80352}" type="slidenum">
               <a:rPr lang="en-US" smtClean="0"/>
-              <a:t>‹#›</a:t>
+              <a:t>‹N›</a:t>
             </a:fld>
             <a:endParaRPr lang="en-US"/>
           </a:p>
@@ -1494,7 +1498,7 @@
           <a:p>
             <a:fld id="{A1E45834-53BD-4C8F-B791-CD5378F4150E}" type="datetimeFigureOut">
               <a:rPr lang="en-US" smtClean="0"/>
-              <a:t>11/19/2024</a:t>
+              <a:t>11/23/2024</a:t>
             </a:fld>
             <a:endParaRPr lang="en-US"/>
           </a:p>
@@ -1548,7 +1552,7 @@
           <a:p>
             <a:fld id="{719D7796-F675-488F-AC46-C88938C80352}" type="slidenum">
               <a:rPr lang="en-US" smtClean="0"/>
-              <a:t>‹#›</a:t>
+              <a:t>‹N›</a:t>
             </a:fld>
             <a:endParaRPr lang="en-US"/>
           </a:p>
@@ -1916,7 +1920,7 @@
           <a:p>
             <a:fld id="{A1E45834-53BD-4C8F-B791-CD5378F4150E}" type="datetimeFigureOut">
               <a:rPr lang="en-US" smtClean="0"/>
-              <a:t>11/19/2024</a:t>
+              <a:t>11/23/2024</a:t>
             </a:fld>
             <a:endParaRPr lang="en-US"/>
           </a:p>
@@ -1970,7 +1974,7 @@
           <a:p>
             <a:fld id="{719D7796-F675-488F-AC46-C88938C80352}" type="slidenum">
               <a:rPr lang="en-US" smtClean="0"/>
-              <a:t>‹#›</a:t>
+              <a:t>‹N›</a:t>
             </a:fld>
             <a:endParaRPr lang="en-US"/>
           </a:p>
@@ -2061,7 +2065,7 @@
           <a:p>
             <a:fld id="{A1E45834-53BD-4C8F-B791-CD5378F4150E}" type="datetimeFigureOut">
               <a:rPr lang="en-US" smtClean="0"/>
-              <a:t>11/19/2024</a:t>
+              <a:t>11/23/2024</a:t>
             </a:fld>
             <a:endParaRPr lang="en-US"/>
           </a:p>
@@ -2115,7 +2119,7 @@
           <a:p>
             <a:fld id="{719D7796-F675-488F-AC46-C88938C80352}" type="slidenum">
               <a:rPr lang="en-US" smtClean="0"/>
-              <a:t>‹#›</a:t>
+              <a:t>‹N›</a:t>
             </a:fld>
             <a:endParaRPr lang="en-US"/>
           </a:p>
@@ -2174,7 +2178,7 @@
           <a:p>
             <a:fld id="{A1E45834-53BD-4C8F-B791-CD5378F4150E}" type="datetimeFigureOut">
               <a:rPr lang="en-US" smtClean="0"/>
-              <a:t>11/19/2024</a:t>
+              <a:t>11/23/2024</a:t>
             </a:fld>
             <a:endParaRPr lang="en-US"/>
           </a:p>
@@ -2228,7 +2232,7 @@
           <a:p>
             <a:fld id="{719D7796-F675-488F-AC46-C88938C80352}" type="slidenum">
               <a:rPr lang="en-US" smtClean="0"/>
-              <a:t>‹#›</a:t>
+              <a:t>‹N›</a:t>
             </a:fld>
             <a:endParaRPr lang="en-US"/>
           </a:p>
@@ -2488,7 +2492,7 @@
           <a:p>
             <a:fld id="{A1E45834-53BD-4C8F-B791-CD5378F4150E}" type="datetimeFigureOut">
               <a:rPr lang="en-US" smtClean="0"/>
-              <a:t>11/19/2024</a:t>
+              <a:t>11/23/2024</a:t>
             </a:fld>
             <a:endParaRPr lang="en-US"/>
           </a:p>
@@ -2542,7 +2546,7 @@
           <a:p>
             <a:fld id="{719D7796-F675-488F-AC46-C88938C80352}" type="slidenum">
               <a:rPr lang="en-US" smtClean="0"/>
-              <a:t>‹#›</a:t>
+              <a:t>‹N›</a:t>
             </a:fld>
             <a:endParaRPr lang="en-US"/>
           </a:p>
@@ -2782,7 +2786,7 @@
           <a:p>
             <a:fld id="{A1E45834-53BD-4C8F-B791-CD5378F4150E}" type="datetimeFigureOut">
               <a:rPr lang="en-US" smtClean="0"/>
-              <a:t>11/19/2024</a:t>
+              <a:t>11/23/2024</a:t>
             </a:fld>
             <a:endParaRPr lang="en-US"/>
           </a:p>
@@ -2836,7 +2840,7 @@
           <a:p>
             <a:fld id="{719D7796-F675-488F-AC46-C88938C80352}" type="slidenum">
               <a:rPr lang="en-US" smtClean="0"/>
-              <a:t>‹#›</a:t>
+              <a:t>‹N›</a:t>
             </a:fld>
             <a:endParaRPr lang="en-US"/>
           </a:p>
@@ -3021,7 +3025,7 @@
           <a:p>
             <a:fld id="{A1E45834-53BD-4C8F-B791-CD5378F4150E}" type="datetimeFigureOut">
               <a:rPr lang="en-US" smtClean="0"/>
-              <a:t>11/19/2024</a:t>
+              <a:t>11/23/2024</a:t>
             </a:fld>
             <a:endParaRPr lang="en-US"/>
           </a:p>
@@ -3107,7 +3111,7 @@
           <a:p>
             <a:fld id="{719D7796-F675-488F-AC46-C88938C80352}" type="slidenum">
               <a:rPr lang="en-US" smtClean="0"/>
-              <a:t>‹#›</a:t>
+              <a:t>‹N›</a:t>
             </a:fld>
             <a:endParaRPr lang="en-US"/>
           </a:p>
@@ -13867,7 +13871,13 @@
     </p:bg>
     <p:spTree>
       <p:nvGrpSpPr>
-        <p:cNvPr id="1" name=""/>
+        <p:cNvPr id="1" name="">
+          <a:extLst>
+            <a:ext uri="{FF2B5EF4-FFF2-40B4-BE49-F238E27FC236}">
+              <a16:creationId xmlns:a16="http://schemas.microsoft.com/office/drawing/2014/main" id="{6526022B-416E-49A1-26C8-8633442ADCD0}"/>
+            </a:ext>
+          </a:extLst>
+        </p:cNvPr>
         <p:cNvGrpSpPr/>
         <p:nvPr/>
       </p:nvGrpSpPr>
@@ -13879,64 +13889,12 @@
           <a:chExt cx="0" cy="0"/>
         </a:xfrm>
       </p:grpSpPr>
-      <p:cxnSp>
-        <p:nvCxnSpPr>
-          <p:cNvPr id="18" name="Straight Connector 17">
+      <p:sp useBgFill="1">
+        <p:nvSpPr>
+          <p:cNvPr id="13" name="Rectangle 12">
             <a:extLst>
               <a:ext uri="{FF2B5EF4-FFF2-40B4-BE49-F238E27FC236}">
-                <a16:creationId xmlns:a16="http://schemas.microsoft.com/office/drawing/2014/main" id="{D8689CE0-64D2-447C-9C1F-872D111D8AC3}"/>
-              </a:ext>
-              <a:ext uri="{C183D7F6-B498-43B3-948B-1728B52AA6E4}">
-                <adec:decorative xmlns:adec="http://schemas.microsoft.com/office/drawing/2017/decorative" val="1"/>
-              </a:ext>
-            </a:extLst>
-          </p:cNvPr>
-          <p:cNvCxnSpPr>
-            <a:cxnSpLocks noGrp="1" noRot="1" noChangeAspect="1" noMove="1" noResize="1" noEditPoints="1" noAdjustHandles="1" noChangeArrowheads="1" noChangeShapeType="1"/>
-          </p:cNvCxnSpPr>
-          <p:nvPr>
-            <p:extLst>
-              <p:ext uri="{386F3935-93C4-4BCD-93E2-E3B085C9AB24}">
-                <p16:designElem xmlns:p16="http://schemas.microsoft.com/office/powerpoint/2015/main" val="1"/>
-              </p:ext>
-            </p:extLst>
-          </p:nvPr>
-        </p:nvCxnSpPr>
-        <p:spPr>
-          <a:xfrm>
-            <a:off x="0" y="1185205"/>
-            <a:ext cx="804195" cy="0"/>
-          </a:xfrm>
-          <a:prstGeom prst="line">
-            <a:avLst/>
-          </a:prstGeom>
-          <a:ln w="85725">
-            <a:solidFill>
-              <a:schemeClr val="tx1"/>
-            </a:solidFill>
-          </a:ln>
-        </p:spPr>
-        <p:style>
-          <a:lnRef idx="1">
-            <a:schemeClr val="accent1"/>
-          </a:lnRef>
-          <a:fillRef idx="0">
-            <a:schemeClr val="accent1"/>
-          </a:fillRef>
-          <a:effectRef idx="0">
-            <a:schemeClr val="accent1"/>
-          </a:effectRef>
-          <a:fontRef idx="minor">
-            <a:schemeClr val="tx1"/>
-          </a:fontRef>
-        </p:style>
-      </p:cxnSp>
-      <p:sp useBgFill="1">
-        <p:nvSpPr>
-          <p:cNvPr id="20" name="Rectangle 19">
-            <a:extLst>
-              <a:ext uri="{FF2B5EF4-FFF2-40B4-BE49-F238E27FC236}">
-                <a16:creationId xmlns:a16="http://schemas.microsoft.com/office/drawing/2014/main" id="{511C99DC-C3C5-4EBE-91DD-345109C3D6E0}"/>
+                <a16:creationId xmlns:a16="http://schemas.microsoft.com/office/drawing/2014/main" id="{A3B168A7-66FE-4359-9866-CBB841A729E6}"/>
               </a:ext>
               <a:ext uri="{C183D7F6-B498-43B3-948B-1728B52AA6E4}">
                 <adec:decorative xmlns:adec="http://schemas.microsoft.com/office/drawing/2017/decorative" val="1"/>
@@ -14012,6 +13970,1406 @@
           <p:cNvPr id="2" name="Title 1">
             <a:extLst>
               <a:ext uri="{FF2B5EF4-FFF2-40B4-BE49-F238E27FC236}">
+                <a16:creationId xmlns:a16="http://schemas.microsoft.com/office/drawing/2014/main" id="{4C9DE9D3-9E8D-999F-045A-9429483D406D}"/>
+              </a:ext>
+            </a:extLst>
+          </p:cNvPr>
+          <p:cNvSpPr>
+            <a:spLocks noGrp="1"/>
+          </p:cNvSpPr>
+          <p:nvPr>
+            <p:ph type="title"/>
+          </p:nvPr>
+        </p:nvSpPr>
+        <p:spPr>
+          <a:xfrm>
+            <a:off x="1091204" y="1091868"/>
+            <a:ext cx="9750966" cy="1186875"/>
+          </a:xfrm>
+        </p:spPr>
+        <p:txBody>
+          <a:bodyPr vert="horz" lIns="91440" tIns="45720" rIns="91440" bIns="45720" rtlCol="0">
+            <a:normAutofit/>
+          </a:bodyPr>
+          <a:lstStyle/>
+          <a:p>
+            <a:r>
+              <a:rPr lang="en-US" sz="4000" cap="all" dirty="0" err="1"/>
+              <a:t>Analisi</a:t>
+            </a:r>
+            <a:r>
+              <a:rPr lang="en-US" sz="4000" cap="all" dirty="0"/>
+              <a:t> Code T5 770 (Entry)</a:t>
+            </a:r>
+            <a:endParaRPr lang="en-US" sz="4000" dirty="0"/>
+          </a:p>
+        </p:txBody>
+      </p:sp>
+      <p:cxnSp>
+        <p:nvCxnSpPr>
+          <p:cNvPr id="15" name="Straight Connector 14">
+            <a:extLst>
+              <a:ext uri="{FF2B5EF4-FFF2-40B4-BE49-F238E27FC236}">
+                <a16:creationId xmlns:a16="http://schemas.microsoft.com/office/drawing/2014/main" id="{F0748755-DDBC-46D0-91EC-1212A8EE2B40}"/>
+              </a:ext>
+              <a:ext uri="{C183D7F6-B498-43B3-948B-1728B52AA6E4}">
+                <adec:decorative xmlns:adec="http://schemas.microsoft.com/office/drawing/2017/decorative" val="1"/>
+              </a:ext>
+            </a:extLst>
+          </p:cNvPr>
+          <p:cNvCxnSpPr>
+            <a:cxnSpLocks noGrp="1" noRot="1" noChangeAspect="1" noMove="1" noResize="1" noEditPoints="1" noAdjustHandles="1" noChangeArrowheads="1" noChangeShapeType="1"/>
+          </p:cNvCxnSpPr>
+          <p:nvPr>
+            <p:extLst>
+              <p:ext uri="{386F3935-93C4-4BCD-93E2-E3B085C9AB24}">
+                <p16:designElem xmlns:p16="http://schemas.microsoft.com/office/powerpoint/2015/main" val="1"/>
+              </p:ext>
+            </p:extLst>
+          </p:nvPr>
+        </p:nvCxnSpPr>
+        <p:spPr>
+          <a:xfrm>
+            <a:off x="-12800" y="1186344"/>
+            <a:ext cx="804195" cy="0"/>
+          </a:xfrm>
+          <a:prstGeom prst="line">
+            <a:avLst/>
+          </a:prstGeom>
+          <a:ln w="85725">
+            <a:solidFill>
+              <a:schemeClr val="tx1"/>
+            </a:solidFill>
+          </a:ln>
+        </p:spPr>
+        <p:style>
+          <a:lnRef idx="1">
+            <a:schemeClr val="accent1"/>
+          </a:lnRef>
+          <a:fillRef idx="0">
+            <a:schemeClr val="accent1"/>
+          </a:fillRef>
+          <a:effectRef idx="0">
+            <a:schemeClr val="accent1"/>
+          </a:effectRef>
+          <a:fontRef idx="minor">
+            <a:schemeClr val="tx1"/>
+          </a:fontRef>
+        </p:style>
+      </p:cxnSp>
+      <p:sp>
+        <p:nvSpPr>
+          <p:cNvPr id="6" name="Content Placeholder 5">
+            <a:extLst>
+              <a:ext uri="{FF2B5EF4-FFF2-40B4-BE49-F238E27FC236}">
+                <a16:creationId xmlns:a16="http://schemas.microsoft.com/office/drawing/2014/main" id="{E179D3F9-689E-7127-9F32-8F56E873207B}"/>
+              </a:ext>
+            </a:extLst>
+          </p:cNvPr>
+          <p:cNvSpPr>
+            <a:spLocks noGrp="1"/>
+          </p:cNvSpPr>
+          <p:nvPr>
+            <p:ph idx="1"/>
+          </p:nvPr>
+        </p:nvSpPr>
+        <p:spPr>
+          <a:xfrm>
+            <a:off x="1120231" y="3204756"/>
+            <a:ext cx="9721939" cy="2042160"/>
+          </a:xfrm>
+        </p:spPr>
+        <p:txBody>
+          <a:bodyPr vert="horz" lIns="91440" tIns="45720" rIns="91440" bIns="45720" rtlCol="0">
+            <a:normAutofit/>
+          </a:bodyPr>
+          <a:lstStyle/>
+          <a:p>
+            <a:pPr marL="0" indent="0">
+              <a:buNone/>
+            </a:pPr>
+            <a:r>
+              <a:rPr lang="en-US" b="1" dirty="0"/>
+              <a:t>PROMPT: </a:t>
+            </a:r>
+            <a:r>
+              <a:rPr lang="en-US" dirty="0"/>
+              <a:t>Implement a basic I2C master controller</a:t>
+            </a:r>
+          </a:p>
+        </p:txBody>
+      </p:sp>
+    </p:spTree>
+    <p:extLst>
+      <p:ext uri="{BB962C8B-B14F-4D97-AF65-F5344CB8AC3E}">
+        <p14:creationId xmlns:p14="http://schemas.microsoft.com/office/powerpoint/2010/main" val="1799130986"/>
+      </p:ext>
+    </p:extLst>
+  </p:cSld>
+  <p:clrMapOvr>
+    <a:masterClrMapping/>
+  </p:clrMapOvr>
+</p:sld>
+</file>
+
+<file path=ppt/slides/slide2.xml><?xml version="1.0" encoding="utf-8"?>
+<p:sld xmlns:a="http://schemas.openxmlformats.org/drawingml/2006/main" xmlns:r="http://schemas.openxmlformats.org/officeDocument/2006/relationships" xmlns:p="http://schemas.openxmlformats.org/presentationml/2006/main">
+  <p:cSld>
+    <p:spTree>
+      <p:nvGrpSpPr>
+        <p:cNvPr id="1" name=""/>
+        <p:cNvGrpSpPr/>
+        <p:nvPr/>
+      </p:nvGrpSpPr>
+      <p:grpSpPr>
+        <a:xfrm>
+          <a:off x="0" y="0"/>
+          <a:ext cx="0" cy="0"/>
+          <a:chOff x="0" y="0"/>
+          <a:chExt cx="0" cy="0"/>
+        </a:xfrm>
+      </p:grpSpPr>
+      <p:sp>
+        <p:nvSpPr>
+          <p:cNvPr id="2" name="Title 1">
+            <a:extLst>
+              <a:ext uri="{FF2B5EF4-FFF2-40B4-BE49-F238E27FC236}">
+                <a16:creationId xmlns:a16="http://schemas.microsoft.com/office/drawing/2014/main" id="{AC499DF1-0D29-F059-3D2A-DCFD9A3CAD41}"/>
+              </a:ext>
+            </a:extLst>
+          </p:cNvPr>
+          <p:cNvSpPr>
+            <a:spLocks noGrp="1"/>
+          </p:cNvSpPr>
+          <p:nvPr>
+            <p:ph type="title"/>
+          </p:nvPr>
+        </p:nvSpPr>
+        <p:spPr/>
+        <p:txBody>
+          <a:bodyPr/>
+          <a:lstStyle/>
+          <a:p>
+            <a:r>
+              <a:rPr lang="en-US" dirty="0" err="1"/>
+              <a:t>Sommario</a:t>
+            </a:r>
+          </a:p>
+        </p:txBody>
+      </p:sp>
+      <p:sp>
+        <p:nvSpPr>
+          <p:cNvPr id="3" name="Content Placeholder 2">
+            <a:extLst>
+              <a:ext uri="{FF2B5EF4-FFF2-40B4-BE49-F238E27FC236}">
+                <a16:creationId xmlns:a16="http://schemas.microsoft.com/office/drawing/2014/main" id="{0A9587D2-A3B6-FEC8-889C-5785A7327FEC}"/>
+              </a:ext>
+            </a:extLst>
+          </p:cNvPr>
+          <p:cNvSpPr>
+            <a:spLocks noGrp="1"/>
+          </p:cNvSpPr>
+          <p:nvPr>
+            <p:ph idx="1"/>
+          </p:nvPr>
+        </p:nvSpPr>
+        <p:spPr>
+          <a:xfrm>
+            <a:off x="879201" y="1980746"/>
+            <a:ext cx="10549570" cy="4490109"/>
+          </a:xfrm>
+        </p:spPr>
+        <p:txBody>
+          <a:bodyPr vert="horz" lIns="91440" tIns="45720" rIns="91440" bIns="45720" rtlCol="0" anchor="t">
+            <a:normAutofit fontScale="85000" lnSpcReduction="20000"/>
+          </a:bodyPr>
+          <a:lstStyle/>
+          <a:p>
+            <a:pPr>
+              <a:buFont typeface="Calibri" panose="020B0504020202020204" pitchFamily="34" charset="0"/>
+            </a:pPr>
+            <a:r>
+              <a:rPr lang="en-US" sz="2800" dirty="0"/>
+              <a:t>Framework di </a:t>
+            </a:r>
+            <a:r>
+              <a:rPr lang="en-US" sz="2800" dirty="0" err="1"/>
+              <a:t>analisi</a:t>
+            </a:r>
+            <a:endParaRPr lang="en-US" sz="2800" dirty="0"/>
+          </a:p>
+          <a:p>
+            <a:pPr>
+              <a:buFont typeface="Calibri" panose="020B0504020202020204" pitchFamily="34" charset="0"/>
+            </a:pPr>
+            <a:r>
+              <a:rPr lang="en-US" sz="2800" err="1"/>
+              <a:t>Analisi</a:t>
+            </a:r>
+            <a:r>
+              <a:rPr lang="en-US" sz="2800" dirty="0"/>
+              <a:t>  </a:t>
+            </a:r>
+            <a:r>
+              <a:rPr lang="en-US" sz="2800" err="1"/>
+              <a:t>sul</a:t>
+            </a:r>
+            <a:r>
+              <a:rPr lang="en-US" sz="2800" dirty="0"/>
+              <a:t> test set</a:t>
+            </a:r>
+            <a:endParaRPr lang="en-US"/>
+          </a:p>
+          <a:p>
+            <a:pPr>
+              <a:buFont typeface="Calibri" panose="020B0504020202020204" pitchFamily="34" charset="0"/>
+            </a:pPr>
+            <a:r>
+              <a:rPr lang="en-US" sz="2800" dirty="0" err="1"/>
+              <a:t>Analisi</a:t>
+            </a:r>
+            <a:r>
+              <a:rPr lang="en-US" sz="2800" dirty="0"/>
+              <a:t> </a:t>
+            </a:r>
+            <a:r>
+              <a:rPr lang="en-US" sz="2800" dirty="0" err="1"/>
+              <a:t>CodeGen</a:t>
+            </a:r>
+            <a:endParaRPr lang="en-US" sz="2800" dirty="0"/>
+          </a:p>
+          <a:p>
+            <a:pPr>
+              <a:buFont typeface="Calibri" panose="020B0504020202020204" pitchFamily="34" charset="0"/>
+            </a:pPr>
+            <a:r>
+              <a:rPr lang="en-US" sz="2800" dirty="0" err="1"/>
+              <a:t>Analisi</a:t>
+            </a:r>
+            <a:r>
+              <a:rPr lang="en-US" sz="2800" dirty="0"/>
+              <a:t> CodeT5_220</a:t>
+            </a:r>
+          </a:p>
+          <a:p>
+            <a:pPr>
+              <a:buFont typeface="Calibri" panose="020B0504020202020204" pitchFamily="34" charset="0"/>
+            </a:pPr>
+            <a:r>
+              <a:rPr lang="en-US" sz="2800" err="1"/>
+              <a:t>Analisi</a:t>
+            </a:r>
+            <a:r>
+              <a:rPr lang="en-US" sz="2800" dirty="0"/>
+              <a:t> </a:t>
+            </a:r>
+            <a:r>
+              <a:rPr lang="en-US" sz="2800" err="1"/>
+              <a:t>CodeGPT</a:t>
+            </a:r>
+            <a:endParaRPr lang="en-US" sz="2800"/>
+          </a:p>
+          <a:p>
+            <a:pPr>
+              <a:buFont typeface="Calibri" panose="020B0504020202020204" pitchFamily="34" charset="0"/>
+              <a:buChar char="-"/>
+            </a:pPr>
+            <a:r>
+              <a:rPr lang="en-US" sz="2800" err="1"/>
+              <a:t>Analisi</a:t>
+            </a:r>
+            <a:r>
+              <a:rPr lang="en-US" sz="2800" dirty="0"/>
+              <a:t> CodeT5_770</a:t>
+            </a:r>
+          </a:p>
+          <a:p>
+            <a:pPr>
+              <a:buFont typeface="Calibri" panose="020B0504020202020204" pitchFamily="34" charset="0"/>
+              <a:buChar char="-"/>
+            </a:pPr>
+            <a:r>
+              <a:rPr lang="en-US" sz="2800" dirty="0" err="1"/>
+              <a:t>Analisi</a:t>
+            </a:r>
+            <a:r>
+              <a:rPr lang="en-US" sz="2800" dirty="0"/>
+              <a:t> Claude Sonnet</a:t>
+            </a:r>
+          </a:p>
+          <a:p>
+            <a:pPr>
+              <a:buFont typeface="Calibri" panose="020B0504020202020204" pitchFamily="34" charset="0"/>
+              <a:buChar char="-"/>
+            </a:pPr>
+            <a:r>
+              <a:rPr lang="en-US" sz="2800" dirty="0" err="1"/>
+              <a:t>Analisi</a:t>
+            </a:r>
+            <a:r>
+              <a:rPr lang="en-US" sz="2800" dirty="0"/>
+              <a:t> common failure</a:t>
+            </a:r>
+          </a:p>
+          <a:p>
+            <a:pPr marL="0" indent="0">
+              <a:buNone/>
+            </a:pPr>
+            <a:endParaRPr lang="en-US" sz="2800" dirty="0"/>
+          </a:p>
+        </p:txBody>
+      </p:sp>
+    </p:spTree>
+    <p:extLst>
+      <p:ext uri="{BB962C8B-B14F-4D97-AF65-F5344CB8AC3E}">
+        <p14:creationId xmlns:p14="http://schemas.microsoft.com/office/powerpoint/2010/main" val="2843851393"/>
+      </p:ext>
+    </p:extLst>
+  </p:cSld>
+  <p:clrMapOvr>
+    <a:masterClrMapping/>
+  </p:clrMapOvr>
+</p:sld>
+</file>
+
+<file path=ppt/slides/slide20.xml><?xml version="1.0" encoding="utf-8"?>
+<p:sld xmlns:a="http://schemas.openxmlformats.org/drawingml/2006/main" xmlns:r="http://schemas.openxmlformats.org/officeDocument/2006/relationships" xmlns:p="http://schemas.openxmlformats.org/presentationml/2006/main">
+  <p:cSld>
+    <p:spTree>
+      <p:nvGrpSpPr>
+        <p:cNvPr id="1" name="">
+          <a:extLst>
+            <a:ext uri="{FF2B5EF4-FFF2-40B4-BE49-F238E27FC236}">
+              <a16:creationId xmlns:a16="http://schemas.microsoft.com/office/drawing/2014/main" id="{55F680D1-3336-F058-F462-D5928070E268}"/>
+            </a:ext>
+          </a:extLst>
+        </p:cNvPr>
+        <p:cNvGrpSpPr/>
+        <p:nvPr/>
+      </p:nvGrpSpPr>
+      <p:grpSpPr>
+        <a:xfrm>
+          <a:off x="0" y="0"/>
+          <a:ext cx="0" cy="0"/>
+          <a:chOff x="0" y="0"/>
+          <a:chExt cx="0" cy="0"/>
+        </a:xfrm>
+      </p:grpSpPr>
+      <p:sp>
+        <p:nvSpPr>
+          <p:cNvPr id="2" name="Title 1">
+            <a:extLst>
+              <a:ext uri="{FF2B5EF4-FFF2-40B4-BE49-F238E27FC236}">
+                <a16:creationId xmlns:a16="http://schemas.microsoft.com/office/drawing/2014/main" id="{D3BE7F0D-B8AC-BFF5-07B3-AFAF12F0ACD9}"/>
+              </a:ext>
+            </a:extLst>
+          </p:cNvPr>
+          <p:cNvSpPr>
+            <a:spLocks noGrp="1"/>
+          </p:cNvSpPr>
+          <p:nvPr>
+            <p:ph type="title"/>
+          </p:nvPr>
+        </p:nvSpPr>
+        <p:spPr>
+          <a:xfrm>
+            <a:off x="1091203" y="1091868"/>
+            <a:ext cx="4627425" cy="1070761"/>
+          </a:xfrm>
+        </p:spPr>
+        <p:txBody>
+          <a:bodyPr vert="horz" lIns="91440" tIns="45720" rIns="91440" bIns="45720" rtlCol="0">
+            <a:normAutofit fontScale="90000"/>
+          </a:bodyPr>
+          <a:lstStyle/>
+          <a:p>
+            <a:r>
+              <a:rPr lang="en-US" sz="4000" cap="all" dirty="0" err="1"/>
+              <a:t>Analisi</a:t>
+            </a:r>
+            <a:r>
+              <a:rPr lang="en-US" sz="4000" cap="all" dirty="0"/>
+              <a:t> Code T5 770 (Entry)</a:t>
+            </a:r>
+            <a:endParaRPr lang="en-US" sz="4000" dirty="0"/>
+          </a:p>
+        </p:txBody>
+      </p:sp>
+      <p:sp>
+        <p:nvSpPr>
+          <p:cNvPr id="6" name="Content Placeholder 5">
+            <a:extLst>
+              <a:ext uri="{FF2B5EF4-FFF2-40B4-BE49-F238E27FC236}">
+                <a16:creationId xmlns:a16="http://schemas.microsoft.com/office/drawing/2014/main" id="{A1F746FC-681A-CC51-BECC-42746AA7EE89}"/>
+              </a:ext>
+            </a:extLst>
+          </p:cNvPr>
+          <p:cNvSpPr>
+            <a:spLocks noGrp="1"/>
+          </p:cNvSpPr>
+          <p:nvPr>
+            <p:ph idx="1"/>
+          </p:nvPr>
+        </p:nvSpPr>
+        <p:spPr>
+          <a:xfrm>
+            <a:off x="822365" y="2162629"/>
+            <a:ext cx="4896264" cy="4484914"/>
+          </a:xfrm>
+        </p:spPr>
+        <p:txBody>
+          <a:bodyPr vert="horz" lIns="91440" tIns="45720" rIns="91440" bIns="45720" rtlCol="0">
+            <a:normAutofit/>
+          </a:bodyPr>
+          <a:lstStyle/>
+          <a:p>
+            <a:pPr marL="0" indent="0">
+              <a:buNone/>
+            </a:pPr>
+            <a:r>
+              <a:rPr lang="en-US" dirty="0"/>
+              <a:t>Il </a:t>
+            </a:r>
+            <a:r>
+              <a:rPr lang="en-US" dirty="0" err="1"/>
+              <a:t>codice</a:t>
+            </a:r>
+            <a:r>
+              <a:rPr lang="en-US" dirty="0"/>
+              <a:t> </a:t>
+            </a:r>
+            <a:r>
+              <a:rPr lang="en-US" dirty="0" err="1"/>
+              <a:t>generato</a:t>
+            </a:r>
+            <a:r>
+              <a:rPr lang="en-US" dirty="0"/>
+              <a:t> non </a:t>
+            </a:r>
+            <a:r>
+              <a:rPr lang="en-US" dirty="0" err="1"/>
+              <a:t>corrisponde</a:t>
+            </a:r>
+            <a:r>
+              <a:rPr lang="en-US" dirty="0"/>
+              <a:t> per </a:t>
+            </a:r>
+            <a:r>
+              <a:rPr lang="en-US" dirty="0" err="1"/>
+              <a:t>nulla</a:t>
+            </a:r>
+            <a:r>
+              <a:rPr lang="en-US" dirty="0"/>
+              <a:t> al prompt in ingress, </a:t>
+            </a:r>
+            <a:r>
+              <a:rPr lang="en-US" dirty="0" err="1"/>
+              <a:t>fatto</a:t>
+            </a:r>
+            <a:r>
+              <a:rPr lang="en-US" dirty="0"/>
+              <a:t> </a:t>
+            </a:r>
+            <a:r>
+              <a:rPr lang="en-US" dirty="0" err="1"/>
+              <a:t>dimostrato</a:t>
+            </a:r>
+            <a:r>
+              <a:rPr lang="en-US" dirty="0"/>
+              <a:t> </a:t>
+            </a:r>
+            <a:r>
+              <a:rPr lang="en-US" dirty="0" err="1"/>
+              <a:t>anche</a:t>
+            </a:r>
+            <a:r>
+              <a:rPr lang="en-US" dirty="0"/>
+              <a:t> da </a:t>
+            </a:r>
+            <a:r>
+              <a:rPr lang="en-US" dirty="0" err="1"/>
+              <a:t>una</a:t>
+            </a:r>
+            <a:r>
+              <a:rPr lang="en-US" dirty="0"/>
+              <a:t> media </a:t>
+            </a:r>
+            <a:r>
+              <a:rPr lang="en-US" dirty="0" err="1"/>
+              <a:t>metriche</a:t>
+            </a:r>
+            <a:r>
+              <a:rPr lang="en-US" dirty="0"/>
+              <a:t> </a:t>
+            </a:r>
+            <a:r>
+              <a:rPr lang="en-US" dirty="0" err="1"/>
+              <a:t>pari</a:t>
+            </a:r>
+            <a:r>
+              <a:rPr lang="en-US" dirty="0"/>
+              <a:t> a 0.35 </a:t>
+            </a:r>
+          </a:p>
+          <a:p>
+            <a:pPr>
+              <a:buFontTx/>
+              <a:buChar char="-"/>
+            </a:pPr>
+            <a:endParaRPr lang="en-US" dirty="0"/>
+          </a:p>
+        </p:txBody>
+      </p:sp>
+      <p:pic>
+        <p:nvPicPr>
+          <p:cNvPr id="8" name="Immagine 7">
+            <a:extLst>
+              <a:ext uri="{FF2B5EF4-FFF2-40B4-BE49-F238E27FC236}">
+                <a16:creationId xmlns:a16="http://schemas.microsoft.com/office/drawing/2014/main" id="{3B40BCD4-9401-33DD-8FA2-79EF0B8476B1}"/>
+              </a:ext>
+            </a:extLst>
+          </p:cNvPr>
+          <p:cNvPicPr>
+            <a:picLocks noChangeAspect="1"/>
+          </p:cNvPicPr>
+          <p:nvPr/>
+        </p:nvPicPr>
+        <p:blipFill>
+          <a:blip r:embed="rId2">
+            <a:extLst>
+              <a:ext uri="{28A0092B-C50C-407E-A947-70E740481C1C}">
+                <a14:useLocalDpi xmlns:a14="http://schemas.microsoft.com/office/drawing/2010/main" val="0"/>
+              </a:ext>
+            </a:extLst>
+          </a:blip>
+          <a:srcRect/>
+          <a:stretch/>
+        </p:blipFill>
+        <p:spPr>
+          <a:xfrm>
+            <a:off x="6096000" y="2028305"/>
+            <a:ext cx="5492377" cy="3213721"/>
+          </a:xfrm>
+          <a:prstGeom prst="rect">
+            <a:avLst/>
+          </a:prstGeom>
+        </p:spPr>
+      </p:pic>
+    </p:spTree>
+    <p:extLst>
+      <p:ext uri="{BB962C8B-B14F-4D97-AF65-F5344CB8AC3E}">
+        <p14:creationId xmlns:p14="http://schemas.microsoft.com/office/powerpoint/2010/main" val="2342985299"/>
+      </p:ext>
+    </p:extLst>
+  </p:cSld>
+  <p:clrMapOvr>
+    <a:masterClrMapping/>
+  </p:clrMapOvr>
+</p:sld>
+</file>
+
+<file path=ppt/slides/slide21.xml><?xml version="1.0" encoding="utf-8"?>
+<p:sld xmlns:a="http://schemas.openxmlformats.org/drawingml/2006/main" xmlns:r="http://schemas.openxmlformats.org/officeDocument/2006/relationships" xmlns:p="http://schemas.openxmlformats.org/presentationml/2006/main">
+  <p:cSld>
+    <p:bg>
+      <p:bgPr>
+        <a:solidFill>
+          <a:schemeClr val="bg1"/>
+        </a:solidFill>
+        <a:effectLst/>
+      </p:bgPr>
+    </p:bg>
+    <p:spTree>
+      <p:nvGrpSpPr>
+        <p:cNvPr id="1" name="">
+          <a:extLst>
+            <a:ext uri="{FF2B5EF4-FFF2-40B4-BE49-F238E27FC236}">
+              <a16:creationId xmlns:a16="http://schemas.microsoft.com/office/drawing/2014/main" id="{071D5BEC-9D42-57D3-60CA-1EDD1E3CD295}"/>
+            </a:ext>
+          </a:extLst>
+        </p:cNvPr>
+        <p:cNvGrpSpPr/>
+        <p:nvPr/>
+      </p:nvGrpSpPr>
+      <p:grpSpPr>
+        <a:xfrm>
+          <a:off x="0" y="0"/>
+          <a:ext cx="0" cy="0"/>
+          <a:chOff x="0" y="0"/>
+          <a:chExt cx="0" cy="0"/>
+        </a:xfrm>
+      </p:grpSpPr>
+      <p:sp useBgFill="1">
+        <p:nvSpPr>
+          <p:cNvPr id="20" name="Rectangle 19">
+            <a:extLst>
+              <a:ext uri="{FF2B5EF4-FFF2-40B4-BE49-F238E27FC236}">
+                <a16:creationId xmlns:a16="http://schemas.microsoft.com/office/drawing/2014/main" id="{A3B168A7-66FE-4359-9866-CBB841A729E6}"/>
+              </a:ext>
+              <a:ext uri="{C183D7F6-B498-43B3-948B-1728B52AA6E4}">
+                <adec:decorative xmlns:adec="http://schemas.microsoft.com/office/drawing/2017/decorative" val="1"/>
+              </a:ext>
+            </a:extLst>
+          </p:cNvPr>
+          <p:cNvSpPr>
+            <a:spLocks noGrp="1" noRot="1" noChangeAspect="1" noMove="1" noResize="1" noEditPoints="1" noAdjustHandles="1" noChangeArrowheads="1" noChangeShapeType="1" noTextEdit="1"/>
+          </p:cNvSpPr>
+          <p:nvPr>
+            <p:extLst>
+              <p:ext uri="{386F3935-93C4-4BCD-93E2-E3B085C9AB24}">
+                <p16:designElem xmlns:p16="http://schemas.microsoft.com/office/powerpoint/2015/main" val="1"/>
+              </p:ext>
+            </p:extLst>
+          </p:nvPr>
+        </p:nvSpPr>
+        <p:spPr>
+          <a:xfrm>
+            <a:off x="0" y="0"/>
+            <a:ext cx="12192000" cy="6858000"/>
+          </a:xfrm>
+          <a:prstGeom prst="rect">
+            <a:avLst/>
+          </a:prstGeom>
+          <a:ln w="12700" cap="flat" cmpd="sng" algn="ctr">
+            <a:noFill/>
+            <a:prstDash val="solid"/>
+            <a:miter lim="800000"/>
+          </a:ln>
+          <a:effectLst/>
+          <a:extLst>
+            <a:ext uri="{91240B29-F687-4F45-9708-019B960494DF}">
+              <a14:hiddenLine xmlns:a14="http://schemas.microsoft.com/office/drawing/2010/main" w="12700" cap="flat" cmpd="sng" algn="ctr">
+                <a:solidFill>
+                  <a:schemeClr val="accent1">
+                    <a:shade val="50000"/>
+                  </a:schemeClr>
+                </a:solidFill>
+                <a:prstDash val="solid"/>
+                <a:miter lim="800000"/>
+              </a14:hiddenLine>
+            </a:ext>
+          </a:extLst>
+        </p:spPr>
+        <p:style>
+          <a:lnRef idx="2">
+            <a:schemeClr val="accent1">
+              <a:shade val="50000"/>
+            </a:schemeClr>
+          </a:lnRef>
+          <a:fillRef idx="1">
+            <a:schemeClr val="accent1"/>
+          </a:fillRef>
+          <a:effectRef idx="0">
+            <a:schemeClr val="accent1"/>
+          </a:effectRef>
+          <a:fontRef idx="minor">
+            <a:schemeClr val="lt1"/>
+          </a:fontRef>
+        </p:style>
+        <p:txBody>
+          <a:bodyPr rtlCol="0" anchor="ctr"/>
+          <a:lstStyle/>
+          <a:p>
+            <a:pPr algn="ctr"/>
+            <a:endParaRPr lang="en-US"/>
+          </a:p>
+        </p:txBody>
+      </p:sp>
+      <p:sp>
+        <p:nvSpPr>
+          <p:cNvPr id="2" name="Title 1">
+            <a:extLst>
+              <a:ext uri="{FF2B5EF4-FFF2-40B4-BE49-F238E27FC236}">
+                <a16:creationId xmlns:a16="http://schemas.microsoft.com/office/drawing/2014/main" id="{646CF99A-2760-5A18-E84D-E5F8EC84EB79}"/>
+              </a:ext>
+            </a:extLst>
+          </p:cNvPr>
+          <p:cNvSpPr>
+            <a:spLocks noGrp="1"/>
+          </p:cNvSpPr>
+          <p:nvPr>
+            <p:ph type="title"/>
+          </p:nvPr>
+        </p:nvSpPr>
+        <p:spPr>
+          <a:xfrm>
+            <a:off x="1091203" y="1091868"/>
+            <a:ext cx="8793025" cy="2042160"/>
+          </a:xfrm>
+        </p:spPr>
+        <p:txBody>
+          <a:bodyPr vert="horz" lIns="91440" tIns="45720" rIns="91440" bIns="45720" rtlCol="0">
+            <a:normAutofit/>
+          </a:bodyPr>
+          <a:lstStyle/>
+          <a:p>
+            <a:r>
+              <a:rPr lang="en-US" sz="4000" cap="all" dirty="0" err="1"/>
+              <a:t>Analisi</a:t>
+            </a:r>
+            <a:r>
+              <a:rPr lang="en-US" sz="4000" cap="all" dirty="0"/>
+              <a:t> Code T5 770 (Entry)</a:t>
+            </a:r>
+            <a:endParaRPr lang="en-US" sz="4000" dirty="0"/>
+          </a:p>
+        </p:txBody>
+      </p:sp>
+      <p:cxnSp>
+        <p:nvCxnSpPr>
+          <p:cNvPr id="22" name="Straight Connector 21">
+            <a:extLst>
+              <a:ext uri="{FF2B5EF4-FFF2-40B4-BE49-F238E27FC236}">
+                <a16:creationId xmlns:a16="http://schemas.microsoft.com/office/drawing/2014/main" id="{F0748755-DDBC-46D0-91EC-1212A8EE2B40}"/>
+              </a:ext>
+              <a:ext uri="{C183D7F6-B498-43B3-948B-1728B52AA6E4}">
+                <adec:decorative xmlns:adec="http://schemas.microsoft.com/office/drawing/2017/decorative" val="1"/>
+              </a:ext>
+            </a:extLst>
+          </p:cNvPr>
+          <p:cNvCxnSpPr>
+            <a:cxnSpLocks noGrp="1" noRot="1" noChangeAspect="1" noMove="1" noResize="1" noEditPoints="1" noAdjustHandles="1" noChangeArrowheads="1" noChangeShapeType="1"/>
+          </p:cNvCxnSpPr>
+          <p:nvPr>
+            <p:extLst>
+              <p:ext uri="{386F3935-93C4-4BCD-93E2-E3B085C9AB24}">
+                <p16:designElem xmlns:p16="http://schemas.microsoft.com/office/powerpoint/2015/main" val="1"/>
+              </p:ext>
+            </p:extLst>
+          </p:nvPr>
+        </p:nvCxnSpPr>
+        <p:spPr>
+          <a:xfrm>
+            <a:off x="-12800" y="1186344"/>
+            <a:ext cx="804195" cy="0"/>
+          </a:xfrm>
+          <a:prstGeom prst="line">
+            <a:avLst/>
+          </a:prstGeom>
+          <a:ln w="85725">
+            <a:solidFill>
+              <a:schemeClr val="tx1"/>
+            </a:solidFill>
+          </a:ln>
+        </p:spPr>
+        <p:style>
+          <a:lnRef idx="1">
+            <a:schemeClr val="accent1"/>
+          </a:lnRef>
+          <a:fillRef idx="0">
+            <a:schemeClr val="accent1"/>
+          </a:fillRef>
+          <a:effectRef idx="0">
+            <a:schemeClr val="accent1"/>
+          </a:effectRef>
+          <a:fontRef idx="minor">
+            <a:schemeClr val="tx1"/>
+          </a:fontRef>
+        </p:style>
+      </p:cxnSp>
+      <p:sp>
+        <p:nvSpPr>
+          <p:cNvPr id="6" name="Content Placeholder 5">
+            <a:extLst>
+              <a:ext uri="{FF2B5EF4-FFF2-40B4-BE49-F238E27FC236}">
+                <a16:creationId xmlns:a16="http://schemas.microsoft.com/office/drawing/2014/main" id="{1AFA827C-08CC-9152-3D62-170E05FF98D7}"/>
+              </a:ext>
+            </a:extLst>
+          </p:cNvPr>
+          <p:cNvSpPr>
+            <a:spLocks noGrp="1"/>
+          </p:cNvSpPr>
+          <p:nvPr>
+            <p:ph idx="1"/>
+          </p:nvPr>
+        </p:nvSpPr>
+        <p:spPr>
+          <a:xfrm>
+            <a:off x="1120231" y="3204756"/>
+            <a:ext cx="9779997" cy="2760616"/>
+          </a:xfrm>
+        </p:spPr>
+        <p:txBody>
+          <a:bodyPr vert="horz" lIns="91440" tIns="45720" rIns="91440" bIns="45720" rtlCol="0">
+            <a:normAutofit/>
+          </a:bodyPr>
+          <a:lstStyle/>
+          <a:p>
+            <a:pPr marL="0" indent="0">
+              <a:buNone/>
+            </a:pPr>
+            <a:r>
+              <a:rPr lang="en-US" b="1" dirty="0"/>
+              <a:t>PROMPT:  </a:t>
+            </a:r>
+            <a:r>
+              <a:rPr lang="en-US" dirty="0"/>
+              <a:t>Create a 4-bit binary counter that increments on each clock pulse and resets asynchronously</a:t>
+            </a:r>
+          </a:p>
+        </p:txBody>
+      </p:sp>
+    </p:spTree>
+    <p:extLst>
+      <p:ext uri="{BB962C8B-B14F-4D97-AF65-F5344CB8AC3E}">
+        <p14:creationId xmlns:p14="http://schemas.microsoft.com/office/powerpoint/2010/main" val="1662964177"/>
+      </p:ext>
+    </p:extLst>
+  </p:cSld>
+  <p:clrMapOvr>
+    <a:masterClrMapping/>
+  </p:clrMapOvr>
+</p:sld>
+</file>
+
+<file path=ppt/slides/slide22.xml><?xml version="1.0" encoding="utf-8"?>
+<p:sld xmlns:a="http://schemas.openxmlformats.org/drawingml/2006/main" xmlns:r="http://schemas.openxmlformats.org/officeDocument/2006/relationships" xmlns:p="http://schemas.openxmlformats.org/presentationml/2006/main">
+  <p:cSld>
+    <p:bg>
+      <p:bgPr>
+        <a:solidFill>
+          <a:schemeClr val="bg1"/>
+        </a:solidFill>
+        <a:effectLst/>
+      </p:bgPr>
+    </p:bg>
+    <p:spTree>
+      <p:nvGrpSpPr>
+        <p:cNvPr id="1" name="">
+          <a:extLst>
+            <a:ext uri="{FF2B5EF4-FFF2-40B4-BE49-F238E27FC236}">
+              <a16:creationId xmlns:a16="http://schemas.microsoft.com/office/drawing/2014/main" id="{B0814F5D-7066-A3E5-3F3F-DA41F2F40EDF}"/>
+            </a:ext>
+          </a:extLst>
+        </p:cNvPr>
+        <p:cNvGrpSpPr/>
+        <p:nvPr/>
+      </p:nvGrpSpPr>
+      <p:grpSpPr>
+        <a:xfrm>
+          <a:off x="0" y="0"/>
+          <a:ext cx="0" cy="0"/>
+          <a:chOff x="0" y="0"/>
+          <a:chExt cx="0" cy="0"/>
+        </a:xfrm>
+      </p:grpSpPr>
+      <p:sp useBgFill="1">
+        <p:nvSpPr>
+          <p:cNvPr id="26" name="Rectangle 21">
+            <a:extLst>
+              <a:ext uri="{FF2B5EF4-FFF2-40B4-BE49-F238E27FC236}">
+                <a16:creationId xmlns:a16="http://schemas.microsoft.com/office/drawing/2014/main" id="{A12145F0-5149-412D-9A3F-1E3051B3979C}"/>
+              </a:ext>
+              <a:ext uri="{C183D7F6-B498-43B3-948B-1728B52AA6E4}">
+                <adec:decorative xmlns:adec="http://schemas.microsoft.com/office/drawing/2017/decorative" val="1"/>
+              </a:ext>
+            </a:extLst>
+          </p:cNvPr>
+          <p:cNvSpPr>
+            <a:spLocks noGrp="1" noRot="1" noChangeAspect="1" noMove="1" noResize="1" noEditPoints="1" noAdjustHandles="1" noChangeArrowheads="1" noChangeShapeType="1" noTextEdit="1"/>
+          </p:cNvSpPr>
+          <p:nvPr>
+            <p:extLst>
+              <p:ext uri="{386F3935-93C4-4BCD-93E2-E3B085C9AB24}">
+                <p16:designElem xmlns:p16="http://schemas.microsoft.com/office/powerpoint/2015/main" val="1"/>
+              </p:ext>
+            </p:extLst>
+          </p:nvPr>
+        </p:nvSpPr>
+        <p:spPr>
+          <a:xfrm>
+            <a:off x="0" y="0"/>
+            <a:ext cx="12192000" cy="6858000"/>
+          </a:xfrm>
+          <a:prstGeom prst="rect">
+            <a:avLst/>
+          </a:prstGeom>
+          <a:ln w="12700" cap="flat" cmpd="sng" algn="ctr">
+            <a:noFill/>
+            <a:prstDash val="solid"/>
+            <a:miter lim="800000"/>
+          </a:ln>
+          <a:effectLst/>
+          <a:extLst>
+            <a:ext uri="{91240B29-F687-4F45-9708-019B960494DF}">
+              <a14:hiddenLine xmlns:a14="http://schemas.microsoft.com/office/drawing/2010/main" w="12700" cap="flat" cmpd="sng" algn="ctr">
+                <a:solidFill>
+                  <a:schemeClr val="accent1">
+                    <a:shade val="50000"/>
+                  </a:schemeClr>
+                </a:solidFill>
+                <a:prstDash val="solid"/>
+                <a:miter lim="800000"/>
+              </a14:hiddenLine>
+            </a:ext>
+          </a:extLst>
+        </p:spPr>
+        <p:style>
+          <a:lnRef idx="2">
+            <a:schemeClr val="accent1">
+              <a:shade val="50000"/>
+            </a:schemeClr>
+          </a:lnRef>
+          <a:fillRef idx="1">
+            <a:schemeClr val="accent1"/>
+          </a:fillRef>
+          <a:effectRef idx="0">
+            <a:schemeClr val="accent1"/>
+          </a:effectRef>
+          <a:fontRef idx="minor">
+            <a:schemeClr val="lt1"/>
+          </a:fontRef>
+        </p:style>
+        <p:txBody>
+          <a:bodyPr rtlCol="0" anchor="ctr"/>
+          <a:lstStyle/>
+          <a:p>
+            <a:pPr algn="ctr"/>
+            <a:endParaRPr lang="en-US"/>
+          </a:p>
+        </p:txBody>
+      </p:sp>
+      <p:sp>
+        <p:nvSpPr>
+          <p:cNvPr id="2" name="Title 1">
+            <a:extLst>
+              <a:ext uri="{FF2B5EF4-FFF2-40B4-BE49-F238E27FC236}">
+                <a16:creationId xmlns:a16="http://schemas.microsoft.com/office/drawing/2014/main" id="{8E151A25-AF41-842F-6580-91903F81A829}"/>
+              </a:ext>
+            </a:extLst>
+          </p:cNvPr>
+          <p:cNvSpPr>
+            <a:spLocks noGrp="1"/>
+          </p:cNvSpPr>
+          <p:nvPr>
+            <p:ph type="title"/>
+          </p:nvPr>
+        </p:nvSpPr>
+        <p:spPr>
+          <a:xfrm>
+            <a:off x="1090940" y="1097279"/>
+            <a:ext cx="10529560" cy="1225587"/>
+          </a:xfrm>
+        </p:spPr>
+        <p:txBody>
+          <a:bodyPr vert="horz" lIns="91440" tIns="45720" rIns="91440" bIns="45720" rtlCol="0">
+            <a:normAutofit/>
+          </a:bodyPr>
+          <a:lstStyle/>
+          <a:p>
+            <a:r>
+              <a:rPr lang="en-US" sz="4000" cap="all"/>
+              <a:t>Analisi </a:t>
+            </a:r>
+            <a:r>
+              <a:rPr lang="en-US" sz="4000" cap="all" dirty="0"/>
+              <a:t>Code T5 770 (Entry)</a:t>
+            </a:r>
+            <a:endParaRPr lang="en-US" sz="4000" cap="all"/>
+          </a:p>
+        </p:txBody>
+      </p:sp>
+      <p:cxnSp>
+        <p:nvCxnSpPr>
+          <p:cNvPr id="27" name="Straight Connector 23">
+            <a:extLst>
+              <a:ext uri="{FF2B5EF4-FFF2-40B4-BE49-F238E27FC236}">
+                <a16:creationId xmlns:a16="http://schemas.microsoft.com/office/drawing/2014/main" id="{F0748755-DDBC-46D0-91EC-1212A8EE2B40}"/>
+              </a:ext>
+              <a:ext uri="{C183D7F6-B498-43B3-948B-1728B52AA6E4}">
+                <adec:decorative xmlns:adec="http://schemas.microsoft.com/office/drawing/2017/decorative" val="1"/>
+              </a:ext>
+            </a:extLst>
+          </p:cNvPr>
+          <p:cNvCxnSpPr>
+            <a:cxnSpLocks noGrp="1" noRot="1" noChangeAspect="1" noMove="1" noResize="1" noEditPoints="1" noAdjustHandles="1" noChangeArrowheads="1" noChangeShapeType="1"/>
+          </p:cNvCxnSpPr>
+          <p:nvPr>
+            <p:extLst>
+              <p:ext uri="{386F3935-93C4-4BCD-93E2-E3B085C9AB24}">
+                <p16:designElem xmlns:p16="http://schemas.microsoft.com/office/powerpoint/2015/main" val="1"/>
+              </p:ext>
+            </p:extLst>
+          </p:nvPr>
+        </p:nvCxnSpPr>
+        <p:spPr>
+          <a:xfrm>
+            <a:off x="0" y="1185255"/>
+            <a:ext cx="804195" cy="0"/>
+          </a:xfrm>
+          <a:prstGeom prst="line">
+            <a:avLst/>
+          </a:prstGeom>
+          <a:ln w="85725">
+            <a:solidFill>
+              <a:schemeClr val="tx1"/>
+            </a:solidFill>
+          </a:ln>
+        </p:spPr>
+        <p:style>
+          <a:lnRef idx="1">
+            <a:schemeClr val="accent1"/>
+          </a:lnRef>
+          <a:fillRef idx="0">
+            <a:schemeClr val="accent1"/>
+          </a:fillRef>
+          <a:effectRef idx="0">
+            <a:schemeClr val="accent1"/>
+          </a:effectRef>
+          <a:fontRef idx="minor">
+            <a:schemeClr val="tx1"/>
+          </a:fontRef>
+        </p:style>
+      </p:cxnSp>
+      <p:sp>
+        <p:nvSpPr>
+          <p:cNvPr id="6" name="Content Placeholder 5">
+            <a:extLst>
+              <a:ext uri="{FF2B5EF4-FFF2-40B4-BE49-F238E27FC236}">
+                <a16:creationId xmlns:a16="http://schemas.microsoft.com/office/drawing/2014/main" id="{1673B036-EC61-5225-0F68-7C31A3820656}"/>
+              </a:ext>
+            </a:extLst>
+          </p:cNvPr>
+          <p:cNvSpPr>
+            <a:spLocks noGrp="1"/>
+          </p:cNvSpPr>
+          <p:nvPr>
+            <p:ph idx="1"/>
+          </p:nvPr>
+        </p:nvSpPr>
+        <p:spPr>
+          <a:xfrm>
+            <a:off x="1096684" y="2455816"/>
+            <a:ext cx="3424020" cy="3830683"/>
+          </a:xfrm>
+        </p:spPr>
+        <p:txBody>
+          <a:bodyPr vert="horz" lIns="91440" tIns="45720" rIns="91440" bIns="45720" rtlCol="0" anchor="t">
+            <a:normAutofit/>
+          </a:bodyPr>
+          <a:lstStyle/>
+          <a:p>
+            <a:pPr marL="0" indent="0">
+              <a:buNone/>
+            </a:pPr>
+            <a:r>
+              <a:rPr lang="en-US" dirty="0"/>
+              <a:t>Il </a:t>
+            </a:r>
+            <a:r>
+              <a:rPr lang="en-US" dirty="0" err="1"/>
+              <a:t>codice</a:t>
+            </a:r>
+            <a:r>
+              <a:rPr lang="en-US" dirty="0"/>
+              <a:t> </a:t>
+            </a:r>
+            <a:r>
+              <a:rPr lang="en-US" dirty="0" err="1"/>
+              <a:t>riportato</a:t>
+            </a:r>
+            <a:r>
+              <a:rPr lang="en-US" dirty="0"/>
+              <a:t> è </a:t>
+            </a:r>
+            <a:r>
+              <a:rPr lang="en-US" dirty="0" err="1"/>
+              <a:t>una</a:t>
+            </a:r>
+            <a:r>
+              <a:rPr lang="en-US" dirty="0"/>
+              <a:t> entity di alto </a:t>
+            </a:r>
+            <a:r>
+              <a:rPr lang="en-US" dirty="0" err="1"/>
+              <a:t>livello</a:t>
+            </a:r>
+            <a:r>
+              <a:rPr lang="en-US" dirty="0"/>
+              <a:t> (high level comment) </a:t>
+            </a:r>
+            <a:r>
+              <a:rPr lang="en-US" dirty="0" err="1"/>
+              <a:t>correttamente</a:t>
+            </a:r>
+            <a:r>
+              <a:rPr lang="en-US" dirty="0"/>
+              <a:t> </a:t>
+            </a:r>
+            <a:r>
+              <a:rPr lang="en-US" dirty="0" err="1"/>
+              <a:t>classificata</a:t>
+            </a:r>
+            <a:r>
+              <a:rPr lang="en-US" dirty="0"/>
+              <a:t> dal </a:t>
+            </a:r>
+            <a:r>
+              <a:rPr lang="en-US" dirty="0" err="1"/>
+              <a:t>modello</a:t>
+            </a:r>
+            <a:r>
+              <a:rPr lang="en-US" dirty="0"/>
+              <a:t> %t 770, </a:t>
+            </a:r>
+            <a:r>
+              <a:rPr lang="en-US" dirty="0" err="1"/>
+              <a:t>ipotesi</a:t>
+            </a:r>
+            <a:r>
+              <a:rPr lang="en-US" dirty="0"/>
+              <a:t> </a:t>
+            </a:r>
+            <a:r>
+              <a:rPr lang="en-US" dirty="0" err="1"/>
+              <a:t>confermata</a:t>
+            </a:r>
+            <a:r>
+              <a:rPr lang="en-US" dirty="0"/>
+              <a:t> </a:t>
+            </a:r>
+            <a:r>
+              <a:rPr lang="en-US" dirty="0" err="1"/>
+              <a:t>anche</a:t>
+            </a:r>
+            <a:r>
+              <a:rPr lang="en-US" dirty="0"/>
+              <a:t> da </a:t>
+            </a:r>
+            <a:r>
+              <a:rPr lang="en-US" dirty="0" err="1"/>
+              <a:t>una</a:t>
+            </a:r>
+            <a:r>
+              <a:rPr lang="en-US" dirty="0"/>
+              <a:t> media </a:t>
+            </a:r>
+            <a:r>
+              <a:rPr lang="en-US" dirty="0" err="1"/>
+              <a:t>sulle</a:t>
+            </a:r>
+            <a:r>
+              <a:rPr lang="en-US" dirty="0"/>
+              <a:t> </a:t>
+            </a:r>
+            <a:r>
+              <a:rPr lang="en-US" dirty="0" err="1"/>
+              <a:t>metriche</a:t>
+            </a:r>
+            <a:r>
+              <a:rPr lang="en-US" dirty="0"/>
+              <a:t> di 0.91</a:t>
+            </a:r>
+          </a:p>
+        </p:txBody>
+      </p:sp>
+      <p:pic>
+        <p:nvPicPr>
+          <p:cNvPr id="4" name="Immagine 3" descr="Immagine che contiene testo, schermo, schermata, software&#10;&#10;Descrizione generata automaticamente">
+            <a:extLst>
+              <a:ext uri="{FF2B5EF4-FFF2-40B4-BE49-F238E27FC236}">
+                <a16:creationId xmlns:a16="http://schemas.microsoft.com/office/drawing/2014/main" id="{31EBC5EE-7904-DB26-C7D2-3337FAB6DA91}"/>
+              </a:ext>
+            </a:extLst>
+          </p:cNvPr>
+          <p:cNvPicPr>
+            <a:picLocks noChangeAspect="1"/>
+          </p:cNvPicPr>
+          <p:nvPr/>
+        </p:nvPicPr>
+        <p:blipFill>
+          <a:blip r:embed="rId2" cstate="print">
+            <a:extLst>
+              <a:ext uri="{28A0092B-C50C-407E-A947-70E740481C1C}">
+                <a14:useLocalDpi xmlns:a14="http://schemas.microsoft.com/office/drawing/2010/main" val="0"/>
+              </a:ext>
+            </a:extLst>
+          </a:blip>
+          <a:stretch>
+            <a:fillRect/>
+          </a:stretch>
+        </p:blipFill>
+        <p:spPr>
+          <a:xfrm>
+            <a:off x="5159873" y="2455815"/>
+            <a:ext cx="6392958" cy="3963633"/>
+          </a:xfrm>
+          <a:prstGeom prst="rect">
+            <a:avLst/>
+          </a:prstGeom>
+        </p:spPr>
+      </p:pic>
+    </p:spTree>
+    <p:extLst>
+      <p:ext uri="{BB962C8B-B14F-4D97-AF65-F5344CB8AC3E}">
+        <p14:creationId xmlns:p14="http://schemas.microsoft.com/office/powerpoint/2010/main" val="2008994703"/>
+      </p:ext>
+    </p:extLst>
+  </p:cSld>
+  <p:clrMapOvr>
+    <a:masterClrMapping/>
+  </p:clrMapOvr>
+</p:sld>
+</file>
+
+<file path=ppt/slides/slide23.xml><?xml version="1.0" encoding="utf-8"?>
+<p:sld xmlns:a="http://schemas.openxmlformats.org/drawingml/2006/main" xmlns:r="http://schemas.openxmlformats.org/officeDocument/2006/relationships" xmlns:p="http://schemas.openxmlformats.org/presentationml/2006/main">
+  <p:cSld>
+    <p:bg>
+      <p:bgPr>
+        <a:solidFill>
+          <a:schemeClr val="bg1"/>
+        </a:solidFill>
+        <a:effectLst/>
+      </p:bgPr>
+    </p:bg>
+    <p:spTree>
+      <p:nvGrpSpPr>
+        <p:cNvPr id="1" name=""/>
+        <p:cNvGrpSpPr/>
+        <p:nvPr/>
+      </p:nvGrpSpPr>
+      <p:grpSpPr>
+        <a:xfrm>
+          <a:off x="0" y="0"/>
+          <a:ext cx="0" cy="0"/>
+          <a:chOff x="0" y="0"/>
+          <a:chExt cx="0" cy="0"/>
+        </a:xfrm>
+      </p:grpSpPr>
+      <p:cxnSp>
+        <p:nvCxnSpPr>
+          <p:cNvPr id="18" name="Straight Connector 17">
+            <a:extLst>
+              <a:ext uri="{FF2B5EF4-FFF2-40B4-BE49-F238E27FC236}">
+                <a16:creationId xmlns:a16="http://schemas.microsoft.com/office/drawing/2014/main" id="{D8689CE0-64D2-447C-9C1F-872D111D8AC3}"/>
+              </a:ext>
+              <a:ext uri="{C183D7F6-B498-43B3-948B-1728B52AA6E4}">
+                <adec:decorative xmlns:adec="http://schemas.microsoft.com/office/drawing/2017/decorative" val="1"/>
+              </a:ext>
+            </a:extLst>
+          </p:cNvPr>
+          <p:cNvCxnSpPr>
+            <a:cxnSpLocks noGrp="1" noRot="1" noChangeAspect="1" noMove="1" noResize="1" noEditPoints="1" noAdjustHandles="1" noChangeArrowheads="1" noChangeShapeType="1"/>
+          </p:cNvCxnSpPr>
+          <p:nvPr>
+            <p:extLst>
+              <p:ext uri="{386F3935-93C4-4BCD-93E2-E3B085C9AB24}">
+                <p16:designElem xmlns:p16="http://schemas.microsoft.com/office/powerpoint/2015/main" val="1"/>
+              </p:ext>
+            </p:extLst>
+          </p:nvPr>
+        </p:nvCxnSpPr>
+        <p:spPr>
+          <a:xfrm>
+            <a:off x="0" y="1185205"/>
+            <a:ext cx="804195" cy="0"/>
+          </a:xfrm>
+          <a:prstGeom prst="line">
+            <a:avLst/>
+          </a:prstGeom>
+          <a:ln w="85725">
+            <a:solidFill>
+              <a:schemeClr val="tx1"/>
+            </a:solidFill>
+          </a:ln>
+        </p:spPr>
+        <p:style>
+          <a:lnRef idx="1">
+            <a:schemeClr val="accent1"/>
+          </a:lnRef>
+          <a:fillRef idx="0">
+            <a:schemeClr val="accent1"/>
+          </a:fillRef>
+          <a:effectRef idx="0">
+            <a:schemeClr val="accent1"/>
+          </a:effectRef>
+          <a:fontRef idx="minor">
+            <a:schemeClr val="tx1"/>
+          </a:fontRef>
+        </p:style>
+      </p:cxnSp>
+      <p:sp useBgFill="1">
+        <p:nvSpPr>
+          <p:cNvPr id="20" name="Rectangle 19">
+            <a:extLst>
+              <a:ext uri="{FF2B5EF4-FFF2-40B4-BE49-F238E27FC236}">
+                <a16:creationId xmlns:a16="http://schemas.microsoft.com/office/drawing/2014/main" id="{511C99DC-C3C5-4EBE-91DD-345109C3D6E0}"/>
+              </a:ext>
+              <a:ext uri="{C183D7F6-B498-43B3-948B-1728B52AA6E4}">
+                <adec:decorative xmlns:adec="http://schemas.microsoft.com/office/drawing/2017/decorative" val="1"/>
+              </a:ext>
+            </a:extLst>
+          </p:cNvPr>
+          <p:cNvSpPr>
+            <a:spLocks noGrp="1" noRot="1" noChangeAspect="1" noMove="1" noResize="1" noEditPoints="1" noAdjustHandles="1" noChangeArrowheads="1" noChangeShapeType="1" noTextEdit="1"/>
+          </p:cNvSpPr>
+          <p:nvPr>
+            <p:extLst>
+              <p:ext uri="{386F3935-93C4-4BCD-93E2-E3B085C9AB24}">
+                <p16:designElem xmlns:p16="http://schemas.microsoft.com/office/powerpoint/2015/main" val="1"/>
+              </p:ext>
+            </p:extLst>
+          </p:nvPr>
+        </p:nvSpPr>
+        <p:spPr>
+          <a:xfrm>
+            <a:off x="0" y="0"/>
+            <a:ext cx="12192000" cy="6858000"/>
+          </a:xfrm>
+          <a:prstGeom prst="rect">
+            <a:avLst/>
+          </a:prstGeom>
+          <a:ln w="12700" cap="flat" cmpd="sng" algn="ctr">
+            <a:noFill/>
+            <a:prstDash val="solid"/>
+            <a:miter lim="800000"/>
+          </a:ln>
+          <a:effectLst/>
+          <a:extLst>
+            <a:ext uri="{91240B29-F687-4F45-9708-019B960494DF}">
+              <a14:hiddenLine xmlns:a14="http://schemas.microsoft.com/office/drawing/2010/main" w="12700" cap="flat" cmpd="sng" algn="ctr">
+                <a:solidFill>
+                  <a:schemeClr val="accent1">
+                    <a:shade val="50000"/>
+                  </a:schemeClr>
+                </a:solidFill>
+                <a:prstDash val="solid"/>
+                <a:miter lim="800000"/>
+              </a14:hiddenLine>
+            </a:ext>
+          </a:extLst>
+        </p:spPr>
+        <p:style>
+          <a:lnRef idx="2">
+            <a:schemeClr val="accent1">
+              <a:shade val="50000"/>
+            </a:schemeClr>
+          </a:lnRef>
+          <a:fillRef idx="1">
+            <a:schemeClr val="accent1"/>
+          </a:fillRef>
+          <a:effectRef idx="0">
+            <a:schemeClr val="accent1"/>
+          </a:effectRef>
+          <a:fontRef idx="minor">
+            <a:schemeClr val="lt1"/>
+          </a:fontRef>
+        </p:style>
+        <p:txBody>
+          <a:bodyPr rtlCol="0" anchor="ctr"/>
+          <a:lstStyle/>
+          <a:p>
+            <a:pPr algn="ctr"/>
+            <a:endParaRPr lang="en-US"/>
+          </a:p>
+        </p:txBody>
+      </p:sp>
+      <p:sp>
+        <p:nvSpPr>
+          <p:cNvPr id="2" name="Title 1">
+            <a:extLst>
+              <a:ext uri="{FF2B5EF4-FFF2-40B4-BE49-F238E27FC236}">
                 <a16:creationId xmlns:a16="http://schemas.microsoft.com/office/drawing/2014/main" id="{AC499DF1-0D29-F059-3D2A-DCFD9A3CAD41}"/>
               </a:ext>
             </a:extLst>
@@ -14638,227 +15996,7 @@
 </p:sld>
 </file>
 
-<file path=ppt/slides/slide2.xml><?xml version="1.0" encoding="utf-8"?>
-<p:sld xmlns:a="http://schemas.openxmlformats.org/drawingml/2006/main" xmlns:r="http://schemas.openxmlformats.org/officeDocument/2006/relationships" xmlns:p="http://schemas.openxmlformats.org/presentationml/2006/main">
-  <p:cSld>
-    <p:spTree>
-      <p:nvGrpSpPr>
-        <p:cNvPr id="1" name=""/>
-        <p:cNvGrpSpPr/>
-        <p:nvPr/>
-      </p:nvGrpSpPr>
-      <p:grpSpPr>
-        <a:xfrm>
-          <a:off x="0" y="0"/>
-          <a:ext cx="0" cy="0"/>
-          <a:chOff x="0" y="0"/>
-          <a:chExt cx="0" cy="0"/>
-        </a:xfrm>
-      </p:grpSpPr>
-      <p:sp>
-        <p:nvSpPr>
-          <p:cNvPr id="2" name="Title 1">
-            <a:extLst>
-              <a:ext uri="{FF2B5EF4-FFF2-40B4-BE49-F238E27FC236}">
-                <a16:creationId xmlns:a16="http://schemas.microsoft.com/office/drawing/2014/main" id="{AC499DF1-0D29-F059-3D2A-DCFD9A3CAD41}"/>
-              </a:ext>
-            </a:extLst>
-          </p:cNvPr>
-          <p:cNvSpPr>
-            <a:spLocks noGrp="1"/>
-          </p:cNvSpPr>
-          <p:nvPr>
-            <p:ph type="title"/>
-          </p:nvPr>
-        </p:nvSpPr>
-        <p:spPr/>
-        <p:txBody>
-          <a:bodyPr/>
-          <a:lstStyle/>
-          <a:p>
-            <a:r>
-              <a:rPr lang="en-US" dirty="0" err="1"/>
-              <a:t>Sommario</a:t>
-            </a:r>
-          </a:p>
-        </p:txBody>
-      </p:sp>
-      <p:sp>
-        <p:nvSpPr>
-          <p:cNvPr id="3" name="Content Placeholder 2">
-            <a:extLst>
-              <a:ext uri="{FF2B5EF4-FFF2-40B4-BE49-F238E27FC236}">
-                <a16:creationId xmlns:a16="http://schemas.microsoft.com/office/drawing/2014/main" id="{0A9587D2-A3B6-FEC8-889C-5785A7327FEC}"/>
-              </a:ext>
-            </a:extLst>
-          </p:cNvPr>
-          <p:cNvSpPr>
-            <a:spLocks noGrp="1"/>
-          </p:cNvSpPr>
-          <p:nvPr>
-            <p:ph idx="1"/>
-          </p:nvPr>
-        </p:nvSpPr>
-        <p:spPr>
-          <a:xfrm>
-            <a:off x="879201" y="1980746"/>
-            <a:ext cx="10549570" cy="4490109"/>
-          </a:xfrm>
-        </p:spPr>
-        <p:txBody>
-          <a:bodyPr vert="horz" lIns="91440" tIns="45720" rIns="91440" bIns="45720" rtlCol="0" anchor="t">
-            <a:normAutofit fontScale="85000" lnSpcReduction="20000"/>
-          </a:bodyPr>
-          <a:lstStyle/>
-          <a:p>
-            <a:pPr>
-              <a:buFont typeface="Calibri" panose="020B0504020202020204" pitchFamily="34" charset="0"/>
-            </a:pPr>
-            <a:r>
-              <a:rPr lang="en-US" sz="2800" dirty="0"/>
-              <a:t>Framework di </a:t>
-            </a:r>
-            <a:r>
-              <a:rPr lang="en-US" sz="2800" dirty="0" err="1"/>
-              <a:t>analisi</a:t>
-            </a:r>
-            <a:endParaRPr lang="en-US" sz="2800" dirty="0"/>
-          </a:p>
-          <a:p>
-            <a:pPr>
-              <a:buFont typeface="Calibri" panose="020B0504020202020204" pitchFamily="34" charset="0"/>
-            </a:pPr>
-            <a:r>
-              <a:rPr lang="en-US" sz="2800" err="1"/>
-              <a:t>Analisi</a:t>
-            </a:r>
-            <a:r>
-              <a:rPr lang="en-US" sz="2800" dirty="0"/>
-              <a:t>  </a:t>
-            </a:r>
-            <a:r>
-              <a:rPr lang="en-US" sz="2800" err="1"/>
-              <a:t>sul</a:t>
-            </a:r>
-            <a:r>
-              <a:rPr lang="en-US" sz="2800" dirty="0"/>
-              <a:t> test set</a:t>
-            </a:r>
-            <a:endParaRPr lang="en-US"/>
-          </a:p>
-          <a:p>
-            <a:pPr>
-              <a:buFont typeface="Calibri" panose="020B0504020202020204" pitchFamily="34" charset="0"/>
-            </a:pPr>
-            <a:r>
-              <a:rPr lang="en-US" sz="2800" dirty="0" err="1"/>
-              <a:t>Analisi</a:t>
-            </a:r>
-            <a:r>
-              <a:rPr lang="en-US" sz="2800" dirty="0"/>
-              <a:t> </a:t>
-            </a:r>
-            <a:r>
-              <a:rPr lang="en-US" sz="2800" dirty="0" err="1"/>
-              <a:t>CodeGen</a:t>
-            </a:r>
-            <a:endParaRPr lang="en-US" sz="2800" dirty="0"/>
-          </a:p>
-          <a:p>
-            <a:pPr>
-              <a:buFont typeface="Calibri" panose="020B0504020202020204" pitchFamily="34" charset="0"/>
-            </a:pPr>
-            <a:r>
-              <a:rPr lang="en-US" sz="2800" dirty="0" err="1"/>
-              <a:t>Analisi</a:t>
-            </a:r>
-            <a:r>
-              <a:rPr lang="en-US" sz="2800" dirty="0"/>
-              <a:t> CodeT5_220</a:t>
-            </a:r>
-          </a:p>
-          <a:p>
-            <a:pPr>
-              <a:buFont typeface="Calibri" panose="020B0504020202020204" pitchFamily="34" charset="0"/>
-            </a:pPr>
-            <a:r>
-              <a:rPr lang="en-US" sz="2800" err="1"/>
-              <a:t>Analisi</a:t>
-            </a:r>
-            <a:r>
-              <a:rPr lang="en-US" sz="2800" dirty="0"/>
-              <a:t> </a:t>
-            </a:r>
-            <a:r>
-              <a:rPr lang="en-US" sz="2800" err="1"/>
-              <a:t>CodeGPT</a:t>
-            </a:r>
-            <a:endParaRPr lang="en-US" sz="2800"/>
-          </a:p>
-          <a:p>
-            <a:pPr>
-              <a:buFont typeface="Calibri" panose="020B0504020202020204" pitchFamily="34" charset="0"/>
-              <a:buChar char="-"/>
-            </a:pPr>
-            <a:r>
-              <a:rPr lang="en-US" sz="2800" err="1"/>
-              <a:t>Analisi</a:t>
-            </a:r>
-            <a:r>
-              <a:rPr lang="en-US" sz="2800" dirty="0"/>
-              <a:t> CodeT5_770</a:t>
-            </a:r>
-          </a:p>
-          <a:p>
-            <a:pPr>
-              <a:buFont typeface="Calibri" panose="020B0504020202020204" pitchFamily="34" charset="0"/>
-              <a:buChar char="-"/>
-            </a:pPr>
-            <a:r>
-              <a:rPr lang="en-US" sz="2800" dirty="0" err="1"/>
-              <a:t>Analisi</a:t>
-            </a:r>
-            <a:r>
-              <a:rPr lang="en-US" sz="2800" dirty="0"/>
-              <a:t> Claude Sonnet</a:t>
-            </a:r>
-          </a:p>
-          <a:p>
-            <a:pPr>
-              <a:buFont typeface="Calibri" panose="020B0504020202020204" pitchFamily="34" charset="0"/>
-              <a:buChar char="-"/>
-            </a:pPr>
-            <a:r>
-              <a:rPr lang="en-US" sz="2800" dirty="0" err="1"/>
-              <a:t>Analisi</a:t>
-            </a:r>
-            <a:r>
-              <a:rPr lang="en-US" sz="2800" dirty="0"/>
-              <a:t> common failure</a:t>
-            </a:r>
-          </a:p>
-          <a:p>
-            <a:pPr marL="0" indent="0">
-              <a:buNone/>
-            </a:pPr>
-            <a:endParaRPr lang="en-US" sz="2800" dirty="0"/>
-          </a:p>
-        </p:txBody>
-      </p:sp>
-    </p:spTree>
-    <p:extLst>
-      <p:ext uri="{BB962C8B-B14F-4D97-AF65-F5344CB8AC3E}">
-        <p14:creationId xmlns:p14="http://schemas.microsoft.com/office/powerpoint/2010/main" val="2843851393"/>
-      </p:ext>
-    </p:extLst>
-  </p:cSld>
-  <p:clrMapOvr>
-    <a:masterClrMapping/>
-  </p:clrMapOvr>
-</p:sld>
-</file>
-
-<file path=ppt/slides/slide20.xml><?xml version="1.0" encoding="utf-8"?>
+<file path=ppt/slides/slide24.xml><?xml version="1.0" encoding="utf-8"?>
 <p:sld xmlns:a="http://schemas.openxmlformats.org/drawingml/2006/main" xmlns:r="http://schemas.openxmlformats.org/officeDocument/2006/relationships" xmlns:p="http://schemas.openxmlformats.org/presentationml/2006/main">
   <p:cSld>
     <p:bg>
@@ -16350,7 +17488,7 @@
 </p:sld>
 </file>
 
-<file path=ppt/slides/slide21.xml><?xml version="1.0" encoding="utf-8"?>
+<file path=ppt/slides/slide25.xml><?xml version="1.0" encoding="utf-8"?>
 <p:sld xmlns:a="http://schemas.openxmlformats.org/drawingml/2006/main" xmlns:r="http://schemas.openxmlformats.org/officeDocument/2006/relationships" xmlns:p="http://schemas.openxmlformats.org/presentationml/2006/main">
   <p:cSld>
     <p:bg>
@@ -17293,7 +18431,7 @@
 </p:sld>
 </file>
 
-<file path=ppt/slides/slide22.xml><?xml version="1.0" encoding="utf-8"?>
+<file path=ppt/slides/slide26.xml><?xml version="1.0" encoding="utf-8"?>
 <p:sld xmlns:a="http://schemas.openxmlformats.org/drawingml/2006/main" xmlns:r="http://schemas.openxmlformats.org/officeDocument/2006/relationships" xmlns:p="http://schemas.openxmlformats.org/presentationml/2006/main">
   <p:cSld>
     <p:bg>
@@ -18274,7 +19412,7 @@
 </p:sld>
 </file>
 
-<file path=ppt/slides/slide23.xml><?xml version="1.0" encoding="utf-8"?>
+<file path=ppt/slides/slide27.xml><?xml version="1.0" encoding="utf-8"?>
 <p:sld xmlns:a="http://schemas.openxmlformats.org/drawingml/2006/main" xmlns:r="http://schemas.openxmlformats.org/officeDocument/2006/relationships" xmlns:p="http://schemas.openxmlformats.org/presentationml/2006/main">
   <p:cSld>
     <p:spTree>
@@ -18507,7 +19645,7 @@
 </p:sld>
 </file>
 
-<file path=ppt/slides/slide24.xml><?xml version="1.0" encoding="utf-8"?>
+<file path=ppt/slides/slide28.xml><?xml version="1.0" encoding="utf-8"?>
 <p:sld xmlns:a="http://schemas.openxmlformats.org/drawingml/2006/main" xmlns:r="http://schemas.openxmlformats.org/officeDocument/2006/relationships" xmlns:p="http://schemas.openxmlformats.org/presentationml/2006/main">
   <p:cSld>
     <p:spTree>
@@ -18823,7 +19961,7 @@
 </p:sld>
 </file>
 
-<file path=ppt/slides/slide25.xml><?xml version="1.0" encoding="utf-8"?>
+<file path=ppt/slides/slide29.xml><?xml version="1.0" encoding="utf-8"?>
 <p:sld xmlns:a="http://schemas.openxmlformats.org/drawingml/2006/main" xmlns:r="http://schemas.openxmlformats.org/officeDocument/2006/relationships" xmlns:p="http://schemas.openxmlformats.org/presentationml/2006/main">
   <p:cSld>
     <p:spTree>

</xml_diff>

<commit_message>
Aggiunta nuova metrica SBART, refactoring del framework e messa a punto presentazione
</commit_message>
<xml_diff>
--- a/altro/Presentazione_risultati.pptx
+++ b/altro/Presentazione_risultati.pptx
@@ -313,7 +313,7 @@
           <a:p>
             <a:fld id="{A1E45834-53BD-4C8F-B791-CD5378F4150E}" type="datetimeFigureOut">
               <a:rPr lang="en-US" smtClean="0"/>
-              <a:t>11/26/2024</a:t>
+              <a:t>11/27/2024</a:t>
             </a:fld>
             <a:endParaRPr lang="en-US"/>
           </a:p>
@@ -511,7 +511,7 @@
           <a:p>
             <a:fld id="{A1E45834-53BD-4C8F-B791-CD5378F4150E}" type="datetimeFigureOut">
               <a:rPr lang="en-US" smtClean="0"/>
-              <a:t>11/26/2024</a:t>
+              <a:t>11/27/2024</a:t>
             </a:fld>
             <a:endParaRPr lang="en-US"/>
           </a:p>
@@ -719,7 +719,7 @@
           <a:p>
             <a:fld id="{A1E45834-53BD-4C8F-B791-CD5378F4150E}" type="datetimeFigureOut">
               <a:rPr lang="en-US" smtClean="0"/>
-              <a:t>11/26/2024</a:t>
+              <a:t>11/27/2024</a:t>
             </a:fld>
             <a:endParaRPr lang="en-US"/>
           </a:p>
@@ -960,7 +960,7 @@
           <a:p>
             <a:fld id="{A1E45834-53BD-4C8F-B791-CD5378F4150E}" type="datetimeFigureOut">
               <a:rPr lang="en-US" smtClean="0"/>
-              <a:t>11/26/2024</a:t>
+              <a:t>11/27/2024</a:t>
             </a:fld>
             <a:endParaRPr lang="en-US"/>
           </a:p>
@@ -1238,7 +1238,7 @@
           <a:p>
             <a:fld id="{A1E45834-53BD-4C8F-B791-CD5378F4150E}" type="datetimeFigureOut">
               <a:rPr lang="en-US" smtClean="0"/>
-              <a:t>11/26/2024</a:t>
+              <a:t>11/27/2024</a:t>
             </a:fld>
             <a:endParaRPr lang="en-US"/>
           </a:p>
@@ -1508,7 +1508,7 @@
           <a:p>
             <a:fld id="{A1E45834-53BD-4C8F-B791-CD5378F4150E}" type="datetimeFigureOut">
               <a:rPr lang="en-US" smtClean="0"/>
-              <a:t>11/26/2024</a:t>
+              <a:t>11/27/2024</a:t>
             </a:fld>
             <a:endParaRPr lang="en-US"/>
           </a:p>
@@ -1930,7 +1930,7 @@
           <a:p>
             <a:fld id="{A1E45834-53BD-4C8F-B791-CD5378F4150E}" type="datetimeFigureOut">
               <a:rPr lang="en-US" smtClean="0"/>
-              <a:t>11/26/2024</a:t>
+              <a:t>11/27/2024</a:t>
             </a:fld>
             <a:endParaRPr lang="en-US"/>
           </a:p>
@@ -2075,7 +2075,7 @@
           <a:p>
             <a:fld id="{A1E45834-53BD-4C8F-B791-CD5378F4150E}" type="datetimeFigureOut">
               <a:rPr lang="en-US" smtClean="0"/>
-              <a:t>11/26/2024</a:t>
+              <a:t>11/27/2024</a:t>
             </a:fld>
             <a:endParaRPr lang="en-US"/>
           </a:p>
@@ -2188,7 +2188,7 @@
           <a:p>
             <a:fld id="{A1E45834-53BD-4C8F-B791-CD5378F4150E}" type="datetimeFigureOut">
               <a:rPr lang="en-US" smtClean="0"/>
-              <a:t>11/26/2024</a:t>
+              <a:t>11/27/2024</a:t>
             </a:fld>
             <a:endParaRPr lang="en-US"/>
           </a:p>
@@ -2502,7 +2502,7 @@
           <a:p>
             <a:fld id="{A1E45834-53BD-4C8F-B791-CD5378F4150E}" type="datetimeFigureOut">
               <a:rPr lang="en-US" smtClean="0"/>
-              <a:t>11/26/2024</a:t>
+              <a:t>11/27/2024</a:t>
             </a:fld>
             <a:endParaRPr lang="en-US"/>
           </a:p>
@@ -2796,7 +2796,7 @@
           <a:p>
             <a:fld id="{A1E45834-53BD-4C8F-B791-CD5378F4150E}" type="datetimeFigureOut">
               <a:rPr lang="en-US" smtClean="0"/>
-              <a:t>11/26/2024</a:t>
+              <a:t>11/27/2024</a:t>
             </a:fld>
             <a:endParaRPr lang="en-US"/>
           </a:p>
@@ -3035,7 +3035,7 @@
           <a:p>
             <a:fld id="{A1E45834-53BD-4C8F-B791-CD5378F4150E}" type="datetimeFigureOut">
               <a:rPr lang="en-US" smtClean="0"/>
-              <a:t>11/26/2024</a:t>
+              <a:t>11/27/2024</a:t>
             </a:fld>
             <a:endParaRPr lang="en-US"/>
           </a:p>
@@ -3802,287 +3802,6 @@
           </a:p>
         </p:txBody>
       </p:sp>
-      <p:graphicFrame>
-        <p:nvGraphicFramePr>
-          <p:cNvPr id="6" name="Tabella 5">
-            <a:extLst>
-              <a:ext uri="{FF2B5EF4-FFF2-40B4-BE49-F238E27FC236}">
-                <a16:creationId xmlns:a16="http://schemas.microsoft.com/office/drawing/2014/main" id="{6F014481-2DB7-342A-A0E6-4CB78187BF59}"/>
-              </a:ext>
-            </a:extLst>
-          </p:cNvPr>
-          <p:cNvGraphicFramePr>
-            <a:graphicFrameLocks noGrp="1"/>
-          </p:cNvGraphicFramePr>
-          <p:nvPr>
-            <p:extLst>
-              <p:ext uri="{D42A27DB-BD31-4B8C-83A1-F6EECF244321}">
-                <p14:modId xmlns:p14="http://schemas.microsoft.com/office/powerpoint/2010/main" val="3147463922"/>
-              </p:ext>
-            </p:extLst>
-          </p:nvPr>
-        </p:nvGraphicFramePr>
-        <p:xfrm>
-          <a:off x="708803" y="3849468"/>
-          <a:ext cx="10774393" cy="1005840"/>
-        </p:xfrm>
-        <a:graphic>
-          <a:graphicData uri="http://schemas.openxmlformats.org/drawingml/2006/table">
-            <a:tbl>
-              <a:tblPr firstRow="1" bandRow="1">
-                <a:tableStyleId>{5C22544A-7EE6-4342-B048-85BDC9FD1C3A}</a:tableStyleId>
-              </a:tblPr>
-              <a:tblGrid>
-                <a:gridCol w="1539199">
-                  <a:extLst>
-                    <a:ext uri="{9D8B030D-6E8A-4147-A177-3AD203B41FA5}">
-                      <a16:colId xmlns:a16="http://schemas.microsoft.com/office/drawing/2014/main" val="2447443544"/>
-                    </a:ext>
-                  </a:extLst>
-                </a:gridCol>
-                <a:gridCol w="1539199">
-                  <a:extLst>
-                    <a:ext uri="{9D8B030D-6E8A-4147-A177-3AD203B41FA5}">
-                      <a16:colId xmlns:a16="http://schemas.microsoft.com/office/drawing/2014/main" val="1535496867"/>
-                    </a:ext>
-                  </a:extLst>
-                </a:gridCol>
-                <a:gridCol w="1539199">
-                  <a:extLst>
-                    <a:ext uri="{9D8B030D-6E8A-4147-A177-3AD203B41FA5}">
-                      <a16:colId xmlns:a16="http://schemas.microsoft.com/office/drawing/2014/main" val="3415672651"/>
-                    </a:ext>
-                  </a:extLst>
-                </a:gridCol>
-                <a:gridCol w="1539199">
-                  <a:extLst>
-                    <a:ext uri="{9D8B030D-6E8A-4147-A177-3AD203B41FA5}">
-                      <a16:colId xmlns:a16="http://schemas.microsoft.com/office/drawing/2014/main" val="253070283"/>
-                    </a:ext>
-                  </a:extLst>
-                </a:gridCol>
-                <a:gridCol w="1539199">
-                  <a:extLst>
-                    <a:ext uri="{9D8B030D-6E8A-4147-A177-3AD203B41FA5}">
-                      <a16:colId xmlns:a16="http://schemas.microsoft.com/office/drawing/2014/main" val="2714512924"/>
-                    </a:ext>
-                  </a:extLst>
-                </a:gridCol>
-                <a:gridCol w="1539199">
-                  <a:extLst>
-                    <a:ext uri="{9D8B030D-6E8A-4147-A177-3AD203B41FA5}">
-                      <a16:colId xmlns:a16="http://schemas.microsoft.com/office/drawing/2014/main" val="3119623602"/>
-                    </a:ext>
-                  </a:extLst>
-                </a:gridCol>
-                <a:gridCol w="1539199">
-                  <a:extLst>
-                    <a:ext uri="{9D8B030D-6E8A-4147-A177-3AD203B41FA5}">
-                      <a16:colId xmlns:a16="http://schemas.microsoft.com/office/drawing/2014/main" val="1046693342"/>
-                    </a:ext>
-                  </a:extLst>
-                </a:gridCol>
-              </a:tblGrid>
-              <a:tr h="606533">
-                <a:tc>
-                  <a:txBody>
-                    <a:bodyPr/>
-                    <a:lstStyle/>
-                    <a:p>
-                      <a:r>
-                        <a:rPr lang="it-IT" dirty="0"/>
-                        <a:t>EM</a:t>
-                      </a:r>
-                    </a:p>
-                  </a:txBody>
-                  <a:tcPr/>
-                </a:tc>
-                <a:tc>
-                  <a:txBody>
-                    <a:bodyPr/>
-                    <a:lstStyle/>
-                    <a:p>
-                      <a:r>
-                        <a:rPr lang="it-IT" dirty="0"/>
-                        <a:t>ED</a:t>
-                      </a:r>
-                    </a:p>
-                  </a:txBody>
-                  <a:tcPr/>
-                </a:tc>
-                <a:tc>
-                  <a:txBody>
-                    <a:bodyPr/>
-                    <a:lstStyle/>
-                    <a:p>
-                      <a:r>
-                        <a:rPr lang="it-IT" dirty="0"/>
-                        <a:t>METEOR</a:t>
-                      </a:r>
-                    </a:p>
-                  </a:txBody>
-                  <a:tcPr/>
-                </a:tc>
-                <a:tc>
-                  <a:txBody>
-                    <a:bodyPr/>
-                    <a:lstStyle/>
-                    <a:p>
-                      <a:r>
-                        <a:rPr lang="it-IT" dirty="0"/>
-                        <a:t>LCS</a:t>
-                      </a:r>
-                    </a:p>
-                  </a:txBody>
-                  <a:tcPr/>
-                </a:tc>
-                <a:tc>
-                  <a:txBody>
-                    <a:bodyPr/>
-                    <a:lstStyle/>
-                    <a:p>
-                      <a:r>
-                        <a:rPr lang="it-IT" dirty="0"/>
-                        <a:t>CRYSTAL BLEU</a:t>
-                      </a:r>
-                    </a:p>
-                  </a:txBody>
-                  <a:tcPr/>
-                </a:tc>
-                <a:tc>
-                  <a:txBody>
-                    <a:bodyPr/>
-                    <a:lstStyle/>
-                    <a:p>
-                      <a:r>
-                        <a:rPr lang="it-IT" dirty="0"/>
-                        <a:t>SACRE BLEU</a:t>
-                      </a:r>
-                    </a:p>
-                  </a:txBody>
-                  <a:tcPr/>
-                </a:tc>
-                <a:tc>
-                  <a:txBody>
-                    <a:bodyPr/>
-                    <a:lstStyle/>
-                    <a:p>
-                      <a:r>
-                        <a:rPr lang="it-IT" dirty="0"/>
-                        <a:t>ROUGE</a:t>
-                      </a:r>
-                    </a:p>
-                  </a:txBody>
-                  <a:tcPr/>
-                </a:tc>
-                <a:extLst>
-                  <a:ext uri="{0D108BD9-81ED-4DB2-BD59-A6C34878D82A}">
-                    <a16:rowId xmlns:a16="http://schemas.microsoft.com/office/drawing/2014/main" val="1105077754"/>
-                  </a:ext>
-                </a:extLst>
-              </a:tr>
-              <a:tr h="346590">
-                <a:tc>
-                  <a:txBody>
-                    <a:bodyPr/>
-                    <a:lstStyle/>
-                    <a:p>
-                      <a:r>
-                        <a:rPr lang="it-IT" dirty="0"/>
-                        <a:t>0,46</a:t>
-                      </a:r>
-                    </a:p>
-                  </a:txBody>
-                  <a:tcPr/>
-                </a:tc>
-                <a:tc>
-                  <a:txBody>
-                    <a:bodyPr/>
-                    <a:lstStyle/>
-                    <a:p>
-                      <a:r>
-                        <a:rPr lang="it-IT" dirty="0"/>
-                        <a:t>0,8</a:t>
-                      </a:r>
-                    </a:p>
-                  </a:txBody>
-                  <a:tcPr/>
-                </a:tc>
-                <a:tc>
-                  <a:txBody>
-                    <a:bodyPr/>
-                    <a:lstStyle/>
-                    <a:p>
-                      <a:r>
-                        <a:rPr lang="it-IT" dirty="0"/>
-                        <a:t>0,83</a:t>
-                      </a:r>
-                    </a:p>
-                  </a:txBody>
-                  <a:tcPr/>
-                </a:tc>
-                <a:tc>
-                  <a:txBody>
-                    <a:bodyPr/>
-                    <a:lstStyle/>
-                    <a:p>
-                      <a:r>
-                        <a:rPr lang="it-IT" dirty="0"/>
-                        <a:t>0,82</a:t>
-                      </a:r>
-                    </a:p>
-                  </a:txBody>
-                  <a:tcPr/>
-                </a:tc>
-                <a:tc>
-                  <a:txBody>
-                    <a:bodyPr/>
-                    <a:lstStyle/>
-                    <a:p>
-                      <a:r>
-                        <a:rPr lang="it-IT" dirty="0"/>
-                        <a:t>0,69</a:t>
-                      </a:r>
-                    </a:p>
-                  </a:txBody>
-                  <a:tcPr/>
-                </a:tc>
-                <a:tc>
-                  <a:txBody>
-                    <a:bodyPr/>
-                    <a:lstStyle/>
-                    <a:p>
-                      <a:r>
-                        <a:rPr lang="it-IT" dirty="0"/>
-                        <a:t>0,91</a:t>
-                      </a:r>
-                    </a:p>
-                  </a:txBody>
-                  <a:tcPr/>
-                </a:tc>
-                <a:tc>
-                  <a:txBody>
-                    <a:bodyPr/>
-                    <a:lstStyle/>
-                    <a:p>
-                      <a:r>
-                        <a:rPr lang="it-IT" dirty="0"/>
-                        <a:t>0,8</a:t>
-                      </a:r>
-                    </a:p>
-                  </a:txBody>
-                  <a:tcPr/>
-                </a:tc>
-                <a:extLst>
-                  <a:ext uri="{0D108BD9-81ED-4DB2-BD59-A6C34878D82A}">
-                    <a16:rowId xmlns:a16="http://schemas.microsoft.com/office/drawing/2014/main" val="2133996632"/>
-                  </a:ext>
-                </a:extLst>
-              </a:tr>
-            </a:tbl>
-          </a:graphicData>
-        </a:graphic>
-      </p:graphicFrame>
       <p:sp>
         <p:nvSpPr>
           <p:cNvPr id="7" name="Content Placeholder 5">
@@ -4150,6 +3869,432 @@
           </a:p>
         </p:txBody>
       </p:sp>
+      <p:graphicFrame>
+        <p:nvGraphicFramePr>
+          <p:cNvPr id="3" name="Tabella 2">
+            <a:extLst>
+              <a:ext uri="{FF2B5EF4-FFF2-40B4-BE49-F238E27FC236}">
+                <a16:creationId xmlns:a16="http://schemas.microsoft.com/office/drawing/2014/main" id="{8E3DD546-50B1-75F5-1985-50C5247CF698}"/>
+              </a:ext>
+            </a:extLst>
+          </p:cNvPr>
+          <p:cNvGraphicFramePr>
+            <a:graphicFrameLocks noGrp="1"/>
+          </p:cNvGraphicFramePr>
+          <p:nvPr>
+            <p:extLst>
+              <p:ext uri="{D42A27DB-BD31-4B8C-83A1-F6EECF244321}">
+                <p14:modId xmlns:p14="http://schemas.microsoft.com/office/powerpoint/2010/main" val="3308760802"/>
+              </p:ext>
+            </p:extLst>
+          </p:nvPr>
+        </p:nvGraphicFramePr>
+        <p:xfrm>
+          <a:off x="1985518" y="3174124"/>
+          <a:ext cx="8127999" cy="2966720"/>
+        </p:xfrm>
+        <a:graphic>
+          <a:graphicData uri="http://schemas.openxmlformats.org/drawingml/2006/table">
+            <a:tbl>
+              <a:tblPr firstRow="1" bandRow="1">
+                <a:tableStyleId>{5C22544A-7EE6-4342-B048-85BDC9FD1C3A}</a:tableStyleId>
+              </a:tblPr>
+              <a:tblGrid>
+                <a:gridCol w="2709333">
+                  <a:extLst>
+                    <a:ext uri="{9D8B030D-6E8A-4147-A177-3AD203B41FA5}">
+                      <a16:colId xmlns:a16="http://schemas.microsoft.com/office/drawing/2014/main" val="3957489615"/>
+                    </a:ext>
+                  </a:extLst>
+                </a:gridCol>
+                <a:gridCol w="2709333">
+                  <a:extLst>
+                    <a:ext uri="{9D8B030D-6E8A-4147-A177-3AD203B41FA5}">
+                      <a16:colId xmlns:a16="http://schemas.microsoft.com/office/drawing/2014/main" val="2605579497"/>
+                    </a:ext>
+                  </a:extLst>
+                </a:gridCol>
+                <a:gridCol w="2709333">
+                  <a:extLst>
+                    <a:ext uri="{9D8B030D-6E8A-4147-A177-3AD203B41FA5}">
+                      <a16:colId xmlns:a16="http://schemas.microsoft.com/office/drawing/2014/main" val="2843452885"/>
+                    </a:ext>
+                  </a:extLst>
+                </a:gridCol>
+              </a:tblGrid>
+              <a:tr h="370840">
+                <a:tc>
+                  <a:txBody>
+                    <a:bodyPr/>
+                    <a:lstStyle/>
+                    <a:p>
+                      <a:r>
+                        <a:rPr lang="it-IT" dirty="0"/>
+                        <a:t>Metrica</a:t>
+                      </a:r>
+                    </a:p>
+                  </a:txBody>
+                  <a:tcPr/>
+                </a:tc>
+                <a:tc>
+                  <a:txBody>
+                    <a:bodyPr/>
+                    <a:lstStyle/>
+                    <a:p>
+                      <a:r>
+                        <a:rPr lang="it-IT" dirty="0" err="1"/>
+                        <a:t>AVG_value</a:t>
+                      </a:r>
+                      <a:endParaRPr lang="it-IT" dirty="0"/>
+                    </a:p>
+                  </a:txBody>
+                  <a:tcPr/>
+                </a:tc>
+                <a:tc>
+                  <a:txBody>
+                    <a:bodyPr/>
+                    <a:lstStyle/>
+                    <a:p>
+                      <a:r>
+                        <a:rPr lang="it-IT" dirty="0"/>
+                        <a:t>C.I al 95%</a:t>
+                      </a:r>
+                    </a:p>
+                  </a:txBody>
+                  <a:tcPr/>
+                </a:tc>
+                <a:extLst>
+                  <a:ext uri="{0D108BD9-81ED-4DB2-BD59-A6C34878D82A}">
+                    <a16:rowId xmlns:a16="http://schemas.microsoft.com/office/drawing/2014/main" val="983539462"/>
+                  </a:ext>
+                </a:extLst>
+              </a:tr>
+              <a:tr h="370840">
+                <a:tc>
+                  <a:txBody>
+                    <a:bodyPr/>
+                    <a:lstStyle/>
+                    <a:p>
+                      <a:r>
+                        <a:rPr lang="it-IT" dirty="0"/>
+                        <a:t>EM</a:t>
+                      </a:r>
+                    </a:p>
+                  </a:txBody>
+                  <a:tcPr/>
+                </a:tc>
+                <a:tc>
+                  <a:txBody>
+                    <a:bodyPr/>
+                    <a:lstStyle/>
+                    <a:p>
+                      <a:r>
+                        <a:rPr lang="it-IT" dirty="0"/>
+                        <a:t>0,46</a:t>
+                      </a:r>
+                    </a:p>
+                  </a:txBody>
+                  <a:tcPr/>
+                </a:tc>
+                <a:tc>
+                  <a:txBody>
+                    <a:bodyPr/>
+                    <a:lstStyle/>
+                    <a:p>
+                      <a:r>
+                        <a:rPr lang="it-IT" dirty="0"/>
+                        <a:t>[0.41,0.51]</a:t>
+                      </a:r>
+                    </a:p>
+                  </a:txBody>
+                  <a:tcPr/>
+                </a:tc>
+                <a:extLst>
+                  <a:ext uri="{0D108BD9-81ED-4DB2-BD59-A6C34878D82A}">
+                    <a16:rowId xmlns:a16="http://schemas.microsoft.com/office/drawing/2014/main" val="3800930924"/>
+                  </a:ext>
+                </a:extLst>
+              </a:tr>
+              <a:tr h="370840">
+                <a:tc>
+                  <a:txBody>
+                    <a:bodyPr/>
+                    <a:lstStyle/>
+                    <a:p>
+                      <a:r>
+                        <a:rPr lang="it-IT" dirty="0"/>
+                        <a:t>ED</a:t>
+                      </a:r>
+                    </a:p>
+                  </a:txBody>
+                  <a:tcPr/>
+                </a:tc>
+                <a:tc>
+                  <a:txBody>
+                    <a:bodyPr/>
+                    <a:lstStyle/>
+                    <a:p>
+                      <a:r>
+                        <a:rPr lang="it-IT" dirty="0"/>
+                        <a:t>0,8</a:t>
+                      </a:r>
+                    </a:p>
+                  </a:txBody>
+                  <a:tcPr/>
+                </a:tc>
+                <a:tc>
+                  <a:txBody>
+                    <a:bodyPr/>
+                    <a:lstStyle/>
+                    <a:p>
+                      <a:r>
+                        <a:rPr lang="it-IT" dirty="0"/>
+                        <a:t>[0.77,0.83]</a:t>
+                      </a:r>
+                    </a:p>
+                  </a:txBody>
+                  <a:tcPr/>
+                </a:tc>
+                <a:extLst>
+                  <a:ext uri="{0D108BD9-81ED-4DB2-BD59-A6C34878D82A}">
+                    <a16:rowId xmlns:a16="http://schemas.microsoft.com/office/drawing/2014/main" val="3388615546"/>
+                  </a:ext>
+                </a:extLst>
+              </a:tr>
+              <a:tr h="370840">
+                <a:tc>
+                  <a:txBody>
+                    <a:bodyPr/>
+                    <a:lstStyle/>
+                    <a:p>
+                      <a:r>
+                        <a:rPr lang="it-IT" dirty="0"/>
+                        <a:t>METEOR</a:t>
+                      </a:r>
+                    </a:p>
+                  </a:txBody>
+                  <a:tcPr/>
+                </a:tc>
+                <a:tc>
+                  <a:txBody>
+                    <a:bodyPr/>
+                    <a:lstStyle/>
+                    <a:p>
+                      <a:r>
+                        <a:rPr lang="it-IT" dirty="0"/>
+                        <a:t>0,83</a:t>
+                      </a:r>
+                    </a:p>
+                  </a:txBody>
+                  <a:tcPr/>
+                </a:tc>
+                <a:tc>
+                  <a:txBody>
+                    <a:bodyPr/>
+                    <a:lstStyle/>
+                    <a:p>
+                      <a:r>
+                        <a:rPr lang="it-IT" dirty="0"/>
+                        <a:t>[0,81,0,86]</a:t>
+                      </a:r>
+                    </a:p>
+                  </a:txBody>
+                  <a:tcPr/>
+                </a:tc>
+                <a:extLst>
+                  <a:ext uri="{0D108BD9-81ED-4DB2-BD59-A6C34878D82A}">
+                    <a16:rowId xmlns:a16="http://schemas.microsoft.com/office/drawing/2014/main" val="1622126826"/>
+                  </a:ext>
+                </a:extLst>
+              </a:tr>
+              <a:tr h="370840">
+                <a:tc>
+                  <a:txBody>
+                    <a:bodyPr/>
+                    <a:lstStyle/>
+                    <a:p>
+                      <a:r>
+                        <a:rPr lang="it-IT" dirty="0"/>
+                        <a:t>LCS</a:t>
+                      </a:r>
+                    </a:p>
+                  </a:txBody>
+                  <a:tcPr/>
+                </a:tc>
+                <a:tc>
+                  <a:txBody>
+                    <a:bodyPr/>
+                    <a:lstStyle/>
+                    <a:p>
+                      <a:r>
+                        <a:rPr lang="it-IT" dirty="0"/>
+                        <a:t>0,82</a:t>
+                      </a:r>
+                    </a:p>
+                  </a:txBody>
+                  <a:tcPr/>
+                </a:tc>
+                <a:tc>
+                  <a:txBody>
+                    <a:bodyPr/>
+                    <a:lstStyle/>
+                    <a:p>
+                      <a:r>
+                        <a:rPr lang="it-IT" dirty="0"/>
+                        <a:t>[0,79,0,84]</a:t>
+                      </a:r>
+                    </a:p>
+                  </a:txBody>
+                  <a:tcPr/>
+                </a:tc>
+                <a:extLst>
+                  <a:ext uri="{0D108BD9-81ED-4DB2-BD59-A6C34878D82A}">
+                    <a16:rowId xmlns:a16="http://schemas.microsoft.com/office/drawing/2014/main" val="463369608"/>
+                  </a:ext>
+                </a:extLst>
+              </a:tr>
+              <a:tr h="370840">
+                <a:tc>
+                  <a:txBody>
+                    <a:bodyPr/>
+                    <a:lstStyle/>
+                    <a:p>
+                      <a:r>
+                        <a:rPr lang="it-IT" dirty="0"/>
+                        <a:t>CRYSTAL BLEU</a:t>
+                      </a:r>
+                    </a:p>
+                  </a:txBody>
+                  <a:tcPr/>
+                </a:tc>
+                <a:tc>
+                  <a:txBody>
+                    <a:bodyPr/>
+                    <a:lstStyle/>
+                    <a:p>
+                      <a:r>
+                        <a:rPr lang="it-IT" dirty="0"/>
+                        <a:t>0,69</a:t>
+                      </a:r>
+                    </a:p>
+                  </a:txBody>
+                  <a:tcPr/>
+                </a:tc>
+                <a:tc>
+                  <a:txBody>
+                    <a:bodyPr/>
+                    <a:lstStyle/>
+                    <a:p>
+                      <a:r>
+                        <a:rPr lang="it-IT" dirty="0"/>
+                        <a:t>[0,65,0,73]</a:t>
+                      </a:r>
+                    </a:p>
+                  </a:txBody>
+                  <a:tcPr/>
+                </a:tc>
+                <a:extLst>
+                  <a:ext uri="{0D108BD9-81ED-4DB2-BD59-A6C34878D82A}">
+                    <a16:rowId xmlns:a16="http://schemas.microsoft.com/office/drawing/2014/main" val="3532095965"/>
+                  </a:ext>
+                </a:extLst>
+              </a:tr>
+              <a:tr h="370840">
+                <a:tc>
+                  <a:txBody>
+                    <a:bodyPr/>
+                    <a:lstStyle/>
+                    <a:p>
+                      <a:r>
+                        <a:rPr lang="it-IT" dirty="0"/>
+                        <a:t>SACRE BLEU</a:t>
+                      </a:r>
+                    </a:p>
+                  </a:txBody>
+                  <a:tcPr/>
+                </a:tc>
+                <a:tc>
+                  <a:txBody>
+                    <a:bodyPr/>
+                    <a:lstStyle/>
+                    <a:p>
+                      <a:r>
+                        <a:rPr lang="it-IT" dirty="0"/>
+                        <a:t>0,91</a:t>
+                      </a:r>
+                    </a:p>
+                  </a:txBody>
+                  <a:tcPr/>
+                </a:tc>
+                <a:tc>
+                  <a:txBody>
+                    <a:bodyPr/>
+                    <a:lstStyle/>
+                    <a:p>
+                      <a:r>
+                        <a:rPr lang="it-IT" dirty="0"/>
+                        <a:t>[0,9,0,93]</a:t>
+                      </a:r>
+                    </a:p>
+                  </a:txBody>
+                  <a:tcPr/>
+                </a:tc>
+                <a:extLst>
+                  <a:ext uri="{0D108BD9-81ED-4DB2-BD59-A6C34878D82A}">
+                    <a16:rowId xmlns:a16="http://schemas.microsoft.com/office/drawing/2014/main" val="2553141499"/>
+                  </a:ext>
+                </a:extLst>
+              </a:tr>
+              <a:tr h="370840">
+                <a:tc>
+                  <a:txBody>
+                    <a:bodyPr/>
+                    <a:lstStyle/>
+                    <a:p>
+                      <a:r>
+                        <a:rPr lang="it-IT" dirty="0"/>
+                        <a:t>ROUGE</a:t>
+                      </a:r>
+                    </a:p>
+                  </a:txBody>
+                  <a:tcPr/>
+                </a:tc>
+                <a:tc>
+                  <a:txBody>
+                    <a:bodyPr/>
+                    <a:lstStyle/>
+                    <a:p>
+                      <a:r>
+                        <a:rPr lang="it-IT" dirty="0"/>
+                        <a:t>0,8</a:t>
+                      </a:r>
+                    </a:p>
+                  </a:txBody>
+                  <a:tcPr/>
+                </a:tc>
+                <a:tc>
+                  <a:txBody>
+                    <a:bodyPr/>
+                    <a:lstStyle/>
+                    <a:p>
+                      <a:r>
+                        <a:rPr lang="it-IT" dirty="0"/>
+                        <a:t>[0,77,0,83]</a:t>
+                      </a:r>
+                    </a:p>
+                  </a:txBody>
+                  <a:tcPr/>
+                </a:tc>
+                <a:extLst>
+                  <a:ext uri="{0D108BD9-81ED-4DB2-BD59-A6C34878D82A}">
+                    <a16:rowId xmlns:a16="http://schemas.microsoft.com/office/drawing/2014/main" val="2304673378"/>
+                  </a:ext>
+                </a:extLst>
+              </a:tr>
+            </a:tbl>
+          </a:graphicData>
+        </a:graphic>
+      </p:graphicFrame>
     </p:spTree>
     <p:extLst>
       <p:ext uri="{BB962C8B-B14F-4D97-AF65-F5344CB8AC3E}">
@@ -7616,287 +7761,6 @@
           </a:p>
         </p:txBody>
       </p:sp>
-      <p:graphicFrame>
-        <p:nvGraphicFramePr>
-          <p:cNvPr id="6" name="Tabella 5">
-            <a:extLst>
-              <a:ext uri="{FF2B5EF4-FFF2-40B4-BE49-F238E27FC236}">
-                <a16:creationId xmlns:a16="http://schemas.microsoft.com/office/drawing/2014/main" id="{DFAF7B2E-194F-E2EA-AE64-098EC2C5B9A6}"/>
-              </a:ext>
-            </a:extLst>
-          </p:cNvPr>
-          <p:cNvGraphicFramePr>
-            <a:graphicFrameLocks noGrp="1"/>
-          </p:cNvGraphicFramePr>
-          <p:nvPr>
-            <p:extLst>
-              <p:ext uri="{D42A27DB-BD31-4B8C-83A1-F6EECF244321}">
-                <p14:modId xmlns:p14="http://schemas.microsoft.com/office/powerpoint/2010/main" val="1975598964"/>
-              </p:ext>
-            </p:extLst>
-          </p:nvPr>
-        </p:nvGraphicFramePr>
-        <p:xfrm>
-          <a:off x="708803" y="3849468"/>
-          <a:ext cx="10774393" cy="1005840"/>
-        </p:xfrm>
-        <a:graphic>
-          <a:graphicData uri="http://schemas.openxmlformats.org/drawingml/2006/table">
-            <a:tbl>
-              <a:tblPr firstRow="1" bandRow="1">
-                <a:tableStyleId>{5C22544A-7EE6-4342-B048-85BDC9FD1C3A}</a:tableStyleId>
-              </a:tblPr>
-              <a:tblGrid>
-                <a:gridCol w="1539199">
-                  <a:extLst>
-                    <a:ext uri="{9D8B030D-6E8A-4147-A177-3AD203B41FA5}">
-                      <a16:colId xmlns:a16="http://schemas.microsoft.com/office/drawing/2014/main" val="2447443544"/>
-                    </a:ext>
-                  </a:extLst>
-                </a:gridCol>
-                <a:gridCol w="1539199">
-                  <a:extLst>
-                    <a:ext uri="{9D8B030D-6E8A-4147-A177-3AD203B41FA5}">
-                      <a16:colId xmlns:a16="http://schemas.microsoft.com/office/drawing/2014/main" val="1535496867"/>
-                    </a:ext>
-                  </a:extLst>
-                </a:gridCol>
-                <a:gridCol w="1539199">
-                  <a:extLst>
-                    <a:ext uri="{9D8B030D-6E8A-4147-A177-3AD203B41FA5}">
-                      <a16:colId xmlns:a16="http://schemas.microsoft.com/office/drawing/2014/main" val="3415672651"/>
-                    </a:ext>
-                  </a:extLst>
-                </a:gridCol>
-                <a:gridCol w="1539199">
-                  <a:extLst>
-                    <a:ext uri="{9D8B030D-6E8A-4147-A177-3AD203B41FA5}">
-                      <a16:colId xmlns:a16="http://schemas.microsoft.com/office/drawing/2014/main" val="253070283"/>
-                    </a:ext>
-                  </a:extLst>
-                </a:gridCol>
-                <a:gridCol w="1539199">
-                  <a:extLst>
-                    <a:ext uri="{9D8B030D-6E8A-4147-A177-3AD203B41FA5}">
-                      <a16:colId xmlns:a16="http://schemas.microsoft.com/office/drawing/2014/main" val="2714512924"/>
-                    </a:ext>
-                  </a:extLst>
-                </a:gridCol>
-                <a:gridCol w="1539199">
-                  <a:extLst>
-                    <a:ext uri="{9D8B030D-6E8A-4147-A177-3AD203B41FA5}">
-                      <a16:colId xmlns:a16="http://schemas.microsoft.com/office/drawing/2014/main" val="3119623602"/>
-                    </a:ext>
-                  </a:extLst>
-                </a:gridCol>
-                <a:gridCol w="1539199">
-                  <a:extLst>
-                    <a:ext uri="{9D8B030D-6E8A-4147-A177-3AD203B41FA5}">
-                      <a16:colId xmlns:a16="http://schemas.microsoft.com/office/drawing/2014/main" val="1046693342"/>
-                    </a:ext>
-                  </a:extLst>
-                </a:gridCol>
-              </a:tblGrid>
-              <a:tr h="606533">
-                <a:tc>
-                  <a:txBody>
-                    <a:bodyPr/>
-                    <a:lstStyle/>
-                    <a:p>
-                      <a:r>
-                        <a:rPr lang="it-IT" dirty="0"/>
-                        <a:t>EM</a:t>
-                      </a:r>
-                    </a:p>
-                  </a:txBody>
-                  <a:tcPr/>
-                </a:tc>
-                <a:tc>
-                  <a:txBody>
-                    <a:bodyPr/>
-                    <a:lstStyle/>
-                    <a:p>
-                      <a:r>
-                        <a:rPr lang="it-IT" dirty="0"/>
-                        <a:t>ED</a:t>
-                      </a:r>
-                    </a:p>
-                  </a:txBody>
-                  <a:tcPr/>
-                </a:tc>
-                <a:tc>
-                  <a:txBody>
-                    <a:bodyPr/>
-                    <a:lstStyle/>
-                    <a:p>
-                      <a:r>
-                        <a:rPr lang="it-IT" dirty="0"/>
-                        <a:t>METEOR</a:t>
-                      </a:r>
-                    </a:p>
-                  </a:txBody>
-                  <a:tcPr/>
-                </a:tc>
-                <a:tc>
-                  <a:txBody>
-                    <a:bodyPr/>
-                    <a:lstStyle/>
-                    <a:p>
-                      <a:r>
-                        <a:rPr lang="it-IT" dirty="0"/>
-                        <a:t>LCS</a:t>
-                      </a:r>
-                    </a:p>
-                  </a:txBody>
-                  <a:tcPr/>
-                </a:tc>
-                <a:tc>
-                  <a:txBody>
-                    <a:bodyPr/>
-                    <a:lstStyle/>
-                    <a:p>
-                      <a:r>
-                        <a:rPr lang="it-IT" dirty="0"/>
-                        <a:t>CRYSTAL BLEU</a:t>
-                      </a:r>
-                    </a:p>
-                  </a:txBody>
-                  <a:tcPr/>
-                </a:tc>
-                <a:tc>
-                  <a:txBody>
-                    <a:bodyPr/>
-                    <a:lstStyle/>
-                    <a:p>
-                      <a:r>
-                        <a:rPr lang="it-IT" dirty="0"/>
-                        <a:t>SACRE BLEU</a:t>
-                      </a:r>
-                    </a:p>
-                  </a:txBody>
-                  <a:tcPr/>
-                </a:tc>
-                <a:tc>
-                  <a:txBody>
-                    <a:bodyPr/>
-                    <a:lstStyle/>
-                    <a:p>
-                      <a:r>
-                        <a:rPr lang="it-IT" dirty="0"/>
-                        <a:t>ROUGE</a:t>
-                      </a:r>
-                    </a:p>
-                  </a:txBody>
-                  <a:tcPr/>
-                </a:tc>
-                <a:extLst>
-                  <a:ext uri="{0D108BD9-81ED-4DB2-BD59-A6C34878D82A}">
-                    <a16:rowId xmlns:a16="http://schemas.microsoft.com/office/drawing/2014/main" val="1105077754"/>
-                  </a:ext>
-                </a:extLst>
-              </a:tr>
-              <a:tr h="346590">
-                <a:tc>
-                  <a:txBody>
-                    <a:bodyPr/>
-                    <a:lstStyle/>
-                    <a:p>
-                      <a:r>
-                        <a:rPr lang="it-IT" dirty="0"/>
-                        <a:t>0,45</a:t>
-                      </a:r>
-                    </a:p>
-                  </a:txBody>
-                  <a:tcPr/>
-                </a:tc>
-                <a:tc>
-                  <a:txBody>
-                    <a:bodyPr/>
-                    <a:lstStyle/>
-                    <a:p>
-                      <a:r>
-                        <a:rPr lang="it-IT" dirty="0"/>
-                        <a:t>0,84</a:t>
-                      </a:r>
-                    </a:p>
-                  </a:txBody>
-                  <a:tcPr/>
-                </a:tc>
-                <a:tc>
-                  <a:txBody>
-                    <a:bodyPr/>
-                    <a:lstStyle/>
-                    <a:p>
-                      <a:r>
-                        <a:rPr lang="it-IT" dirty="0"/>
-                        <a:t>0,86</a:t>
-                      </a:r>
-                    </a:p>
-                  </a:txBody>
-                  <a:tcPr/>
-                </a:tc>
-                <a:tc>
-                  <a:txBody>
-                    <a:bodyPr/>
-                    <a:lstStyle/>
-                    <a:p>
-                      <a:r>
-                        <a:rPr lang="it-IT" dirty="0"/>
-                        <a:t>0,86</a:t>
-                      </a:r>
-                    </a:p>
-                  </a:txBody>
-                  <a:tcPr/>
-                </a:tc>
-                <a:tc>
-                  <a:txBody>
-                    <a:bodyPr/>
-                    <a:lstStyle/>
-                    <a:p>
-                      <a:r>
-                        <a:rPr lang="it-IT" dirty="0"/>
-                        <a:t>0,74</a:t>
-                      </a:r>
-                    </a:p>
-                  </a:txBody>
-                  <a:tcPr/>
-                </a:tc>
-                <a:tc>
-                  <a:txBody>
-                    <a:bodyPr/>
-                    <a:lstStyle/>
-                    <a:p>
-                      <a:r>
-                        <a:rPr lang="it-IT" dirty="0"/>
-                        <a:t>0,92</a:t>
-                      </a:r>
-                    </a:p>
-                  </a:txBody>
-                  <a:tcPr/>
-                </a:tc>
-                <a:tc>
-                  <a:txBody>
-                    <a:bodyPr/>
-                    <a:lstStyle/>
-                    <a:p>
-                      <a:r>
-                        <a:rPr lang="it-IT" dirty="0"/>
-                        <a:t>0,83</a:t>
-                      </a:r>
-                    </a:p>
-                  </a:txBody>
-                  <a:tcPr/>
-                </a:tc>
-                <a:extLst>
-                  <a:ext uri="{0D108BD9-81ED-4DB2-BD59-A6C34878D82A}">
-                    <a16:rowId xmlns:a16="http://schemas.microsoft.com/office/drawing/2014/main" val="2133996632"/>
-                  </a:ext>
-                </a:extLst>
-              </a:tr>
-            </a:tbl>
-          </a:graphicData>
-        </a:graphic>
-      </p:graphicFrame>
       <p:sp>
         <p:nvSpPr>
           <p:cNvPr id="7" name="Content Placeholder 5">
@@ -7964,6 +7828,432 @@
           </a:p>
         </p:txBody>
       </p:sp>
+      <p:graphicFrame>
+        <p:nvGraphicFramePr>
+          <p:cNvPr id="3" name="Tabella 2">
+            <a:extLst>
+              <a:ext uri="{FF2B5EF4-FFF2-40B4-BE49-F238E27FC236}">
+                <a16:creationId xmlns:a16="http://schemas.microsoft.com/office/drawing/2014/main" id="{F94BB1A0-776E-5A17-488F-6635D81955BE}"/>
+              </a:ext>
+            </a:extLst>
+          </p:cNvPr>
+          <p:cNvGraphicFramePr>
+            <a:graphicFrameLocks noGrp="1"/>
+          </p:cNvGraphicFramePr>
+          <p:nvPr>
+            <p:extLst>
+              <p:ext uri="{D42A27DB-BD31-4B8C-83A1-F6EECF244321}">
+                <p14:modId xmlns:p14="http://schemas.microsoft.com/office/powerpoint/2010/main" val="3390164372"/>
+              </p:ext>
+            </p:extLst>
+          </p:nvPr>
+        </p:nvGraphicFramePr>
+        <p:xfrm>
+          <a:off x="2032000" y="3174124"/>
+          <a:ext cx="8127999" cy="2966720"/>
+        </p:xfrm>
+        <a:graphic>
+          <a:graphicData uri="http://schemas.openxmlformats.org/drawingml/2006/table">
+            <a:tbl>
+              <a:tblPr firstRow="1" bandRow="1">
+                <a:tableStyleId>{5C22544A-7EE6-4342-B048-85BDC9FD1C3A}</a:tableStyleId>
+              </a:tblPr>
+              <a:tblGrid>
+                <a:gridCol w="2709333">
+                  <a:extLst>
+                    <a:ext uri="{9D8B030D-6E8A-4147-A177-3AD203B41FA5}">
+                      <a16:colId xmlns:a16="http://schemas.microsoft.com/office/drawing/2014/main" val="3957489615"/>
+                    </a:ext>
+                  </a:extLst>
+                </a:gridCol>
+                <a:gridCol w="2709333">
+                  <a:extLst>
+                    <a:ext uri="{9D8B030D-6E8A-4147-A177-3AD203B41FA5}">
+                      <a16:colId xmlns:a16="http://schemas.microsoft.com/office/drawing/2014/main" val="2605579497"/>
+                    </a:ext>
+                  </a:extLst>
+                </a:gridCol>
+                <a:gridCol w="2709333">
+                  <a:extLst>
+                    <a:ext uri="{9D8B030D-6E8A-4147-A177-3AD203B41FA5}">
+                      <a16:colId xmlns:a16="http://schemas.microsoft.com/office/drawing/2014/main" val="2843452885"/>
+                    </a:ext>
+                  </a:extLst>
+                </a:gridCol>
+              </a:tblGrid>
+              <a:tr h="370840">
+                <a:tc>
+                  <a:txBody>
+                    <a:bodyPr/>
+                    <a:lstStyle/>
+                    <a:p>
+                      <a:r>
+                        <a:rPr lang="it-IT" dirty="0"/>
+                        <a:t>Metrica</a:t>
+                      </a:r>
+                    </a:p>
+                  </a:txBody>
+                  <a:tcPr/>
+                </a:tc>
+                <a:tc>
+                  <a:txBody>
+                    <a:bodyPr/>
+                    <a:lstStyle/>
+                    <a:p>
+                      <a:r>
+                        <a:rPr lang="it-IT" dirty="0" err="1"/>
+                        <a:t>AVG_value</a:t>
+                      </a:r>
+                      <a:endParaRPr lang="it-IT" dirty="0"/>
+                    </a:p>
+                  </a:txBody>
+                  <a:tcPr/>
+                </a:tc>
+                <a:tc>
+                  <a:txBody>
+                    <a:bodyPr/>
+                    <a:lstStyle/>
+                    <a:p>
+                      <a:r>
+                        <a:rPr lang="it-IT" dirty="0"/>
+                        <a:t>C.I al 95%</a:t>
+                      </a:r>
+                    </a:p>
+                  </a:txBody>
+                  <a:tcPr/>
+                </a:tc>
+                <a:extLst>
+                  <a:ext uri="{0D108BD9-81ED-4DB2-BD59-A6C34878D82A}">
+                    <a16:rowId xmlns:a16="http://schemas.microsoft.com/office/drawing/2014/main" val="983539462"/>
+                  </a:ext>
+                </a:extLst>
+              </a:tr>
+              <a:tr h="370840">
+                <a:tc>
+                  <a:txBody>
+                    <a:bodyPr/>
+                    <a:lstStyle/>
+                    <a:p>
+                      <a:r>
+                        <a:rPr lang="it-IT" dirty="0"/>
+                        <a:t>EM</a:t>
+                      </a:r>
+                    </a:p>
+                  </a:txBody>
+                  <a:tcPr/>
+                </a:tc>
+                <a:tc>
+                  <a:txBody>
+                    <a:bodyPr/>
+                    <a:lstStyle/>
+                    <a:p>
+                      <a:r>
+                        <a:rPr lang="it-IT" dirty="0"/>
+                        <a:t>0,45</a:t>
+                      </a:r>
+                    </a:p>
+                  </a:txBody>
+                  <a:tcPr/>
+                </a:tc>
+                <a:tc>
+                  <a:txBody>
+                    <a:bodyPr/>
+                    <a:lstStyle/>
+                    <a:p>
+                      <a:r>
+                        <a:rPr lang="it-IT" dirty="0"/>
+                        <a:t>[0.39,0.50]</a:t>
+                      </a:r>
+                    </a:p>
+                  </a:txBody>
+                  <a:tcPr/>
+                </a:tc>
+                <a:extLst>
+                  <a:ext uri="{0D108BD9-81ED-4DB2-BD59-A6C34878D82A}">
+                    <a16:rowId xmlns:a16="http://schemas.microsoft.com/office/drawing/2014/main" val="3800930924"/>
+                  </a:ext>
+                </a:extLst>
+              </a:tr>
+              <a:tr h="370840">
+                <a:tc>
+                  <a:txBody>
+                    <a:bodyPr/>
+                    <a:lstStyle/>
+                    <a:p>
+                      <a:r>
+                        <a:rPr lang="it-IT" dirty="0"/>
+                        <a:t>ED</a:t>
+                      </a:r>
+                    </a:p>
+                  </a:txBody>
+                  <a:tcPr/>
+                </a:tc>
+                <a:tc>
+                  <a:txBody>
+                    <a:bodyPr/>
+                    <a:lstStyle/>
+                    <a:p>
+                      <a:r>
+                        <a:rPr lang="it-IT" dirty="0"/>
+                        <a:t>0,84</a:t>
+                      </a:r>
+                    </a:p>
+                  </a:txBody>
+                  <a:tcPr/>
+                </a:tc>
+                <a:tc>
+                  <a:txBody>
+                    <a:bodyPr/>
+                    <a:lstStyle/>
+                    <a:p>
+                      <a:r>
+                        <a:rPr lang="it-IT" dirty="0"/>
+                        <a:t>[0.82,0.87]</a:t>
+                      </a:r>
+                    </a:p>
+                  </a:txBody>
+                  <a:tcPr/>
+                </a:tc>
+                <a:extLst>
+                  <a:ext uri="{0D108BD9-81ED-4DB2-BD59-A6C34878D82A}">
+                    <a16:rowId xmlns:a16="http://schemas.microsoft.com/office/drawing/2014/main" val="3388615546"/>
+                  </a:ext>
+                </a:extLst>
+              </a:tr>
+              <a:tr h="370840">
+                <a:tc>
+                  <a:txBody>
+                    <a:bodyPr/>
+                    <a:lstStyle/>
+                    <a:p>
+                      <a:r>
+                        <a:rPr lang="it-IT" dirty="0"/>
+                        <a:t>METEOR</a:t>
+                      </a:r>
+                    </a:p>
+                  </a:txBody>
+                  <a:tcPr/>
+                </a:tc>
+                <a:tc>
+                  <a:txBody>
+                    <a:bodyPr/>
+                    <a:lstStyle/>
+                    <a:p>
+                      <a:r>
+                        <a:rPr lang="it-IT" dirty="0"/>
+                        <a:t>0,86</a:t>
+                      </a:r>
+                    </a:p>
+                  </a:txBody>
+                  <a:tcPr/>
+                </a:tc>
+                <a:tc>
+                  <a:txBody>
+                    <a:bodyPr/>
+                    <a:lstStyle/>
+                    <a:p>
+                      <a:r>
+                        <a:rPr lang="it-IT" dirty="0"/>
+                        <a:t>[0.84,0.88]</a:t>
+                      </a:r>
+                    </a:p>
+                  </a:txBody>
+                  <a:tcPr/>
+                </a:tc>
+                <a:extLst>
+                  <a:ext uri="{0D108BD9-81ED-4DB2-BD59-A6C34878D82A}">
+                    <a16:rowId xmlns:a16="http://schemas.microsoft.com/office/drawing/2014/main" val="1622126826"/>
+                  </a:ext>
+                </a:extLst>
+              </a:tr>
+              <a:tr h="370840">
+                <a:tc>
+                  <a:txBody>
+                    <a:bodyPr/>
+                    <a:lstStyle/>
+                    <a:p>
+                      <a:r>
+                        <a:rPr lang="it-IT" dirty="0"/>
+                        <a:t>LCS</a:t>
+                      </a:r>
+                    </a:p>
+                  </a:txBody>
+                  <a:tcPr/>
+                </a:tc>
+                <a:tc>
+                  <a:txBody>
+                    <a:bodyPr/>
+                    <a:lstStyle/>
+                    <a:p>
+                      <a:r>
+                        <a:rPr lang="it-IT" dirty="0"/>
+                        <a:t>0,86</a:t>
+                      </a:r>
+                    </a:p>
+                  </a:txBody>
+                  <a:tcPr/>
+                </a:tc>
+                <a:tc>
+                  <a:txBody>
+                    <a:bodyPr/>
+                    <a:lstStyle/>
+                    <a:p>
+                      <a:r>
+                        <a:rPr lang="it-IT" dirty="0"/>
+                        <a:t>[0.84,0.88]</a:t>
+                      </a:r>
+                    </a:p>
+                  </a:txBody>
+                  <a:tcPr/>
+                </a:tc>
+                <a:extLst>
+                  <a:ext uri="{0D108BD9-81ED-4DB2-BD59-A6C34878D82A}">
+                    <a16:rowId xmlns:a16="http://schemas.microsoft.com/office/drawing/2014/main" val="463369608"/>
+                  </a:ext>
+                </a:extLst>
+              </a:tr>
+              <a:tr h="370840">
+                <a:tc>
+                  <a:txBody>
+                    <a:bodyPr/>
+                    <a:lstStyle/>
+                    <a:p>
+                      <a:r>
+                        <a:rPr lang="it-IT" dirty="0"/>
+                        <a:t>CRYSTAL BLEU</a:t>
+                      </a:r>
+                    </a:p>
+                  </a:txBody>
+                  <a:tcPr/>
+                </a:tc>
+                <a:tc>
+                  <a:txBody>
+                    <a:bodyPr/>
+                    <a:lstStyle/>
+                    <a:p>
+                      <a:r>
+                        <a:rPr lang="it-IT" dirty="0"/>
+                        <a:t>0,74</a:t>
+                      </a:r>
+                    </a:p>
+                  </a:txBody>
+                  <a:tcPr/>
+                </a:tc>
+                <a:tc>
+                  <a:txBody>
+                    <a:bodyPr/>
+                    <a:lstStyle/>
+                    <a:p>
+                      <a:r>
+                        <a:rPr lang="it-IT" dirty="0"/>
+                        <a:t>[0.70,0.78]</a:t>
+                      </a:r>
+                    </a:p>
+                  </a:txBody>
+                  <a:tcPr/>
+                </a:tc>
+                <a:extLst>
+                  <a:ext uri="{0D108BD9-81ED-4DB2-BD59-A6C34878D82A}">
+                    <a16:rowId xmlns:a16="http://schemas.microsoft.com/office/drawing/2014/main" val="3532095965"/>
+                  </a:ext>
+                </a:extLst>
+              </a:tr>
+              <a:tr h="370840">
+                <a:tc>
+                  <a:txBody>
+                    <a:bodyPr/>
+                    <a:lstStyle/>
+                    <a:p>
+                      <a:r>
+                        <a:rPr lang="it-IT" dirty="0"/>
+                        <a:t>SACRE BLEU</a:t>
+                      </a:r>
+                    </a:p>
+                  </a:txBody>
+                  <a:tcPr/>
+                </a:tc>
+                <a:tc>
+                  <a:txBody>
+                    <a:bodyPr/>
+                    <a:lstStyle/>
+                    <a:p>
+                      <a:r>
+                        <a:rPr lang="it-IT" dirty="0"/>
+                        <a:t>0,92</a:t>
+                      </a:r>
+                    </a:p>
+                  </a:txBody>
+                  <a:tcPr/>
+                </a:tc>
+                <a:tc>
+                  <a:txBody>
+                    <a:bodyPr/>
+                    <a:lstStyle/>
+                    <a:p>
+                      <a:r>
+                        <a:rPr lang="it-IT" dirty="0"/>
+                        <a:t>[0.91,0.94]</a:t>
+                      </a:r>
+                    </a:p>
+                  </a:txBody>
+                  <a:tcPr/>
+                </a:tc>
+                <a:extLst>
+                  <a:ext uri="{0D108BD9-81ED-4DB2-BD59-A6C34878D82A}">
+                    <a16:rowId xmlns:a16="http://schemas.microsoft.com/office/drawing/2014/main" val="2553141499"/>
+                  </a:ext>
+                </a:extLst>
+              </a:tr>
+              <a:tr h="370840">
+                <a:tc>
+                  <a:txBody>
+                    <a:bodyPr/>
+                    <a:lstStyle/>
+                    <a:p>
+                      <a:r>
+                        <a:rPr lang="it-IT" dirty="0"/>
+                        <a:t>ROUGE</a:t>
+                      </a:r>
+                    </a:p>
+                  </a:txBody>
+                  <a:tcPr/>
+                </a:tc>
+                <a:tc>
+                  <a:txBody>
+                    <a:bodyPr/>
+                    <a:lstStyle/>
+                    <a:p>
+                      <a:r>
+                        <a:rPr lang="it-IT" dirty="0"/>
+                        <a:t>0,83</a:t>
+                      </a:r>
+                    </a:p>
+                  </a:txBody>
+                  <a:tcPr/>
+                </a:tc>
+                <a:tc>
+                  <a:txBody>
+                    <a:bodyPr/>
+                    <a:lstStyle/>
+                    <a:p>
+                      <a:r>
+                        <a:rPr lang="it-IT" dirty="0"/>
+                        <a:t>[0.80,0.85]</a:t>
+                      </a:r>
+                    </a:p>
+                  </a:txBody>
+                  <a:tcPr/>
+                </a:tc>
+                <a:extLst>
+                  <a:ext uri="{0D108BD9-81ED-4DB2-BD59-A6C34878D82A}">
+                    <a16:rowId xmlns:a16="http://schemas.microsoft.com/office/drawing/2014/main" val="2304673378"/>
+                  </a:ext>
+                </a:extLst>
+              </a:tr>
+            </a:tbl>
+          </a:graphicData>
+        </a:graphic>
+      </p:graphicFrame>
     </p:spTree>
     <p:extLst>
       <p:ext uri="{BB962C8B-B14F-4D97-AF65-F5344CB8AC3E}">
@@ -11464,287 +11754,6 @@
           </a:p>
         </p:txBody>
       </p:sp>
-      <p:graphicFrame>
-        <p:nvGraphicFramePr>
-          <p:cNvPr id="6" name="Tabella 5">
-            <a:extLst>
-              <a:ext uri="{FF2B5EF4-FFF2-40B4-BE49-F238E27FC236}">
-                <a16:creationId xmlns:a16="http://schemas.microsoft.com/office/drawing/2014/main" id="{207602E2-7123-2F4D-6BE9-AACAAAE61017}"/>
-              </a:ext>
-            </a:extLst>
-          </p:cNvPr>
-          <p:cNvGraphicFramePr>
-            <a:graphicFrameLocks noGrp="1"/>
-          </p:cNvGraphicFramePr>
-          <p:nvPr>
-            <p:extLst>
-              <p:ext uri="{D42A27DB-BD31-4B8C-83A1-F6EECF244321}">
-                <p14:modId xmlns:p14="http://schemas.microsoft.com/office/powerpoint/2010/main" val="4052669327"/>
-              </p:ext>
-            </p:extLst>
-          </p:nvPr>
-        </p:nvGraphicFramePr>
-        <p:xfrm>
-          <a:off x="708803" y="3849468"/>
-          <a:ext cx="10774393" cy="1005840"/>
-        </p:xfrm>
-        <a:graphic>
-          <a:graphicData uri="http://schemas.openxmlformats.org/drawingml/2006/table">
-            <a:tbl>
-              <a:tblPr firstRow="1" bandRow="1">
-                <a:tableStyleId>{5C22544A-7EE6-4342-B048-85BDC9FD1C3A}</a:tableStyleId>
-              </a:tblPr>
-              <a:tblGrid>
-                <a:gridCol w="1539199">
-                  <a:extLst>
-                    <a:ext uri="{9D8B030D-6E8A-4147-A177-3AD203B41FA5}">
-                      <a16:colId xmlns:a16="http://schemas.microsoft.com/office/drawing/2014/main" val="2447443544"/>
-                    </a:ext>
-                  </a:extLst>
-                </a:gridCol>
-                <a:gridCol w="1539199">
-                  <a:extLst>
-                    <a:ext uri="{9D8B030D-6E8A-4147-A177-3AD203B41FA5}">
-                      <a16:colId xmlns:a16="http://schemas.microsoft.com/office/drawing/2014/main" val="1535496867"/>
-                    </a:ext>
-                  </a:extLst>
-                </a:gridCol>
-                <a:gridCol w="1539199">
-                  <a:extLst>
-                    <a:ext uri="{9D8B030D-6E8A-4147-A177-3AD203B41FA5}">
-                      <a16:colId xmlns:a16="http://schemas.microsoft.com/office/drawing/2014/main" val="3415672651"/>
-                    </a:ext>
-                  </a:extLst>
-                </a:gridCol>
-                <a:gridCol w="1539199">
-                  <a:extLst>
-                    <a:ext uri="{9D8B030D-6E8A-4147-A177-3AD203B41FA5}">
-                      <a16:colId xmlns:a16="http://schemas.microsoft.com/office/drawing/2014/main" val="253070283"/>
-                    </a:ext>
-                  </a:extLst>
-                </a:gridCol>
-                <a:gridCol w="1539199">
-                  <a:extLst>
-                    <a:ext uri="{9D8B030D-6E8A-4147-A177-3AD203B41FA5}">
-                      <a16:colId xmlns:a16="http://schemas.microsoft.com/office/drawing/2014/main" val="2714512924"/>
-                    </a:ext>
-                  </a:extLst>
-                </a:gridCol>
-                <a:gridCol w="1539199">
-                  <a:extLst>
-                    <a:ext uri="{9D8B030D-6E8A-4147-A177-3AD203B41FA5}">
-                      <a16:colId xmlns:a16="http://schemas.microsoft.com/office/drawing/2014/main" val="3119623602"/>
-                    </a:ext>
-                  </a:extLst>
-                </a:gridCol>
-                <a:gridCol w="1539199">
-                  <a:extLst>
-                    <a:ext uri="{9D8B030D-6E8A-4147-A177-3AD203B41FA5}">
-                      <a16:colId xmlns:a16="http://schemas.microsoft.com/office/drawing/2014/main" val="1046693342"/>
-                    </a:ext>
-                  </a:extLst>
-                </a:gridCol>
-              </a:tblGrid>
-              <a:tr h="606533">
-                <a:tc>
-                  <a:txBody>
-                    <a:bodyPr/>
-                    <a:lstStyle/>
-                    <a:p>
-                      <a:r>
-                        <a:rPr lang="it-IT" dirty="0"/>
-                        <a:t>EM</a:t>
-                      </a:r>
-                    </a:p>
-                  </a:txBody>
-                  <a:tcPr/>
-                </a:tc>
-                <a:tc>
-                  <a:txBody>
-                    <a:bodyPr/>
-                    <a:lstStyle/>
-                    <a:p>
-                      <a:r>
-                        <a:rPr lang="it-IT" dirty="0"/>
-                        <a:t>ED</a:t>
-                      </a:r>
-                    </a:p>
-                  </a:txBody>
-                  <a:tcPr/>
-                </a:tc>
-                <a:tc>
-                  <a:txBody>
-                    <a:bodyPr/>
-                    <a:lstStyle/>
-                    <a:p>
-                      <a:r>
-                        <a:rPr lang="it-IT" dirty="0"/>
-                        <a:t>METEOR</a:t>
-                      </a:r>
-                    </a:p>
-                  </a:txBody>
-                  <a:tcPr/>
-                </a:tc>
-                <a:tc>
-                  <a:txBody>
-                    <a:bodyPr/>
-                    <a:lstStyle/>
-                    <a:p>
-                      <a:r>
-                        <a:rPr lang="it-IT" dirty="0"/>
-                        <a:t>LCS</a:t>
-                      </a:r>
-                    </a:p>
-                  </a:txBody>
-                  <a:tcPr/>
-                </a:tc>
-                <a:tc>
-                  <a:txBody>
-                    <a:bodyPr/>
-                    <a:lstStyle/>
-                    <a:p>
-                      <a:r>
-                        <a:rPr lang="it-IT" dirty="0"/>
-                        <a:t>CRYSTAL BLEU</a:t>
-                      </a:r>
-                    </a:p>
-                  </a:txBody>
-                  <a:tcPr/>
-                </a:tc>
-                <a:tc>
-                  <a:txBody>
-                    <a:bodyPr/>
-                    <a:lstStyle/>
-                    <a:p>
-                      <a:r>
-                        <a:rPr lang="it-IT" dirty="0"/>
-                        <a:t>SACRE BLEU</a:t>
-                      </a:r>
-                    </a:p>
-                  </a:txBody>
-                  <a:tcPr/>
-                </a:tc>
-                <a:tc>
-                  <a:txBody>
-                    <a:bodyPr/>
-                    <a:lstStyle/>
-                    <a:p>
-                      <a:r>
-                        <a:rPr lang="it-IT" dirty="0"/>
-                        <a:t>ROUGE</a:t>
-                      </a:r>
-                    </a:p>
-                  </a:txBody>
-                  <a:tcPr/>
-                </a:tc>
-                <a:extLst>
-                  <a:ext uri="{0D108BD9-81ED-4DB2-BD59-A6C34878D82A}">
-                    <a16:rowId xmlns:a16="http://schemas.microsoft.com/office/drawing/2014/main" val="1105077754"/>
-                  </a:ext>
-                </a:extLst>
-              </a:tr>
-              <a:tr h="346590">
-                <a:tc>
-                  <a:txBody>
-                    <a:bodyPr/>
-                    <a:lstStyle/>
-                    <a:p>
-                      <a:r>
-                        <a:rPr lang="it-IT" dirty="0"/>
-                        <a:t>0,12</a:t>
-                      </a:r>
-                    </a:p>
-                  </a:txBody>
-                  <a:tcPr/>
-                </a:tc>
-                <a:tc>
-                  <a:txBody>
-                    <a:bodyPr/>
-                    <a:lstStyle/>
-                    <a:p>
-                      <a:r>
-                        <a:rPr lang="it-IT" dirty="0"/>
-                        <a:t>0,53</a:t>
-                      </a:r>
-                    </a:p>
-                  </a:txBody>
-                  <a:tcPr/>
-                </a:tc>
-                <a:tc>
-                  <a:txBody>
-                    <a:bodyPr/>
-                    <a:lstStyle/>
-                    <a:p>
-                      <a:r>
-                        <a:rPr lang="it-IT" dirty="0"/>
-                        <a:t>0,57</a:t>
-                      </a:r>
-                    </a:p>
-                  </a:txBody>
-                  <a:tcPr/>
-                </a:tc>
-                <a:tc>
-                  <a:txBody>
-                    <a:bodyPr/>
-                    <a:lstStyle/>
-                    <a:p>
-                      <a:r>
-                        <a:rPr lang="it-IT" dirty="0"/>
-                        <a:t>0,56</a:t>
-                      </a:r>
-                    </a:p>
-                  </a:txBody>
-                  <a:tcPr/>
-                </a:tc>
-                <a:tc>
-                  <a:txBody>
-                    <a:bodyPr/>
-                    <a:lstStyle/>
-                    <a:p>
-                      <a:r>
-                        <a:rPr lang="it-IT" dirty="0"/>
-                        <a:t>0,36</a:t>
-                      </a:r>
-                    </a:p>
-                  </a:txBody>
-                  <a:tcPr/>
-                </a:tc>
-                <a:tc>
-                  <a:txBody>
-                    <a:bodyPr/>
-                    <a:lstStyle/>
-                    <a:p>
-                      <a:r>
-                        <a:rPr lang="it-IT" dirty="0"/>
-                        <a:t>0,72</a:t>
-                      </a:r>
-                    </a:p>
-                  </a:txBody>
-                  <a:tcPr/>
-                </a:tc>
-                <a:tc>
-                  <a:txBody>
-                    <a:bodyPr/>
-                    <a:lstStyle/>
-                    <a:p>
-                      <a:r>
-                        <a:rPr lang="it-IT" dirty="0"/>
-                        <a:t>0,53</a:t>
-                      </a:r>
-                    </a:p>
-                  </a:txBody>
-                  <a:tcPr/>
-                </a:tc>
-                <a:extLst>
-                  <a:ext uri="{0D108BD9-81ED-4DB2-BD59-A6C34878D82A}">
-                    <a16:rowId xmlns:a16="http://schemas.microsoft.com/office/drawing/2014/main" val="2133996632"/>
-                  </a:ext>
-                </a:extLst>
-              </a:tr>
-            </a:tbl>
-          </a:graphicData>
-        </a:graphic>
-      </p:graphicFrame>
       <p:sp>
         <p:nvSpPr>
           <p:cNvPr id="7" name="Content Placeholder 5">
@@ -11812,6 +11821,432 @@
           </a:p>
         </p:txBody>
       </p:sp>
+      <p:graphicFrame>
+        <p:nvGraphicFramePr>
+          <p:cNvPr id="3" name="Tabella 2">
+            <a:extLst>
+              <a:ext uri="{FF2B5EF4-FFF2-40B4-BE49-F238E27FC236}">
+                <a16:creationId xmlns:a16="http://schemas.microsoft.com/office/drawing/2014/main" id="{40D56AA0-840B-20BF-44E5-E3368E5E66DD}"/>
+              </a:ext>
+            </a:extLst>
+          </p:cNvPr>
+          <p:cNvGraphicFramePr>
+            <a:graphicFrameLocks noGrp="1"/>
+          </p:cNvGraphicFramePr>
+          <p:nvPr>
+            <p:extLst>
+              <p:ext uri="{D42A27DB-BD31-4B8C-83A1-F6EECF244321}">
+                <p14:modId xmlns:p14="http://schemas.microsoft.com/office/powerpoint/2010/main" val="1769821050"/>
+              </p:ext>
+            </p:extLst>
+          </p:nvPr>
+        </p:nvGraphicFramePr>
+        <p:xfrm>
+          <a:off x="2032000" y="3174124"/>
+          <a:ext cx="8127999" cy="2966720"/>
+        </p:xfrm>
+        <a:graphic>
+          <a:graphicData uri="http://schemas.openxmlformats.org/drawingml/2006/table">
+            <a:tbl>
+              <a:tblPr firstRow="1" bandRow="1">
+                <a:tableStyleId>{5C22544A-7EE6-4342-B048-85BDC9FD1C3A}</a:tableStyleId>
+              </a:tblPr>
+              <a:tblGrid>
+                <a:gridCol w="2709333">
+                  <a:extLst>
+                    <a:ext uri="{9D8B030D-6E8A-4147-A177-3AD203B41FA5}">
+                      <a16:colId xmlns:a16="http://schemas.microsoft.com/office/drawing/2014/main" val="3957489615"/>
+                    </a:ext>
+                  </a:extLst>
+                </a:gridCol>
+                <a:gridCol w="2709333">
+                  <a:extLst>
+                    <a:ext uri="{9D8B030D-6E8A-4147-A177-3AD203B41FA5}">
+                      <a16:colId xmlns:a16="http://schemas.microsoft.com/office/drawing/2014/main" val="2605579497"/>
+                    </a:ext>
+                  </a:extLst>
+                </a:gridCol>
+                <a:gridCol w="2709333">
+                  <a:extLst>
+                    <a:ext uri="{9D8B030D-6E8A-4147-A177-3AD203B41FA5}">
+                      <a16:colId xmlns:a16="http://schemas.microsoft.com/office/drawing/2014/main" val="2843452885"/>
+                    </a:ext>
+                  </a:extLst>
+                </a:gridCol>
+              </a:tblGrid>
+              <a:tr h="370840">
+                <a:tc>
+                  <a:txBody>
+                    <a:bodyPr/>
+                    <a:lstStyle/>
+                    <a:p>
+                      <a:r>
+                        <a:rPr lang="it-IT" dirty="0"/>
+                        <a:t>Metrica</a:t>
+                      </a:r>
+                    </a:p>
+                  </a:txBody>
+                  <a:tcPr/>
+                </a:tc>
+                <a:tc>
+                  <a:txBody>
+                    <a:bodyPr/>
+                    <a:lstStyle/>
+                    <a:p>
+                      <a:r>
+                        <a:rPr lang="it-IT" dirty="0" err="1"/>
+                        <a:t>AVG_value</a:t>
+                      </a:r>
+                      <a:endParaRPr lang="it-IT" dirty="0"/>
+                    </a:p>
+                  </a:txBody>
+                  <a:tcPr/>
+                </a:tc>
+                <a:tc>
+                  <a:txBody>
+                    <a:bodyPr/>
+                    <a:lstStyle/>
+                    <a:p>
+                      <a:r>
+                        <a:rPr lang="it-IT" dirty="0"/>
+                        <a:t>C.I al 95%</a:t>
+                      </a:r>
+                    </a:p>
+                  </a:txBody>
+                  <a:tcPr/>
+                </a:tc>
+                <a:extLst>
+                  <a:ext uri="{0D108BD9-81ED-4DB2-BD59-A6C34878D82A}">
+                    <a16:rowId xmlns:a16="http://schemas.microsoft.com/office/drawing/2014/main" val="983539462"/>
+                  </a:ext>
+                </a:extLst>
+              </a:tr>
+              <a:tr h="370840">
+                <a:tc>
+                  <a:txBody>
+                    <a:bodyPr/>
+                    <a:lstStyle/>
+                    <a:p>
+                      <a:r>
+                        <a:rPr lang="it-IT" dirty="0"/>
+                        <a:t>EM</a:t>
+                      </a:r>
+                    </a:p>
+                  </a:txBody>
+                  <a:tcPr/>
+                </a:tc>
+                <a:tc>
+                  <a:txBody>
+                    <a:bodyPr/>
+                    <a:lstStyle/>
+                    <a:p>
+                      <a:r>
+                        <a:rPr lang="it-IT" dirty="0"/>
+                        <a:t>0,12</a:t>
+                      </a:r>
+                    </a:p>
+                  </a:txBody>
+                  <a:tcPr/>
+                </a:tc>
+                <a:tc>
+                  <a:txBody>
+                    <a:bodyPr/>
+                    <a:lstStyle/>
+                    <a:p>
+                      <a:r>
+                        <a:rPr lang="it-IT" dirty="0"/>
+                        <a:t>[0.09,0.16]</a:t>
+                      </a:r>
+                    </a:p>
+                  </a:txBody>
+                  <a:tcPr/>
+                </a:tc>
+                <a:extLst>
+                  <a:ext uri="{0D108BD9-81ED-4DB2-BD59-A6C34878D82A}">
+                    <a16:rowId xmlns:a16="http://schemas.microsoft.com/office/drawing/2014/main" val="3800930924"/>
+                  </a:ext>
+                </a:extLst>
+              </a:tr>
+              <a:tr h="370840">
+                <a:tc>
+                  <a:txBody>
+                    <a:bodyPr/>
+                    <a:lstStyle/>
+                    <a:p>
+                      <a:r>
+                        <a:rPr lang="it-IT" dirty="0"/>
+                        <a:t>ED</a:t>
+                      </a:r>
+                    </a:p>
+                  </a:txBody>
+                  <a:tcPr/>
+                </a:tc>
+                <a:tc>
+                  <a:txBody>
+                    <a:bodyPr/>
+                    <a:lstStyle/>
+                    <a:p>
+                      <a:r>
+                        <a:rPr lang="it-IT" dirty="0"/>
+                        <a:t>0,53</a:t>
+                      </a:r>
+                    </a:p>
+                  </a:txBody>
+                  <a:tcPr/>
+                </a:tc>
+                <a:tc>
+                  <a:txBody>
+                    <a:bodyPr/>
+                    <a:lstStyle/>
+                    <a:p>
+                      <a:r>
+                        <a:rPr lang="it-IT" dirty="0"/>
+                        <a:t>[0.50,0.56]</a:t>
+                      </a:r>
+                    </a:p>
+                  </a:txBody>
+                  <a:tcPr/>
+                </a:tc>
+                <a:extLst>
+                  <a:ext uri="{0D108BD9-81ED-4DB2-BD59-A6C34878D82A}">
+                    <a16:rowId xmlns:a16="http://schemas.microsoft.com/office/drawing/2014/main" val="3388615546"/>
+                  </a:ext>
+                </a:extLst>
+              </a:tr>
+              <a:tr h="370840">
+                <a:tc>
+                  <a:txBody>
+                    <a:bodyPr/>
+                    <a:lstStyle/>
+                    <a:p>
+                      <a:r>
+                        <a:rPr lang="it-IT" dirty="0"/>
+                        <a:t>METEOR</a:t>
+                      </a:r>
+                    </a:p>
+                  </a:txBody>
+                  <a:tcPr/>
+                </a:tc>
+                <a:tc>
+                  <a:txBody>
+                    <a:bodyPr/>
+                    <a:lstStyle/>
+                    <a:p>
+                      <a:r>
+                        <a:rPr lang="it-IT" dirty="0"/>
+                        <a:t>0,57</a:t>
+                      </a:r>
+                    </a:p>
+                  </a:txBody>
+                  <a:tcPr/>
+                </a:tc>
+                <a:tc>
+                  <a:txBody>
+                    <a:bodyPr/>
+                    <a:lstStyle/>
+                    <a:p>
+                      <a:r>
+                        <a:rPr lang="it-IT" dirty="0"/>
+                        <a:t>[0.54,0.61]</a:t>
+                      </a:r>
+                    </a:p>
+                  </a:txBody>
+                  <a:tcPr/>
+                </a:tc>
+                <a:extLst>
+                  <a:ext uri="{0D108BD9-81ED-4DB2-BD59-A6C34878D82A}">
+                    <a16:rowId xmlns:a16="http://schemas.microsoft.com/office/drawing/2014/main" val="1622126826"/>
+                  </a:ext>
+                </a:extLst>
+              </a:tr>
+              <a:tr h="370840">
+                <a:tc>
+                  <a:txBody>
+                    <a:bodyPr/>
+                    <a:lstStyle/>
+                    <a:p>
+                      <a:r>
+                        <a:rPr lang="it-IT" dirty="0"/>
+                        <a:t>LCS</a:t>
+                      </a:r>
+                    </a:p>
+                  </a:txBody>
+                  <a:tcPr/>
+                </a:tc>
+                <a:tc>
+                  <a:txBody>
+                    <a:bodyPr/>
+                    <a:lstStyle/>
+                    <a:p>
+                      <a:r>
+                        <a:rPr lang="it-IT" dirty="0"/>
+                        <a:t>0,56</a:t>
+                      </a:r>
+                    </a:p>
+                  </a:txBody>
+                  <a:tcPr/>
+                </a:tc>
+                <a:tc>
+                  <a:txBody>
+                    <a:bodyPr/>
+                    <a:lstStyle/>
+                    <a:p>
+                      <a:r>
+                        <a:rPr lang="it-IT" dirty="0"/>
+                        <a:t>[0.52,0.59]</a:t>
+                      </a:r>
+                    </a:p>
+                  </a:txBody>
+                  <a:tcPr/>
+                </a:tc>
+                <a:extLst>
+                  <a:ext uri="{0D108BD9-81ED-4DB2-BD59-A6C34878D82A}">
+                    <a16:rowId xmlns:a16="http://schemas.microsoft.com/office/drawing/2014/main" val="463369608"/>
+                  </a:ext>
+                </a:extLst>
+              </a:tr>
+              <a:tr h="370840">
+                <a:tc>
+                  <a:txBody>
+                    <a:bodyPr/>
+                    <a:lstStyle/>
+                    <a:p>
+                      <a:r>
+                        <a:rPr lang="it-IT" dirty="0"/>
+                        <a:t>CRYSTAL BLEU</a:t>
+                      </a:r>
+                    </a:p>
+                  </a:txBody>
+                  <a:tcPr/>
+                </a:tc>
+                <a:tc>
+                  <a:txBody>
+                    <a:bodyPr/>
+                    <a:lstStyle/>
+                    <a:p>
+                      <a:r>
+                        <a:rPr lang="it-IT" dirty="0"/>
+                        <a:t>0,36</a:t>
+                      </a:r>
+                    </a:p>
+                  </a:txBody>
+                  <a:tcPr/>
+                </a:tc>
+                <a:tc>
+                  <a:txBody>
+                    <a:bodyPr/>
+                    <a:lstStyle/>
+                    <a:p>
+                      <a:r>
+                        <a:rPr lang="it-IT" dirty="0"/>
+                        <a:t>[0.32,0.40]</a:t>
+                      </a:r>
+                    </a:p>
+                  </a:txBody>
+                  <a:tcPr/>
+                </a:tc>
+                <a:extLst>
+                  <a:ext uri="{0D108BD9-81ED-4DB2-BD59-A6C34878D82A}">
+                    <a16:rowId xmlns:a16="http://schemas.microsoft.com/office/drawing/2014/main" val="3532095965"/>
+                  </a:ext>
+                </a:extLst>
+              </a:tr>
+              <a:tr h="370840">
+                <a:tc>
+                  <a:txBody>
+                    <a:bodyPr/>
+                    <a:lstStyle/>
+                    <a:p>
+                      <a:r>
+                        <a:rPr lang="it-IT" dirty="0"/>
+                        <a:t>SACRE BLEU</a:t>
+                      </a:r>
+                    </a:p>
+                  </a:txBody>
+                  <a:tcPr/>
+                </a:tc>
+                <a:tc>
+                  <a:txBody>
+                    <a:bodyPr/>
+                    <a:lstStyle/>
+                    <a:p>
+                      <a:r>
+                        <a:rPr lang="it-IT" dirty="0"/>
+                        <a:t>0,72</a:t>
+                      </a:r>
+                    </a:p>
+                  </a:txBody>
+                  <a:tcPr/>
+                </a:tc>
+                <a:tc>
+                  <a:txBody>
+                    <a:bodyPr/>
+                    <a:lstStyle/>
+                    <a:p>
+                      <a:r>
+                        <a:rPr lang="it-IT" dirty="0"/>
+                        <a:t>[0.69,0.76]</a:t>
+                      </a:r>
+                    </a:p>
+                  </a:txBody>
+                  <a:tcPr/>
+                </a:tc>
+                <a:extLst>
+                  <a:ext uri="{0D108BD9-81ED-4DB2-BD59-A6C34878D82A}">
+                    <a16:rowId xmlns:a16="http://schemas.microsoft.com/office/drawing/2014/main" val="2553141499"/>
+                  </a:ext>
+                </a:extLst>
+              </a:tr>
+              <a:tr h="370840">
+                <a:tc>
+                  <a:txBody>
+                    <a:bodyPr/>
+                    <a:lstStyle/>
+                    <a:p>
+                      <a:r>
+                        <a:rPr lang="it-IT" dirty="0"/>
+                        <a:t>ROUGE</a:t>
+                      </a:r>
+                    </a:p>
+                  </a:txBody>
+                  <a:tcPr/>
+                </a:tc>
+                <a:tc>
+                  <a:txBody>
+                    <a:bodyPr/>
+                    <a:lstStyle/>
+                    <a:p>
+                      <a:r>
+                        <a:rPr lang="it-IT" dirty="0"/>
+                        <a:t>0,53</a:t>
+                      </a:r>
+                    </a:p>
+                  </a:txBody>
+                  <a:tcPr/>
+                </a:tc>
+                <a:tc>
+                  <a:txBody>
+                    <a:bodyPr/>
+                    <a:lstStyle/>
+                    <a:p>
+                      <a:r>
+                        <a:rPr lang="it-IT" dirty="0"/>
+                        <a:t>[0.49,0.56]</a:t>
+                      </a:r>
+                    </a:p>
+                  </a:txBody>
+                  <a:tcPr/>
+                </a:tc>
+                <a:extLst>
+                  <a:ext uri="{0D108BD9-81ED-4DB2-BD59-A6C34878D82A}">
+                    <a16:rowId xmlns:a16="http://schemas.microsoft.com/office/drawing/2014/main" val="2304673378"/>
+                  </a:ext>
+                </a:extLst>
+              </a:tr>
+            </a:tbl>
+          </a:graphicData>
+        </a:graphic>
+      </p:graphicFrame>
     </p:spTree>
     <p:extLst>
       <p:ext uri="{BB962C8B-B14F-4D97-AF65-F5344CB8AC3E}">
@@ -15444,287 +15879,6 @@
           </a:p>
         </p:txBody>
       </p:sp>
-      <p:graphicFrame>
-        <p:nvGraphicFramePr>
-          <p:cNvPr id="6" name="Tabella 5">
-            <a:extLst>
-              <a:ext uri="{FF2B5EF4-FFF2-40B4-BE49-F238E27FC236}">
-                <a16:creationId xmlns:a16="http://schemas.microsoft.com/office/drawing/2014/main" id="{16861A52-BC14-700E-6FEA-CDD8B5AC21B6}"/>
-              </a:ext>
-            </a:extLst>
-          </p:cNvPr>
-          <p:cNvGraphicFramePr>
-            <a:graphicFrameLocks noGrp="1"/>
-          </p:cNvGraphicFramePr>
-          <p:nvPr>
-            <p:extLst>
-              <p:ext uri="{D42A27DB-BD31-4B8C-83A1-F6EECF244321}">
-                <p14:modId xmlns:p14="http://schemas.microsoft.com/office/powerpoint/2010/main" val="3222845139"/>
-              </p:ext>
-            </p:extLst>
-          </p:nvPr>
-        </p:nvGraphicFramePr>
-        <p:xfrm>
-          <a:off x="708803" y="3849468"/>
-          <a:ext cx="10774393" cy="1005840"/>
-        </p:xfrm>
-        <a:graphic>
-          <a:graphicData uri="http://schemas.openxmlformats.org/drawingml/2006/table">
-            <a:tbl>
-              <a:tblPr firstRow="1" bandRow="1">
-                <a:tableStyleId>{5C22544A-7EE6-4342-B048-85BDC9FD1C3A}</a:tableStyleId>
-              </a:tblPr>
-              <a:tblGrid>
-                <a:gridCol w="1539199">
-                  <a:extLst>
-                    <a:ext uri="{9D8B030D-6E8A-4147-A177-3AD203B41FA5}">
-                      <a16:colId xmlns:a16="http://schemas.microsoft.com/office/drawing/2014/main" val="2447443544"/>
-                    </a:ext>
-                  </a:extLst>
-                </a:gridCol>
-                <a:gridCol w="1539199">
-                  <a:extLst>
-                    <a:ext uri="{9D8B030D-6E8A-4147-A177-3AD203B41FA5}">
-                      <a16:colId xmlns:a16="http://schemas.microsoft.com/office/drawing/2014/main" val="1535496867"/>
-                    </a:ext>
-                  </a:extLst>
-                </a:gridCol>
-                <a:gridCol w="1539199">
-                  <a:extLst>
-                    <a:ext uri="{9D8B030D-6E8A-4147-A177-3AD203B41FA5}">
-                      <a16:colId xmlns:a16="http://schemas.microsoft.com/office/drawing/2014/main" val="3415672651"/>
-                    </a:ext>
-                  </a:extLst>
-                </a:gridCol>
-                <a:gridCol w="1539199">
-                  <a:extLst>
-                    <a:ext uri="{9D8B030D-6E8A-4147-A177-3AD203B41FA5}">
-                      <a16:colId xmlns:a16="http://schemas.microsoft.com/office/drawing/2014/main" val="253070283"/>
-                    </a:ext>
-                  </a:extLst>
-                </a:gridCol>
-                <a:gridCol w="1539199">
-                  <a:extLst>
-                    <a:ext uri="{9D8B030D-6E8A-4147-A177-3AD203B41FA5}">
-                      <a16:colId xmlns:a16="http://schemas.microsoft.com/office/drawing/2014/main" val="2714512924"/>
-                    </a:ext>
-                  </a:extLst>
-                </a:gridCol>
-                <a:gridCol w="1539199">
-                  <a:extLst>
-                    <a:ext uri="{9D8B030D-6E8A-4147-A177-3AD203B41FA5}">
-                      <a16:colId xmlns:a16="http://schemas.microsoft.com/office/drawing/2014/main" val="3119623602"/>
-                    </a:ext>
-                  </a:extLst>
-                </a:gridCol>
-                <a:gridCol w="1539199">
-                  <a:extLst>
-                    <a:ext uri="{9D8B030D-6E8A-4147-A177-3AD203B41FA5}">
-                      <a16:colId xmlns:a16="http://schemas.microsoft.com/office/drawing/2014/main" val="1046693342"/>
-                    </a:ext>
-                  </a:extLst>
-                </a:gridCol>
-              </a:tblGrid>
-              <a:tr h="606533">
-                <a:tc>
-                  <a:txBody>
-                    <a:bodyPr/>
-                    <a:lstStyle/>
-                    <a:p>
-                      <a:r>
-                        <a:rPr lang="it-IT" dirty="0"/>
-                        <a:t>EM</a:t>
-                      </a:r>
-                    </a:p>
-                  </a:txBody>
-                  <a:tcPr/>
-                </a:tc>
-                <a:tc>
-                  <a:txBody>
-                    <a:bodyPr/>
-                    <a:lstStyle/>
-                    <a:p>
-                      <a:r>
-                        <a:rPr lang="it-IT" dirty="0"/>
-                        <a:t>ED</a:t>
-                      </a:r>
-                    </a:p>
-                  </a:txBody>
-                  <a:tcPr/>
-                </a:tc>
-                <a:tc>
-                  <a:txBody>
-                    <a:bodyPr/>
-                    <a:lstStyle/>
-                    <a:p>
-                      <a:r>
-                        <a:rPr lang="it-IT" dirty="0"/>
-                        <a:t>METEOR</a:t>
-                      </a:r>
-                    </a:p>
-                  </a:txBody>
-                  <a:tcPr/>
-                </a:tc>
-                <a:tc>
-                  <a:txBody>
-                    <a:bodyPr/>
-                    <a:lstStyle/>
-                    <a:p>
-                      <a:r>
-                        <a:rPr lang="it-IT" dirty="0"/>
-                        <a:t>LCS</a:t>
-                      </a:r>
-                    </a:p>
-                  </a:txBody>
-                  <a:tcPr/>
-                </a:tc>
-                <a:tc>
-                  <a:txBody>
-                    <a:bodyPr/>
-                    <a:lstStyle/>
-                    <a:p>
-                      <a:r>
-                        <a:rPr lang="it-IT" dirty="0"/>
-                        <a:t>CRYSTAL BLEU</a:t>
-                      </a:r>
-                    </a:p>
-                  </a:txBody>
-                  <a:tcPr/>
-                </a:tc>
-                <a:tc>
-                  <a:txBody>
-                    <a:bodyPr/>
-                    <a:lstStyle/>
-                    <a:p>
-                      <a:r>
-                        <a:rPr lang="it-IT" dirty="0"/>
-                        <a:t>SACRE BLEU</a:t>
-                      </a:r>
-                    </a:p>
-                  </a:txBody>
-                  <a:tcPr/>
-                </a:tc>
-                <a:tc>
-                  <a:txBody>
-                    <a:bodyPr/>
-                    <a:lstStyle/>
-                    <a:p>
-                      <a:r>
-                        <a:rPr lang="it-IT" dirty="0"/>
-                        <a:t>ROUGE</a:t>
-                      </a:r>
-                    </a:p>
-                  </a:txBody>
-                  <a:tcPr/>
-                </a:tc>
-                <a:extLst>
-                  <a:ext uri="{0D108BD9-81ED-4DB2-BD59-A6C34878D82A}">
-                    <a16:rowId xmlns:a16="http://schemas.microsoft.com/office/drawing/2014/main" val="1105077754"/>
-                  </a:ext>
-                </a:extLst>
-              </a:tr>
-              <a:tr h="346590">
-                <a:tc>
-                  <a:txBody>
-                    <a:bodyPr/>
-                    <a:lstStyle/>
-                    <a:p>
-                      <a:r>
-                        <a:rPr lang="it-IT" dirty="0"/>
-                        <a:t>0,51</a:t>
-                      </a:r>
-                    </a:p>
-                  </a:txBody>
-                  <a:tcPr/>
-                </a:tc>
-                <a:tc>
-                  <a:txBody>
-                    <a:bodyPr/>
-                    <a:lstStyle/>
-                    <a:p>
-                      <a:r>
-                        <a:rPr lang="it-IT" dirty="0"/>
-                        <a:t>0,87</a:t>
-                      </a:r>
-                    </a:p>
-                  </a:txBody>
-                  <a:tcPr/>
-                </a:tc>
-                <a:tc>
-                  <a:txBody>
-                    <a:bodyPr/>
-                    <a:lstStyle/>
-                    <a:p>
-                      <a:r>
-                        <a:rPr lang="it-IT" dirty="0"/>
-                        <a:t>0,88</a:t>
-                      </a:r>
-                    </a:p>
-                  </a:txBody>
-                  <a:tcPr/>
-                </a:tc>
-                <a:tc>
-                  <a:txBody>
-                    <a:bodyPr/>
-                    <a:lstStyle/>
-                    <a:p>
-                      <a:r>
-                        <a:rPr lang="it-IT" dirty="0"/>
-                        <a:t>0,88</a:t>
-                      </a:r>
-                    </a:p>
-                  </a:txBody>
-                  <a:tcPr/>
-                </a:tc>
-                <a:tc>
-                  <a:txBody>
-                    <a:bodyPr/>
-                    <a:lstStyle/>
-                    <a:p>
-                      <a:r>
-                        <a:rPr lang="it-IT" dirty="0"/>
-                        <a:t>0,74</a:t>
-                      </a:r>
-                    </a:p>
-                  </a:txBody>
-                  <a:tcPr/>
-                </a:tc>
-                <a:tc>
-                  <a:txBody>
-                    <a:bodyPr/>
-                    <a:lstStyle/>
-                    <a:p>
-                      <a:r>
-                        <a:rPr lang="it-IT" dirty="0"/>
-                        <a:t>0,92</a:t>
-                      </a:r>
-                    </a:p>
-                  </a:txBody>
-                  <a:tcPr/>
-                </a:tc>
-                <a:tc>
-                  <a:txBody>
-                    <a:bodyPr/>
-                    <a:lstStyle/>
-                    <a:p>
-                      <a:r>
-                        <a:rPr lang="it-IT" dirty="0"/>
-                        <a:t>0,83</a:t>
-                      </a:r>
-                    </a:p>
-                  </a:txBody>
-                  <a:tcPr/>
-                </a:tc>
-                <a:extLst>
-                  <a:ext uri="{0D108BD9-81ED-4DB2-BD59-A6C34878D82A}">
-                    <a16:rowId xmlns:a16="http://schemas.microsoft.com/office/drawing/2014/main" val="2133996632"/>
-                  </a:ext>
-                </a:extLst>
-              </a:tr>
-            </a:tbl>
-          </a:graphicData>
-        </a:graphic>
-      </p:graphicFrame>
       <p:sp>
         <p:nvSpPr>
           <p:cNvPr id="7" name="Content Placeholder 5">
@@ -15792,6 +15946,432 @@
           </a:p>
         </p:txBody>
       </p:sp>
+      <p:graphicFrame>
+        <p:nvGraphicFramePr>
+          <p:cNvPr id="3" name="Tabella 2">
+            <a:extLst>
+              <a:ext uri="{FF2B5EF4-FFF2-40B4-BE49-F238E27FC236}">
+                <a16:creationId xmlns:a16="http://schemas.microsoft.com/office/drawing/2014/main" id="{C18E7B09-E91B-8A12-E0C5-DA2509D55640}"/>
+              </a:ext>
+            </a:extLst>
+          </p:cNvPr>
+          <p:cNvGraphicFramePr>
+            <a:graphicFrameLocks noGrp="1"/>
+          </p:cNvGraphicFramePr>
+          <p:nvPr>
+            <p:extLst>
+              <p:ext uri="{D42A27DB-BD31-4B8C-83A1-F6EECF244321}">
+                <p14:modId xmlns:p14="http://schemas.microsoft.com/office/powerpoint/2010/main" val="3340964139"/>
+              </p:ext>
+            </p:extLst>
+          </p:nvPr>
+        </p:nvGraphicFramePr>
+        <p:xfrm>
+          <a:off x="1857256" y="3174124"/>
+          <a:ext cx="8127999" cy="2966720"/>
+        </p:xfrm>
+        <a:graphic>
+          <a:graphicData uri="http://schemas.openxmlformats.org/drawingml/2006/table">
+            <a:tbl>
+              <a:tblPr firstRow="1" bandRow="1">
+                <a:tableStyleId>{5C22544A-7EE6-4342-B048-85BDC9FD1C3A}</a:tableStyleId>
+              </a:tblPr>
+              <a:tblGrid>
+                <a:gridCol w="2709333">
+                  <a:extLst>
+                    <a:ext uri="{9D8B030D-6E8A-4147-A177-3AD203B41FA5}">
+                      <a16:colId xmlns:a16="http://schemas.microsoft.com/office/drawing/2014/main" val="3957489615"/>
+                    </a:ext>
+                  </a:extLst>
+                </a:gridCol>
+                <a:gridCol w="2709333">
+                  <a:extLst>
+                    <a:ext uri="{9D8B030D-6E8A-4147-A177-3AD203B41FA5}">
+                      <a16:colId xmlns:a16="http://schemas.microsoft.com/office/drawing/2014/main" val="2605579497"/>
+                    </a:ext>
+                  </a:extLst>
+                </a:gridCol>
+                <a:gridCol w="2709333">
+                  <a:extLst>
+                    <a:ext uri="{9D8B030D-6E8A-4147-A177-3AD203B41FA5}">
+                      <a16:colId xmlns:a16="http://schemas.microsoft.com/office/drawing/2014/main" val="2843452885"/>
+                    </a:ext>
+                  </a:extLst>
+                </a:gridCol>
+              </a:tblGrid>
+              <a:tr h="370840">
+                <a:tc>
+                  <a:txBody>
+                    <a:bodyPr/>
+                    <a:lstStyle/>
+                    <a:p>
+                      <a:r>
+                        <a:rPr lang="it-IT" dirty="0"/>
+                        <a:t>Metrica</a:t>
+                      </a:r>
+                    </a:p>
+                  </a:txBody>
+                  <a:tcPr/>
+                </a:tc>
+                <a:tc>
+                  <a:txBody>
+                    <a:bodyPr/>
+                    <a:lstStyle/>
+                    <a:p>
+                      <a:r>
+                        <a:rPr lang="it-IT" dirty="0" err="1"/>
+                        <a:t>AVG_value</a:t>
+                      </a:r>
+                      <a:endParaRPr lang="it-IT" dirty="0"/>
+                    </a:p>
+                  </a:txBody>
+                  <a:tcPr/>
+                </a:tc>
+                <a:tc>
+                  <a:txBody>
+                    <a:bodyPr/>
+                    <a:lstStyle/>
+                    <a:p>
+                      <a:r>
+                        <a:rPr lang="it-IT" dirty="0"/>
+                        <a:t>C.I al 95%</a:t>
+                      </a:r>
+                    </a:p>
+                  </a:txBody>
+                  <a:tcPr/>
+                </a:tc>
+                <a:extLst>
+                  <a:ext uri="{0D108BD9-81ED-4DB2-BD59-A6C34878D82A}">
+                    <a16:rowId xmlns:a16="http://schemas.microsoft.com/office/drawing/2014/main" val="983539462"/>
+                  </a:ext>
+                </a:extLst>
+              </a:tr>
+              <a:tr h="370840">
+                <a:tc>
+                  <a:txBody>
+                    <a:bodyPr/>
+                    <a:lstStyle/>
+                    <a:p>
+                      <a:r>
+                        <a:rPr lang="it-IT" dirty="0"/>
+                        <a:t>EM</a:t>
+                      </a:r>
+                    </a:p>
+                  </a:txBody>
+                  <a:tcPr/>
+                </a:tc>
+                <a:tc>
+                  <a:txBody>
+                    <a:bodyPr/>
+                    <a:lstStyle/>
+                    <a:p>
+                      <a:r>
+                        <a:rPr lang="it-IT" dirty="0"/>
+                        <a:t>0,51</a:t>
+                      </a:r>
+                    </a:p>
+                  </a:txBody>
+                  <a:tcPr/>
+                </a:tc>
+                <a:tc>
+                  <a:txBody>
+                    <a:bodyPr/>
+                    <a:lstStyle/>
+                    <a:p>
+                      <a:r>
+                        <a:rPr lang="it-IT" dirty="0"/>
+                        <a:t>[0.45,0.56]</a:t>
+                      </a:r>
+                    </a:p>
+                  </a:txBody>
+                  <a:tcPr/>
+                </a:tc>
+                <a:extLst>
+                  <a:ext uri="{0D108BD9-81ED-4DB2-BD59-A6C34878D82A}">
+                    <a16:rowId xmlns:a16="http://schemas.microsoft.com/office/drawing/2014/main" val="3800930924"/>
+                  </a:ext>
+                </a:extLst>
+              </a:tr>
+              <a:tr h="370840">
+                <a:tc>
+                  <a:txBody>
+                    <a:bodyPr/>
+                    <a:lstStyle/>
+                    <a:p>
+                      <a:r>
+                        <a:rPr lang="it-IT" dirty="0"/>
+                        <a:t>ED</a:t>
+                      </a:r>
+                    </a:p>
+                  </a:txBody>
+                  <a:tcPr/>
+                </a:tc>
+                <a:tc>
+                  <a:txBody>
+                    <a:bodyPr/>
+                    <a:lstStyle/>
+                    <a:p>
+                      <a:r>
+                        <a:rPr lang="it-IT" dirty="0"/>
+                        <a:t>0,87</a:t>
+                      </a:r>
+                    </a:p>
+                  </a:txBody>
+                  <a:tcPr/>
+                </a:tc>
+                <a:tc>
+                  <a:txBody>
+                    <a:bodyPr/>
+                    <a:lstStyle/>
+                    <a:p>
+                      <a:r>
+                        <a:rPr lang="it-IT" dirty="0"/>
+                        <a:t>[0.84,0.89]</a:t>
+                      </a:r>
+                    </a:p>
+                  </a:txBody>
+                  <a:tcPr/>
+                </a:tc>
+                <a:extLst>
+                  <a:ext uri="{0D108BD9-81ED-4DB2-BD59-A6C34878D82A}">
+                    <a16:rowId xmlns:a16="http://schemas.microsoft.com/office/drawing/2014/main" val="3388615546"/>
+                  </a:ext>
+                </a:extLst>
+              </a:tr>
+              <a:tr h="370840">
+                <a:tc>
+                  <a:txBody>
+                    <a:bodyPr/>
+                    <a:lstStyle/>
+                    <a:p>
+                      <a:r>
+                        <a:rPr lang="it-IT" dirty="0"/>
+                        <a:t>METEOR</a:t>
+                      </a:r>
+                    </a:p>
+                  </a:txBody>
+                  <a:tcPr/>
+                </a:tc>
+                <a:tc>
+                  <a:txBody>
+                    <a:bodyPr/>
+                    <a:lstStyle/>
+                    <a:p>
+                      <a:r>
+                        <a:rPr lang="it-IT" dirty="0"/>
+                        <a:t>0,88</a:t>
+                      </a:r>
+                    </a:p>
+                  </a:txBody>
+                  <a:tcPr/>
+                </a:tc>
+                <a:tc>
+                  <a:txBody>
+                    <a:bodyPr/>
+                    <a:lstStyle/>
+                    <a:p>
+                      <a:r>
+                        <a:rPr lang="it-IT" dirty="0"/>
+                        <a:t>[0.86,0.9]</a:t>
+                      </a:r>
+                    </a:p>
+                  </a:txBody>
+                  <a:tcPr/>
+                </a:tc>
+                <a:extLst>
+                  <a:ext uri="{0D108BD9-81ED-4DB2-BD59-A6C34878D82A}">
+                    <a16:rowId xmlns:a16="http://schemas.microsoft.com/office/drawing/2014/main" val="1622126826"/>
+                  </a:ext>
+                </a:extLst>
+              </a:tr>
+              <a:tr h="370840">
+                <a:tc>
+                  <a:txBody>
+                    <a:bodyPr/>
+                    <a:lstStyle/>
+                    <a:p>
+                      <a:r>
+                        <a:rPr lang="it-IT" dirty="0"/>
+                        <a:t>LCS</a:t>
+                      </a:r>
+                    </a:p>
+                  </a:txBody>
+                  <a:tcPr/>
+                </a:tc>
+                <a:tc>
+                  <a:txBody>
+                    <a:bodyPr/>
+                    <a:lstStyle/>
+                    <a:p>
+                      <a:r>
+                        <a:rPr lang="it-IT" dirty="0"/>
+                        <a:t>0,88</a:t>
+                      </a:r>
+                    </a:p>
+                  </a:txBody>
+                  <a:tcPr/>
+                </a:tc>
+                <a:tc>
+                  <a:txBody>
+                    <a:bodyPr/>
+                    <a:lstStyle/>
+                    <a:p>
+                      <a:r>
+                        <a:rPr lang="it-IT" dirty="0"/>
+                        <a:t>[0.86,0.9]</a:t>
+                      </a:r>
+                    </a:p>
+                  </a:txBody>
+                  <a:tcPr/>
+                </a:tc>
+                <a:extLst>
+                  <a:ext uri="{0D108BD9-81ED-4DB2-BD59-A6C34878D82A}">
+                    <a16:rowId xmlns:a16="http://schemas.microsoft.com/office/drawing/2014/main" val="463369608"/>
+                  </a:ext>
+                </a:extLst>
+              </a:tr>
+              <a:tr h="370840">
+                <a:tc>
+                  <a:txBody>
+                    <a:bodyPr/>
+                    <a:lstStyle/>
+                    <a:p>
+                      <a:r>
+                        <a:rPr lang="it-IT" dirty="0"/>
+                        <a:t>CRYSTAL BLEU</a:t>
+                      </a:r>
+                    </a:p>
+                  </a:txBody>
+                  <a:tcPr/>
+                </a:tc>
+                <a:tc>
+                  <a:txBody>
+                    <a:bodyPr/>
+                    <a:lstStyle/>
+                    <a:p>
+                      <a:r>
+                        <a:rPr lang="it-IT" dirty="0"/>
+                        <a:t>0,74</a:t>
+                      </a:r>
+                    </a:p>
+                  </a:txBody>
+                  <a:tcPr/>
+                </a:tc>
+                <a:tc>
+                  <a:txBody>
+                    <a:bodyPr/>
+                    <a:lstStyle/>
+                    <a:p>
+                      <a:r>
+                        <a:rPr lang="it-IT" dirty="0"/>
+                        <a:t>[0.71,0.79]</a:t>
+                      </a:r>
+                    </a:p>
+                  </a:txBody>
+                  <a:tcPr/>
+                </a:tc>
+                <a:extLst>
+                  <a:ext uri="{0D108BD9-81ED-4DB2-BD59-A6C34878D82A}">
+                    <a16:rowId xmlns:a16="http://schemas.microsoft.com/office/drawing/2014/main" val="3532095965"/>
+                  </a:ext>
+                </a:extLst>
+              </a:tr>
+              <a:tr h="370840">
+                <a:tc>
+                  <a:txBody>
+                    <a:bodyPr/>
+                    <a:lstStyle/>
+                    <a:p>
+                      <a:r>
+                        <a:rPr lang="it-IT" dirty="0"/>
+                        <a:t>SACRE BLEU</a:t>
+                      </a:r>
+                    </a:p>
+                  </a:txBody>
+                  <a:tcPr/>
+                </a:tc>
+                <a:tc>
+                  <a:txBody>
+                    <a:bodyPr/>
+                    <a:lstStyle/>
+                    <a:p>
+                      <a:r>
+                        <a:rPr lang="it-IT" dirty="0"/>
+                        <a:t>0,92</a:t>
+                      </a:r>
+                    </a:p>
+                  </a:txBody>
+                  <a:tcPr/>
+                </a:tc>
+                <a:tc>
+                  <a:txBody>
+                    <a:bodyPr/>
+                    <a:lstStyle/>
+                    <a:p>
+                      <a:r>
+                        <a:rPr lang="it-IT" dirty="0"/>
+                        <a:t>[0.92,0.95]</a:t>
+                      </a:r>
+                    </a:p>
+                  </a:txBody>
+                  <a:tcPr/>
+                </a:tc>
+                <a:extLst>
+                  <a:ext uri="{0D108BD9-81ED-4DB2-BD59-A6C34878D82A}">
+                    <a16:rowId xmlns:a16="http://schemas.microsoft.com/office/drawing/2014/main" val="2553141499"/>
+                  </a:ext>
+                </a:extLst>
+              </a:tr>
+              <a:tr h="370840">
+                <a:tc>
+                  <a:txBody>
+                    <a:bodyPr/>
+                    <a:lstStyle/>
+                    <a:p>
+                      <a:r>
+                        <a:rPr lang="it-IT" dirty="0"/>
+                        <a:t>ROUGE</a:t>
+                      </a:r>
+                    </a:p>
+                  </a:txBody>
+                  <a:tcPr/>
+                </a:tc>
+                <a:tc>
+                  <a:txBody>
+                    <a:bodyPr/>
+                    <a:lstStyle/>
+                    <a:p>
+                      <a:r>
+                        <a:rPr lang="it-IT" dirty="0"/>
+                        <a:t>0,83</a:t>
+                      </a:r>
+                    </a:p>
+                  </a:txBody>
+                  <a:tcPr/>
+                </a:tc>
+                <a:tc>
+                  <a:txBody>
+                    <a:bodyPr/>
+                    <a:lstStyle/>
+                    <a:p>
+                      <a:r>
+                        <a:rPr lang="it-IT" dirty="0"/>
+                        <a:t>[0.84,0.88]</a:t>
+                      </a:r>
+                    </a:p>
+                  </a:txBody>
+                  <a:tcPr/>
+                </a:tc>
+                <a:extLst>
+                  <a:ext uri="{0D108BD9-81ED-4DB2-BD59-A6C34878D82A}">
+                    <a16:rowId xmlns:a16="http://schemas.microsoft.com/office/drawing/2014/main" val="2304673378"/>
+                  </a:ext>
+                </a:extLst>
+              </a:tr>
+            </a:tbl>
+          </a:graphicData>
+        </a:graphic>
+      </p:graphicFrame>
     </p:spTree>
     <p:extLst>
       <p:ext uri="{BB962C8B-B14F-4D97-AF65-F5344CB8AC3E}">
@@ -19288,287 +19868,6 @@
           </a:p>
         </p:txBody>
       </p:sp>
-      <p:graphicFrame>
-        <p:nvGraphicFramePr>
-          <p:cNvPr id="6" name="Tabella 5">
-            <a:extLst>
-              <a:ext uri="{FF2B5EF4-FFF2-40B4-BE49-F238E27FC236}">
-                <a16:creationId xmlns:a16="http://schemas.microsoft.com/office/drawing/2014/main" id="{89CF3D45-D4F2-A1C2-58DC-64FB3A2DCFF5}"/>
-              </a:ext>
-            </a:extLst>
-          </p:cNvPr>
-          <p:cNvGraphicFramePr>
-            <a:graphicFrameLocks noGrp="1"/>
-          </p:cNvGraphicFramePr>
-          <p:nvPr>
-            <p:extLst>
-              <p:ext uri="{D42A27DB-BD31-4B8C-83A1-F6EECF244321}">
-                <p14:modId xmlns:p14="http://schemas.microsoft.com/office/powerpoint/2010/main" val="454668817"/>
-              </p:ext>
-            </p:extLst>
-          </p:nvPr>
-        </p:nvGraphicFramePr>
-        <p:xfrm>
-          <a:off x="708803" y="3849468"/>
-          <a:ext cx="10774393" cy="1005840"/>
-        </p:xfrm>
-        <a:graphic>
-          <a:graphicData uri="http://schemas.openxmlformats.org/drawingml/2006/table">
-            <a:tbl>
-              <a:tblPr firstRow="1" bandRow="1">
-                <a:tableStyleId>{5C22544A-7EE6-4342-B048-85BDC9FD1C3A}</a:tableStyleId>
-              </a:tblPr>
-              <a:tblGrid>
-                <a:gridCol w="1539199">
-                  <a:extLst>
-                    <a:ext uri="{9D8B030D-6E8A-4147-A177-3AD203B41FA5}">
-                      <a16:colId xmlns:a16="http://schemas.microsoft.com/office/drawing/2014/main" val="2447443544"/>
-                    </a:ext>
-                  </a:extLst>
-                </a:gridCol>
-                <a:gridCol w="1539199">
-                  <a:extLst>
-                    <a:ext uri="{9D8B030D-6E8A-4147-A177-3AD203B41FA5}">
-                      <a16:colId xmlns:a16="http://schemas.microsoft.com/office/drawing/2014/main" val="1535496867"/>
-                    </a:ext>
-                  </a:extLst>
-                </a:gridCol>
-                <a:gridCol w="1539199">
-                  <a:extLst>
-                    <a:ext uri="{9D8B030D-6E8A-4147-A177-3AD203B41FA5}">
-                      <a16:colId xmlns:a16="http://schemas.microsoft.com/office/drawing/2014/main" val="3415672651"/>
-                    </a:ext>
-                  </a:extLst>
-                </a:gridCol>
-                <a:gridCol w="1539199">
-                  <a:extLst>
-                    <a:ext uri="{9D8B030D-6E8A-4147-A177-3AD203B41FA5}">
-                      <a16:colId xmlns:a16="http://schemas.microsoft.com/office/drawing/2014/main" val="253070283"/>
-                    </a:ext>
-                  </a:extLst>
-                </a:gridCol>
-                <a:gridCol w="1539199">
-                  <a:extLst>
-                    <a:ext uri="{9D8B030D-6E8A-4147-A177-3AD203B41FA5}">
-                      <a16:colId xmlns:a16="http://schemas.microsoft.com/office/drawing/2014/main" val="2714512924"/>
-                    </a:ext>
-                  </a:extLst>
-                </a:gridCol>
-                <a:gridCol w="1539199">
-                  <a:extLst>
-                    <a:ext uri="{9D8B030D-6E8A-4147-A177-3AD203B41FA5}">
-                      <a16:colId xmlns:a16="http://schemas.microsoft.com/office/drawing/2014/main" val="3119623602"/>
-                    </a:ext>
-                  </a:extLst>
-                </a:gridCol>
-                <a:gridCol w="1539199">
-                  <a:extLst>
-                    <a:ext uri="{9D8B030D-6E8A-4147-A177-3AD203B41FA5}">
-                      <a16:colId xmlns:a16="http://schemas.microsoft.com/office/drawing/2014/main" val="1046693342"/>
-                    </a:ext>
-                  </a:extLst>
-                </a:gridCol>
-              </a:tblGrid>
-              <a:tr h="606533">
-                <a:tc>
-                  <a:txBody>
-                    <a:bodyPr/>
-                    <a:lstStyle/>
-                    <a:p>
-                      <a:r>
-                        <a:rPr lang="it-IT" dirty="0"/>
-                        <a:t>EM</a:t>
-                      </a:r>
-                    </a:p>
-                  </a:txBody>
-                  <a:tcPr/>
-                </a:tc>
-                <a:tc>
-                  <a:txBody>
-                    <a:bodyPr/>
-                    <a:lstStyle/>
-                    <a:p>
-                      <a:r>
-                        <a:rPr lang="it-IT" dirty="0"/>
-                        <a:t>ED</a:t>
-                      </a:r>
-                    </a:p>
-                  </a:txBody>
-                  <a:tcPr/>
-                </a:tc>
-                <a:tc>
-                  <a:txBody>
-                    <a:bodyPr/>
-                    <a:lstStyle/>
-                    <a:p>
-                      <a:r>
-                        <a:rPr lang="it-IT" dirty="0"/>
-                        <a:t>METEOR</a:t>
-                      </a:r>
-                    </a:p>
-                  </a:txBody>
-                  <a:tcPr/>
-                </a:tc>
-                <a:tc>
-                  <a:txBody>
-                    <a:bodyPr/>
-                    <a:lstStyle/>
-                    <a:p>
-                      <a:r>
-                        <a:rPr lang="it-IT" dirty="0"/>
-                        <a:t>LCS</a:t>
-                      </a:r>
-                    </a:p>
-                  </a:txBody>
-                  <a:tcPr/>
-                </a:tc>
-                <a:tc>
-                  <a:txBody>
-                    <a:bodyPr/>
-                    <a:lstStyle/>
-                    <a:p>
-                      <a:r>
-                        <a:rPr lang="it-IT" dirty="0"/>
-                        <a:t>CRYSTAL BLEU</a:t>
-                      </a:r>
-                    </a:p>
-                  </a:txBody>
-                  <a:tcPr/>
-                </a:tc>
-                <a:tc>
-                  <a:txBody>
-                    <a:bodyPr/>
-                    <a:lstStyle/>
-                    <a:p>
-                      <a:r>
-                        <a:rPr lang="it-IT" dirty="0"/>
-                        <a:t>SACRE BLEU</a:t>
-                      </a:r>
-                    </a:p>
-                  </a:txBody>
-                  <a:tcPr/>
-                </a:tc>
-                <a:tc>
-                  <a:txBody>
-                    <a:bodyPr/>
-                    <a:lstStyle/>
-                    <a:p>
-                      <a:r>
-                        <a:rPr lang="it-IT" dirty="0"/>
-                        <a:t>ROUGE</a:t>
-                      </a:r>
-                    </a:p>
-                  </a:txBody>
-                  <a:tcPr/>
-                </a:tc>
-                <a:extLst>
-                  <a:ext uri="{0D108BD9-81ED-4DB2-BD59-A6C34878D82A}">
-                    <a16:rowId xmlns:a16="http://schemas.microsoft.com/office/drawing/2014/main" val="1105077754"/>
-                  </a:ext>
-                </a:extLst>
-              </a:tr>
-              <a:tr h="346590">
-                <a:tc>
-                  <a:txBody>
-                    <a:bodyPr/>
-                    <a:lstStyle/>
-                    <a:p>
-                      <a:r>
-                        <a:rPr lang="it-IT" dirty="0"/>
-                        <a:t>0,28</a:t>
-                      </a:r>
-                    </a:p>
-                  </a:txBody>
-                  <a:tcPr/>
-                </a:tc>
-                <a:tc>
-                  <a:txBody>
-                    <a:bodyPr/>
-                    <a:lstStyle/>
-                    <a:p>
-                      <a:r>
-                        <a:rPr lang="it-IT" dirty="0"/>
-                        <a:t>0,76</a:t>
-                      </a:r>
-                    </a:p>
-                  </a:txBody>
-                  <a:tcPr/>
-                </a:tc>
-                <a:tc>
-                  <a:txBody>
-                    <a:bodyPr/>
-                    <a:lstStyle/>
-                    <a:p>
-                      <a:r>
-                        <a:rPr lang="it-IT" dirty="0"/>
-                        <a:t>0,80</a:t>
-                      </a:r>
-                    </a:p>
-                  </a:txBody>
-                  <a:tcPr/>
-                </a:tc>
-                <a:tc>
-                  <a:txBody>
-                    <a:bodyPr/>
-                    <a:lstStyle/>
-                    <a:p>
-                      <a:r>
-                        <a:rPr lang="it-IT" dirty="0"/>
-                        <a:t>0,78</a:t>
-                      </a:r>
-                    </a:p>
-                  </a:txBody>
-                  <a:tcPr/>
-                </a:tc>
-                <a:tc>
-                  <a:txBody>
-                    <a:bodyPr/>
-                    <a:lstStyle/>
-                    <a:p>
-                      <a:r>
-                        <a:rPr lang="it-IT" dirty="0"/>
-                        <a:t>0,60</a:t>
-                      </a:r>
-                    </a:p>
-                  </a:txBody>
-                  <a:tcPr/>
-                </a:tc>
-                <a:tc>
-                  <a:txBody>
-                    <a:bodyPr/>
-                    <a:lstStyle/>
-                    <a:p>
-                      <a:r>
-                        <a:rPr lang="it-IT" dirty="0"/>
-                        <a:t>0,88</a:t>
-                      </a:r>
-                    </a:p>
-                  </a:txBody>
-                  <a:tcPr/>
-                </a:tc>
-                <a:tc>
-                  <a:txBody>
-                    <a:bodyPr/>
-                    <a:lstStyle/>
-                    <a:p>
-                      <a:r>
-                        <a:rPr lang="it-IT" dirty="0"/>
-                        <a:t>0,69</a:t>
-                      </a:r>
-                    </a:p>
-                  </a:txBody>
-                  <a:tcPr/>
-                </a:tc>
-                <a:extLst>
-                  <a:ext uri="{0D108BD9-81ED-4DB2-BD59-A6C34878D82A}">
-                    <a16:rowId xmlns:a16="http://schemas.microsoft.com/office/drawing/2014/main" val="2133996632"/>
-                  </a:ext>
-                </a:extLst>
-              </a:tr>
-            </a:tbl>
-          </a:graphicData>
-        </a:graphic>
-      </p:graphicFrame>
       <p:sp>
         <p:nvSpPr>
           <p:cNvPr id="7" name="Content Placeholder 5">
@@ -19636,6 +19935,432 @@
           </a:p>
         </p:txBody>
       </p:sp>
+      <p:graphicFrame>
+        <p:nvGraphicFramePr>
+          <p:cNvPr id="3" name="Tabella 2">
+            <a:extLst>
+              <a:ext uri="{FF2B5EF4-FFF2-40B4-BE49-F238E27FC236}">
+                <a16:creationId xmlns:a16="http://schemas.microsoft.com/office/drawing/2014/main" id="{1D2A2D35-6F3B-14C9-DDD8-F053DA23860E}"/>
+              </a:ext>
+            </a:extLst>
+          </p:cNvPr>
+          <p:cNvGraphicFramePr>
+            <a:graphicFrameLocks noGrp="1"/>
+          </p:cNvGraphicFramePr>
+          <p:nvPr>
+            <p:extLst>
+              <p:ext uri="{D42A27DB-BD31-4B8C-83A1-F6EECF244321}">
+                <p14:modId xmlns:p14="http://schemas.microsoft.com/office/powerpoint/2010/main" val="1846475932"/>
+              </p:ext>
+            </p:extLst>
+          </p:nvPr>
+        </p:nvGraphicFramePr>
+        <p:xfrm>
+          <a:off x="2346029" y="3429000"/>
+          <a:ext cx="8127999" cy="2966720"/>
+        </p:xfrm>
+        <a:graphic>
+          <a:graphicData uri="http://schemas.openxmlformats.org/drawingml/2006/table">
+            <a:tbl>
+              <a:tblPr firstRow="1" bandRow="1">
+                <a:tableStyleId>{5C22544A-7EE6-4342-B048-85BDC9FD1C3A}</a:tableStyleId>
+              </a:tblPr>
+              <a:tblGrid>
+                <a:gridCol w="2709333">
+                  <a:extLst>
+                    <a:ext uri="{9D8B030D-6E8A-4147-A177-3AD203B41FA5}">
+                      <a16:colId xmlns:a16="http://schemas.microsoft.com/office/drawing/2014/main" val="3957489615"/>
+                    </a:ext>
+                  </a:extLst>
+                </a:gridCol>
+                <a:gridCol w="2709333">
+                  <a:extLst>
+                    <a:ext uri="{9D8B030D-6E8A-4147-A177-3AD203B41FA5}">
+                      <a16:colId xmlns:a16="http://schemas.microsoft.com/office/drawing/2014/main" val="2605579497"/>
+                    </a:ext>
+                  </a:extLst>
+                </a:gridCol>
+                <a:gridCol w="2709333">
+                  <a:extLst>
+                    <a:ext uri="{9D8B030D-6E8A-4147-A177-3AD203B41FA5}">
+                      <a16:colId xmlns:a16="http://schemas.microsoft.com/office/drawing/2014/main" val="2843452885"/>
+                    </a:ext>
+                  </a:extLst>
+                </a:gridCol>
+              </a:tblGrid>
+              <a:tr h="370840">
+                <a:tc>
+                  <a:txBody>
+                    <a:bodyPr/>
+                    <a:lstStyle/>
+                    <a:p>
+                      <a:r>
+                        <a:rPr lang="it-IT" dirty="0"/>
+                        <a:t>Metrica</a:t>
+                      </a:r>
+                    </a:p>
+                  </a:txBody>
+                  <a:tcPr/>
+                </a:tc>
+                <a:tc>
+                  <a:txBody>
+                    <a:bodyPr/>
+                    <a:lstStyle/>
+                    <a:p>
+                      <a:r>
+                        <a:rPr lang="it-IT" dirty="0" err="1"/>
+                        <a:t>AVG_value</a:t>
+                      </a:r>
+                      <a:endParaRPr lang="it-IT" dirty="0"/>
+                    </a:p>
+                  </a:txBody>
+                  <a:tcPr/>
+                </a:tc>
+                <a:tc>
+                  <a:txBody>
+                    <a:bodyPr/>
+                    <a:lstStyle/>
+                    <a:p>
+                      <a:r>
+                        <a:rPr lang="it-IT" dirty="0"/>
+                        <a:t>C.I al 95%</a:t>
+                      </a:r>
+                    </a:p>
+                  </a:txBody>
+                  <a:tcPr/>
+                </a:tc>
+                <a:extLst>
+                  <a:ext uri="{0D108BD9-81ED-4DB2-BD59-A6C34878D82A}">
+                    <a16:rowId xmlns:a16="http://schemas.microsoft.com/office/drawing/2014/main" val="983539462"/>
+                  </a:ext>
+                </a:extLst>
+              </a:tr>
+              <a:tr h="370840">
+                <a:tc>
+                  <a:txBody>
+                    <a:bodyPr/>
+                    <a:lstStyle/>
+                    <a:p>
+                      <a:r>
+                        <a:rPr lang="it-IT" dirty="0"/>
+                        <a:t>EM</a:t>
+                      </a:r>
+                    </a:p>
+                  </a:txBody>
+                  <a:tcPr/>
+                </a:tc>
+                <a:tc>
+                  <a:txBody>
+                    <a:bodyPr/>
+                    <a:lstStyle/>
+                    <a:p>
+                      <a:r>
+                        <a:rPr lang="it-IT" dirty="0"/>
+                        <a:t>0,28</a:t>
+                      </a:r>
+                    </a:p>
+                  </a:txBody>
+                  <a:tcPr/>
+                </a:tc>
+                <a:tc>
+                  <a:txBody>
+                    <a:bodyPr/>
+                    <a:lstStyle/>
+                    <a:p>
+                      <a:r>
+                        <a:rPr lang="it-IT" dirty="0"/>
+                        <a:t>[0.23,0.33]</a:t>
+                      </a:r>
+                    </a:p>
+                  </a:txBody>
+                  <a:tcPr/>
+                </a:tc>
+                <a:extLst>
+                  <a:ext uri="{0D108BD9-81ED-4DB2-BD59-A6C34878D82A}">
+                    <a16:rowId xmlns:a16="http://schemas.microsoft.com/office/drawing/2014/main" val="3800930924"/>
+                  </a:ext>
+                </a:extLst>
+              </a:tr>
+              <a:tr h="370840">
+                <a:tc>
+                  <a:txBody>
+                    <a:bodyPr/>
+                    <a:lstStyle/>
+                    <a:p>
+                      <a:r>
+                        <a:rPr lang="it-IT" dirty="0"/>
+                        <a:t>ED</a:t>
+                      </a:r>
+                    </a:p>
+                  </a:txBody>
+                  <a:tcPr/>
+                </a:tc>
+                <a:tc>
+                  <a:txBody>
+                    <a:bodyPr/>
+                    <a:lstStyle/>
+                    <a:p>
+                      <a:r>
+                        <a:rPr lang="it-IT" dirty="0"/>
+                        <a:t>0,76</a:t>
+                      </a:r>
+                    </a:p>
+                  </a:txBody>
+                  <a:tcPr/>
+                </a:tc>
+                <a:tc>
+                  <a:txBody>
+                    <a:bodyPr/>
+                    <a:lstStyle/>
+                    <a:p>
+                      <a:r>
+                        <a:rPr lang="it-IT" dirty="0"/>
+                        <a:t>[0.74,0.79]</a:t>
+                      </a:r>
+                    </a:p>
+                  </a:txBody>
+                  <a:tcPr/>
+                </a:tc>
+                <a:extLst>
+                  <a:ext uri="{0D108BD9-81ED-4DB2-BD59-A6C34878D82A}">
+                    <a16:rowId xmlns:a16="http://schemas.microsoft.com/office/drawing/2014/main" val="3388615546"/>
+                  </a:ext>
+                </a:extLst>
+              </a:tr>
+              <a:tr h="370840">
+                <a:tc>
+                  <a:txBody>
+                    <a:bodyPr/>
+                    <a:lstStyle/>
+                    <a:p>
+                      <a:r>
+                        <a:rPr lang="it-IT" dirty="0"/>
+                        <a:t>METEOR</a:t>
+                      </a:r>
+                    </a:p>
+                  </a:txBody>
+                  <a:tcPr/>
+                </a:tc>
+                <a:tc>
+                  <a:txBody>
+                    <a:bodyPr/>
+                    <a:lstStyle/>
+                    <a:p>
+                      <a:r>
+                        <a:rPr lang="it-IT" dirty="0"/>
+                        <a:t>0,80</a:t>
+                      </a:r>
+                    </a:p>
+                  </a:txBody>
+                  <a:tcPr/>
+                </a:tc>
+                <a:tc>
+                  <a:txBody>
+                    <a:bodyPr/>
+                    <a:lstStyle/>
+                    <a:p>
+                      <a:r>
+                        <a:rPr lang="it-IT" dirty="0"/>
+                        <a:t>[0.77,0.83]</a:t>
+                      </a:r>
+                    </a:p>
+                  </a:txBody>
+                  <a:tcPr/>
+                </a:tc>
+                <a:extLst>
+                  <a:ext uri="{0D108BD9-81ED-4DB2-BD59-A6C34878D82A}">
+                    <a16:rowId xmlns:a16="http://schemas.microsoft.com/office/drawing/2014/main" val="1622126826"/>
+                  </a:ext>
+                </a:extLst>
+              </a:tr>
+              <a:tr h="370840">
+                <a:tc>
+                  <a:txBody>
+                    <a:bodyPr/>
+                    <a:lstStyle/>
+                    <a:p>
+                      <a:r>
+                        <a:rPr lang="it-IT" dirty="0"/>
+                        <a:t>LCS</a:t>
+                      </a:r>
+                    </a:p>
+                  </a:txBody>
+                  <a:tcPr/>
+                </a:tc>
+                <a:tc>
+                  <a:txBody>
+                    <a:bodyPr/>
+                    <a:lstStyle/>
+                    <a:p>
+                      <a:r>
+                        <a:rPr lang="it-IT" dirty="0"/>
+                        <a:t>0,78</a:t>
+                      </a:r>
+                    </a:p>
+                  </a:txBody>
+                  <a:tcPr/>
+                </a:tc>
+                <a:tc>
+                  <a:txBody>
+                    <a:bodyPr/>
+                    <a:lstStyle/>
+                    <a:p>
+                      <a:r>
+                        <a:rPr lang="it-IT" dirty="0"/>
+                        <a:t>[0.76,0.81]</a:t>
+                      </a:r>
+                    </a:p>
+                  </a:txBody>
+                  <a:tcPr/>
+                </a:tc>
+                <a:extLst>
+                  <a:ext uri="{0D108BD9-81ED-4DB2-BD59-A6C34878D82A}">
+                    <a16:rowId xmlns:a16="http://schemas.microsoft.com/office/drawing/2014/main" val="463369608"/>
+                  </a:ext>
+                </a:extLst>
+              </a:tr>
+              <a:tr h="370840">
+                <a:tc>
+                  <a:txBody>
+                    <a:bodyPr/>
+                    <a:lstStyle/>
+                    <a:p>
+                      <a:r>
+                        <a:rPr lang="it-IT" dirty="0"/>
+                        <a:t>CRYSTAL BLEU</a:t>
+                      </a:r>
+                    </a:p>
+                  </a:txBody>
+                  <a:tcPr/>
+                </a:tc>
+                <a:tc>
+                  <a:txBody>
+                    <a:bodyPr/>
+                    <a:lstStyle/>
+                    <a:p>
+                      <a:r>
+                        <a:rPr lang="it-IT" dirty="0"/>
+                        <a:t>0,60</a:t>
+                      </a:r>
+                    </a:p>
+                  </a:txBody>
+                  <a:tcPr/>
+                </a:tc>
+                <a:tc>
+                  <a:txBody>
+                    <a:bodyPr/>
+                    <a:lstStyle/>
+                    <a:p>
+                      <a:r>
+                        <a:rPr lang="it-IT" dirty="0"/>
+                        <a:t>[0.56,0.64]</a:t>
+                      </a:r>
+                    </a:p>
+                  </a:txBody>
+                  <a:tcPr/>
+                </a:tc>
+                <a:extLst>
+                  <a:ext uri="{0D108BD9-81ED-4DB2-BD59-A6C34878D82A}">
+                    <a16:rowId xmlns:a16="http://schemas.microsoft.com/office/drawing/2014/main" val="3532095965"/>
+                  </a:ext>
+                </a:extLst>
+              </a:tr>
+              <a:tr h="370840">
+                <a:tc>
+                  <a:txBody>
+                    <a:bodyPr/>
+                    <a:lstStyle/>
+                    <a:p>
+                      <a:r>
+                        <a:rPr lang="it-IT" dirty="0"/>
+                        <a:t>SACRE BLEU</a:t>
+                      </a:r>
+                    </a:p>
+                  </a:txBody>
+                  <a:tcPr/>
+                </a:tc>
+                <a:tc>
+                  <a:txBody>
+                    <a:bodyPr/>
+                    <a:lstStyle/>
+                    <a:p>
+                      <a:r>
+                        <a:rPr lang="it-IT" dirty="0"/>
+                        <a:t>0,88</a:t>
+                      </a:r>
+                    </a:p>
+                  </a:txBody>
+                  <a:tcPr/>
+                </a:tc>
+                <a:tc>
+                  <a:txBody>
+                    <a:bodyPr/>
+                    <a:lstStyle/>
+                    <a:p>
+                      <a:r>
+                        <a:rPr lang="it-IT" dirty="0"/>
+                        <a:t>[0.87,0.9]</a:t>
+                      </a:r>
+                    </a:p>
+                  </a:txBody>
+                  <a:tcPr/>
+                </a:tc>
+                <a:extLst>
+                  <a:ext uri="{0D108BD9-81ED-4DB2-BD59-A6C34878D82A}">
+                    <a16:rowId xmlns:a16="http://schemas.microsoft.com/office/drawing/2014/main" val="2553141499"/>
+                  </a:ext>
+                </a:extLst>
+              </a:tr>
+              <a:tr h="370840">
+                <a:tc>
+                  <a:txBody>
+                    <a:bodyPr/>
+                    <a:lstStyle/>
+                    <a:p>
+                      <a:r>
+                        <a:rPr lang="it-IT" dirty="0"/>
+                        <a:t>ROUGE</a:t>
+                      </a:r>
+                    </a:p>
+                  </a:txBody>
+                  <a:tcPr/>
+                </a:tc>
+                <a:tc>
+                  <a:txBody>
+                    <a:bodyPr/>
+                    <a:lstStyle/>
+                    <a:p>
+                      <a:r>
+                        <a:rPr lang="it-IT" dirty="0"/>
+                        <a:t>0,69</a:t>
+                      </a:r>
+                    </a:p>
+                  </a:txBody>
+                  <a:tcPr/>
+                </a:tc>
+                <a:tc>
+                  <a:txBody>
+                    <a:bodyPr/>
+                    <a:lstStyle/>
+                    <a:p>
+                      <a:r>
+                        <a:rPr lang="it-IT" dirty="0"/>
+                        <a:t>[0.67,0.73]</a:t>
+                      </a:r>
+                    </a:p>
+                  </a:txBody>
+                  <a:tcPr/>
+                </a:tc>
+                <a:extLst>
+                  <a:ext uri="{0D108BD9-81ED-4DB2-BD59-A6C34878D82A}">
+                    <a16:rowId xmlns:a16="http://schemas.microsoft.com/office/drawing/2014/main" val="2304673378"/>
+                  </a:ext>
+                </a:extLst>
+              </a:tr>
+            </a:tbl>
+          </a:graphicData>
+        </a:graphic>
+      </p:graphicFrame>
     </p:spTree>
     <p:extLst>
       <p:ext uri="{BB962C8B-B14F-4D97-AF65-F5344CB8AC3E}">

</xml_diff>